<commit_message>
Insertion of wing and elevator span calculation lines
</commit_message>
<xml_diff>
--- a/TechnicalReport/Figures.pptx
+++ b/TechnicalReport/Figures.pptx
@@ -262,7 +262,7 @@
           <a:p>
             <a:fld id="{C1A24063-2F13-4A0D-BF3F-218053084915}" type="datetimeFigureOut">
               <a:rPr lang="en-US" smtClean="0"/>
-              <a:t>1/2/2023</a:t>
+              <a:t>1/4/2023</a:t>
             </a:fld>
             <a:endParaRPr lang="en-US"/>
           </a:p>
@@ -460,7 +460,7 @@
           <a:p>
             <a:fld id="{C1A24063-2F13-4A0D-BF3F-218053084915}" type="datetimeFigureOut">
               <a:rPr lang="en-US" smtClean="0"/>
-              <a:t>1/2/2023</a:t>
+              <a:t>1/4/2023</a:t>
             </a:fld>
             <a:endParaRPr lang="en-US"/>
           </a:p>
@@ -668,7 +668,7 @@
           <a:p>
             <a:fld id="{C1A24063-2F13-4A0D-BF3F-218053084915}" type="datetimeFigureOut">
               <a:rPr lang="en-US" smtClean="0"/>
-              <a:t>1/2/2023</a:t>
+              <a:t>1/4/2023</a:t>
             </a:fld>
             <a:endParaRPr lang="en-US"/>
           </a:p>
@@ -866,7 +866,7 @@
           <a:p>
             <a:fld id="{C1A24063-2F13-4A0D-BF3F-218053084915}" type="datetimeFigureOut">
               <a:rPr lang="en-US" smtClean="0"/>
-              <a:t>1/2/2023</a:t>
+              <a:t>1/4/2023</a:t>
             </a:fld>
             <a:endParaRPr lang="en-US"/>
           </a:p>
@@ -1141,7 +1141,7 @@
           <a:p>
             <a:fld id="{C1A24063-2F13-4A0D-BF3F-218053084915}" type="datetimeFigureOut">
               <a:rPr lang="en-US" smtClean="0"/>
-              <a:t>1/2/2023</a:t>
+              <a:t>1/4/2023</a:t>
             </a:fld>
             <a:endParaRPr lang="en-US"/>
           </a:p>
@@ -1406,7 +1406,7 @@
           <a:p>
             <a:fld id="{C1A24063-2F13-4A0D-BF3F-218053084915}" type="datetimeFigureOut">
               <a:rPr lang="en-US" smtClean="0"/>
-              <a:t>1/2/2023</a:t>
+              <a:t>1/4/2023</a:t>
             </a:fld>
             <a:endParaRPr lang="en-US"/>
           </a:p>
@@ -1818,7 +1818,7 @@
           <a:p>
             <a:fld id="{C1A24063-2F13-4A0D-BF3F-218053084915}" type="datetimeFigureOut">
               <a:rPr lang="en-US" smtClean="0"/>
-              <a:t>1/2/2023</a:t>
+              <a:t>1/4/2023</a:t>
             </a:fld>
             <a:endParaRPr lang="en-US"/>
           </a:p>
@@ -1959,7 +1959,7 @@
           <a:p>
             <a:fld id="{C1A24063-2F13-4A0D-BF3F-218053084915}" type="datetimeFigureOut">
               <a:rPr lang="en-US" smtClean="0"/>
-              <a:t>1/2/2023</a:t>
+              <a:t>1/4/2023</a:t>
             </a:fld>
             <a:endParaRPr lang="en-US"/>
           </a:p>
@@ -2072,7 +2072,7 @@
           <a:p>
             <a:fld id="{C1A24063-2F13-4A0D-BF3F-218053084915}" type="datetimeFigureOut">
               <a:rPr lang="en-US" smtClean="0"/>
-              <a:t>1/2/2023</a:t>
+              <a:t>1/4/2023</a:t>
             </a:fld>
             <a:endParaRPr lang="en-US"/>
           </a:p>
@@ -2383,7 +2383,7 @@
           <a:p>
             <a:fld id="{C1A24063-2F13-4A0D-BF3F-218053084915}" type="datetimeFigureOut">
               <a:rPr lang="en-US" smtClean="0"/>
-              <a:t>1/2/2023</a:t>
+              <a:t>1/4/2023</a:t>
             </a:fld>
             <a:endParaRPr lang="en-US"/>
           </a:p>
@@ -2671,7 +2671,7 @@
           <a:p>
             <a:fld id="{C1A24063-2F13-4A0D-BF3F-218053084915}" type="datetimeFigureOut">
               <a:rPr lang="en-US" smtClean="0"/>
-              <a:t>1/2/2023</a:t>
+              <a:t>1/4/2023</a:t>
             </a:fld>
             <a:endParaRPr lang="en-US"/>
           </a:p>
@@ -2912,7 +2912,7 @@
           <a:p>
             <a:fld id="{C1A24063-2F13-4A0D-BF3F-218053084915}" type="datetimeFigureOut">
               <a:rPr lang="en-US" smtClean="0"/>
-              <a:t>1/2/2023</a:t>
+              <a:t>1/4/2023</a:t>
             </a:fld>
             <a:endParaRPr lang="en-US"/>
           </a:p>
@@ -4333,8 +4333,8 @@
           </a:fontRef>
         </p:style>
       </p:cxnSp>
-      <mc:AlternateContent xmlns:mc="http://schemas.openxmlformats.org/markup-compatibility/2006">
-        <mc:Choice xmlns:a14="http://schemas.microsoft.com/office/drawing/2010/main" Requires="a14">
+      <mc:AlternateContent xmlns:mc="http://schemas.openxmlformats.org/markup-compatibility/2006" xmlns:a14="http://schemas.microsoft.com/office/drawing/2010/main">
+        <mc:Choice Requires="a14">
           <p:sp>
             <p:nvSpPr>
               <p:cNvPr id="61" name="TextBox 60">
@@ -4446,7 +4446,7 @@
             </p:txBody>
           </p:sp>
         </mc:Choice>
-        <mc:Fallback>
+        <mc:Fallback xmlns="">
           <p:sp>
             <p:nvSpPr>
               <p:cNvPr id="61" name="TextBox 60">
@@ -4536,8 +4536,8 @@
           </a:fontRef>
         </p:style>
       </p:cxnSp>
-      <mc:AlternateContent xmlns:mc="http://schemas.openxmlformats.org/markup-compatibility/2006">
-        <mc:Choice xmlns:a14="http://schemas.microsoft.com/office/drawing/2010/main" Requires="a14">
+      <mc:AlternateContent xmlns:mc="http://schemas.openxmlformats.org/markup-compatibility/2006" xmlns:a14="http://schemas.microsoft.com/office/drawing/2010/main">
+        <mc:Choice Requires="a14">
           <p:sp>
             <p:nvSpPr>
               <p:cNvPr id="65" name="TextBox 64">
@@ -4640,7 +4640,7 @@
             </p:txBody>
           </p:sp>
         </mc:Choice>
-        <mc:Fallback>
+        <mc:Fallback xmlns="">
           <p:sp>
             <p:nvSpPr>
               <p:cNvPr id="65" name="TextBox 64">
@@ -4730,8 +4730,8 @@
           </a:fontRef>
         </p:style>
       </p:cxnSp>
-      <mc:AlternateContent xmlns:mc="http://schemas.openxmlformats.org/markup-compatibility/2006">
-        <mc:Choice xmlns:a14="http://schemas.microsoft.com/office/drawing/2010/main" Requires="a14">
+      <mc:AlternateContent xmlns:mc="http://schemas.openxmlformats.org/markup-compatibility/2006" xmlns:a14="http://schemas.microsoft.com/office/drawing/2010/main">
+        <mc:Choice Requires="a14">
           <p:sp>
             <p:nvSpPr>
               <p:cNvPr id="72" name="TextBox 71">
@@ -4834,7 +4834,7 @@
             </p:txBody>
           </p:sp>
         </mc:Choice>
-        <mc:Fallback>
+        <mc:Fallback xmlns="">
           <p:sp>
             <p:nvSpPr>
               <p:cNvPr id="72" name="TextBox 71">
@@ -4924,8 +4924,8 @@
           </a:fontRef>
         </p:style>
       </p:cxnSp>
-      <mc:AlternateContent xmlns:mc="http://schemas.openxmlformats.org/markup-compatibility/2006">
-        <mc:Choice xmlns:a14="http://schemas.microsoft.com/office/drawing/2010/main" Requires="a14">
+      <mc:AlternateContent xmlns:mc="http://schemas.openxmlformats.org/markup-compatibility/2006" xmlns:a14="http://schemas.microsoft.com/office/drawing/2010/main">
+        <mc:Choice Requires="a14">
           <p:sp>
             <p:nvSpPr>
               <p:cNvPr id="86" name="TextBox 85">
@@ -5028,7 +5028,7 @@
             </p:txBody>
           </p:sp>
         </mc:Choice>
-        <mc:Fallback>
+        <mc:Fallback xmlns="">
           <p:sp>
             <p:nvSpPr>
               <p:cNvPr id="86" name="TextBox 85">
@@ -5207,8 +5207,8 @@
           </a:fontRef>
         </p:style>
       </p:cxnSp>
-      <mc:AlternateContent xmlns:mc="http://schemas.openxmlformats.org/markup-compatibility/2006">
-        <mc:Choice xmlns:a14="http://schemas.microsoft.com/office/drawing/2010/main" Requires="a14">
+      <mc:AlternateContent xmlns:mc="http://schemas.openxmlformats.org/markup-compatibility/2006" xmlns:a14="http://schemas.microsoft.com/office/drawing/2010/main">
+        <mc:Choice Requires="a14">
           <p:sp>
             <p:nvSpPr>
               <p:cNvPr id="118" name="TextBox 117">
@@ -5311,7 +5311,7 @@
             </p:txBody>
           </p:sp>
         </mc:Choice>
-        <mc:Fallback>
+        <mc:Fallback xmlns="">
           <p:sp>
             <p:nvSpPr>
               <p:cNvPr id="118" name="TextBox 117">
@@ -5401,8 +5401,8 @@
           </a:fontRef>
         </p:style>
       </p:cxnSp>
-      <mc:AlternateContent xmlns:mc="http://schemas.openxmlformats.org/markup-compatibility/2006">
-        <mc:Choice xmlns:a14="http://schemas.microsoft.com/office/drawing/2010/main" Requires="a14">
+      <mc:AlternateContent xmlns:mc="http://schemas.openxmlformats.org/markup-compatibility/2006" xmlns:a14="http://schemas.microsoft.com/office/drawing/2010/main">
+        <mc:Choice Requires="a14">
           <p:sp>
             <p:nvSpPr>
               <p:cNvPr id="121" name="TextBox 120">
@@ -5505,7 +5505,7 @@
             </p:txBody>
           </p:sp>
         </mc:Choice>
-        <mc:Fallback>
+        <mc:Fallback xmlns="">
           <p:sp>
             <p:nvSpPr>
               <p:cNvPr id="121" name="TextBox 120">
@@ -5595,8 +5595,8 @@
           </a:fontRef>
         </p:style>
       </p:cxnSp>
-      <mc:AlternateContent xmlns:mc="http://schemas.openxmlformats.org/markup-compatibility/2006">
-        <mc:Choice xmlns:a14="http://schemas.microsoft.com/office/drawing/2010/main" Requires="a14">
+      <mc:AlternateContent xmlns:mc="http://schemas.openxmlformats.org/markup-compatibility/2006" xmlns:a14="http://schemas.microsoft.com/office/drawing/2010/main">
+        <mc:Choice Requires="a14">
           <p:sp>
             <p:nvSpPr>
               <p:cNvPr id="125" name="TextBox 124">
@@ -5699,7 +5699,7 @@
             </p:txBody>
           </p:sp>
         </mc:Choice>
-        <mc:Fallback>
+        <mc:Fallback xmlns="">
           <p:sp>
             <p:nvSpPr>
               <p:cNvPr id="125" name="TextBox 124">
@@ -5789,8 +5789,8 @@
           </a:fontRef>
         </p:style>
       </p:cxnSp>
-      <mc:AlternateContent xmlns:mc="http://schemas.openxmlformats.org/markup-compatibility/2006">
-        <mc:Choice xmlns:a14="http://schemas.microsoft.com/office/drawing/2010/main" Requires="a14">
+      <mc:AlternateContent xmlns:mc="http://schemas.openxmlformats.org/markup-compatibility/2006" xmlns:a14="http://schemas.microsoft.com/office/drawing/2010/main">
+        <mc:Choice Requires="a14">
           <p:sp>
             <p:nvSpPr>
               <p:cNvPr id="133" name="TextBox 132">
@@ -5893,7 +5893,7 @@
             </p:txBody>
           </p:sp>
         </mc:Choice>
-        <mc:Fallback>
+        <mc:Fallback xmlns="">
           <p:sp>
             <p:nvSpPr>
               <p:cNvPr id="133" name="TextBox 132">
@@ -5938,8 +5938,8 @@
           </p:sp>
         </mc:Fallback>
       </mc:AlternateContent>
-      <mc:AlternateContent xmlns:mc="http://schemas.openxmlformats.org/markup-compatibility/2006">
-        <mc:Choice xmlns:a14="http://schemas.microsoft.com/office/drawing/2010/main" Requires="a14">
+      <mc:AlternateContent xmlns:mc="http://schemas.openxmlformats.org/markup-compatibility/2006" xmlns:a14="http://schemas.microsoft.com/office/drawing/2010/main">
+        <mc:Choice Requires="a14">
           <p:sp>
             <p:nvSpPr>
               <p:cNvPr id="134" name="TextBox 133">
@@ -6042,7 +6042,7 @@
             </p:txBody>
           </p:sp>
         </mc:Choice>
-        <mc:Fallback>
+        <mc:Fallback xmlns="">
           <p:sp>
             <p:nvSpPr>
               <p:cNvPr id="134" name="TextBox 133">
@@ -6271,8 +6271,8 @@
           </a:fontRef>
         </p:style>
       </p:cxnSp>
-      <mc:AlternateContent xmlns:mc="http://schemas.openxmlformats.org/markup-compatibility/2006">
-        <mc:Choice xmlns:a14="http://schemas.microsoft.com/office/drawing/2010/main" Requires="a14">
+      <mc:AlternateContent xmlns:mc="http://schemas.openxmlformats.org/markup-compatibility/2006" xmlns:a14="http://schemas.microsoft.com/office/drawing/2010/main">
+        <mc:Choice Requires="a14">
           <p:sp>
             <p:nvSpPr>
               <p:cNvPr id="148" name="TextBox 147">
@@ -6352,7 +6352,7 @@
             </p:txBody>
           </p:sp>
         </mc:Choice>
-        <mc:Fallback>
+        <mc:Fallback xmlns="">
           <p:sp>
             <p:nvSpPr>
               <p:cNvPr id="148" name="TextBox 147">
@@ -6638,8 +6638,8 @@
           </a:p>
         </p:txBody>
       </p:sp>
-      <mc:AlternateContent xmlns:mc="http://schemas.openxmlformats.org/markup-compatibility/2006">
-        <mc:Choice xmlns:a14="http://schemas.microsoft.com/office/drawing/2010/main" Requires="a14">
+      <mc:AlternateContent xmlns:mc="http://schemas.openxmlformats.org/markup-compatibility/2006" xmlns:a14="http://schemas.microsoft.com/office/drawing/2010/main">
+        <mc:Choice Requires="a14">
           <p:sp>
             <p:nvSpPr>
               <p:cNvPr id="12" name="TextBox 11">
@@ -6721,7 +6721,7 @@
             </p:txBody>
           </p:sp>
         </mc:Choice>
-        <mc:Fallback>
+        <mc:Fallback xmlns="">
           <p:sp>
             <p:nvSpPr>
               <p:cNvPr id="12" name="TextBox 11">
@@ -6766,8 +6766,8 @@
           </p:sp>
         </mc:Fallback>
       </mc:AlternateContent>
-      <mc:AlternateContent xmlns:mc="http://schemas.openxmlformats.org/markup-compatibility/2006">
-        <mc:Choice xmlns:a14="http://schemas.microsoft.com/office/drawing/2010/main" Requires="a14">
+      <mc:AlternateContent xmlns:mc="http://schemas.openxmlformats.org/markup-compatibility/2006" xmlns:a14="http://schemas.microsoft.com/office/drawing/2010/main">
+        <mc:Choice Requires="a14">
           <p:sp>
             <p:nvSpPr>
               <p:cNvPr id="13" name="TextBox 12">
@@ -6852,7 +6852,7 @@
             </p:txBody>
           </p:sp>
         </mc:Choice>
-        <mc:Fallback>
+        <mc:Fallback xmlns="">
           <p:sp>
             <p:nvSpPr>
               <p:cNvPr id="13" name="TextBox 12">
@@ -6897,6 +6897,178 @@
           </p:sp>
         </mc:Fallback>
       </mc:AlternateContent>
+      <mc:AlternateContent xmlns:mc="http://schemas.openxmlformats.org/markup-compatibility/2006">
+        <mc:Choice xmlns:a14="http://schemas.microsoft.com/office/drawing/2010/main" Requires="a14">
+          <p:sp>
+            <p:nvSpPr>
+              <p:cNvPr id="2" name="TextBox 1">
+                <a:extLst>
+                  <a:ext uri="{FF2B5EF4-FFF2-40B4-BE49-F238E27FC236}">
+                    <a16:creationId xmlns:a16="http://schemas.microsoft.com/office/drawing/2014/main" id="{94584DC7-F888-D0E5-C52F-D840C3DFC295}"/>
+                  </a:ext>
+                </a:extLst>
+              </p:cNvPr>
+              <p:cNvSpPr txBox="1"/>
+              <p:nvPr/>
+            </p:nvSpPr>
+            <p:spPr>
+              <a:xfrm>
+                <a:off x="3659134" y="3415437"/>
+                <a:ext cx="920476" cy="276999"/>
+              </a:xfrm>
+              <a:prstGeom prst="rect">
+                <a:avLst/>
+              </a:prstGeom>
+              <a:solidFill>
+                <a:schemeClr val="bg1"/>
+              </a:solidFill>
+            </p:spPr>
+            <p:txBody>
+              <a:bodyPr wrap="square" rtlCol="0">
+                <a:spAutoFit/>
+              </a:bodyPr>
+              <a:lstStyle/>
+              <a:p>
+                <a:pPr/>
+                <a14:m>
+                  <m:oMathPara xmlns:m="http://schemas.openxmlformats.org/officeDocument/2006/math">
+                    <m:oMathParaPr>
+                      <m:jc m:val="centerGroup"/>
+                    </m:oMathParaPr>
+                    <m:oMath xmlns:m="http://schemas.openxmlformats.org/officeDocument/2006/math">
+                      <m:r>
+                        <a:rPr lang="en-US" sz="1200" i="1" smtClean="0">
+                          <a:latin typeface="Cambria Math" panose="02040503050406030204" pitchFamily="18" charset="0"/>
+                        </a:rPr>
+                        <m:t>1</m:t>
+                      </m:r>
+                      <m:r>
+                        <a:rPr lang="en-US" sz="1200" b="0" i="1" smtClean="0">
+                          <a:latin typeface="Cambria Math" panose="02040503050406030204" pitchFamily="18" charset="0"/>
+                        </a:rPr>
+                        <m:t>397</m:t>
+                      </m:r>
+                      <m:r>
+                        <a:rPr lang="en-US" sz="1200" b="0" i="1" smtClean="0">
+                          <a:solidFill>
+                            <a:schemeClr val="tx1"/>
+                          </a:solidFill>
+                          <a:latin typeface="Cambria Math" panose="02040503050406030204" pitchFamily="18" charset="0"/>
+                        </a:rPr>
+                        <m:t> [</m:t>
+                      </m:r>
+                      <m:r>
+                        <a:rPr lang="en-US" sz="1200" b="0" i="1" smtClean="0">
+                          <a:solidFill>
+                            <a:schemeClr val="tx1"/>
+                          </a:solidFill>
+                          <a:latin typeface="Cambria Math" panose="02040503050406030204" pitchFamily="18" charset="0"/>
+                        </a:rPr>
+                        <m:t>𝑚𝑚</m:t>
+                      </m:r>
+                      <m:r>
+                        <a:rPr lang="en-US" sz="1200" b="0" i="1" smtClean="0">
+                          <a:solidFill>
+                            <a:schemeClr val="tx1"/>
+                          </a:solidFill>
+                          <a:latin typeface="Cambria Math" panose="02040503050406030204" pitchFamily="18" charset="0"/>
+                        </a:rPr>
+                        <m:t>]</m:t>
+                      </m:r>
+                    </m:oMath>
+                  </m:oMathPara>
+                </a14:m>
+                <a:endParaRPr lang="en-US" dirty="0"/>
+              </a:p>
+            </p:txBody>
+          </p:sp>
+        </mc:Choice>
+        <mc:Fallback>
+          <p:sp>
+            <p:nvSpPr>
+              <p:cNvPr id="2" name="TextBox 1">
+                <a:extLst>
+                  <a:ext uri="{FF2B5EF4-FFF2-40B4-BE49-F238E27FC236}">
+                    <a16:creationId xmlns:a16="http://schemas.microsoft.com/office/drawing/2014/main" id="{94584DC7-F888-D0E5-C52F-D840C3DFC295}"/>
+                  </a:ext>
+                </a:extLst>
+              </p:cNvPr>
+              <p:cNvSpPr txBox="1">
+                <a:spLocks noRot="1" noChangeAspect="1" noMove="1" noResize="1" noEditPoints="1" noAdjustHandles="1" noChangeArrowheads="1" noChangeShapeType="1" noTextEdit="1"/>
+              </p:cNvSpPr>
+              <p:nvPr/>
+            </p:nvSpPr>
+            <p:spPr>
+              <a:xfrm>
+                <a:off x="3659134" y="3415437"/>
+                <a:ext cx="920476" cy="276999"/>
+              </a:xfrm>
+              <a:prstGeom prst="rect">
+                <a:avLst/>
+              </a:prstGeom>
+              <a:blipFill>
+                <a:blip r:embed="rId15"/>
+                <a:stretch>
+                  <a:fillRect b="-6522"/>
+                </a:stretch>
+              </a:blipFill>
+            </p:spPr>
+            <p:txBody>
+              <a:bodyPr/>
+              <a:lstStyle/>
+              <a:p>
+                <a:r>
+                  <a:rPr lang="en-US">
+                    <a:noFill/>
+                  </a:rPr>
+                  <a:t> </a:t>
+                </a:r>
+              </a:p>
+            </p:txBody>
+          </p:sp>
+        </mc:Fallback>
+      </mc:AlternateContent>
+      <p:cxnSp>
+        <p:nvCxnSpPr>
+          <p:cNvPr id="3" name="Straight Connector 2">
+            <a:extLst>
+              <a:ext uri="{FF2B5EF4-FFF2-40B4-BE49-F238E27FC236}">
+                <a16:creationId xmlns:a16="http://schemas.microsoft.com/office/drawing/2014/main" id="{B0D5E2BD-FDF7-A257-55F5-6095BA5DC53E}"/>
+              </a:ext>
+            </a:extLst>
+          </p:cNvPr>
+          <p:cNvCxnSpPr>
+            <a:cxnSpLocks/>
+          </p:cNvCxnSpPr>
+          <p:nvPr/>
+        </p:nvCxnSpPr>
+        <p:spPr>
+          <a:xfrm>
+            <a:off x="1631348" y="3684361"/>
+            <a:ext cx="1845276" cy="0"/>
+          </a:xfrm>
+          <a:prstGeom prst="line">
+            <a:avLst/>
+          </a:prstGeom>
+          <a:ln w="12700">
+            <a:prstDash val="dash"/>
+          </a:ln>
+        </p:spPr>
+        <p:style>
+          <a:lnRef idx="1">
+            <a:schemeClr val="dk1"/>
+          </a:lnRef>
+          <a:fillRef idx="0">
+            <a:schemeClr val="dk1"/>
+          </a:fillRef>
+          <a:effectRef idx="0">
+            <a:schemeClr val="dk1"/>
+          </a:effectRef>
+          <a:fontRef idx="minor">
+            <a:schemeClr val="tx1"/>
+          </a:fontRef>
+        </p:style>
+      </p:cxnSp>
     </p:spTree>
     <p:extLst>
       <p:ext uri="{BB962C8B-B14F-4D97-AF65-F5344CB8AC3E}">
@@ -7004,8 +7176,8 @@
           </a:fontRef>
         </p:style>
       </p:cxnSp>
-      <mc:AlternateContent xmlns:mc="http://schemas.openxmlformats.org/markup-compatibility/2006">
-        <mc:Choice xmlns:a14="http://schemas.microsoft.com/office/drawing/2010/main" Requires="a14">
+      <mc:AlternateContent xmlns:mc="http://schemas.openxmlformats.org/markup-compatibility/2006" xmlns:a14="http://schemas.microsoft.com/office/drawing/2010/main">
+        <mc:Choice Requires="a14">
           <p:sp>
             <p:nvSpPr>
               <p:cNvPr id="16" name="TextBox 15">
@@ -7092,7 +7264,7 @@
             </p:txBody>
           </p:sp>
         </mc:Choice>
-        <mc:Fallback>
+        <mc:Fallback xmlns="">
           <p:sp>
             <p:nvSpPr>
               <p:cNvPr id="16" name="TextBox 15">
@@ -7563,8 +7735,8 @@
           </a:fontRef>
         </p:style>
       </p:cxnSp>
-      <mc:AlternateContent xmlns:mc="http://schemas.openxmlformats.org/markup-compatibility/2006">
-        <mc:Choice xmlns:a14="http://schemas.microsoft.com/office/drawing/2010/main" Requires="a14">
+      <mc:AlternateContent xmlns:mc="http://schemas.openxmlformats.org/markup-compatibility/2006" xmlns:a14="http://schemas.microsoft.com/office/drawing/2010/main">
+        <mc:Choice Requires="a14">
           <p:sp>
             <p:nvSpPr>
               <p:cNvPr id="12" name="TextBox 11">
@@ -7651,7 +7823,7 @@
             </p:txBody>
           </p:sp>
         </mc:Choice>
-        <mc:Fallback>
+        <mc:Fallback xmlns="">
           <p:sp>
             <p:nvSpPr>
               <p:cNvPr id="12" name="TextBox 11">
@@ -8161,8 +8333,8 @@
           </a:fontRef>
         </p:style>
       </p:cxnSp>
-      <mc:AlternateContent xmlns:mc="http://schemas.openxmlformats.org/markup-compatibility/2006">
-        <mc:Choice xmlns:a14="http://schemas.microsoft.com/office/drawing/2010/main" Requires="a14">
+      <mc:AlternateContent xmlns:mc="http://schemas.openxmlformats.org/markup-compatibility/2006" xmlns:a14="http://schemas.microsoft.com/office/drawing/2010/main">
+        <mc:Choice Requires="a14">
           <p:sp>
             <p:nvSpPr>
               <p:cNvPr id="52" name="TextBox 51">
@@ -8249,7 +8421,7 @@
             </p:txBody>
           </p:sp>
         </mc:Choice>
-        <mc:Fallback>
+        <mc:Fallback xmlns="">
           <p:sp>
             <p:nvSpPr>
               <p:cNvPr id="52" name="TextBox 51">
@@ -8294,8 +8466,8 @@
           </p:sp>
         </mc:Fallback>
       </mc:AlternateContent>
-      <mc:AlternateContent xmlns:mc="http://schemas.openxmlformats.org/markup-compatibility/2006">
-        <mc:Choice xmlns:a14="http://schemas.microsoft.com/office/drawing/2010/main" Requires="a14">
+      <mc:AlternateContent xmlns:mc="http://schemas.openxmlformats.org/markup-compatibility/2006" xmlns:a14="http://schemas.microsoft.com/office/drawing/2010/main">
+        <mc:Choice Requires="a14">
           <p:sp>
             <p:nvSpPr>
               <p:cNvPr id="53" name="TextBox 52">
@@ -8382,7 +8554,7 @@
             </p:txBody>
           </p:sp>
         </mc:Choice>
-        <mc:Fallback>
+        <mc:Fallback xmlns="">
           <p:sp>
             <p:nvSpPr>
               <p:cNvPr id="53" name="TextBox 52">
@@ -8567,8 +8739,8 @@
           </a:fontRef>
         </p:style>
       </p:cxnSp>
-      <mc:AlternateContent xmlns:mc="http://schemas.openxmlformats.org/markup-compatibility/2006">
-        <mc:Choice xmlns:a14="http://schemas.microsoft.com/office/drawing/2010/main" Requires="a14">
+      <mc:AlternateContent xmlns:mc="http://schemas.openxmlformats.org/markup-compatibility/2006" xmlns:a14="http://schemas.microsoft.com/office/drawing/2010/main">
+        <mc:Choice Requires="a14">
           <p:sp>
             <p:nvSpPr>
               <p:cNvPr id="60" name="TextBox 59">
@@ -8655,7 +8827,7 @@
             </p:txBody>
           </p:sp>
         </mc:Choice>
-        <mc:Fallback>
+        <mc:Fallback xmlns="">
           <p:sp>
             <p:nvSpPr>
               <p:cNvPr id="60" name="TextBox 59">
@@ -8975,8 +9147,8 @@
           </a:p>
         </p:txBody>
       </p:sp>
-      <mc:AlternateContent xmlns:mc="http://schemas.openxmlformats.org/markup-compatibility/2006">
-        <mc:Choice xmlns:a14="http://schemas.microsoft.com/office/drawing/2010/main" Requires="a14">
+      <mc:AlternateContent xmlns:mc="http://schemas.openxmlformats.org/markup-compatibility/2006" xmlns:a14="http://schemas.microsoft.com/office/drawing/2010/main">
+        <mc:Choice Requires="a14">
           <p:sp>
             <p:nvSpPr>
               <p:cNvPr id="76" name="TextBox 75">
@@ -9061,7 +9233,7 @@
             </p:txBody>
           </p:sp>
         </mc:Choice>
-        <mc:Fallback>
+        <mc:Fallback xmlns="">
           <p:sp>
             <p:nvSpPr>
               <p:cNvPr id="76" name="TextBox 75">
@@ -9106,8 +9278,8 @@
           </p:sp>
         </mc:Fallback>
       </mc:AlternateContent>
-      <mc:AlternateContent xmlns:mc="http://schemas.openxmlformats.org/markup-compatibility/2006">
-        <mc:Choice xmlns:a14="http://schemas.microsoft.com/office/drawing/2010/main" Requires="a14">
+      <mc:AlternateContent xmlns:mc="http://schemas.openxmlformats.org/markup-compatibility/2006" xmlns:a14="http://schemas.microsoft.com/office/drawing/2010/main">
+        <mc:Choice Requires="a14">
           <p:sp>
             <p:nvSpPr>
               <p:cNvPr id="77" name="TextBox 76">
@@ -9192,7 +9364,7 @@
             </p:txBody>
           </p:sp>
         </mc:Choice>
-        <mc:Fallback>
+        <mc:Fallback xmlns="">
           <p:sp>
             <p:nvSpPr>
               <p:cNvPr id="77" name="TextBox 76">
@@ -10566,8 +10738,8 @@
           </a:fontRef>
         </p:style>
       </p:cxnSp>
-      <mc:AlternateContent xmlns:mc="http://schemas.openxmlformats.org/markup-compatibility/2006">
-        <mc:Choice xmlns:a14="http://schemas.microsoft.com/office/drawing/2010/main" Requires="a14">
+      <mc:AlternateContent xmlns:mc="http://schemas.openxmlformats.org/markup-compatibility/2006" xmlns:a14="http://schemas.microsoft.com/office/drawing/2010/main">
+        <mc:Choice Requires="a14">
           <p:sp>
             <p:nvSpPr>
               <p:cNvPr id="18" name="TextBox 17">
@@ -10670,7 +10842,7 @@
             </p:txBody>
           </p:sp>
         </mc:Choice>
-        <mc:Fallback>
+        <mc:Fallback xmlns="">
           <p:sp>
             <p:nvSpPr>
               <p:cNvPr id="18" name="TextBox 17">
@@ -10715,8 +10887,8 @@
           </p:sp>
         </mc:Fallback>
       </mc:AlternateContent>
-      <mc:AlternateContent xmlns:mc="http://schemas.openxmlformats.org/markup-compatibility/2006">
-        <mc:Choice xmlns:a14="http://schemas.microsoft.com/office/drawing/2010/main" Requires="a14">
+      <mc:AlternateContent xmlns:mc="http://schemas.openxmlformats.org/markup-compatibility/2006" xmlns:a14="http://schemas.microsoft.com/office/drawing/2010/main">
+        <mc:Choice Requires="a14">
           <p:sp>
             <p:nvSpPr>
               <p:cNvPr id="19" name="TextBox 18">
@@ -10794,16 +10966,7 @@
                                   </a:solidFill>
                                   <a:latin typeface="Cambria Math" panose="02040503050406030204" pitchFamily="18" charset="0"/>
                                 </a:rPr>
-                                <m:t>𝑤</m:t>
-                              </m:r>
-                              <m:r>
-                                <a:rPr lang="en-US" sz="1200" b="0" i="1" smtClean="0">
-                                  <a:solidFill>
-                                    <a:schemeClr val="accent1"/>
-                                  </a:solidFill>
-                                  <a:latin typeface="Cambria Math" panose="02040503050406030204" pitchFamily="18" charset="0"/>
-                                </a:rPr>
-                                <m:t>𝑓</m:t>
+                                <m:t>𝑤𝑓</m:t>
                               </m:r>
                             </m:e>
                             <m:sub>
@@ -10828,7 +10991,7 @@
             </p:txBody>
           </p:sp>
         </mc:Choice>
-        <mc:Fallback>
+        <mc:Fallback xmlns="">
           <p:sp>
             <p:nvSpPr>
               <p:cNvPr id="19" name="TextBox 18">
@@ -11008,8 +11171,8 @@
           </a:fontRef>
         </p:style>
       </p:cxnSp>
-      <mc:AlternateContent xmlns:mc="http://schemas.openxmlformats.org/markup-compatibility/2006">
-        <mc:Choice xmlns:a14="http://schemas.microsoft.com/office/drawing/2010/main" Requires="a14">
+      <mc:AlternateContent xmlns:mc="http://schemas.openxmlformats.org/markup-compatibility/2006" xmlns:a14="http://schemas.microsoft.com/office/drawing/2010/main">
+        <mc:Choice Requires="a14">
           <p:sp>
             <p:nvSpPr>
               <p:cNvPr id="26" name="TextBox 25">
@@ -11112,7 +11275,7 @@
             </p:txBody>
           </p:sp>
         </mc:Choice>
-        <mc:Fallback>
+        <mc:Fallback xmlns="">
           <p:sp>
             <p:nvSpPr>
               <p:cNvPr id="26" name="TextBox 25">
@@ -11202,8 +11365,8 @@
           </a:fontRef>
         </p:style>
       </p:cxnSp>
-      <mc:AlternateContent xmlns:mc="http://schemas.openxmlformats.org/markup-compatibility/2006">
-        <mc:Choice xmlns:a14="http://schemas.microsoft.com/office/drawing/2010/main" Requires="a14">
+      <mc:AlternateContent xmlns:mc="http://schemas.openxmlformats.org/markup-compatibility/2006" xmlns:a14="http://schemas.microsoft.com/office/drawing/2010/main">
+        <mc:Choice Requires="a14">
           <p:sp>
             <p:nvSpPr>
               <p:cNvPr id="30" name="TextBox 29">
@@ -11306,7 +11469,7 @@
             </p:txBody>
           </p:sp>
         </mc:Choice>
-        <mc:Fallback>
+        <mc:Fallback xmlns="">
           <p:sp>
             <p:nvSpPr>
               <p:cNvPr id="30" name="TextBox 29">
@@ -11351,8 +11514,8 @@
           </p:sp>
         </mc:Fallback>
       </mc:AlternateContent>
-      <mc:AlternateContent xmlns:mc="http://schemas.openxmlformats.org/markup-compatibility/2006">
-        <mc:Choice xmlns:a14="http://schemas.microsoft.com/office/drawing/2010/main" Requires="a14">
+      <mc:AlternateContent xmlns:mc="http://schemas.openxmlformats.org/markup-compatibility/2006" xmlns:a14="http://schemas.microsoft.com/office/drawing/2010/main">
+        <mc:Choice Requires="a14">
           <p:sp>
             <p:nvSpPr>
               <p:cNvPr id="35" name="TextBox 34">
@@ -11437,7 +11600,7 @@
             </p:txBody>
           </p:sp>
         </mc:Choice>
-        <mc:Fallback>
+        <mc:Fallback xmlns="">
           <p:sp>
             <p:nvSpPr>
               <p:cNvPr id="35" name="TextBox 34">
@@ -11621,8 +11784,8 @@
           </a:fontRef>
         </p:style>
       </p:cxnSp>
-      <mc:AlternateContent xmlns:mc="http://schemas.openxmlformats.org/markup-compatibility/2006">
-        <mc:Choice xmlns:a14="http://schemas.microsoft.com/office/drawing/2010/main" Requires="a14">
+      <mc:AlternateContent xmlns:mc="http://schemas.openxmlformats.org/markup-compatibility/2006" xmlns:a14="http://schemas.microsoft.com/office/drawing/2010/main">
+        <mc:Choice Requires="a14">
           <p:sp>
             <p:nvSpPr>
               <p:cNvPr id="48" name="TextBox 47">
@@ -11702,7 +11865,7 @@
             </p:txBody>
           </p:sp>
         </mc:Choice>
-        <mc:Fallback>
+        <mc:Fallback xmlns="">
           <p:sp>
             <p:nvSpPr>
               <p:cNvPr id="48" name="TextBox 47">
@@ -11792,8 +11955,8 @@
           </a:fontRef>
         </p:style>
       </p:cxnSp>
-      <mc:AlternateContent xmlns:mc="http://schemas.openxmlformats.org/markup-compatibility/2006">
-        <mc:Choice xmlns:a14="http://schemas.microsoft.com/office/drawing/2010/main" Requires="a14">
+      <mc:AlternateContent xmlns:mc="http://schemas.openxmlformats.org/markup-compatibility/2006" xmlns:a14="http://schemas.microsoft.com/office/drawing/2010/main">
+        <mc:Choice Requires="a14">
           <p:sp>
             <p:nvSpPr>
               <p:cNvPr id="59" name="TextBox 58">
@@ -11871,7 +12034,7 @@
             </p:txBody>
           </p:sp>
         </mc:Choice>
-        <mc:Fallback>
+        <mc:Fallback xmlns="">
           <p:sp>
             <p:nvSpPr>
               <p:cNvPr id="59" name="TextBox 58">

</xml_diff>

<commit_message>
Dimensioning in a working state
</commit_message>
<xml_diff>
--- a/TechnicalReport/Figures.pptx
+++ b/TechnicalReport/Figures.pptx
@@ -4333,8 +4333,8 @@
           </a:fontRef>
         </p:style>
       </p:cxnSp>
-      <mc:AlternateContent xmlns:mc="http://schemas.openxmlformats.org/markup-compatibility/2006" xmlns:a14="http://schemas.microsoft.com/office/drawing/2010/main">
-        <mc:Choice Requires="a14">
+      <mc:AlternateContent xmlns:mc="http://schemas.openxmlformats.org/markup-compatibility/2006">
+        <mc:Choice xmlns:a14="http://schemas.microsoft.com/office/drawing/2010/main" Requires="a14">
           <p:sp>
             <p:nvSpPr>
               <p:cNvPr id="61" name="TextBox 60">
@@ -4446,7 +4446,7 @@
             </p:txBody>
           </p:sp>
         </mc:Choice>
-        <mc:Fallback xmlns="">
+        <mc:Fallback>
           <p:sp>
             <p:nvSpPr>
               <p:cNvPr id="61" name="TextBox 60">
@@ -7069,6 +7069,782 @@
           </a:fontRef>
         </p:style>
       </p:cxnSp>
+      <mc:AlternateContent xmlns:mc="http://schemas.openxmlformats.org/markup-compatibility/2006">
+        <mc:Choice xmlns:a14="http://schemas.microsoft.com/office/drawing/2010/main" Requires="a14">
+          <p:sp>
+            <p:nvSpPr>
+              <p:cNvPr id="15" name="TextBox 14">
+                <a:extLst>
+                  <a:ext uri="{FF2B5EF4-FFF2-40B4-BE49-F238E27FC236}">
+                    <a16:creationId xmlns:a16="http://schemas.microsoft.com/office/drawing/2014/main" id="{44431998-9F13-0466-10C4-526B9C30E364}"/>
+                  </a:ext>
+                </a:extLst>
+              </p:cNvPr>
+              <p:cNvSpPr txBox="1"/>
+              <p:nvPr/>
+            </p:nvSpPr>
+            <p:spPr>
+              <a:xfrm>
+                <a:off x="1226959" y="3781827"/>
+                <a:ext cx="345529" cy="292901"/>
+              </a:xfrm>
+              <a:prstGeom prst="rect">
+                <a:avLst/>
+              </a:prstGeom>
+              <a:noFill/>
+            </p:spPr>
+            <p:txBody>
+              <a:bodyPr wrap="square" rtlCol="0">
+                <a:spAutoFit/>
+              </a:bodyPr>
+              <a:lstStyle/>
+              <a:p>
+                <a:pPr/>
+                <a14:m>
+                  <m:oMathPara xmlns:m="http://schemas.openxmlformats.org/officeDocument/2006/math">
+                    <m:oMathParaPr>
+                      <m:jc m:val="centerGroup"/>
+                    </m:oMathParaPr>
+                    <m:oMath xmlns:m="http://schemas.openxmlformats.org/officeDocument/2006/math">
+                      <m:sSub>
+                        <m:sSubPr>
+                          <m:ctrlPr>
+                            <a:rPr lang="en-US" sz="1200" b="0" i="1" smtClean="0">
+                              <a:solidFill>
+                                <a:schemeClr val="accent1"/>
+                              </a:solidFill>
+                              <a:latin typeface="Cambria Math" panose="02040503050406030204" pitchFamily="18" charset="0"/>
+                            </a:rPr>
+                          </m:ctrlPr>
+                        </m:sSubPr>
+                        <m:e>
+                          <m:r>
+                            <a:rPr lang="en-US" sz="1200" b="0" i="1" smtClean="0">
+                              <a:solidFill>
+                                <a:schemeClr val="accent1"/>
+                              </a:solidFill>
+                              <a:latin typeface="Cambria Math" panose="02040503050406030204" pitchFamily="18" charset="0"/>
+                            </a:rPr>
+                            <m:t>𝑆</m:t>
+                          </m:r>
+                        </m:e>
+                        <m:sub>
+                          <m:sSub>
+                            <m:sSubPr>
+                              <m:ctrlPr>
+                                <a:rPr lang="en-US" sz="1200" b="0" i="1" smtClean="0">
+                                  <a:solidFill>
+                                    <a:schemeClr val="accent1"/>
+                                  </a:solidFill>
+                                  <a:latin typeface="Cambria Math" panose="02040503050406030204" pitchFamily="18" charset="0"/>
+                                </a:rPr>
+                              </m:ctrlPr>
+                            </m:sSubPr>
+                            <m:e>
+                              <m:r>
+                                <a:rPr lang="en-US" sz="1200" b="0" i="1" smtClean="0">
+                                  <a:solidFill>
+                                    <a:schemeClr val="accent1"/>
+                                  </a:solidFill>
+                                  <a:latin typeface="Cambria Math" panose="02040503050406030204" pitchFamily="18" charset="0"/>
+                                </a:rPr>
+                                <m:t>𝑤</m:t>
+                              </m:r>
+                            </m:e>
+                            <m:sub>
+                              <m:r>
+                                <a:rPr lang="en-US" sz="1200" b="0" i="1" smtClean="0">
+                                  <a:solidFill>
+                                    <a:schemeClr val="accent1"/>
+                                  </a:solidFill>
+                                  <a:latin typeface="Cambria Math" panose="02040503050406030204" pitchFamily="18" charset="0"/>
+                                </a:rPr>
+                                <m:t>2</m:t>
+                              </m:r>
+                            </m:sub>
+                          </m:sSub>
+                        </m:sub>
+                      </m:sSub>
+                    </m:oMath>
+                  </m:oMathPara>
+                </a14:m>
+                <a:endParaRPr lang="en-US" dirty="0"/>
+              </a:p>
+            </p:txBody>
+          </p:sp>
+        </mc:Choice>
+        <mc:Fallback>
+          <p:sp>
+            <p:nvSpPr>
+              <p:cNvPr id="15" name="TextBox 14">
+                <a:extLst>
+                  <a:ext uri="{FF2B5EF4-FFF2-40B4-BE49-F238E27FC236}">
+                    <a16:creationId xmlns:a16="http://schemas.microsoft.com/office/drawing/2014/main" id="{44431998-9F13-0466-10C4-526B9C30E364}"/>
+                  </a:ext>
+                </a:extLst>
+              </p:cNvPr>
+              <p:cNvSpPr txBox="1">
+                <a:spLocks noRot="1" noChangeAspect="1" noMove="1" noResize="1" noEditPoints="1" noAdjustHandles="1" noChangeArrowheads="1" noChangeShapeType="1" noTextEdit="1"/>
+              </p:cNvSpPr>
+              <p:nvPr/>
+            </p:nvSpPr>
+            <p:spPr>
+              <a:xfrm>
+                <a:off x="1226959" y="3781827"/>
+                <a:ext cx="345529" cy="292901"/>
+              </a:xfrm>
+              <a:prstGeom prst="rect">
+                <a:avLst/>
+              </a:prstGeom>
+              <a:blipFill>
+                <a:blip r:embed="rId16"/>
+                <a:stretch>
+                  <a:fillRect/>
+                </a:stretch>
+              </a:blipFill>
+            </p:spPr>
+            <p:txBody>
+              <a:bodyPr/>
+              <a:lstStyle/>
+              <a:p>
+                <a:r>
+                  <a:rPr lang="en-US">
+                    <a:noFill/>
+                  </a:rPr>
+                  <a:t> </a:t>
+                </a:r>
+              </a:p>
+            </p:txBody>
+          </p:sp>
+        </mc:Fallback>
+      </mc:AlternateContent>
+      <p:cxnSp>
+        <p:nvCxnSpPr>
+          <p:cNvPr id="16" name="Straight Arrow Connector 15">
+            <a:extLst>
+              <a:ext uri="{FF2B5EF4-FFF2-40B4-BE49-F238E27FC236}">
+                <a16:creationId xmlns:a16="http://schemas.microsoft.com/office/drawing/2014/main" id="{FEC6AD89-91CD-FDD9-E94C-7F72A289E7B6}"/>
+              </a:ext>
+            </a:extLst>
+          </p:cNvPr>
+          <p:cNvCxnSpPr>
+            <a:cxnSpLocks/>
+          </p:cNvCxnSpPr>
+          <p:nvPr/>
+        </p:nvCxnSpPr>
+        <p:spPr>
+          <a:xfrm flipV="1">
+            <a:off x="1713459" y="3684361"/>
+            <a:ext cx="8379" cy="846254"/>
+          </a:xfrm>
+          <a:prstGeom prst="straightConnector1">
+            <a:avLst/>
+          </a:prstGeom>
+          <a:ln w="12700">
+            <a:solidFill>
+              <a:srgbClr val="002060"/>
+            </a:solidFill>
+            <a:headEnd type="triangle" w="sm" len="sm"/>
+            <a:tailEnd type="triangle" w="sm" len="sm"/>
+          </a:ln>
+        </p:spPr>
+        <p:style>
+          <a:lnRef idx="1">
+            <a:schemeClr val="accent1"/>
+          </a:lnRef>
+          <a:fillRef idx="0">
+            <a:schemeClr val="accent1"/>
+          </a:fillRef>
+          <a:effectRef idx="0">
+            <a:schemeClr val="accent1"/>
+          </a:effectRef>
+          <a:fontRef idx="minor">
+            <a:schemeClr val="tx1"/>
+          </a:fontRef>
+        </p:style>
+      </p:cxnSp>
+      <mc:AlternateContent xmlns:mc="http://schemas.openxmlformats.org/markup-compatibility/2006">
+        <mc:Choice xmlns:a14="http://schemas.microsoft.com/office/drawing/2010/main" Requires="a14">
+          <p:sp>
+            <p:nvSpPr>
+              <p:cNvPr id="20" name="TextBox 19">
+                <a:extLst>
+                  <a:ext uri="{FF2B5EF4-FFF2-40B4-BE49-F238E27FC236}">
+                    <a16:creationId xmlns:a16="http://schemas.microsoft.com/office/drawing/2014/main" id="{0516F204-C089-F5C4-3D4E-BECD66B71F39}"/>
+                  </a:ext>
+                </a:extLst>
+              </p:cNvPr>
+              <p:cNvSpPr txBox="1"/>
+              <p:nvPr/>
+            </p:nvSpPr>
+            <p:spPr>
+              <a:xfrm>
+                <a:off x="3688986" y="4217332"/>
+                <a:ext cx="345529" cy="292901"/>
+              </a:xfrm>
+              <a:prstGeom prst="rect">
+                <a:avLst/>
+              </a:prstGeom>
+              <a:noFill/>
+            </p:spPr>
+            <p:txBody>
+              <a:bodyPr wrap="square" rtlCol="0">
+                <a:spAutoFit/>
+              </a:bodyPr>
+              <a:lstStyle/>
+              <a:p>
+                <a:pPr/>
+                <a14:m>
+                  <m:oMathPara xmlns:m="http://schemas.openxmlformats.org/officeDocument/2006/math">
+                    <m:oMathParaPr>
+                      <m:jc m:val="centerGroup"/>
+                    </m:oMathParaPr>
+                    <m:oMath xmlns:m="http://schemas.openxmlformats.org/officeDocument/2006/math">
+                      <m:sSub>
+                        <m:sSubPr>
+                          <m:ctrlPr>
+                            <a:rPr lang="en-US" sz="1200" b="0" i="1" smtClean="0">
+                              <a:solidFill>
+                                <a:schemeClr val="accent1"/>
+                              </a:solidFill>
+                              <a:latin typeface="Cambria Math" panose="02040503050406030204" pitchFamily="18" charset="0"/>
+                            </a:rPr>
+                          </m:ctrlPr>
+                        </m:sSubPr>
+                        <m:e>
+                          <m:r>
+                            <a:rPr lang="en-US" sz="1200" b="0" i="1" smtClean="0">
+                              <a:solidFill>
+                                <a:schemeClr val="accent1"/>
+                              </a:solidFill>
+                              <a:latin typeface="Cambria Math" panose="02040503050406030204" pitchFamily="18" charset="0"/>
+                            </a:rPr>
+                            <m:t>𝑆</m:t>
+                          </m:r>
+                        </m:e>
+                        <m:sub>
+                          <m:sSub>
+                            <m:sSubPr>
+                              <m:ctrlPr>
+                                <a:rPr lang="en-US" sz="1200" b="0" i="1" smtClean="0">
+                                  <a:solidFill>
+                                    <a:schemeClr val="accent1"/>
+                                  </a:solidFill>
+                                  <a:latin typeface="Cambria Math" panose="02040503050406030204" pitchFamily="18" charset="0"/>
+                                </a:rPr>
+                              </m:ctrlPr>
+                            </m:sSubPr>
+                            <m:e>
+                              <m:r>
+                                <a:rPr lang="en-US" sz="1200" b="0" i="1" smtClean="0">
+                                  <a:solidFill>
+                                    <a:schemeClr val="accent1"/>
+                                  </a:solidFill>
+                                  <a:latin typeface="Cambria Math" panose="02040503050406030204" pitchFamily="18" charset="0"/>
+                                </a:rPr>
+                                <m:t>𝑤</m:t>
+                              </m:r>
+                            </m:e>
+                            <m:sub>
+                              <m:r>
+                                <a:rPr lang="en-US" sz="1200" b="0" i="1" smtClean="0">
+                                  <a:solidFill>
+                                    <a:schemeClr val="accent1"/>
+                                  </a:solidFill>
+                                  <a:latin typeface="Cambria Math" panose="02040503050406030204" pitchFamily="18" charset="0"/>
+                                </a:rPr>
+                                <m:t>1</m:t>
+                              </m:r>
+                            </m:sub>
+                          </m:sSub>
+                        </m:sub>
+                      </m:sSub>
+                    </m:oMath>
+                  </m:oMathPara>
+                </a14:m>
+                <a:endParaRPr lang="en-US" dirty="0"/>
+              </a:p>
+            </p:txBody>
+          </p:sp>
+        </mc:Choice>
+        <mc:Fallback>
+          <p:sp>
+            <p:nvSpPr>
+              <p:cNvPr id="20" name="TextBox 19">
+                <a:extLst>
+                  <a:ext uri="{FF2B5EF4-FFF2-40B4-BE49-F238E27FC236}">
+                    <a16:creationId xmlns:a16="http://schemas.microsoft.com/office/drawing/2014/main" id="{0516F204-C089-F5C4-3D4E-BECD66B71F39}"/>
+                  </a:ext>
+                </a:extLst>
+              </p:cNvPr>
+              <p:cNvSpPr txBox="1">
+                <a:spLocks noRot="1" noChangeAspect="1" noMove="1" noResize="1" noEditPoints="1" noAdjustHandles="1" noChangeArrowheads="1" noChangeShapeType="1" noTextEdit="1"/>
+              </p:cNvSpPr>
+              <p:nvPr/>
+            </p:nvSpPr>
+            <p:spPr>
+              <a:xfrm>
+                <a:off x="3688986" y="4217332"/>
+                <a:ext cx="345529" cy="292901"/>
+              </a:xfrm>
+              <a:prstGeom prst="rect">
+                <a:avLst/>
+              </a:prstGeom>
+              <a:blipFill>
+                <a:blip r:embed="rId17"/>
+                <a:stretch>
+                  <a:fillRect/>
+                </a:stretch>
+              </a:blipFill>
+            </p:spPr>
+            <p:txBody>
+              <a:bodyPr/>
+              <a:lstStyle/>
+              <a:p>
+                <a:r>
+                  <a:rPr lang="en-US">
+                    <a:noFill/>
+                  </a:rPr>
+                  <a:t> </a:t>
+                </a:r>
+              </a:p>
+            </p:txBody>
+          </p:sp>
+        </mc:Fallback>
+      </mc:AlternateContent>
+      <p:cxnSp>
+        <p:nvCxnSpPr>
+          <p:cNvPr id="21" name="Straight Arrow Connector 20">
+            <a:extLst>
+              <a:ext uri="{FF2B5EF4-FFF2-40B4-BE49-F238E27FC236}">
+                <a16:creationId xmlns:a16="http://schemas.microsoft.com/office/drawing/2014/main" id="{BEC3A1F3-9942-DC43-21C6-86719E567E47}"/>
+              </a:ext>
+            </a:extLst>
+          </p:cNvPr>
+          <p:cNvCxnSpPr>
+            <a:cxnSpLocks/>
+          </p:cNvCxnSpPr>
+          <p:nvPr/>
+        </p:nvCxnSpPr>
+        <p:spPr>
+          <a:xfrm flipV="1">
+            <a:off x="4175486" y="4186241"/>
+            <a:ext cx="0" cy="344374"/>
+          </a:xfrm>
+          <a:prstGeom prst="straightConnector1">
+            <a:avLst/>
+          </a:prstGeom>
+          <a:ln w="12700">
+            <a:solidFill>
+              <a:srgbClr val="002060"/>
+            </a:solidFill>
+            <a:headEnd type="triangle" w="sm" len="sm"/>
+            <a:tailEnd type="triangle" w="sm" len="sm"/>
+          </a:ln>
+        </p:spPr>
+        <p:style>
+          <a:lnRef idx="1">
+            <a:schemeClr val="accent1"/>
+          </a:lnRef>
+          <a:fillRef idx="0">
+            <a:schemeClr val="accent1"/>
+          </a:fillRef>
+          <a:effectRef idx="0">
+            <a:schemeClr val="accent1"/>
+          </a:effectRef>
+          <a:fontRef idx="minor">
+            <a:schemeClr val="tx1"/>
+          </a:fontRef>
+        </p:style>
+      </p:cxnSp>
+      <p:cxnSp>
+        <p:nvCxnSpPr>
+          <p:cNvPr id="23" name="Straight Arrow Connector 22">
+            <a:extLst>
+              <a:ext uri="{FF2B5EF4-FFF2-40B4-BE49-F238E27FC236}">
+                <a16:creationId xmlns:a16="http://schemas.microsoft.com/office/drawing/2014/main" id="{AFCE2280-153B-9581-608D-37C5BB755E2B}"/>
+              </a:ext>
+            </a:extLst>
+          </p:cNvPr>
+          <p:cNvCxnSpPr>
+            <a:cxnSpLocks/>
+          </p:cNvCxnSpPr>
+          <p:nvPr/>
+        </p:nvCxnSpPr>
+        <p:spPr>
+          <a:xfrm flipV="1">
+            <a:off x="2157075" y="1474662"/>
+            <a:ext cx="0" cy="3055953"/>
+          </a:xfrm>
+          <a:prstGeom prst="straightConnector1">
+            <a:avLst/>
+          </a:prstGeom>
+          <a:ln w="12700">
+            <a:solidFill>
+              <a:srgbClr val="002060"/>
+            </a:solidFill>
+            <a:headEnd type="triangle" w="sm" len="sm"/>
+            <a:tailEnd type="triangle" w="sm" len="sm"/>
+          </a:ln>
+        </p:spPr>
+        <p:style>
+          <a:lnRef idx="1">
+            <a:schemeClr val="accent1"/>
+          </a:lnRef>
+          <a:fillRef idx="0">
+            <a:schemeClr val="accent1"/>
+          </a:fillRef>
+          <a:effectRef idx="0">
+            <a:schemeClr val="accent1"/>
+          </a:effectRef>
+          <a:fontRef idx="minor">
+            <a:schemeClr val="tx1"/>
+          </a:fontRef>
+        </p:style>
+      </p:cxnSp>
+      <mc:AlternateContent xmlns:mc="http://schemas.openxmlformats.org/markup-compatibility/2006">
+        <mc:Choice xmlns:a14="http://schemas.microsoft.com/office/drawing/2010/main" Requires="a14">
+          <p:sp>
+            <p:nvSpPr>
+              <p:cNvPr id="25" name="TextBox 24">
+                <a:extLst>
+                  <a:ext uri="{FF2B5EF4-FFF2-40B4-BE49-F238E27FC236}">
+                    <a16:creationId xmlns:a16="http://schemas.microsoft.com/office/drawing/2014/main" id="{5FFCE2AD-2204-1949-9E51-954BF6A9F056}"/>
+                  </a:ext>
+                </a:extLst>
+              </p:cNvPr>
+              <p:cNvSpPr txBox="1"/>
+              <p:nvPr/>
+            </p:nvSpPr>
+            <p:spPr>
+              <a:xfrm>
+                <a:off x="1661865" y="2313613"/>
+                <a:ext cx="534875" cy="293798"/>
+              </a:xfrm>
+              <a:prstGeom prst="rect">
+                <a:avLst/>
+              </a:prstGeom>
+              <a:noFill/>
+            </p:spPr>
+            <p:txBody>
+              <a:bodyPr wrap="square" rtlCol="0">
+                <a:spAutoFit/>
+              </a:bodyPr>
+              <a:lstStyle/>
+              <a:p>
+                <a:pPr/>
+                <a14:m>
+                  <m:oMathPara xmlns:m="http://schemas.openxmlformats.org/officeDocument/2006/math">
+                    <m:oMathParaPr>
+                      <m:jc m:val="centerGroup"/>
+                    </m:oMathParaPr>
+                    <m:oMath xmlns:m="http://schemas.openxmlformats.org/officeDocument/2006/math">
+                      <m:sSub>
+                        <m:sSubPr>
+                          <m:ctrlPr>
+                            <a:rPr lang="en-US" sz="1200" b="0" i="1" smtClean="0">
+                              <a:solidFill>
+                                <a:schemeClr val="accent1"/>
+                              </a:solidFill>
+                              <a:latin typeface="Cambria Math" panose="02040503050406030204" pitchFamily="18" charset="0"/>
+                            </a:rPr>
+                          </m:ctrlPr>
+                        </m:sSubPr>
+                        <m:e>
+                          <m:r>
+                            <a:rPr lang="en-US" sz="1200" b="0" i="1" smtClean="0">
+                              <a:solidFill>
+                                <a:schemeClr val="accent1"/>
+                              </a:solidFill>
+                              <a:latin typeface="Cambria Math" panose="02040503050406030204" pitchFamily="18" charset="0"/>
+                            </a:rPr>
+                            <m:t>𝑆</m:t>
+                          </m:r>
+                        </m:e>
+                        <m:sub>
+                          <m:sSub>
+                            <m:sSubPr>
+                              <m:ctrlPr>
+                                <a:rPr lang="en-US" sz="1200" b="0" i="1" smtClean="0">
+                                  <a:solidFill>
+                                    <a:schemeClr val="accent1"/>
+                                  </a:solidFill>
+                                  <a:latin typeface="Cambria Math" panose="02040503050406030204" pitchFamily="18" charset="0"/>
+                                </a:rPr>
+                              </m:ctrlPr>
+                            </m:sSubPr>
+                            <m:e>
+                              <m:r>
+                                <a:rPr lang="en-US" sz="1200" b="0" i="1" smtClean="0">
+                                  <a:solidFill>
+                                    <a:schemeClr val="accent1"/>
+                                  </a:solidFill>
+                                  <a:latin typeface="Cambria Math" panose="02040503050406030204" pitchFamily="18" charset="0"/>
+                                </a:rPr>
+                                <m:t>𝑤</m:t>
+                              </m:r>
+                            </m:e>
+                            <m:sub>
+                              <m:r>
+                                <a:rPr lang="en-US" sz="1200" b="0" i="1" smtClean="0">
+                                  <a:solidFill>
+                                    <a:schemeClr val="accent1"/>
+                                  </a:solidFill>
+                                  <a:latin typeface="Cambria Math" panose="02040503050406030204" pitchFamily="18" charset="0"/>
+                                </a:rPr>
+                                <m:t>3</m:t>
+                              </m:r>
+                            </m:sub>
+                          </m:sSub>
+                        </m:sub>
+                      </m:sSub>
+                    </m:oMath>
+                  </m:oMathPara>
+                </a14:m>
+                <a:endParaRPr lang="en-US" dirty="0"/>
+              </a:p>
+            </p:txBody>
+          </p:sp>
+        </mc:Choice>
+        <mc:Fallback>
+          <p:sp>
+            <p:nvSpPr>
+              <p:cNvPr id="25" name="TextBox 24">
+                <a:extLst>
+                  <a:ext uri="{FF2B5EF4-FFF2-40B4-BE49-F238E27FC236}">
+                    <a16:creationId xmlns:a16="http://schemas.microsoft.com/office/drawing/2014/main" id="{5FFCE2AD-2204-1949-9E51-954BF6A9F056}"/>
+                  </a:ext>
+                </a:extLst>
+              </p:cNvPr>
+              <p:cNvSpPr txBox="1">
+                <a:spLocks noRot="1" noChangeAspect="1" noMove="1" noResize="1" noEditPoints="1" noAdjustHandles="1" noChangeArrowheads="1" noChangeShapeType="1" noTextEdit="1"/>
+              </p:cNvSpPr>
+              <p:nvPr/>
+            </p:nvSpPr>
+            <p:spPr>
+              <a:xfrm>
+                <a:off x="1661865" y="2313613"/>
+                <a:ext cx="534875" cy="293798"/>
+              </a:xfrm>
+              <a:prstGeom prst="rect">
+                <a:avLst/>
+              </a:prstGeom>
+              <a:blipFill>
+                <a:blip r:embed="rId18"/>
+                <a:stretch>
+                  <a:fillRect/>
+                </a:stretch>
+              </a:blipFill>
+            </p:spPr>
+            <p:txBody>
+              <a:bodyPr/>
+              <a:lstStyle/>
+              <a:p>
+                <a:r>
+                  <a:rPr lang="en-US">
+                    <a:noFill/>
+                  </a:rPr>
+                  <a:t> </a:t>
+                </a:r>
+              </a:p>
+            </p:txBody>
+          </p:sp>
+        </mc:Fallback>
+      </mc:AlternateContent>
+      <p:cxnSp>
+        <p:nvCxnSpPr>
+          <p:cNvPr id="26" name="Straight Arrow Connector 25">
+            <a:extLst>
+              <a:ext uri="{FF2B5EF4-FFF2-40B4-BE49-F238E27FC236}">
+                <a16:creationId xmlns:a16="http://schemas.microsoft.com/office/drawing/2014/main" id="{3D19D5C3-42D8-CDC5-A455-DBC9E72B0982}"/>
+              </a:ext>
+            </a:extLst>
+          </p:cNvPr>
+          <p:cNvCxnSpPr>
+            <a:cxnSpLocks/>
+          </p:cNvCxnSpPr>
+          <p:nvPr/>
+        </p:nvCxnSpPr>
+        <p:spPr>
+          <a:xfrm flipV="1">
+            <a:off x="5235528" y="3308124"/>
+            <a:ext cx="0" cy="1222491"/>
+          </a:xfrm>
+          <a:prstGeom prst="straightConnector1">
+            <a:avLst/>
+          </a:prstGeom>
+          <a:ln w="12700">
+            <a:solidFill>
+              <a:srgbClr val="002060"/>
+            </a:solidFill>
+            <a:headEnd type="triangle" w="sm" len="sm"/>
+            <a:tailEnd type="triangle" w="sm" len="sm"/>
+          </a:ln>
+        </p:spPr>
+        <p:style>
+          <a:lnRef idx="1">
+            <a:schemeClr val="accent1"/>
+          </a:lnRef>
+          <a:fillRef idx="0">
+            <a:schemeClr val="accent1"/>
+          </a:fillRef>
+          <a:effectRef idx="0">
+            <a:schemeClr val="accent1"/>
+          </a:effectRef>
+          <a:fontRef idx="minor">
+            <a:schemeClr val="tx1"/>
+          </a:fontRef>
+        </p:style>
+      </p:cxnSp>
+      <mc:AlternateContent xmlns:mc="http://schemas.openxmlformats.org/markup-compatibility/2006">
+        <mc:Choice xmlns:a14="http://schemas.microsoft.com/office/drawing/2010/main" Requires="a14">
+          <p:sp>
+            <p:nvSpPr>
+              <p:cNvPr id="27" name="TextBox 26">
+                <a:extLst>
+                  <a:ext uri="{FF2B5EF4-FFF2-40B4-BE49-F238E27FC236}">
+                    <a16:creationId xmlns:a16="http://schemas.microsoft.com/office/drawing/2014/main" id="{3991290E-6C63-A7F3-EF45-306A62C3DB9A}"/>
+                  </a:ext>
+                </a:extLst>
+              </p:cNvPr>
+              <p:cNvSpPr txBox="1"/>
+              <p:nvPr/>
+            </p:nvSpPr>
+            <p:spPr>
+              <a:xfrm>
+                <a:off x="5256884" y="3327159"/>
+                <a:ext cx="345529" cy="292901"/>
+              </a:xfrm>
+              <a:prstGeom prst="rect">
+                <a:avLst/>
+              </a:prstGeom>
+              <a:noFill/>
+            </p:spPr>
+            <p:txBody>
+              <a:bodyPr wrap="square" rtlCol="0">
+                <a:spAutoFit/>
+              </a:bodyPr>
+              <a:lstStyle/>
+              <a:p>
+                <a:pPr/>
+                <a14:m>
+                  <m:oMathPara xmlns:m="http://schemas.openxmlformats.org/officeDocument/2006/math">
+                    <m:oMathParaPr>
+                      <m:jc m:val="centerGroup"/>
+                    </m:oMathParaPr>
+                    <m:oMath xmlns:m="http://schemas.openxmlformats.org/officeDocument/2006/math">
+                      <m:sSub>
+                        <m:sSubPr>
+                          <m:ctrlPr>
+                            <a:rPr lang="en-US" sz="1200" b="0" i="1" smtClean="0">
+                              <a:solidFill>
+                                <a:schemeClr val="accent1"/>
+                              </a:solidFill>
+                              <a:latin typeface="Cambria Math" panose="02040503050406030204" pitchFamily="18" charset="0"/>
+                            </a:rPr>
+                          </m:ctrlPr>
+                        </m:sSubPr>
+                        <m:e>
+                          <m:r>
+                            <a:rPr lang="en-US" sz="1200" b="0" i="1" smtClean="0">
+                              <a:solidFill>
+                                <a:schemeClr val="accent1"/>
+                              </a:solidFill>
+                              <a:latin typeface="Cambria Math" panose="02040503050406030204" pitchFamily="18" charset="0"/>
+                            </a:rPr>
+                            <m:t>𝑆</m:t>
+                          </m:r>
+                        </m:e>
+                        <m:sub>
+                          <m:sSub>
+                            <m:sSubPr>
+                              <m:ctrlPr>
+                                <a:rPr lang="en-US" sz="1200" b="0" i="1" smtClean="0">
+                                  <a:solidFill>
+                                    <a:schemeClr val="accent1"/>
+                                  </a:solidFill>
+                                  <a:latin typeface="Cambria Math" panose="02040503050406030204" pitchFamily="18" charset="0"/>
+                                </a:rPr>
+                              </m:ctrlPr>
+                            </m:sSubPr>
+                            <m:e>
+                              <m:r>
+                                <a:rPr lang="en-US" sz="1200" b="0" i="1" smtClean="0">
+                                  <a:solidFill>
+                                    <a:schemeClr val="accent1"/>
+                                  </a:solidFill>
+                                  <a:latin typeface="Cambria Math" panose="02040503050406030204" pitchFamily="18" charset="0"/>
+                                </a:rPr>
+                                <m:t>𝑒</m:t>
+                              </m:r>
+                            </m:e>
+                            <m:sub>
+                              <m:r>
+                                <a:rPr lang="en-US" sz="1200" b="0" i="1" smtClean="0">
+                                  <a:solidFill>
+                                    <a:schemeClr val="accent1"/>
+                                  </a:solidFill>
+                                  <a:latin typeface="Cambria Math" panose="02040503050406030204" pitchFamily="18" charset="0"/>
+                                </a:rPr>
+                                <m:t>1</m:t>
+                              </m:r>
+                            </m:sub>
+                          </m:sSub>
+                        </m:sub>
+                      </m:sSub>
+                    </m:oMath>
+                  </m:oMathPara>
+                </a14:m>
+                <a:endParaRPr lang="en-US" dirty="0"/>
+              </a:p>
+            </p:txBody>
+          </p:sp>
+        </mc:Choice>
+        <mc:Fallback>
+          <p:sp>
+            <p:nvSpPr>
+              <p:cNvPr id="27" name="TextBox 26">
+                <a:extLst>
+                  <a:ext uri="{FF2B5EF4-FFF2-40B4-BE49-F238E27FC236}">
+                    <a16:creationId xmlns:a16="http://schemas.microsoft.com/office/drawing/2014/main" id="{3991290E-6C63-A7F3-EF45-306A62C3DB9A}"/>
+                  </a:ext>
+                </a:extLst>
+              </p:cNvPr>
+              <p:cNvSpPr txBox="1">
+                <a:spLocks noRot="1" noChangeAspect="1" noMove="1" noResize="1" noEditPoints="1" noAdjustHandles="1" noChangeArrowheads="1" noChangeShapeType="1" noTextEdit="1"/>
+              </p:cNvSpPr>
+              <p:nvPr/>
+            </p:nvSpPr>
+            <p:spPr>
+              <a:xfrm>
+                <a:off x="5256884" y="3327159"/>
+                <a:ext cx="345529" cy="292901"/>
+              </a:xfrm>
+              <a:prstGeom prst="rect">
+                <a:avLst/>
+              </a:prstGeom>
+              <a:blipFill>
+                <a:blip r:embed="rId19"/>
+                <a:stretch>
+                  <a:fillRect/>
+                </a:stretch>
+              </a:blipFill>
+            </p:spPr>
+            <p:txBody>
+              <a:bodyPr/>
+              <a:lstStyle/>
+              <a:p>
+                <a:r>
+                  <a:rPr lang="en-US">
+                    <a:noFill/>
+                  </a:rPr>
+                  <a:t> </a:t>
+                </a:r>
+              </a:p>
+            </p:txBody>
+          </p:sp>
+        </mc:Fallback>
+      </mc:AlternateContent>
     </p:spTree>
     <p:extLst>
       <p:ext uri="{BB962C8B-B14F-4D97-AF65-F5344CB8AC3E}">
@@ -7395,8 +8171,8 @@
           </a:fontRef>
         </p:style>
       </p:cxnSp>
-      <mc:AlternateContent xmlns:mc="http://schemas.openxmlformats.org/markup-compatibility/2006" xmlns:a14="http://schemas.microsoft.com/office/drawing/2010/main">
-        <mc:Choice Requires="a14">
+      <mc:AlternateContent xmlns:mc="http://schemas.openxmlformats.org/markup-compatibility/2006">
+        <mc:Choice xmlns:a14="http://schemas.microsoft.com/office/drawing/2010/main" Requires="a14">
           <p:sp>
             <p:nvSpPr>
               <p:cNvPr id="25" name="TextBox 24">
@@ -7508,7 +8284,7 @@
             </p:txBody>
           </p:sp>
         </mc:Choice>
-        <mc:Fallback xmlns="">
+        <mc:Fallback>
           <p:sp>
             <p:nvSpPr>
               <p:cNvPr id="25" name="TextBox 24">
@@ -10887,8 +11663,8 @@
           </p:sp>
         </mc:Fallback>
       </mc:AlternateContent>
-      <mc:AlternateContent xmlns:mc="http://schemas.openxmlformats.org/markup-compatibility/2006" xmlns:a14="http://schemas.microsoft.com/office/drawing/2010/main">
-        <mc:Choice Requires="a14">
+      <mc:AlternateContent xmlns:mc="http://schemas.openxmlformats.org/markup-compatibility/2006">
+        <mc:Choice xmlns:a14="http://schemas.microsoft.com/office/drawing/2010/main" Requires="a14">
           <p:sp>
             <p:nvSpPr>
               <p:cNvPr id="19" name="TextBox 18">
@@ -10991,7 +11767,7 @@
             </p:txBody>
           </p:sp>
         </mc:Choice>
-        <mc:Fallback xmlns="">
+        <mc:Fallback>
           <p:sp>
             <p:nvSpPr>
               <p:cNvPr id="19" name="TextBox 18">
@@ -11955,8 +12731,8 @@
           </a:fontRef>
         </p:style>
       </p:cxnSp>
-      <mc:AlternateContent xmlns:mc="http://schemas.openxmlformats.org/markup-compatibility/2006" xmlns:a14="http://schemas.microsoft.com/office/drawing/2010/main">
-        <mc:Choice Requires="a14">
+      <mc:AlternateContent xmlns:mc="http://schemas.openxmlformats.org/markup-compatibility/2006">
+        <mc:Choice xmlns:a14="http://schemas.microsoft.com/office/drawing/2010/main" Requires="a14">
           <p:sp>
             <p:nvSpPr>
               <p:cNvPr id="59" name="TextBox 58">
@@ -12015,15 +12791,40 @@
                           </m:r>
                         </m:e>
                         <m:sub>
-                          <m:r>
-                            <a:rPr lang="en-US" sz="1200" b="0" i="1" smtClean="0">
-                              <a:solidFill>
-                                <a:schemeClr val="accent1"/>
-                              </a:solidFill>
-                              <a:latin typeface="Cambria Math" panose="02040503050406030204" pitchFamily="18" charset="0"/>
-                            </a:rPr>
-                            <m:t>𝑓</m:t>
-                          </m:r>
+                          <m:sSub>
+                            <m:sSubPr>
+                              <m:ctrlPr>
+                                <a:rPr lang="en-US" sz="1200" b="0" i="1" smtClean="0">
+                                  <a:solidFill>
+                                    <a:schemeClr val="accent1"/>
+                                  </a:solidFill>
+                                  <a:latin typeface="Cambria Math" panose="02040503050406030204" pitchFamily="18" charset="0"/>
+                                </a:rPr>
+                              </m:ctrlPr>
+                            </m:sSubPr>
+                            <m:e>
+                              <m:r>
+                                <a:rPr lang="en-US" sz="1200" b="0" i="1" smtClean="0">
+                                  <a:solidFill>
+                                    <a:schemeClr val="accent1"/>
+                                  </a:solidFill>
+                                  <a:latin typeface="Cambria Math" panose="02040503050406030204" pitchFamily="18" charset="0"/>
+                                </a:rPr>
+                                <m:t>𝑓</m:t>
+                              </m:r>
+                            </m:e>
+                            <m:sub>
+                              <m:r>
+                                <a:rPr lang="en-US" sz="1200" b="0" i="1" smtClean="0">
+                                  <a:solidFill>
+                                    <a:schemeClr val="accent1"/>
+                                  </a:solidFill>
+                                  <a:latin typeface="Cambria Math" panose="02040503050406030204" pitchFamily="18" charset="0"/>
+                                </a:rPr>
+                                <m:t>1</m:t>
+                              </m:r>
+                            </m:sub>
+                          </m:sSub>
                         </m:sub>
                       </m:sSub>
                     </m:oMath>
@@ -12034,7 +12835,7 @@
             </p:txBody>
           </p:sp>
         </mc:Choice>
-        <mc:Fallback xmlns="">
+        <mc:Fallback>
           <p:sp>
             <p:nvSpPr>
               <p:cNvPr id="59" name="TextBox 58">

</xml_diff>

<commit_message>
Progress in automatic pilot design
</commit_message>
<xml_diff>
--- a/TechnicalReport/Figures.pptx
+++ b/TechnicalReport/Figures.pptx
@@ -9,6 +9,8 @@
     <p:sldId id="256" r:id="rId3"/>
     <p:sldId id="259" r:id="rId4"/>
     <p:sldId id="258" r:id="rId5"/>
+    <p:sldId id="260" r:id="rId6"/>
+    <p:sldId id="261" r:id="rId7"/>
   </p:sldIdLst>
   <p:sldSz cx="12192000" cy="6858000"/>
   <p:notesSz cx="6858000" cy="9144000"/>
@@ -262,7 +264,7 @@
           <a:p>
             <a:fld id="{C1A24063-2F13-4A0D-BF3F-218053084915}" type="datetimeFigureOut">
               <a:rPr lang="en-US" smtClean="0"/>
-              <a:t>1/4/2023</a:t>
+              <a:t>1/8/2023</a:t>
             </a:fld>
             <a:endParaRPr lang="en-US"/>
           </a:p>
@@ -460,7 +462,7 @@
           <a:p>
             <a:fld id="{C1A24063-2F13-4A0D-BF3F-218053084915}" type="datetimeFigureOut">
               <a:rPr lang="en-US" smtClean="0"/>
-              <a:t>1/4/2023</a:t>
+              <a:t>1/8/2023</a:t>
             </a:fld>
             <a:endParaRPr lang="en-US"/>
           </a:p>
@@ -668,7 +670,7 @@
           <a:p>
             <a:fld id="{C1A24063-2F13-4A0D-BF3F-218053084915}" type="datetimeFigureOut">
               <a:rPr lang="en-US" smtClean="0"/>
-              <a:t>1/4/2023</a:t>
+              <a:t>1/8/2023</a:t>
             </a:fld>
             <a:endParaRPr lang="en-US"/>
           </a:p>
@@ -866,7 +868,7 @@
           <a:p>
             <a:fld id="{C1A24063-2F13-4A0D-BF3F-218053084915}" type="datetimeFigureOut">
               <a:rPr lang="en-US" smtClean="0"/>
-              <a:t>1/4/2023</a:t>
+              <a:t>1/8/2023</a:t>
             </a:fld>
             <a:endParaRPr lang="en-US"/>
           </a:p>
@@ -1141,7 +1143,7 @@
           <a:p>
             <a:fld id="{C1A24063-2F13-4A0D-BF3F-218053084915}" type="datetimeFigureOut">
               <a:rPr lang="en-US" smtClean="0"/>
-              <a:t>1/4/2023</a:t>
+              <a:t>1/8/2023</a:t>
             </a:fld>
             <a:endParaRPr lang="en-US"/>
           </a:p>
@@ -1406,7 +1408,7 @@
           <a:p>
             <a:fld id="{C1A24063-2F13-4A0D-BF3F-218053084915}" type="datetimeFigureOut">
               <a:rPr lang="en-US" smtClean="0"/>
-              <a:t>1/4/2023</a:t>
+              <a:t>1/8/2023</a:t>
             </a:fld>
             <a:endParaRPr lang="en-US"/>
           </a:p>
@@ -1818,7 +1820,7 @@
           <a:p>
             <a:fld id="{C1A24063-2F13-4A0D-BF3F-218053084915}" type="datetimeFigureOut">
               <a:rPr lang="en-US" smtClean="0"/>
-              <a:t>1/4/2023</a:t>
+              <a:t>1/8/2023</a:t>
             </a:fld>
             <a:endParaRPr lang="en-US"/>
           </a:p>
@@ -1959,7 +1961,7 @@
           <a:p>
             <a:fld id="{C1A24063-2F13-4A0D-BF3F-218053084915}" type="datetimeFigureOut">
               <a:rPr lang="en-US" smtClean="0"/>
-              <a:t>1/4/2023</a:t>
+              <a:t>1/8/2023</a:t>
             </a:fld>
             <a:endParaRPr lang="en-US"/>
           </a:p>
@@ -2072,7 +2074,7 @@
           <a:p>
             <a:fld id="{C1A24063-2F13-4A0D-BF3F-218053084915}" type="datetimeFigureOut">
               <a:rPr lang="en-US" smtClean="0"/>
-              <a:t>1/4/2023</a:t>
+              <a:t>1/8/2023</a:t>
             </a:fld>
             <a:endParaRPr lang="en-US"/>
           </a:p>
@@ -2383,7 +2385,7 @@
           <a:p>
             <a:fld id="{C1A24063-2F13-4A0D-BF3F-218053084915}" type="datetimeFigureOut">
               <a:rPr lang="en-US" smtClean="0"/>
-              <a:t>1/4/2023</a:t>
+              <a:t>1/8/2023</a:t>
             </a:fld>
             <a:endParaRPr lang="en-US"/>
           </a:p>
@@ -2671,7 +2673,7 @@
           <a:p>
             <a:fld id="{C1A24063-2F13-4A0D-BF3F-218053084915}" type="datetimeFigureOut">
               <a:rPr lang="en-US" smtClean="0"/>
-              <a:t>1/4/2023</a:t>
+              <a:t>1/8/2023</a:t>
             </a:fld>
             <a:endParaRPr lang="en-US"/>
           </a:p>
@@ -2912,7 +2914,7 @@
           <a:p>
             <a:fld id="{C1A24063-2F13-4A0D-BF3F-218053084915}" type="datetimeFigureOut">
               <a:rPr lang="en-US" smtClean="0"/>
-              <a:t>1/4/2023</a:t>
+              <a:t>1/8/2023</a:t>
             </a:fld>
             <a:endParaRPr lang="en-US"/>
           </a:p>
@@ -4333,8 +4335,8 @@
           </a:fontRef>
         </p:style>
       </p:cxnSp>
-      <mc:AlternateContent xmlns:mc="http://schemas.openxmlformats.org/markup-compatibility/2006">
-        <mc:Choice xmlns:a14="http://schemas.microsoft.com/office/drawing/2010/main" Requires="a14">
+      <mc:AlternateContent xmlns:mc="http://schemas.openxmlformats.org/markup-compatibility/2006" xmlns:a14="http://schemas.microsoft.com/office/drawing/2010/main">
+        <mc:Choice Requires="a14">
           <p:sp>
             <p:nvSpPr>
               <p:cNvPr id="61" name="TextBox 60">
@@ -4446,7 +4448,7 @@
             </p:txBody>
           </p:sp>
         </mc:Choice>
-        <mc:Fallback>
+        <mc:Fallback xmlns="">
           <p:sp>
             <p:nvSpPr>
               <p:cNvPr id="61" name="TextBox 60">
@@ -6897,8 +6899,8 @@
           </p:sp>
         </mc:Fallback>
       </mc:AlternateContent>
-      <mc:AlternateContent xmlns:mc="http://schemas.openxmlformats.org/markup-compatibility/2006">
-        <mc:Choice xmlns:a14="http://schemas.microsoft.com/office/drawing/2010/main" Requires="a14">
+      <mc:AlternateContent xmlns:mc="http://schemas.openxmlformats.org/markup-compatibility/2006" xmlns:a14="http://schemas.microsoft.com/office/drawing/2010/main">
+        <mc:Choice Requires="a14">
           <p:sp>
             <p:nvSpPr>
               <p:cNvPr id="2" name="TextBox 1">
@@ -6983,7 +6985,7 @@
             </p:txBody>
           </p:sp>
         </mc:Choice>
-        <mc:Fallback>
+        <mc:Fallback xmlns="">
           <p:sp>
             <p:nvSpPr>
               <p:cNvPr id="2" name="TextBox 1">
@@ -7069,8 +7071,8 @@
           </a:fontRef>
         </p:style>
       </p:cxnSp>
-      <mc:AlternateContent xmlns:mc="http://schemas.openxmlformats.org/markup-compatibility/2006">
-        <mc:Choice xmlns:a14="http://schemas.microsoft.com/office/drawing/2010/main" Requires="a14">
+      <mc:AlternateContent xmlns:mc="http://schemas.openxmlformats.org/markup-compatibility/2006" xmlns:a14="http://schemas.microsoft.com/office/drawing/2010/main">
+        <mc:Choice Requires="a14">
           <p:sp>
             <p:nvSpPr>
               <p:cNvPr id="15" name="TextBox 14">
@@ -7173,7 +7175,7 @@
             </p:txBody>
           </p:sp>
         </mc:Choice>
-        <mc:Fallback>
+        <mc:Fallback xmlns="">
           <p:sp>
             <p:nvSpPr>
               <p:cNvPr id="15" name="TextBox 14">
@@ -7263,8 +7265,8 @@
           </a:fontRef>
         </p:style>
       </p:cxnSp>
-      <mc:AlternateContent xmlns:mc="http://schemas.openxmlformats.org/markup-compatibility/2006">
-        <mc:Choice xmlns:a14="http://schemas.microsoft.com/office/drawing/2010/main" Requires="a14">
+      <mc:AlternateContent xmlns:mc="http://schemas.openxmlformats.org/markup-compatibility/2006" xmlns:a14="http://schemas.microsoft.com/office/drawing/2010/main">
+        <mc:Choice Requires="a14">
           <p:sp>
             <p:nvSpPr>
               <p:cNvPr id="20" name="TextBox 19">
@@ -7367,7 +7369,7 @@
             </p:txBody>
           </p:sp>
         </mc:Choice>
-        <mc:Fallback>
+        <mc:Fallback xmlns="">
           <p:sp>
             <p:nvSpPr>
               <p:cNvPr id="20" name="TextBox 19">
@@ -7502,8 +7504,8 @@
           </a:fontRef>
         </p:style>
       </p:cxnSp>
-      <mc:AlternateContent xmlns:mc="http://schemas.openxmlformats.org/markup-compatibility/2006">
-        <mc:Choice xmlns:a14="http://schemas.microsoft.com/office/drawing/2010/main" Requires="a14">
+      <mc:AlternateContent xmlns:mc="http://schemas.openxmlformats.org/markup-compatibility/2006" xmlns:a14="http://schemas.microsoft.com/office/drawing/2010/main">
+        <mc:Choice Requires="a14">
           <p:sp>
             <p:nvSpPr>
               <p:cNvPr id="25" name="TextBox 24">
@@ -7606,7 +7608,7 @@
             </p:txBody>
           </p:sp>
         </mc:Choice>
-        <mc:Fallback>
+        <mc:Fallback xmlns="">
           <p:sp>
             <p:nvSpPr>
               <p:cNvPr id="25" name="TextBox 24">
@@ -7696,8 +7698,8 @@
           </a:fontRef>
         </p:style>
       </p:cxnSp>
-      <mc:AlternateContent xmlns:mc="http://schemas.openxmlformats.org/markup-compatibility/2006">
-        <mc:Choice xmlns:a14="http://schemas.microsoft.com/office/drawing/2010/main" Requires="a14">
+      <mc:AlternateContent xmlns:mc="http://schemas.openxmlformats.org/markup-compatibility/2006" xmlns:a14="http://schemas.microsoft.com/office/drawing/2010/main">
+        <mc:Choice Requires="a14">
           <p:sp>
             <p:nvSpPr>
               <p:cNvPr id="27" name="TextBox 26">
@@ -7800,7 +7802,7 @@
             </p:txBody>
           </p:sp>
         </mc:Choice>
-        <mc:Fallback>
+        <mc:Fallback xmlns="">
           <p:sp>
             <p:nvSpPr>
               <p:cNvPr id="27" name="TextBox 26">
@@ -8171,8 +8173,8 @@
           </a:fontRef>
         </p:style>
       </p:cxnSp>
-      <mc:AlternateContent xmlns:mc="http://schemas.openxmlformats.org/markup-compatibility/2006">
-        <mc:Choice xmlns:a14="http://schemas.microsoft.com/office/drawing/2010/main" Requires="a14">
+      <mc:AlternateContent xmlns:mc="http://schemas.openxmlformats.org/markup-compatibility/2006" xmlns:a14="http://schemas.microsoft.com/office/drawing/2010/main">
+        <mc:Choice Requires="a14">
           <p:sp>
             <p:nvSpPr>
               <p:cNvPr id="25" name="TextBox 24">
@@ -8284,7 +8286,7 @@
             </p:txBody>
           </p:sp>
         </mc:Choice>
-        <mc:Fallback>
+        <mc:Fallback xmlns="">
           <p:sp>
             <p:nvSpPr>
               <p:cNvPr id="25" name="TextBox 24">
@@ -11663,8 +11665,8 @@
           </p:sp>
         </mc:Fallback>
       </mc:AlternateContent>
-      <mc:AlternateContent xmlns:mc="http://schemas.openxmlformats.org/markup-compatibility/2006">
-        <mc:Choice xmlns:a14="http://schemas.microsoft.com/office/drawing/2010/main" Requires="a14">
+      <mc:AlternateContent xmlns:mc="http://schemas.openxmlformats.org/markup-compatibility/2006" xmlns:a14="http://schemas.microsoft.com/office/drawing/2010/main">
+        <mc:Choice Requires="a14">
           <p:sp>
             <p:nvSpPr>
               <p:cNvPr id="19" name="TextBox 18">
@@ -11767,7 +11769,7 @@
             </p:txBody>
           </p:sp>
         </mc:Choice>
-        <mc:Fallback>
+        <mc:Fallback xmlns="">
           <p:sp>
             <p:nvSpPr>
               <p:cNvPr id="19" name="TextBox 18">
@@ -12731,8 +12733,8 @@
           </a:fontRef>
         </p:style>
       </p:cxnSp>
-      <mc:AlternateContent xmlns:mc="http://schemas.openxmlformats.org/markup-compatibility/2006">
-        <mc:Choice xmlns:a14="http://schemas.microsoft.com/office/drawing/2010/main" Requires="a14">
+      <mc:AlternateContent xmlns:mc="http://schemas.openxmlformats.org/markup-compatibility/2006" xmlns:a14="http://schemas.microsoft.com/office/drawing/2010/main">
+        <mc:Choice Requires="a14">
           <p:sp>
             <p:nvSpPr>
               <p:cNvPr id="59" name="TextBox 58">
@@ -12835,7 +12837,7 @@
             </p:txBody>
           </p:sp>
         </mc:Choice>
-        <mc:Fallback>
+        <mc:Fallback xmlns="">
           <p:sp>
             <p:nvSpPr>
               <p:cNvPr id="59" name="TextBox 58">
@@ -12884,6 +12886,276 @@
     <p:extLst>
       <p:ext uri="{BB962C8B-B14F-4D97-AF65-F5344CB8AC3E}">
         <p14:creationId xmlns:p14="http://schemas.microsoft.com/office/powerpoint/2010/main" val="3591047611"/>
+      </p:ext>
+    </p:extLst>
+  </p:cSld>
+  <p:clrMapOvr>
+    <a:masterClrMapping/>
+  </p:clrMapOvr>
+</p:sld>
+</file>
+
+<file path=ppt/slides/slide5.xml><?xml version="1.0" encoding="utf-8"?>
+<p:sld xmlns:a="http://schemas.openxmlformats.org/drawingml/2006/main" xmlns:r="http://schemas.openxmlformats.org/officeDocument/2006/relationships" xmlns:p="http://schemas.openxmlformats.org/presentationml/2006/main">
+  <p:cSld>
+    <p:spTree>
+      <p:nvGrpSpPr>
+        <p:cNvPr id="1" name=""/>
+        <p:cNvGrpSpPr/>
+        <p:nvPr/>
+      </p:nvGrpSpPr>
+      <p:grpSpPr>
+        <a:xfrm>
+          <a:off x="0" y="0"/>
+          <a:ext cx="0" cy="0"/>
+          <a:chOff x="0" y="0"/>
+          <a:chExt cx="0" cy="0"/>
+        </a:xfrm>
+      </p:grpSpPr>
+      <p:pic>
+        <p:nvPicPr>
+          <p:cNvPr id="5" name="Picture 4">
+            <a:extLst>
+              <a:ext uri="{FF2B5EF4-FFF2-40B4-BE49-F238E27FC236}">
+                <a16:creationId xmlns:a16="http://schemas.microsoft.com/office/drawing/2014/main" id="{7B955D96-9DC8-4A27-7939-411045D7CD37}"/>
+              </a:ext>
+            </a:extLst>
+          </p:cNvPr>
+          <p:cNvPicPr>
+            <a:picLocks noChangeAspect="1"/>
+          </p:cNvPicPr>
+          <p:nvPr/>
+        </p:nvPicPr>
+        <p:blipFill>
+          <a:blip r:embed="rId2"/>
+          <a:stretch>
+            <a:fillRect/>
+          </a:stretch>
+        </p:blipFill>
+        <p:spPr>
+          <a:xfrm>
+            <a:off x="573728" y="4542069"/>
+            <a:ext cx="7705725" cy="1381125"/>
+          </a:xfrm>
+          <a:prstGeom prst="rect">
+            <a:avLst/>
+          </a:prstGeom>
+        </p:spPr>
+      </p:pic>
+      <p:pic>
+        <p:nvPicPr>
+          <p:cNvPr id="9" name="Picture 8">
+            <a:extLst>
+              <a:ext uri="{FF2B5EF4-FFF2-40B4-BE49-F238E27FC236}">
+                <a16:creationId xmlns:a16="http://schemas.microsoft.com/office/drawing/2014/main" id="{37BB94AD-2B01-F711-F05E-D4B4C960B0C0}"/>
+              </a:ext>
+            </a:extLst>
+          </p:cNvPr>
+          <p:cNvPicPr>
+            <a:picLocks noChangeAspect="1"/>
+          </p:cNvPicPr>
+          <p:nvPr/>
+        </p:nvPicPr>
+        <p:blipFill>
+          <a:blip r:embed="rId3"/>
+          <a:stretch>
+            <a:fillRect/>
+          </a:stretch>
+        </p:blipFill>
+        <p:spPr>
+          <a:xfrm>
+            <a:off x="477735" y="2053598"/>
+            <a:ext cx="4743450" cy="2314575"/>
+          </a:xfrm>
+          <a:prstGeom prst="rect">
+            <a:avLst/>
+          </a:prstGeom>
+        </p:spPr>
+      </p:pic>
+      <p:pic>
+        <p:nvPicPr>
+          <p:cNvPr id="11" name="Picture 10">
+            <a:extLst>
+              <a:ext uri="{FF2B5EF4-FFF2-40B4-BE49-F238E27FC236}">
+                <a16:creationId xmlns:a16="http://schemas.microsoft.com/office/drawing/2014/main" id="{63EA7671-9235-7C40-FDF5-08385EC28960}"/>
+              </a:ext>
+            </a:extLst>
+          </p:cNvPr>
+          <p:cNvPicPr>
+            <a:picLocks noChangeAspect="1"/>
+          </p:cNvPicPr>
+          <p:nvPr/>
+        </p:nvPicPr>
+        <p:blipFill>
+          <a:blip r:embed="rId4"/>
+          <a:stretch>
+            <a:fillRect/>
+          </a:stretch>
+        </p:blipFill>
+        <p:spPr>
+          <a:xfrm>
+            <a:off x="985137" y="1552313"/>
+            <a:ext cx="1228725" cy="276225"/>
+          </a:xfrm>
+          <a:prstGeom prst="rect">
+            <a:avLst/>
+          </a:prstGeom>
+        </p:spPr>
+      </p:pic>
+    </p:spTree>
+    <p:extLst>
+      <p:ext uri="{BB962C8B-B14F-4D97-AF65-F5344CB8AC3E}">
+        <p14:creationId xmlns:p14="http://schemas.microsoft.com/office/powerpoint/2010/main" val="3622038331"/>
+      </p:ext>
+    </p:extLst>
+  </p:cSld>
+  <p:clrMapOvr>
+    <a:masterClrMapping/>
+  </p:clrMapOvr>
+</p:sld>
+</file>
+
+<file path=ppt/slides/slide6.xml><?xml version="1.0" encoding="utf-8"?>
+<p:sld xmlns:a="http://schemas.openxmlformats.org/drawingml/2006/main" xmlns:r="http://schemas.openxmlformats.org/officeDocument/2006/relationships" xmlns:p="http://schemas.openxmlformats.org/presentationml/2006/main">
+  <p:cSld>
+    <p:spTree>
+      <p:nvGrpSpPr>
+        <p:cNvPr id="1" name=""/>
+        <p:cNvGrpSpPr/>
+        <p:nvPr/>
+      </p:nvGrpSpPr>
+      <p:grpSpPr>
+        <a:xfrm>
+          <a:off x="0" y="0"/>
+          <a:ext cx="0" cy="0"/>
+          <a:chOff x="0" y="0"/>
+          <a:chExt cx="0" cy="0"/>
+        </a:xfrm>
+      </p:grpSpPr>
+      <p:pic>
+        <p:nvPicPr>
+          <p:cNvPr id="3" name="Picture 2">
+            <a:extLst>
+              <a:ext uri="{FF2B5EF4-FFF2-40B4-BE49-F238E27FC236}">
+                <a16:creationId xmlns:a16="http://schemas.microsoft.com/office/drawing/2014/main" id="{10211A64-1A60-C87E-12EB-6F0E3F25EC87}"/>
+              </a:ext>
+            </a:extLst>
+          </p:cNvPr>
+          <p:cNvPicPr>
+            <a:picLocks noChangeAspect="1"/>
+          </p:cNvPicPr>
+          <p:nvPr/>
+        </p:nvPicPr>
+        <p:blipFill>
+          <a:blip r:embed="rId2"/>
+          <a:stretch>
+            <a:fillRect/>
+          </a:stretch>
+        </p:blipFill>
+        <p:spPr>
+          <a:xfrm>
+            <a:off x="384277" y="4402559"/>
+            <a:ext cx="4992910" cy="2157631"/>
+          </a:xfrm>
+          <a:prstGeom prst="rect">
+            <a:avLst/>
+          </a:prstGeom>
+        </p:spPr>
+      </p:pic>
+      <p:pic>
+        <p:nvPicPr>
+          <p:cNvPr id="6" name="Picture 5">
+            <a:extLst>
+              <a:ext uri="{FF2B5EF4-FFF2-40B4-BE49-F238E27FC236}">
+                <a16:creationId xmlns:a16="http://schemas.microsoft.com/office/drawing/2014/main" id="{D5E3F976-2274-B5E7-CBD9-F062F883C083}"/>
+              </a:ext>
+            </a:extLst>
+          </p:cNvPr>
+          <p:cNvPicPr>
+            <a:picLocks noChangeAspect="1"/>
+          </p:cNvPicPr>
+          <p:nvPr/>
+        </p:nvPicPr>
+        <p:blipFill>
+          <a:blip r:embed="rId3"/>
+          <a:stretch>
+            <a:fillRect/>
+          </a:stretch>
+        </p:blipFill>
+        <p:spPr>
+          <a:xfrm>
+            <a:off x="587054" y="1963023"/>
+            <a:ext cx="3222136" cy="2044817"/>
+          </a:xfrm>
+          <a:prstGeom prst="rect">
+            <a:avLst/>
+          </a:prstGeom>
+        </p:spPr>
+      </p:pic>
+      <p:pic>
+        <p:nvPicPr>
+          <p:cNvPr id="8" name="Picture 7">
+            <a:extLst>
+              <a:ext uri="{FF2B5EF4-FFF2-40B4-BE49-F238E27FC236}">
+                <a16:creationId xmlns:a16="http://schemas.microsoft.com/office/drawing/2014/main" id="{440C9119-E5F0-C191-42BA-9DD3337EC08A}"/>
+              </a:ext>
+            </a:extLst>
+          </p:cNvPr>
+          <p:cNvPicPr>
+            <a:picLocks noChangeAspect="1"/>
+          </p:cNvPicPr>
+          <p:nvPr/>
+        </p:nvPicPr>
+        <p:blipFill>
+          <a:blip r:embed="rId4"/>
+          <a:stretch>
+            <a:fillRect/>
+          </a:stretch>
+        </p:blipFill>
+        <p:spPr>
+          <a:xfrm>
+            <a:off x="297851" y="241375"/>
+            <a:ext cx="5532497" cy="1326929"/>
+          </a:xfrm>
+          <a:prstGeom prst="rect">
+            <a:avLst/>
+          </a:prstGeom>
+        </p:spPr>
+      </p:pic>
+      <p:pic>
+        <p:nvPicPr>
+          <p:cNvPr id="12" name="Picture 11">
+            <a:extLst>
+              <a:ext uri="{FF2B5EF4-FFF2-40B4-BE49-F238E27FC236}">
+                <a16:creationId xmlns:a16="http://schemas.microsoft.com/office/drawing/2014/main" id="{67966FC3-49A5-B74F-115F-B9E4A6F3AA44}"/>
+              </a:ext>
+            </a:extLst>
+          </p:cNvPr>
+          <p:cNvPicPr>
+            <a:picLocks noChangeAspect="1"/>
+          </p:cNvPicPr>
+          <p:nvPr/>
+        </p:nvPicPr>
+        <p:blipFill>
+          <a:blip r:embed="rId5"/>
+          <a:stretch>
+            <a:fillRect/>
+          </a:stretch>
+        </p:blipFill>
+        <p:spPr>
+          <a:xfrm>
+            <a:off x="6160099" y="363041"/>
+            <a:ext cx="5734050" cy="2809875"/>
+          </a:xfrm>
+          <a:prstGeom prst="rect">
+            <a:avLst/>
+          </a:prstGeom>
+        </p:spPr>
+      </p:pic>
+    </p:spTree>
+    <p:extLst>
+      <p:ext uri="{BB962C8B-B14F-4D97-AF65-F5344CB8AC3E}">
+        <p14:creationId xmlns:p14="http://schemas.microsoft.com/office/powerpoint/2010/main" val="2782701362"/>
       </p:ext>
     </p:extLst>
   </p:cSld>

</xml_diff>

<commit_message>
Generate second version of the simulation in XFLR
</commit_message>
<xml_diff>
--- a/TechnicalReport/Figures.pptx
+++ b/TechnicalReport/Figures.pptx
@@ -11,6 +11,9 @@
     <p:sldId id="258" r:id="rId5"/>
     <p:sldId id="260" r:id="rId6"/>
     <p:sldId id="261" r:id="rId7"/>
+    <p:sldId id="262" r:id="rId8"/>
+    <p:sldId id="263" r:id="rId9"/>
+    <p:sldId id="264" r:id="rId10"/>
   </p:sldIdLst>
   <p:sldSz cx="12192000" cy="6858000"/>
   <p:notesSz cx="6858000" cy="9144000"/>
@@ -264,7 +267,7 @@
           <a:p>
             <a:fld id="{C1A24063-2F13-4A0D-BF3F-218053084915}" type="datetimeFigureOut">
               <a:rPr lang="en-US" smtClean="0"/>
-              <a:t>1/8/2023</a:t>
+              <a:t>2/8/2023</a:t>
             </a:fld>
             <a:endParaRPr lang="en-US"/>
           </a:p>
@@ -462,7 +465,7 @@
           <a:p>
             <a:fld id="{C1A24063-2F13-4A0D-BF3F-218053084915}" type="datetimeFigureOut">
               <a:rPr lang="en-US" smtClean="0"/>
-              <a:t>1/8/2023</a:t>
+              <a:t>2/8/2023</a:t>
             </a:fld>
             <a:endParaRPr lang="en-US"/>
           </a:p>
@@ -670,7 +673,7 @@
           <a:p>
             <a:fld id="{C1A24063-2F13-4A0D-BF3F-218053084915}" type="datetimeFigureOut">
               <a:rPr lang="en-US" smtClean="0"/>
-              <a:t>1/8/2023</a:t>
+              <a:t>2/8/2023</a:t>
             </a:fld>
             <a:endParaRPr lang="en-US"/>
           </a:p>
@@ -868,7 +871,7 @@
           <a:p>
             <a:fld id="{C1A24063-2F13-4A0D-BF3F-218053084915}" type="datetimeFigureOut">
               <a:rPr lang="en-US" smtClean="0"/>
-              <a:t>1/8/2023</a:t>
+              <a:t>2/8/2023</a:t>
             </a:fld>
             <a:endParaRPr lang="en-US"/>
           </a:p>
@@ -1143,7 +1146,7 @@
           <a:p>
             <a:fld id="{C1A24063-2F13-4A0D-BF3F-218053084915}" type="datetimeFigureOut">
               <a:rPr lang="en-US" smtClean="0"/>
-              <a:t>1/8/2023</a:t>
+              <a:t>2/8/2023</a:t>
             </a:fld>
             <a:endParaRPr lang="en-US"/>
           </a:p>
@@ -1408,7 +1411,7 @@
           <a:p>
             <a:fld id="{C1A24063-2F13-4A0D-BF3F-218053084915}" type="datetimeFigureOut">
               <a:rPr lang="en-US" smtClean="0"/>
-              <a:t>1/8/2023</a:t>
+              <a:t>2/8/2023</a:t>
             </a:fld>
             <a:endParaRPr lang="en-US"/>
           </a:p>
@@ -1820,7 +1823,7 @@
           <a:p>
             <a:fld id="{C1A24063-2F13-4A0D-BF3F-218053084915}" type="datetimeFigureOut">
               <a:rPr lang="en-US" smtClean="0"/>
-              <a:t>1/8/2023</a:t>
+              <a:t>2/8/2023</a:t>
             </a:fld>
             <a:endParaRPr lang="en-US"/>
           </a:p>
@@ -1961,7 +1964,7 @@
           <a:p>
             <a:fld id="{C1A24063-2F13-4A0D-BF3F-218053084915}" type="datetimeFigureOut">
               <a:rPr lang="en-US" smtClean="0"/>
-              <a:t>1/8/2023</a:t>
+              <a:t>2/8/2023</a:t>
             </a:fld>
             <a:endParaRPr lang="en-US"/>
           </a:p>
@@ -2074,7 +2077,7 @@
           <a:p>
             <a:fld id="{C1A24063-2F13-4A0D-BF3F-218053084915}" type="datetimeFigureOut">
               <a:rPr lang="en-US" smtClean="0"/>
-              <a:t>1/8/2023</a:t>
+              <a:t>2/8/2023</a:t>
             </a:fld>
             <a:endParaRPr lang="en-US"/>
           </a:p>
@@ -2385,7 +2388,7 @@
           <a:p>
             <a:fld id="{C1A24063-2F13-4A0D-BF3F-218053084915}" type="datetimeFigureOut">
               <a:rPr lang="en-US" smtClean="0"/>
-              <a:t>1/8/2023</a:t>
+              <a:t>2/8/2023</a:t>
             </a:fld>
             <a:endParaRPr lang="en-US"/>
           </a:p>
@@ -2673,7 +2676,7 @@
           <a:p>
             <a:fld id="{C1A24063-2F13-4A0D-BF3F-218053084915}" type="datetimeFigureOut">
               <a:rPr lang="en-US" smtClean="0"/>
-              <a:t>1/8/2023</a:t>
+              <a:t>2/8/2023</a:t>
             </a:fld>
             <a:endParaRPr lang="en-US"/>
           </a:p>
@@ -2914,7 +2917,7 @@
           <a:p>
             <a:fld id="{C1A24063-2F13-4A0D-BF3F-218053084915}" type="datetimeFigureOut">
               <a:rPr lang="en-US" smtClean="0"/>
-              <a:t>1/8/2023</a:t>
+              <a:t>2/8/2023</a:t>
             </a:fld>
             <a:endParaRPr lang="en-US"/>
           </a:p>
@@ -13165,6 +13168,533 @@
 </p:sld>
 </file>
 
+<file path=ppt/slides/slide7.xml><?xml version="1.0" encoding="utf-8"?>
+<p:sld xmlns:a="http://schemas.openxmlformats.org/drawingml/2006/main" xmlns:r="http://schemas.openxmlformats.org/officeDocument/2006/relationships" xmlns:p="http://schemas.openxmlformats.org/presentationml/2006/main">
+  <p:cSld>
+    <p:spTree>
+      <p:nvGrpSpPr>
+        <p:cNvPr id="1" name=""/>
+        <p:cNvGrpSpPr/>
+        <p:nvPr/>
+      </p:nvGrpSpPr>
+      <p:grpSpPr>
+        <a:xfrm>
+          <a:off x="0" y="0"/>
+          <a:ext cx="0" cy="0"/>
+          <a:chOff x="0" y="0"/>
+          <a:chExt cx="0" cy="0"/>
+        </a:xfrm>
+      </p:grpSpPr>
+      <p:pic>
+        <p:nvPicPr>
+          <p:cNvPr id="5" name="Picture 4">
+            <a:extLst>
+              <a:ext uri="{FF2B5EF4-FFF2-40B4-BE49-F238E27FC236}">
+                <a16:creationId xmlns:a16="http://schemas.microsoft.com/office/drawing/2014/main" id="{052B70B6-2FB9-4E35-B428-FB6ACD4FDFF0}"/>
+              </a:ext>
+            </a:extLst>
+          </p:cNvPr>
+          <p:cNvPicPr>
+            <a:picLocks noChangeAspect="1"/>
+          </p:cNvPicPr>
+          <p:nvPr/>
+        </p:nvPicPr>
+        <p:blipFill>
+          <a:blip r:embed="rId2"/>
+          <a:stretch>
+            <a:fillRect/>
+          </a:stretch>
+        </p:blipFill>
+        <p:spPr>
+          <a:xfrm>
+            <a:off x="1095374" y="1049426"/>
+            <a:ext cx="10001250" cy="2705100"/>
+          </a:xfrm>
+          <a:prstGeom prst="rect">
+            <a:avLst/>
+          </a:prstGeom>
+        </p:spPr>
+      </p:pic>
+      <p:sp>
+        <p:nvSpPr>
+          <p:cNvPr id="6" name="TextBox 5">
+            <a:extLst>
+              <a:ext uri="{FF2B5EF4-FFF2-40B4-BE49-F238E27FC236}">
+                <a16:creationId xmlns:a16="http://schemas.microsoft.com/office/drawing/2014/main" id="{B68A9736-0FE1-D02E-74D5-1B5A022FD70B}"/>
+              </a:ext>
+            </a:extLst>
+          </p:cNvPr>
+          <p:cNvSpPr txBox="1"/>
+          <p:nvPr/>
+        </p:nvSpPr>
+        <p:spPr>
+          <a:xfrm>
+            <a:off x="1225899" y="1294145"/>
+            <a:ext cx="2160396" cy="369332"/>
+          </a:xfrm>
+          <a:prstGeom prst="rect">
+            <a:avLst/>
+          </a:prstGeom>
+          <a:noFill/>
+        </p:spPr>
+        <p:txBody>
+          <a:bodyPr wrap="square" rtlCol="0">
+            <a:spAutoFit/>
+          </a:bodyPr>
+          <a:lstStyle/>
+          <a:p>
+            <a:r>
+              <a:rPr lang="en-US" dirty="0"/>
+              <a:t>Nasa MS(1) - 0313</a:t>
+            </a:r>
+          </a:p>
+        </p:txBody>
+      </p:sp>
+      <p:pic>
+        <p:nvPicPr>
+          <p:cNvPr id="8" name="Picture 7">
+            <a:extLst>
+              <a:ext uri="{FF2B5EF4-FFF2-40B4-BE49-F238E27FC236}">
+                <a16:creationId xmlns:a16="http://schemas.microsoft.com/office/drawing/2014/main" id="{22A7514E-A7F4-E9AD-305A-4592AA2405FE}"/>
+              </a:ext>
+            </a:extLst>
+          </p:cNvPr>
+          <p:cNvPicPr>
+            <a:picLocks noChangeAspect="1"/>
+          </p:cNvPicPr>
+          <p:nvPr/>
+        </p:nvPicPr>
+        <p:blipFill>
+          <a:blip r:embed="rId3"/>
+          <a:stretch>
+            <a:fillRect/>
+          </a:stretch>
+        </p:blipFill>
+        <p:spPr>
+          <a:xfrm>
+            <a:off x="1095374" y="3754526"/>
+            <a:ext cx="10001250" cy="2619375"/>
+          </a:xfrm>
+          <a:prstGeom prst="rect">
+            <a:avLst/>
+          </a:prstGeom>
+        </p:spPr>
+      </p:pic>
+      <p:sp>
+        <p:nvSpPr>
+          <p:cNvPr id="9" name="TextBox 8">
+            <a:extLst>
+              <a:ext uri="{FF2B5EF4-FFF2-40B4-BE49-F238E27FC236}">
+                <a16:creationId xmlns:a16="http://schemas.microsoft.com/office/drawing/2014/main" id="{157C5166-826D-C6D3-B395-E3F581FD6645}"/>
+              </a:ext>
+            </a:extLst>
+          </p:cNvPr>
+          <p:cNvSpPr txBox="1"/>
+          <p:nvPr/>
+        </p:nvSpPr>
+        <p:spPr>
+          <a:xfrm>
+            <a:off x="1348153" y="3941961"/>
+            <a:ext cx="2160396" cy="369332"/>
+          </a:xfrm>
+          <a:prstGeom prst="rect">
+            <a:avLst/>
+          </a:prstGeom>
+          <a:noFill/>
+        </p:spPr>
+        <p:txBody>
+          <a:bodyPr wrap="square" rtlCol="0">
+            <a:spAutoFit/>
+          </a:bodyPr>
+          <a:lstStyle/>
+          <a:p>
+            <a:r>
+              <a:rPr lang="en-US" dirty="0"/>
+              <a:t>NACA 0013</a:t>
+            </a:r>
+          </a:p>
+        </p:txBody>
+      </p:sp>
+    </p:spTree>
+    <p:extLst>
+      <p:ext uri="{BB962C8B-B14F-4D97-AF65-F5344CB8AC3E}">
+        <p14:creationId xmlns:p14="http://schemas.microsoft.com/office/powerpoint/2010/main" val="2037263508"/>
+      </p:ext>
+    </p:extLst>
+  </p:cSld>
+  <p:clrMapOvr>
+    <a:masterClrMapping/>
+  </p:clrMapOvr>
+</p:sld>
+</file>
+
+<file path=ppt/slides/slide8.xml><?xml version="1.0" encoding="utf-8"?>
+<p:sld xmlns:a="http://schemas.openxmlformats.org/drawingml/2006/main" xmlns:r="http://schemas.openxmlformats.org/officeDocument/2006/relationships" xmlns:p="http://schemas.openxmlformats.org/presentationml/2006/main">
+  <p:cSld>
+    <p:spTree>
+      <p:nvGrpSpPr>
+        <p:cNvPr id="1" name=""/>
+        <p:cNvGrpSpPr/>
+        <p:nvPr/>
+      </p:nvGrpSpPr>
+      <p:grpSpPr>
+        <a:xfrm>
+          <a:off x="0" y="0"/>
+          <a:ext cx="0" cy="0"/>
+          <a:chOff x="0" y="0"/>
+          <a:chExt cx="0" cy="0"/>
+        </a:xfrm>
+      </p:grpSpPr>
+      <p:pic>
+        <p:nvPicPr>
+          <p:cNvPr id="3" name="Picture 2">
+            <a:extLst>
+              <a:ext uri="{FF2B5EF4-FFF2-40B4-BE49-F238E27FC236}">
+                <a16:creationId xmlns:a16="http://schemas.microsoft.com/office/drawing/2014/main" id="{202E14CC-2017-59AC-F7A3-C32C5A86FAD3}"/>
+              </a:ext>
+            </a:extLst>
+          </p:cNvPr>
+          <p:cNvPicPr>
+            <a:picLocks noChangeAspect="1"/>
+          </p:cNvPicPr>
+          <p:nvPr/>
+        </p:nvPicPr>
+        <p:blipFill>
+          <a:blip r:embed="rId2"/>
+          <a:stretch>
+            <a:fillRect/>
+          </a:stretch>
+        </p:blipFill>
+        <p:spPr>
+          <a:xfrm>
+            <a:off x="1100137" y="2486025"/>
+            <a:ext cx="9991725" cy="1885950"/>
+          </a:xfrm>
+          <a:prstGeom prst="rect">
+            <a:avLst/>
+          </a:prstGeom>
+        </p:spPr>
+      </p:pic>
+      <p:sp>
+        <p:nvSpPr>
+          <p:cNvPr id="4" name="TextBox 3">
+            <a:extLst>
+              <a:ext uri="{FF2B5EF4-FFF2-40B4-BE49-F238E27FC236}">
+                <a16:creationId xmlns:a16="http://schemas.microsoft.com/office/drawing/2014/main" id="{4502A471-00FC-6404-A352-7D9BE3BE2876}"/>
+              </a:ext>
+            </a:extLst>
+          </p:cNvPr>
+          <p:cNvSpPr txBox="1"/>
+          <p:nvPr/>
+        </p:nvSpPr>
+        <p:spPr>
+          <a:xfrm>
+            <a:off x="1245996" y="2486025"/>
+            <a:ext cx="2160396" cy="369332"/>
+          </a:xfrm>
+          <a:prstGeom prst="rect">
+            <a:avLst/>
+          </a:prstGeom>
+          <a:noFill/>
+        </p:spPr>
+        <p:txBody>
+          <a:bodyPr wrap="square" rtlCol="0">
+            <a:spAutoFit/>
+          </a:bodyPr>
+          <a:lstStyle/>
+          <a:p>
+            <a:r>
+              <a:rPr lang="en-US" dirty="0"/>
+              <a:t>NACA with flaps</a:t>
+            </a:r>
+          </a:p>
+        </p:txBody>
+      </p:sp>
+    </p:spTree>
+    <p:extLst>
+      <p:ext uri="{BB962C8B-B14F-4D97-AF65-F5344CB8AC3E}">
+        <p14:creationId xmlns:p14="http://schemas.microsoft.com/office/powerpoint/2010/main" val="1377541627"/>
+      </p:ext>
+    </p:extLst>
+  </p:cSld>
+  <p:clrMapOvr>
+    <a:masterClrMapping/>
+  </p:clrMapOvr>
+</p:sld>
+</file>
+
+<file path=ppt/slides/slide9.xml><?xml version="1.0" encoding="utf-8"?>
+<p:sld xmlns:a="http://schemas.openxmlformats.org/drawingml/2006/main" xmlns:r="http://schemas.openxmlformats.org/officeDocument/2006/relationships" xmlns:p="http://schemas.openxmlformats.org/presentationml/2006/main">
+  <p:cSld>
+    <p:spTree>
+      <p:nvGrpSpPr>
+        <p:cNvPr id="1" name=""/>
+        <p:cNvGrpSpPr/>
+        <p:nvPr/>
+      </p:nvGrpSpPr>
+      <p:grpSpPr>
+        <a:xfrm>
+          <a:off x="0" y="0"/>
+          <a:ext cx="0" cy="0"/>
+          <a:chOff x="0" y="0"/>
+          <a:chExt cx="0" cy="0"/>
+        </a:xfrm>
+      </p:grpSpPr>
+      <p:pic>
+        <p:nvPicPr>
+          <p:cNvPr id="3" name="Picture 2">
+            <a:extLst>
+              <a:ext uri="{FF2B5EF4-FFF2-40B4-BE49-F238E27FC236}">
+                <a16:creationId xmlns:a16="http://schemas.microsoft.com/office/drawing/2014/main" id="{AE6DBC1B-F4CD-3B6B-3C1A-44A529D1F2E1}"/>
+              </a:ext>
+            </a:extLst>
+          </p:cNvPr>
+          <p:cNvPicPr>
+            <a:picLocks noChangeAspect="1"/>
+          </p:cNvPicPr>
+          <p:nvPr/>
+        </p:nvPicPr>
+        <p:blipFill>
+          <a:blip r:embed="rId2"/>
+          <a:stretch>
+            <a:fillRect/>
+          </a:stretch>
+        </p:blipFill>
+        <p:spPr>
+          <a:xfrm>
+            <a:off x="514350" y="1862137"/>
+            <a:ext cx="11163300" cy="3133725"/>
+          </a:xfrm>
+          <a:prstGeom prst="rect">
+            <a:avLst/>
+          </a:prstGeom>
+        </p:spPr>
+      </p:pic>
+      <mc:AlternateContent xmlns:mc="http://schemas.openxmlformats.org/markup-compatibility/2006">
+        <mc:Choice xmlns:a14="http://schemas.microsoft.com/office/drawing/2010/main" Requires="a14">
+          <p:sp>
+            <p:nvSpPr>
+              <p:cNvPr id="4" name="TextBox 3">
+                <a:extLst>
+                  <a:ext uri="{FF2B5EF4-FFF2-40B4-BE49-F238E27FC236}">
+                    <a16:creationId xmlns:a16="http://schemas.microsoft.com/office/drawing/2014/main" id="{C682ED06-2E4C-D805-5B36-27CB24B2E529}"/>
+                  </a:ext>
+                </a:extLst>
+              </p:cNvPr>
+              <p:cNvSpPr txBox="1"/>
+              <p:nvPr/>
+            </p:nvSpPr>
+            <p:spPr>
+              <a:xfrm>
+                <a:off x="819969" y="2028825"/>
+                <a:ext cx="2160396" cy="369332"/>
+              </a:xfrm>
+              <a:prstGeom prst="rect">
+                <a:avLst/>
+              </a:prstGeom>
+              <a:noFill/>
+            </p:spPr>
+            <p:txBody>
+              <a:bodyPr wrap="square" rtlCol="0">
+                <a:spAutoFit/>
+              </a:bodyPr>
+              <a:lstStyle/>
+              <a:p>
+                <a:r>
+                  <a:rPr lang="en-US" dirty="0">
+                    <a:solidFill>
+                      <a:schemeClr val="bg1"/>
+                    </a:solidFill>
+                  </a:rPr>
+                  <a:t>Re </a:t>
+                </a:r>
+                <a14:m>
+                  <m:oMath xmlns:m="http://schemas.openxmlformats.org/officeDocument/2006/math">
+                    <m:sSup>
+                      <m:sSupPr>
+                        <m:ctrlPr>
+                          <a:rPr lang="en-US" b="0" i="1" smtClean="0">
+                            <a:solidFill>
+                              <a:schemeClr val="bg1"/>
+                            </a:solidFill>
+                            <a:latin typeface="Cambria Math" panose="02040503050406030204" pitchFamily="18" charset="0"/>
+                          </a:rPr>
+                        </m:ctrlPr>
+                      </m:sSupPr>
+                      <m:e>
+                        <m:r>
+                          <a:rPr lang="en-US" b="0" i="1" smtClean="0">
+                            <a:solidFill>
+                              <a:schemeClr val="bg1"/>
+                            </a:solidFill>
+                            <a:latin typeface="Cambria Math" panose="02040503050406030204" pitchFamily="18" charset="0"/>
+                          </a:rPr>
+                          <m:t>10</m:t>
+                        </m:r>
+                      </m:e>
+                      <m:sup>
+                        <m:r>
+                          <a:rPr lang="en-US" b="0" i="1" smtClean="0">
+                            <a:solidFill>
+                              <a:schemeClr val="bg1"/>
+                            </a:solidFill>
+                            <a:latin typeface="Cambria Math" panose="02040503050406030204" pitchFamily="18" charset="0"/>
+                          </a:rPr>
+                          <m:t>6</m:t>
+                        </m:r>
+                      </m:sup>
+                    </m:sSup>
+                    <m:r>
+                      <a:rPr lang="en-US" b="0" i="1" smtClean="0">
+                        <a:solidFill>
+                          <a:schemeClr val="bg1"/>
+                        </a:solidFill>
+                        <a:latin typeface="Cambria Math" panose="02040503050406030204" pitchFamily="18" charset="0"/>
+                      </a:rPr>
+                      <m:t>−</m:t>
+                    </m:r>
+                    <m:sSup>
+                      <m:sSupPr>
+                        <m:ctrlPr>
+                          <a:rPr lang="en-US" b="0" i="1" smtClean="0">
+                            <a:solidFill>
+                              <a:schemeClr val="bg1"/>
+                            </a:solidFill>
+                            <a:latin typeface="Cambria Math" panose="02040503050406030204" pitchFamily="18" charset="0"/>
+                          </a:rPr>
+                        </m:ctrlPr>
+                      </m:sSupPr>
+                      <m:e>
+                        <m:r>
+                          <a:rPr lang="en-US" b="0" i="1" smtClean="0">
+                            <a:solidFill>
+                              <a:schemeClr val="bg1"/>
+                            </a:solidFill>
+                            <a:latin typeface="Cambria Math" panose="02040503050406030204" pitchFamily="18" charset="0"/>
+                          </a:rPr>
+                          <m:t>10</m:t>
+                        </m:r>
+                      </m:e>
+                      <m:sup>
+                        <m:r>
+                          <a:rPr lang="en-US" b="0" i="1" smtClean="0">
+                            <a:solidFill>
+                              <a:schemeClr val="bg1"/>
+                            </a:solidFill>
+                            <a:latin typeface="Cambria Math" panose="02040503050406030204" pitchFamily="18" charset="0"/>
+                          </a:rPr>
+                          <m:t>9</m:t>
+                        </m:r>
+                      </m:sup>
+                    </m:sSup>
+                  </m:oMath>
+                </a14:m>
+                <a:endParaRPr lang="en-US" dirty="0">
+                  <a:solidFill>
+                    <a:schemeClr val="bg1"/>
+                  </a:solidFill>
+                </a:endParaRPr>
+              </a:p>
+            </p:txBody>
+          </p:sp>
+        </mc:Choice>
+        <mc:Fallback>
+          <p:sp>
+            <p:nvSpPr>
+              <p:cNvPr id="4" name="TextBox 3">
+                <a:extLst>
+                  <a:ext uri="{FF2B5EF4-FFF2-40B4-BE49-F238E27FC236}">
+                    <a16:creationId xmlns:a16="http://schemas.microsoft.com/office/drawing/2014/main" id="{C682ED06-2E4C-D805-5B36-27CB24B2E529}"/>
+                  </a:ext>
+                </a:extLst>
+              </p:cNvPr>
+              <p:cNvSpPr txBox="1">
+                <a:spLocks noRot="1" noChangeAspect="1" noMove="1" noResize="1" noEditPoints="1" noAdjustHandles="1" noChangeArrowheads="1" noChangeShapeType="1" noTextEdit="1"/>
+              </p:cNvSpPr>
+              <p:nvPr/>
+            </p:nvSpPr>
+            <p:spPr>
+              <a:xfrm>
+                <a:off x="819969" y="2028825"/>
+                <a:ext cx="2160396" cy="369332"/>
+              </a:xfrm>
+              <a:prstGeom prst="rect">
+                <a:avLst/>
+              </a:prstGeom>
+              <a:blipFill>
+                <a:blip r:embed="rId3"/>
+                <a:stretch>
+                  <a:fillRect l="-2542" t="-10000" b="-26667"/>
+                </a:stretch>
+              </a:blipFill>
+            </p:spPr>
+            <p:txBody>
+              <a:bodyPr/>
+              <a:lstStyle/>
+              <a:p>
+                <a:r>
+                  <a:rPr lang="en-US">
+                    <a:noFill/>
+                  </a:rPr>
+                  <a:t> </a:t>
+                </a:r>
+              </a:p>
+            </p:txBody>
+          </p:sp>
+        </mc:Fallback>
+      </mc:AlternateContent>
+      <p:sp>
+        <p:nvSpPr>
+          <p:cNvPr id="5" name="TextBox 4">
+            <a:extLst>
+              <a:ext uri="{FF2B5EF4-FFF2-40B4-BE49-F238E27FC236}">
+                <a16:creationId xmlns:a16="http://schemas.microsoft.com/office/drawing/2014/main" id="{C8FB0067-67F7-1258-A4DB-BAB5B1DFDFE2}"/>
+              </a:ext>
+            </a:extLst>
+          </p:cNvPr>
+          <p:cNvSpPr txBox="1"/>
+          <p:nvPr/>
+        </p:nvSpPr>
+        <p:spPr>
+          <a:xfrm>
+            <a:off x="3285984" y="2028825"/>
+            <a:ext cx="2160396" cy="369332"/>
+          </a:xfrm>
+          <a:prstGeom prst="rect">
+            <a:avLst/>
+          </a:prstGeom>
+          <a:noFill/>
+        </p:spPr>
+        <p:txBody>
+          <a:bodyPr wrap="square" rtlCol="0">
+            <a:spAutoFit/>
+          </a:bodyPr>
+          <a:lstStyle/>
+          <a:p>
+            <a:r>
+              <a:rPr lang="en-US" dirty="0">
+                <a:solidFill>
+                  <a:schemeClr val="bg1"/>
+                </a:solidFill>
+              </a:rPr>
+              <a:t>NASA 0313</a:t>
+            </a:r>
+          </a:p>
+        </p:txBody>
+      </p:sp>
+    </p:spTree>
+    <p:extLst>
+      <p:ext uri="{BB962C8B-B14F-4D97-AF65-F5344CB8AC3E}">
+        <p14:creationId xmlns:p14="http://schemas.microsoft.com/office/powerpoint/2010/main" val="2892974697"/>
+      </p:ext>
+    </p:extLst>
+  </p:cSld>
+  <p:clrMapOvr>
+    <a:masterClrMapping/>
+  </p:clrMapOvr>
+</p:sld>
+</file>
+
 <file path=ppt/theme/theme1.xml><?xml version="1.0" encoding="utf-8"?>
 <a:theme xmlns:a="http://schemas.openxmlformats.org/drawingml/2006/main" name="Office Theme">
   <a:themeElements>

</xml_diff>

<commit_message>
Static stability analysis done
</commit_message>
<xml_diff>
--- a/TechnicalReport/Figures.pptx
+++ b/TechnicalReport/Figures.pptx
@@ -16,6 +16,7 @@
     <p:sldId id="264" r:id="rId10"/>
     <p:sldId id="265" r:id="rId11"/>
     <p:sldId id="266" r:id="rId12"/>
+    <p:sldId id="267" r:id="rId13"/>
   </p:sldIdLst>
   <p:sldSz cx="12192000" cy="6858000"/>
   <p:notesSz cx="6858000" cy="9144000"/>
@@ -269,7 +270,7 @@
           <a:p>
             <a:fld id="{C1A24063-2F13-4A0D-BF3F-218053084915}" type="datetimeFigureOut">
               <a:rPr lang="en-US" smtClean="0"/>
-              <a:t>2/8/2023</a:t>
+              <a:t>2/9/2023</a:t>
             </a:fld>
             <a:endParaRPr lang="en-US"/>
           </a:p>
@@ -467,7 +468,7 @@
           <a:p>
             <a:fld id="{C1A24063-2F13-4A0D-BF3F-218053084915}" type="datetimeFigureOut">
               <a:rPr lang="en-US" smtClean="0"/>
-              <a:t>2/8/2023</a:t>
+              <a:t>2/9/2023</a:t>
             </a:fld>
             <a:endParaRPr lang="en-US"/>
           </a:p>
@@ -675,7 +676,7 @@
           <a:p>
             <a:fld id="{C1A24063-2F13-4A0D-BF3F-218053084915}" type="datetimeFigureOut">
               <a:rPr lang="en-US" smtClean="0"/>
-              <a:t>2/8/2023</a:t>
+              <a:t>2/9/2023</a:t>
             </a:fld>
             <a:endParaRPr lang="en-US"/>
           </a:p>
@@ -873,7 +874,7 @@
           <a:p>
             <a:fld id="{C1A24063-2F13-4A0D-BF3F-218053084915}" type="datetimeFigureOut">
               <a:rPr lang="en-US" smtClean="0"/>
-              <a:t>2/8/2023</a:t>
+              <a:t>2/9/2023</a:t>
             </a:fld>
             <a:endParaRPr lang="en-US"/>
           </a:p>
@@ -1148,7 +1149,7 @@
           <a:p>
             <a:fld id="{C1A24063-2F13-4A0D-BF3F-218053084915}" type="datetimeFigureOut">
               <a:rPr lang="en-US" smtClean="0"/>
-              <a:t>2/8/2023</a:t>
+              <a:t>2/9/2023</a:t>
             </a:fld>
             <a:endParaRPr lang="en-US"/>
           </a:p>
@@ -1413,7 +1414,7 @@
           <a:p>
             <a:fld id="{C1A24063-2F13-4A0D-BF3F-218053084915}" type="datetimeFigureOut">
               <a:rPr lang="en-US" smtClean="0"/>
-              <a:t>2/8/2023</a:t>
+              <a:t>2/9/2023</a:t>
             </a:fld>
             <a:endParaRPr lang="en-US"/>
           </a:p>
@@ -1825,7 +1826,7 @@
           <a:p>
             <a:fld id="{C1A24063-2F13-4A0D-BF3F-218053084915}" type="datetimeFigureOut">
               <a:rPr lang="en-US" smtClean="0"/>
-              <a:t>2/8/2023</a:t>
+              <a:t>2/9/2023</a:t>
             </a:fld>
             <a:endParaRPr lang="en-US"/>
           </a:p>
@@ -1966,7 +1967,7 @@
           <a:p>
             <a:fld id="{C1A24063-2F13-4A0D-BF3F-218053084915}" type="datetimeFigureOut">
               <a:rPr lang="en-US" smtClean="0"/>
-              <a:t>2/8/2023</a:t>
+              <a:t>2/9/2023</a:t>
             </a:fld>
             <a:endParaRPr lang="en-US"/>
           </a:p>
@@ -2079,7 +2080,7 @@
           <a:p>
             <a:fld id="{C1A24063-2F13-4A0D-BF3F-218053084915}" type="datetimeFigureOut">
               <a:rPr lang="en-US" smtClean="0"/>
-              <a:t>2/8/2023</a:t>
+              <a:t>2/9/2023</a:t>
             </a:fld>
             <a:endParaRPr lang="en-US"/>
           </a:p>
@@ -2390,7 +2391,7 @@
           <a:p>
             <a:fld id="{C1A24063-2F13-4A0D-BF3F-218053084915}" type="datetimeFigureOut">
               <a:rPr lang="en-US" smtClean="0"/>
-              <a:t>2/8/2023</a:t>
+              <a:t>2/9/2023</a:t>
             </a:fld>
             <a:endParaRPr lang="en-US"/>
           </a:p>
@@ -2678,7 +2679,7 @@
           <a:p>
             <a:fld id="{C1A24063-2F13-4A0D-BF3F-218053084915}" type="datetimeFigureOut">
               <a:rPr lang="en-US" smtClean="0"/>
-              <a:t>2/8/2023</a:t>
+              <a:t>2/9/2023</a:t>
             </a:fld>
             <a:endParaRPr lang="en-US"/>
           </a:p>
@@ -2919,7 +2920,7 @@
           <a:p>
             <a:fld id="{C1A24063-2F13-4A0D-BF3F-218053084915}" type="datetimeFigureOut">
               <a:rPr lang="en-US" smtClean="0"/>
-              <a:t>2/8/2023</a:t>
+              <a:t>2/9/2023</a:t>
             </a:fld>
             <a:endParaRPr lang="en-US"/>
           </a:p>
@@ -4686,8 +4687,8 @@
             </a:fontRef>
           </p:style>
         </p:cxnSp>
-        <mc:AlternateContent xmlns:mc="http://schemas.openxmlformats.org/markup-compatibility/2006">
-          <mc:Choice xmlns:a14="http://schemas.microsoft.com/office/drawing/2010/main" Requires="a14">
+        <mc:AlternateContent xmlns:mc="http://schemas.openxmlformats.org/markup-compatibility/2006" xmlns:a14="http://schemas.microsoft.com/office/drawing/2010/main">
+          <mc:Choice Requires="a14">
             <p:sp>
               <p:nvSpPr>
                 <p:cNvPr id="202" name="TextBox 201">
@@ -4790,7 +4791,7 @@
               </p:txBody>
             </p:sp>
           </mc:Choice>
-          <mc:Fallback>
+          <mc:Fallback xmlns="">
             <p:sp>
               <p:nvSpPr>
                 <p:cNvPr id="202" name="TextBox 201">
@@ -4835,8 +4836,8 @@
             </p:sp>
           </mc:Fallback>
         </mc:AlternateContent>
-        <mc:AlternateContent xmlns:mc="http://schemas.openxmlformats.org/markup-compatibility/2006">
-          <mc:Choice xmlns:a14="http://schemas.microsoft.com/office/drawing/2010/main" Requires="a14">
+        <mc:AlternateContent xmlns:mc="http://schemas.openxmlformats.org/markup-compatibility/2006" xmlns:a14="http://schemas.microsoft.com/office/drawing/2010/main">
+          <mc:Choice Requires="a14">
             <p:sp>
               <p:nvSpPr>
                 <p:cNvPr id="203" name="TextBox 202">
@@ -4939,7 +4940,7 @@
               </p:txBody>
             </p:sp>
           </mc:Choice>
-          <mc:Fallback>
+          <mc:Fallback xmlns="">
             <p:sp>
               <p:nvSpPr>
                 <p:cNvPr id="203" name="TextBox 202">
@@ -5119,8 +5120,8 @@
             </a:fontRef>
           </p:style>
         </p:cxnSp>
-        <mc:AlternateContent xmlns:mc="http://schemas.openxmlformats.org/markup-compatibility/2006">
-          <mc:Choice xmlns:a14="http://schemas.microsoft.com/office/drawing/2010/main" Requires="a14">
+        <mc:AlternateContent xmlns:mc="http://schemas.openxmlformats.org/markup-compatibility/2006" xmlns:a14="http://schemas.microsoft.com/office/drawing/2010/main">
+          <mc:Choice Requires="a14">
             <p:sp>
               <p:nvSpPr>
                 <p:cNvPr id="207" name="TextBox 206">
@@ -5223,7 +5224,7 @@
               </p:txBody>
             </p:sp>
           </mc:Choice>
-          <mc:Fallback>
+          <mc:Fallback xmlns="">
             <p:sp>
               <p:nvSpPr>
                 <p:cNvPr id="207" name="TextBox 206">
@@ -5313,8 +5314,8 @@
             </a:fontRef>
           </p:style>
         </p:cxnSp>
-        <mc:AlternateContent xmlns:mc="http://schemas.openxmlformats.org/markup-compatibility/2006">
-          <mc:Choice xmlns:a14="http://schemas.microsoft.com/office/drawing/2010/main" Requires="a14">
+        <mc:AlternateContent xmlns:mc="http://schemas.openxmlformats.org/markup-compatibility/2006" xmlns:a14="http://schemas.microsoft.com/office/drawing/2010/main">
+          <mc:Choice Requires="a14">
             <p:sp>
               <p:nvSpPr>
                 <p:cNvPr id="209" name="TextBox 208">
@@ -5417,7 +5418,7 @@
               </p:txBody>
             </p:sp>
           </mc:Choice>
-          <mc:Fallback>
+          <mc:Fallback xmlns="">
             <p:sp>
               <p:nvSpPr>
                 <p:cNvPr id="209" name="TextBox 208">
@@ -5462,8 +5463,8 @@
             </p:sp>
           </mc:Fallback>
         </mc:AlternateContent>
-        <mc:AlternateContent xmlns:mc="http://schemas.openxmlformats.org/markup-compatibility/2006">
-          <mc:Choice xmlns:a14="http://schemas.microsoft.com/office/drawing/2010/main" Requires="a14">
+        <mc:AlternateContent xmlns:mc="http://schemas.openxmlformats.org/markup-compatibility/2006" xmlns:a14="http://schemas.microsoft.com/office/drawing/2010/main">
+          <mc:Choice Requires="a14">
             <p:sp>
               <p:nvSpPr>
                 <p:cNvPr id="210" name="TextBox 209">
@@ -5548,7 +5549,7 @@
               </p:txBody>
             </p:sp>
           </mc:Choice>
-          <mc:Fallback>
+          <mc:Fallback xmlns="">
             <p:sp>
               <p:nvSpPr>
                 <p:cNvPr id="210" name="TextBox 209">
@@ -5732,8 +5733,8 @@
             </a:fontRef>
           </p:style>
         </p:cxnSp>
-        <mc:AlternateContent xmlns:mc="http://schemas.openxmlformats.org/markup-compatibility/2006">
-          <mc:Choice xmlns:a14="http://schemas.microsoft.com/office/drawing/2010/main" Requires="a14">
+        <mc:AlternateContent xmlns:mc="http://schemas.openxmlformats.org/markup-compatibility/2006" xmlns:a14="http://schemas.microsoft.com/office/drawing/2010/main">
+          <mc:Choice Requires="a14">
             <p:sp>
               <p:nvSpPr>
                 <p:cNvPr id="214" name="TextBox 213">
@@ -5813,7 +5814,7 @@
               </p:txBody>
             </p:sp>
           </mc:Choice>
-          <mc:Fallback>
+          <mc:Fallback xmlns="">
             <p:sp>
               <p:nvSpPr>
                 <p:cNvPr id="214" name="TextBox 213">
@@ -5903,8 +5904,8 @@
             </a:fontRef>
           </p:style>
         </p:cxnSp>
-        <mc:AlternateContent xmlns:mc="http://schemas.openxmlformats.org/markup-compatibility/2006">
-          <mc:Choice xmlns:a14="http://schemas.microsoft.com/office/drawing/2010/main" Requires="a14">
+        <mc:AlternateContent xmlns:mc="http://schemas.openxmlformats.org/markup-compatibility/2006" xmlns:a14="http://schemas.microsoft.com/office/drawing/2010/main">
+          <mc:Choice Requires="a14">
             <p:sp>
               <p:nvSpPr>
                 <p:cNvPr id="216" name="TextBox 215">
@@ -6007,7 +6008,7 @@
               </p:txBody>
             </p:sp>
           </mc:Choice>
-          <mc:Fallback>
+          <mc:Fallback xmlns="">
             <p:sp>
               <p:nvSpPr>
                 <p:cNvPr id="216" name="TextBox 215">
@@ -6150,8 +6151,8 @@
             </a:fontRef>
           </p:style>
         </p:cxnSp>
-        <mc:AlternateContent xmlns:mc="http://schemas.openxmlformats.org/markup-compatibility/2006">
-          <mc:Choice xmlns:a14="http://schemas.microsoft.com/office/drawing/2010/main" Requires="a14">
+        <mc:AlternateContent xmlns:mc="http://schemas.openxmlformats.org/markup-compatibility/2006" xmlns:a14="http://schemas.microsoft.com/office/drawing/2010/main">
+          <mc:Choice Requires="a14">
             <p:sp>
               <p:nvSpPr>
                 <p:cNvPr id="162" name="TextBox 161">
@@ -6238,7 +6239,7 @@
               </p:txBody>
             </p:sp>
           </mc:Choice>
-          <mc:Fallback>
+          <mc:Fallback xmlns="">
             <p:sp>
               <p:nvSpPr>
                 <p:cNvPr id="162" name="TextBox 161">
@@ -6369,8 +6370,8 @@
             </a:fontRef>
           </p:style>
         </p:cxnSp>
-        <mc:AlternateContent xmlns:mc="http://schemas.openxmlformats.org/markup-compatibility/2006">
-          <mc:Choice xmlns:a14="http://schemas.microsoft.com/office/drawing/2010/main" Requires="a14">
+        <mc:AlternateContent xmlns:mc="http://schemas.openxmlformats.org/markup-compatibility/2006" xmlns:a14="http://schemas.microsoft.com/office/drawing/2010/main">
+          <mc:Choice Requires="a14">
             <p:sp>
               <p:nvSpPr>
                 <p:cNvPr id="165" name="TextBox 164">
@@ -6482,7 +6483,7 @@
               </p:txBody>
             </p:sp>
           </mc:Choice>
-          <mc:Fallback>
+          <mc:Fallback xmlns="">
             <p:sp>
               <p:nvSpPr>
                 <p:cNvPr id="165" name="TextBox 164">
@@ -6709,8 +6710,8 @@
             </a:fontRef>
           </p:style>
         </p:cxnSp>
-        <mc:AlternateContent xmlns:mc="http://schemas.openxmlformats.org/markup-compatibility/2006">
-          <mc:Choice xmlns:a14="http://schemas.microsoft.com/office/drawing/2010/main" Requires="a14">
+        <mc:AlternateContent xmlns:mc="http://schemas.openxmlformats.org/markup-compatibility/2006" xmlns:a14="http://schemas.microsoft.com/office/drawing/2010/main">
+          <mc:Choice Requires="a14">
             <p:sp>
               <p:nvSpPr>
                 <p:cNvPr id="169" name="TextBox 168">
@@ -6797,7 +6798,7 @@
               </p:txBody>
             </p:sp>
           </mc:Choice>
-          <mc:Fallback>
+          <mc:Fallback xmlns="">
             <p:sp>
               <p:nvSpPr>
                 <p:cNvPr id="169" name="TextBox 168">
@@ -7307,8 +7308,8 @@
             </a:fontRef>
           </p:style>
         </p:cxnSp>
-        <mc:AlternateContent xmlns:mc="http://schemas.openxmlformats.org/markup-compatibility/2006">
-          <mc:Choice xmlns:a14="http://schemas.microsoft.com/office/drawing/2010/main" Requires="a14">
+        <mc:AlternateContent xmlns:mc="http://schemas.openxmlformats.org/markup-compatibility/2006" xmlns:a14="http://schemas.microsoft.com/office/drawing/2010/main">
+          <mc:Choice Requires="a14">
             <p:sp>
               <p:nvSpPr>
                 <p:cNvPr id="178" name="TextBox 177">
@@ -7395,7 +7396,7 @@
               </p:txBody>
             </p:sp>
           </mc:Choice>
-          <mc:Fallback>
+          <mc:Fallback xmlns="">
             <p:sp>
               <p:nvSpPr>
                 <p:cNvPr id="178" name="TextBox 177">
@@ -7440,8 +7441,8 @@
             </p:sp>
           </mc:Fallback>
         </mc:AlternateContent>
-        <mc:AlternateContent xmlns:mc="http://schemas.openxmlformats.org/markup-compatibility/2006">
-          <mc:Choice xmlns:a14="http://schemas.microsoft.com/office/drawing/2010/main" Requires="a14">
+        <mc:AlternateContent xmlns:mc="http://schemas.openxmlformats.org/markup-compatibility/2006" xmlns:a14="http://schemas.microsoft.com/office/drawing/2010/main">
+          <mc:Choice Requires="a14">
             <p:sp>
               <p:nvSpPr>
                 <p:cNvPr id="179" name="TextBox 178">
@@ -7528,7 +7529,7 @@
               </p:txBody>
             </p:sp>
           </mc:Choice>
-          <mc:Fallback>
+          <mc:Fallback xmlns="">
             <p:sp>
               <p:nvSpPr>
                 <p:cNvPr id="179" name="TextBox 178">
@@ -7713,8 +7714,8 @@
             </a:fontRef>
           </p:style>
         </p:cxnSp>
-        <mc:AlternateContent xmlns:mc="http://schemas.openxmlformats.org/markup-compatibility/2006">
-          <mc:Choice xmlns:a14="http://schemas.microsoft.com/office/drawing/2010/main" Requires="a14">
+        <mc:AlternateContent xmlns:mc="http://schemas.openxmlformats.org/markup-compatibility/2006" xmlns:a14="http://schemas.microsoft.com/office/drawing/2010/main">
+          <mc:Choice Requires="a14">
             <p:sp>
               <p:nvSpPr>
                 <p:cNvPr id="183" name="TextBox 182">
@@ -7801,7 +7802,7 @@
               </p:txBody>
             </p:sp>
           </mc:Choice>
-          <mc:Fallback>
+          <mc:Fallback xmlns="">
             <p:sp>
               <p:nvSpPr>
                 <p:cNvPr id="183" name="TextBox 182">
@@ -8121,8 +8122,8 @@
             </a:p>
           </p:txBody>
         </p:sp>
-        <mc:AlternateContent xmlns:mc="http://schemas.openxmlformats.org/markup-compatibility/2006">
-          <mc:Choice xmlns:a14="http://schemas.microsoft.com/office/drawing/2010/main" Requires="a14">
+        <mc:AlternateContent xmlns:mc="http://schemas.openxmlformats.org/markup-compatibility/2006" xmlns:a14="http://schemas.microsoft.com/office/drawing/2010/main">
+          <mc:Choice Requires="a14">
             <p:sp>
               <p:nvSpPr>
                 <p:cNvPr id="186" name="TextBox 185">
@@ -8207,7 +8208,7 @@
               </p:txBody>
             </p:sp>
           </mc:Choice>
-          <mc:Fallback>
+          <mc:Fallback xmlns="">
             <p:sp>
               <p:nvSpPr>
                 <p:cNvPr id="186" name="TextBox 185">
@@ -8252,8 +8253,8 @@
             </p:sp>
           </mc:Fallback>
         </mc:AlternateContent>
-        <mc:AlternateContent xmlns:mc="http://schemas.openxmlformats.org/markup-compatibility/2006">
-          <mc:Choice xmlns:a14="http://schemas.microsoft.com/office/drawing/2010/main" Requires="a14">
+        <mc:AlternateContent xmlns:mc="http://schemas.openxmlformats.org/markup-compatibility/2006" xmlns:a14="http://schemas.microsoft.com/office/drawing/2010/main">
+          <mc:Choice Requires="a14">
             <p:sp>
               <p:nvSpPr>
                 <p:cNvPr id="187" name="TextBox 186">
@@ -8338,7 +8339,7 @@
               </p:txBody>
             </p:sp>
           </mc:Choice>
-          <mc:Fallback>
+          <mc:Fallback xmlns="">
             <p:sp>
               <p:nvSpPr>
                 <p:cNvPr id="187" name="TextBox 186">
@@ -9522,8 +9523,8 @@
             </a:fontRef>
           </p:style>
         </p:cxnSp>
-        <mc:AlternateContent xmlns:mc="http://schemas.openxmlformats.org/markup-compatibility/2006">
-          <mc:Choice xmlns:a14="http://schemas.microsoft.com/office/drawing/2010/main" Requires="a14">
+        <mc:AlternateContent xmlns:mc="http://schemas.openxmlformats.org/markup-compatibility/2006" xmlns:a14="http://schemas.microsoft.com/office/drawing/2010/main">
+          <mc:Choice Requires="a14">
             <p:sp>
               <p:nvSpPr>
                 <p:cNvPr id="123" name="TextBox 122">
@@ -9635,7 +9636,7 @@
               </p:txBody>
             </p:sp>
           </mc:Choice>
-          <mc:Fallback>
+          <mc:Fallback xmlns="">
             <p:sp>
               <p:nvSpPr>
                 <p:cNvPr id="123" name="TextBox 122">
@@ -9725,8 +9726,8 @@
             </a:fontRef>
           </p:style>
         </p:cxnSp>
-        <mc:AlternateContent xmlns:mc="http://schemas.openxmlformats.org/markup-compatibility/2006">
-          <mc:Choice xmlns:a14="http://schemas.microsoft.com/office/drawing/2010/main" Requires="a14">
+        <mc:AlternateContent xmlns:mc="http://schemas.openxmlformats.org/markup-compatibility/2006" xmlns:a14="http://schemas.microsoft.com/office/drawing/2010/main">
+          <mc:Choice Requires="a14">
             <p:sp>
               <p:nvSpPr>
                 <p:cNvPr id="125" name="TextBox 124">
@@ -9829,7 +9830,7 @@
               </p:txBody>
             </p:sp>
           </mc:Choice>
-          <mc:Fallback>
+          <mc:Fallback xmlns="">
             <p:sp>
               <p:nvSpPr>
                 <p:cNvPr id="125" name="TextBox 124">
@@ -9919,8 +9920,8 @@
             </a:fontRef>
           </p:style>
         </p:cxnSp>
-        <mc:AlternateContent xmlns:mc="http://schemas.openxmlformats.org/markup-compatibility/2006">
-          <mc:Choice xmlns:a14="http://schemas.microsoft.com/office/drawing/2010/main" Requires="a14">
+        <mc:AlternateContent xmlns:mc="http://schemas.openxmlformats.org/markup-compatibility/2006" xmlns:a14="http://schemas.microsoft.com/office/drawing/2010/main">
+          <mc:Choice Requires="a14">
             <p:sp>
               <p:nvSpPr>
                 <p:cNvPr id="127" name="TextBox 126">
@@ -10023,7 +10024,7 @@
               </p:txBody>
             </p:sp>
           </mc:Choice>
-          <mc:Fallback>
+          <mc:Fallback xmlns="">
             <p:sp>
               <p:nvSpPr>
                 <p:cNvPr id="127" name="TextBox 126">
@@ -10113,8 +10114,8 @@
             </a:fontRef>
           </p:style>
         </p:cxnSp>
-        <mc:AlternateContent xmlns:mc="http://schemas.openxmlformats.org/markup-compatibility/2006">
-          <mc:Choice xmlns:a14="http://schemas.microsoft.com/office/drawing/2010/main" Requires="a14">
+        <mc:AlternateContent xmlns:mc="http://schemas.openxmlformats.org/markup-compatibility/2006" xmlns:a14="http://schemas.microsoft.com/office/drawing/2010/main">
+          <mc:Choice Requires="a14">
             <p:sp>
               <p:nvSpPr>
                 <p:cNvPr id="129" name="TextBox 128">
@@ -10217,7 +10218,7 @@
               </p:txBody>
             </p:sp>
           </mc:Choice>
-          <mc:Fallback>
+          <mc:Fallback xmlns="">
             <p:sp>
               <p:nvSpPr>
                 <p:cNvPr id="129" name="TextBox 128">
@@ -10396,8 +10397,8 @@
             </a:fontRef>
           </p:style>
         </p:cxnSp>
-        <mc:AlternateContent xmlns:mc="http://schemas.openxmlformats.org/markup-compatibility/2006">
-          <mc:Choice xmlns:a14="http://schemas.microsoft.com/office/drawing/2010/main" Requires="a14">
+        <mc:AlternateContent xmlns:mc="http://schemas.openxmlformats.org/markup-compatibility/2006" xmlns:a14="http://schemas.microsoft.com/office/drawing/2010/main">
+          <mc:Choice Requires="a14">
             <p:sp>
               <p:nvSpPr>
                 <p:cNvPr id="132" name="TextBox 131">
@@ -10500,7 +10501,7 @@
               </p:txBody>
             </p:sp>
           </mc:Choice>
-          <mc:Fallback>
+          <mc:Fallback xmlns="">
             <p:sp>
               <p:nvSpPr>
                 <p:cNvPr id="132" name="TextBox 131">
@@ -10590,8 +10591,8 @@
             </a:fontRef>
           </p:style>
         </p:cxnSp>
-        <mc:AlternateContent xmlns:mc="http://schemas.openxmlformats.org/markup-compatibility/2006">
-          <mc:Choice xmlns:a14="http://schemas.microsoft.com/office/drawing/2010/main" Requires="a14">
+        <mc:AlternateContent xmlns:mc="http://schemas.openxmlformats.org/markup-compatibility/2006" xmlns:a14="http://schemas.microsoft.com/office/drawing/2010/main">
+          <mc:Choice Requires="a14">
             <p:sp>
               <p:nvSpPr>
                 <p:cNvPr id="134" name="TextBox 133">
@@ -10694,7 +10695,7 @@
               </p:txBody>
             </p:sp>
           </mc:Choice>
-          <mc:Fallback>
+          <mc:Fallback xmlns="">
             <p:sp>
               <p:nvSpPr>
                 <p:cNvPr id="134" name="TextBox 133">
@@ -10784,8 +10785,8 @@
             </a:fontRef>
           </p:style>
         </p:cxnSp>
-        <mc:AlternateContent xmlns:mc="http://schemas.openxmlformats.org/markup-compatibility/2006">
-          <mc:Choice xmlns:a14="http://schemas.microsoft.com/office/drawing/2010/main" Requires="a14">
+        <mc:AlternateContent xmlns:mc="http://schemas.openxmlformats.org/markup-compatibility/2006" xmlns:a14="http://schemas.microsoft.com/office/drawing/2010/main">
+          <mc:Choice Requires="a14">
             <p:sp>
               <p:nvSpPr>
                 <p:cNvPr id="136" name="TextBox 135">
@@ -10888,7 +10889,7 @@
               </p:txBody>
             </p:sp>
           </mc:Choice>
-          <mc:Fallback>
+          <mc:Fallback xmlns="">
             <p:sp>
               <p:nvSpPr>
                 <p:cNvPr id="136" name="TextBox 135">
@@ -10978,8 +10979,8 @@
             </a:fontRef>
           </p:style>
         </p:cxnSp>
-        <mc:AlternateContent xmlns:mc="http://schemas.openxmlformats.org/markup-compatibility/2006">
-          <mc:Choice xmlns:a14="http://schemas.microsoft.com/office/drawing/2010/main" Requires="a14">
+        <mc:AlternateContent xmlns:mc="http://schemas.openxmlformats.org/markup-compatibility/2006" xmlns:a14="http://schemas.microsoft.com/office/drawing/2010/main">
+          <mc:Choice Requires="a14">
             <p:sp>
               <p:nvSpPr>
                 <p:cNvPr id="138" name="TextBox 137">
@@ -11082,7 +11083,7 @@
               </p:txBody>
             </p:sp>
           </mc:Choice>
-          <mc:Fallback>
+          <mc:Fallback xmlns="">
             <p:sp>
               <p:nvSpPr>
                 <p:cNvPr id="138" name="TextBox 137">
@@ -11127,8 +11128,8 @@
             </p:sp>
           </mc:Fallback>
         </mc:AlternateContent>
-        <mc:AlternateContent xmlns:mc="http://schemas.openxmlformats.org/markup-compatibility/2006">
-          <mc:Choice xmlns:a14="http://schemas.microsoft.com/office/drawing/2010/main" Requires="a14">
+        <mc:AlternateContent xmlns:mc="http://schemas.openxmlformats.org/markup-compatibility/2006" xmlns:a14="http://schemas.microsoft.com/office/drawing/2010/main">
+          <mc:Choice Requires="a14">
             <p:sp>
               <p:nvSpPr>
                 <p:cNvPr id="139" name="TextBox 138">
@@ -11231,7 +11232,7 @@
               </p:txBody>
             </p:sp>
           </mc:Choice>
-          <mc:Fallback>
+          <mc:Fallback xmlns="">
             <p:sp>
               <p:nvSpPr>
                 <p:cNvPr id="139" name="TextBox 138">
@@ -11460,8 +11461,8 @@
             </a:fontRef>
           </p:style>
         </p:cxnSp>
-        <mc:AlternateContent xmlns:mc="http://schemas.openxmlformats.org/markup-compatibility/2006">
-          <mc:Choice xmlns:a14="http://schemas.microsoft.com/office/drawing/2010/main" Requires="a14">
+        <mc:AlternateContent xmlns:mc="http://schemas.openxmlformats.org/markup-compatibility/2006" xmlns:a14="http://schemas.microsoft.com/office/drawing/2010/main">
+          <mc:Choice Requires="a14">
             <p:sp>
               <p:nvSpPr>
                 <p:cNvPr id="144" name="TextBox 143">
@@ -11541,7 +11542,7 @@
               </p:txBody>
             </p:sp>
           </mc:Choice>
-          <mc:Fallback>
+          <mc:Fallback xmlns="">
             <p:sp>
               <p:nvSpPr>
                 <p:cNvPr id="144" name="TextBox 143">
@@ -11682,8 +11683,8 @@
             </a:p>
           </p:txBody>
         </p:sp>
-        <mc:AlternateContent xmlns:mc="http://schemas.openxmlformats.org/markup-compatibility/2006">
-          <mc:Choice xmlns:a14="http://schemas.microsoft.com/office/drawing/2010/main" Requires="a14">
+        <mc:AlternateContent xmlns:mc="http://schemas.openxmlformats.org/markup-compatibility/2006" xmlns:a14="http://schemas.microsoft.com/office/drawing/2010/main">
+          <mc:Choice Requires="a14">
             <p:sp>
               <p:nvSpPr>
                 <p:cNvPr id="147" name="TextBox 146">
@@ -11765,7 +11766,7 @@
               </p:txBody>
             </p:sp>
           </mc:Choice>
-          <mc:Fallback>
+          <mc:Fallback xmlns="">
             <p:sp>
               <p:nvSpPr>
                 <p:cNvPr id="147" name="TextBox 146">
@@ -11810,8 +11811,8 @@
             </p:sp>
           </mc:Fallback>
         </mc:AlternateContent>
-        <mc:AlternateContent xmlns:mc="http://schemas.openxmlformats.org/markup-compatibility/2006">
-          <mc:Choice xmlns:a14="http://schemas.microsoft.com/office/drawing/2010/main" Requires="a14">
+        <mc:AlternateContent xmlns:mc="http://schemas.openxmlformats.org/markup-compatibility/2006" xmlns:a14="http://schemas.microsoft.com/office/drawing/2010/main">
+          <mc:Choice Requires="a14">
             <p:sp>
               <p:nvSpPr>
                 <p:cNvPr id="148" name="TextBox 147">
@@ -11896,7 +11897,7 @@
               </p:txBody>
             </p:sp>
           </mc:Choice>
-          <mc:Fallback>
+          <mc:Fallback xmlns="">
             <p:sp>
               <p:nvSpPr>
                 <p:cNvPr id="148" name="TextBox 147">
@@ -11941,8 +11942,8 @@
             </p:sp>
           </mc:Fallback>
         </mc:AlternateContent>
-        <mc:AlternateContent xmlns:mc="http://schemas.openxmlformats.org/markup-compatibility/2006">
-          <mc:Choice xmlns:a14="http://schemas.microsoft.com/office/drawing/2010/main" Requires="a14">
+        <mc:AlternateContent xmlns:mc="http://schemas.openxmlformats.org/markup-compatibility/2006" xmlns:a14="http://schemas.microsoft.com/office/drawing/2010/main">
+          <mc:Choice Requires="a14">
             <p:sp>
               <p:nvSpPr>
                 <p:cNvPr id="149" name="TextBox 148">
@@ -12027,7 +12028,7 @@
               </p:txBody>
             </p:sp>
           </mc:Choice>
-          <mc:Fallback>
+          <mc:Fallback xmlns="">
             <p:sp>
               <p:nvSpPr>
                 <p:cNvPr id="149" name="TextBox 148">
@@ -12113,8 +12114,8 @@
             </a:fontRef>
           </p:style>
         </p:cxnSp>
-        <mc:AlternateContent xmlns:mc="http://schemas.openxmlformats.org/markup-compatibility/2006">
-          <mc:Choice xmlns:a14="http://schemas.microsoft.com/office/drawing/2010/main" Requires="a14">
+        <mc:AlternateContent xmlns:mc="http://schemas.openxmlformats.org/markup-compatibility/2006" xmlns:a14="http://schemas.microsoft.com/office/drawing/2010/main">
+          <mc:Choice Requires="a14">
             <p:sp>
               <p:nvSpPr>
                 <p:cNvPr id="151" name="TextBox 150">
@@ -12217,7 +12218,7 @@
               </p:txBody>
             </p:sp>
           </mc:Choice>
-          <mc:Fallback>
+          <mc:Fallback xmlns="">
             <p:sp>
               <p:nvSpPr>
                 <p:cNvPr id="151" name="TextBox 150">
@@ -12307,8 +12308,8 @@
             </a:fontRef>
           </p:style>
         </p:cxnSp>
-        <mc:AlternateContent xmlns:mc="http://schemas.openxmlformats.org/markup-compatibility/2006">
-          <mc:Choice xmlns:a14="http://schemas.microsoft.com/office/drawing/2010/main" Requires="a14">
+        <mc:AlternateContent xmlns:mc="http://schemas.openxmlformats.org/markup-compatibility/2006" xmlns:a14="http://schemas.microsoft.com/office/drawing/2010/main">
+          <mc:Choice Requires="a14">
             <p:sp>
               <p:nvSpPr>
                 <p:cNvPr id="153" name="TextBox 152">
@@ -12411,7 +12412,7 @@
               </p:txBody>
             </p:sp>
           </mc:Choice>
-          <mc:Fallback>
+          <mc:Fallback xmlns="">
             <p:sp>
               <p:nvSpPr>
                 <p:cNvPr id="153" name="TextBox 152">
@@ -12546,8 +12547,8 @@
             </a:fontRef>
           </p:style>
         </p:cxnSp>
-        <mc:AlternateContent xmlns:mc="http://schemas.openxmlformats.org/markup-compatibility/2006">
-          <mc:Choice xmlns:a14="http://schemas.microsoft.com/office/drawing/2010/main" Requires="a14">
+        <mc:AlternateContent xmlns:mc="http://schemas.openxmlformats.org/markup-compatibility/2006" xmlns:a14="http://schemas.microsoft.com/office/drawing/2010/main">
+          <mc:Choice Requires="a14">
             <p:sp>
               <p:nvSpPr>
                 <p:cNvPr id="156" name="TextBox 155">
@@ -12650,7 +12651,7 @@
               </p:txBody>
             </p:sp>
           </mc:Choice>
-          <mc:Fallback>
+          <mc:Fallback xmlns="">
             <p:sp>
               <p:nvSpPr>
                 <p:cNvPr id="156" name="TextBox 155">
@@ -12740,8 +12741,8 @@
             </a:fontRef>
           </p:style>
         </p:cxnSp>
-        <mc:AlternateContent xmlns:mc="http://schemas.openxmlformats.org/markup-compatibility/2006">
-          <mc:Choice xmlns:a14="http://schemas.microsoft.com/office/drawing/2010/main" Requires="a14">
+        <mc:AlternateContent xmlns:mc="http://schemas.openxmlformats.org/markup-compatibility/2006" xmlns:a14="http://schemas.microsoft.com/office/drawing/2010/main">
+          <mc:Choice Requires="a14">
             <p:sp>
               <p:nvSpPr>
                 <p:cNvPr id="158" name="TextBox 157">
@@ -12844,7 +12845,7 @@
               </p:txBody>
             </p:sp>
           </mc:Choice>
-          <mc:Fallback>
+          <mc:Fallback xmlns="">
             <p:sp>
               <p:nvSpPr>
                 <p:cNvPr id="158" name="TextBox 157">
@@ -12973,7 +12974,7 @@
         <p:spPr>
           <a:xfrm>
             <a:off x="951634" y="487073"/>
-            <a:ext cx="5506849" cy="4282353"/>
+            <a:ext cx="6212646" cy="4831210"/>
           </a:xfrm>
           <a:prstGeom prst="rect">
             <a:avLst/>
@@ -12984,6 +12985,66 @@
     <p:extLst>
       <p:ext uri="{BB962C8B-B14F-4D97-AF65-F5344CB8AC3E}">
         <p14:creationId xmlns:p14="http://schemas.microsoft.com/office/powerpoint/2010/main" val="1630708820"/>
+      </p:ext>
+    </p:extLst>
+  </p:cSld>
+  <p:clrMapOvr>
+    <a:masterClrMapping/>
+  </p:clrMapOvr>
+</p:sld>
+</file>
+
+<file path=ppt/slides/slide12.xml><?xml version="1.0" encoding="utf-8"?>
+<p:sld xmlns:a="http://schemas.openxmlformats.org/drawingml/2006/main" xmlns:r="http://schemas.openxmlformats.org/officeDocument/2006/relationships" xmlns:p="http://schemas.openxmlformats.org/presentationml/2006/main">
+  <p:cSld>
+    <p:spTree>
+      <p:nvGrpSpPr>
+        <p:cNvPr id="1" name=""/>
+        <p:cNvGrpSpPr/>
+        <p:nvPr/>
+      </p:nvGrpSpPr>
+      <p:grpSpPr>
+        <a:xfrm>
+          <a:off x="0" y="0"/>
+          <a:ext cx="0" cy="0"/>
+          <a:chOff x="0" y="0"/>
+          <a:chExt cx="0" cy="0"/>
+        </a:xfrm>
+      </p:grpSpPr>
+      <p:pic>
+        <p:nvPicPr>
+          <p:cNvPr id="2" name="Picture 1">
+            <a:extLst>
+              <a:ext uri="{FF2B5EF4-FFF2-40B4-BE49-F238E27FC236}">
+                <a16:creationId xmlns:a16="http://schemas.microsoft.com/office/drawing/2014/main" id="{257E3E96-6469-CD9C-DB96-921B5838E546}"/>
+              </a:ext>
+            </a:extLst>
+          </p:cNvPr>
+          <p:cNvPicPr>
+            <a:picLocks noChangeAspect="1"/>
+          </p:cNvPicPr>
+          <p:nvPr/>
+        </p:nvPicPr>
+        <p:blipFill>
+          <a:blip r:embed="rId2"/>
+          <a:stretch>
+            <a:fillRect/>
+          </a:stretch>
+        </p:blipFill>
+        <p:spPr>
+          <a:xfrm>
+            <a:off x="2793365" y="1524952"/>
+            <a:ext cx="6605270" cy="3808095"/>
+          </a:xfrm>
+          <a:prstGeom prst="rect">
+            <a:avLst/>
+          </a:prstGeom>
+        </p:spPr>
+      </p:pic>
+    </p:spTree>
+    <p:extLst>
+      <p:ext uri="{BB962C8B-B14F-4D97-AF65-F5344CB8AC3E}">
+        <p14:creationId xmlns:p14="http://schemas.microsoft.com/office/powerpoint/2010/main" val="328655193"/>
       </p:ext>
     </p:extLst>
   </p:cSld>
@@ -14102,8 +14163,8 @@
             </a:fontRef>
           </p:style>
         </p:cxnSp>
-        <mc:AlternateContent xmlns:mc="http://schemas.openxmlformats.org/markup-compatibility/2006">
-          <mc:Choice xmlns:a14="http://schemas.microsoft.com/office/drawing/2010/main" Requires="a14">
+        <mc:AlternateContent xmlns:mc="http://schemas.openxmlformats.org/markup-compatibility/2006" xmlns:a14="http://schemas.microsoft.com/office/drawing/2010/main">
+          <mc:Choice Requires="a14">
             <p:sp>
               <p:nvSpPr>
                 <p:cNvPr id="61" name="TextBox 60">
@@ -14215,7 +14276,7 @@
               </p:txBody>
             </p:sp>
           </mc:Choice>
-          <mc:Fallback>
+          <mc:Fallback xmlns="">
             <p:sp>
               <p:nvSpPr>
                 <p:cNvPr id="61" name="TextBox 60">
@@ -14305,8 +14366,8 @@
             </a:fontRef>
           </p:style>
         </p:cxnSp>
-        <mc:AlternateContent xmlns:mc="http://schemas.openxmlformats.org/markup-compatibility/2006">
-          <mc:Choice xmlns:a14="http://schemas.microsoft.com/office/drawing/2010/main" Requires="a14">
+        <mc:AlternateContent xmlns:mc="http://schemas.openxmlformats.org/markup-compatibility/2006" xmlns:a14="http://schemas.microsoft.com/office/drawing/2010/main">
+          <mc:Choice Requires="a14">
             <p:sp>
               <p:nvSpPr>
                 <p:cNvPr id="65" name="TextBox 64">
@@ -14409,7 +14470,7 @@
               </p:txBody>
             </p:sp>
           </mc:Choice>
-          <mc:Fallback>
+          <mc:Fallback xmlns="">
             <p:sp>
               <p:nvSpPr>
                 <p:cNvPr id="65" name="TextBox 64">
@@ -14499,8 +14560,8 @@
             </a:fontRef>
           </p:style>
         </p:cxnSp>
-        <mc:AlternateContent xmlns:mc="http://schemas.openxmlformats.org/markup-compatibility/2006">
-          <mc:Choice xmlns:a14="http://schemas.microsoft.com/office/drawing/2010/main" Requires="a14">
+        <mc:AlternateContent xmlns:mc="http://schemas.openxmlformats.org/markup-compatibility/2006" xmlns:a14="http://schemas.microsoft.com/office/drawing/2010/main">
+          <mc:Choice Requires="a14">
             <p:sp>
               <p:nvSpPr>
                 <p:cNvPr id="72" name="TextBox 71">
@@ -14603,7 +14664,7 @@
               </p:txBody>
             </p:sp>
           </mc:Choice>
-          <mc:Fallback>
+          <mc:Fallback xmlns="">
             <p:sp>
               <p:nvSpPr>
                 <p:cNvPr id="72" name="TextBox 71">
@@ -14693,8 +14754,8 @@
             </a:fontRef>
           </p:style>
         </p:cxnSp>
-        <mc:AlternateContent xmlns:mc="http://schemas.openxmlformats.org/markup-compatibility/2006">
-          <mc:Choice xmlns:a14="http://schemas.microsoft.com/office/drawing/2010/main" Requires="a14">
+        <mc:AlternateContent xmlns:mc="http://schemas.openxmlformats.org/markup-compatibility/2006" xmlns:a14="http://schemas.microsoft.com/office/drawing/2010/main">
+          <mc:Choice Requires="a14">
             <p:sp>
               <p:nvSpPr>
                 <p:cNvPr id="86" name="TextBox 85">
@@ -14797,7 +14858,7 @@
               </p:txBody>
             </p:sp>
           </mc:Choice>
-          <mc:Fallback>
+          <mc:Fallback xmlns="">
             <p:sp>
               <p:nvSpPr>
                 <p:cNvPr id="86" name="TextBox 85">
@@ -14976,8 +15037,8 @@
             </a:fontRef>
           </p:style>
         </p:cxnSp>
-        <mc:AlternateContent xmlns:mc="http://schemas.openxmlformats.org/markup-compatibility/2006">
-          <mc:Choice xmlns:a14="http://schemas.microsoft.com/office/drawing/2010/main" Requires="a14">
+        <mc:AlternateContent xmlns:mc="http://schemas.openxmlformats.org/markup-compatibility/2006" xmlns:a14="http://schemas.microsoft.com/office/drawing/2010/main">
+          <mc:Choice Requires="a14">
             <p:sp>
               <p:nvSpPr>
                 <p:cNvPr id="118" name="TextBox 117">
@@ -15080,7 +15141,7 @@
               </p:txBody>
             </p:sp>
           </mc:Choice>
-          <mc:Fallback>
+          <mc:Fallback xmlns="">
             <p:sp>
               <p:nvSpPr>
                 <p:cNvPr id="118" name="TextBox 117">
@@ -15170,8 +15231,8 @@
             </a:fontRef>
           </p:style>
         </p:cxnSp>
-        <mc:AlternateContent xmlns:mc="http://schemas.openxmlformats.org/markup-compatibility/2006">
-          <mc:Choice xmlns:a14="http://schemas.microsoft.com/office/drawing/2010/main" Requires="a14">
+        <mc:AlternateContent xmlns:mc="http://schemas.openxmlformats.org/markup-compatibility/2006" xmlns:a14="http://schemas.microsoft.com/office/drawing/2010/main">
+          <mc:Choice Requires="a14">
             <p:sp>
               <p:nvSpPr>
                 <p:cNvPr id="121" name="TextBox 120">
@@ -15274,7 +15335,7 @@
               </p:txBody>
             </p:sp>
           </mc:Choice>
-          <mc:Fallback>
+          <mc:Fallback xmlns="">
             <p:sp>
               <p:nvSpPr>
                 <p:cNvPr id="121" name="TextBox 120">
@@ -15364,8 +15425,8 @@
             </a:fontRef>
           </p:style>
         </p:cxnSp>
-        <mc:AlternateContent xmlns:mc="http://schemas.openxmlformats.org/markup-compatibility/2006">
-          <mc:Choice xmlns:a14="http://schemas.microsoft.com/office/drawing/2010/main" Requires="a14">
+        <mc:AlternateContent xmlns:mc="http://schemas.openxmlformats.org/markup-compatibility/2006" xmlns:a14="http://schemas.microsoft.com/office/drawing/2010/main">
+          <mc:Choice Requires="a14">
             <p:sp>
               <p:nvSpPr>
                 <p:cNvPr id="125" name="TextBox 124">
@@ -15468,7 +15529,7 @@
               </p:txBody>
             </p:sp>
           </mc:Choice>
-          <mc:Fallback>
+          <mc:Fallback xmlns="">
             <p:sp>
               <p:nvSpPr>
                 <p:cNvPr id="125" name="TextBox 124">
@@ -15558,8 +15619,8 @@
             </a:fontRef>
           </p:style>
         </p:cxnSp>
-        <mc:AlternateContent xmlns:mc="http://schemas.openxmlformats.org/markup-compatibility/2006">
-          <mc:Choice xmlns:a14="http://schemas.microsoft.com/office/drawing/2010/main" Requires="a14">
+        <mc:AlternateContent xmlns:mc="http://schemas.openxmlformats.org/markup-compatibility/2006" xmlns:a14="http://schemas.microsoft.com/office/drawing/2010/main">
+          <mc:Choice Requires="a14">
             <p:sp>
               <p:nvSpPr>
                 <p:cNvPr id="133" name="TextBox 132">
@@ -15662,7 +15723,7 @@
               </p:txBody>
             </p:sp>
           </mc:Choice>
-          <mc:Fallback>
+          <mc:Fallback xmlns="">
             <p:sp>
               <p:nvSpPr>
                 <p:cNvPr id="133" name="TextBox 132">
@@ -15707,8 +15768,8 @@
             </p:sp>
           </mc:Fallback>
         </mc:AlternateContent>
-        <mc:AlternateContent xmlns:mc="http://schemas.openxmlformats.org/markup-compatibility/2006">
-          <mc:Choice xmlns:a14="http://schemas.microsoft.com/office/drawing/2010/main" Requires="a14">
+        <mc:AlternateContent xmlns:mc="http://schemas.openxmlformats.org/markup-compatibility/2006" xmlns:a14="http://schemas.microsoft.com/office/drawing/2010/main">
+          <mc:Choice Requires="a14">
             <p:sp>
               <p:nvSpPr>
                 <p:cNvPr id="134" name="TextBox 133">
@@ -15811,7 +15872,7 @@
               </p:txBody>
             </p:sp>
           </mc:Choice>
-          <mc:Fallback>
+          <mc:Fallback xmlns="">
             <p:sp>
               <p:nvSpPr>
                 <p:cNvPr id="134" name="TextBox 133">
@@ -16040,8 +16101,8 @@
             </a:fontRef>
           </p:style>
         </p:cxnSp>
-        <mc:AlternateContent xmlns:mc="http://schemas.openxmlformats.org/markup-compatibility/2006">
-          <mc:Choice xmlns:a14="http://schemas.microsoft.com/office/drawing/2010/main" Requires="a14">
+        <mc:AlternateContent xmlns:mc="http://schemas.openxmlformats.org/markup-compatibility/2006" xmlns:a14="http://schemas.microsoft.com/office/drawing/2010/main">
+          <mc:Choice Requires="a14">
             <p:sp>
               <p:nvSpPr>
                 <p:cNvPr id="148" name="TextBox 147">
@@ -16121,7 +16182,7 @@
               </p:txBody>
             </p:sp>
           </mc:Choice>
-          <mc:Fallback>
+          <mc:Fallback xmlns="">
             <p:sp>
               <p:nvSpPr>
                 <p:cNvPr id="148" name="TextBox 147">
@@ -16262,8 +16323,8 @@
             </a:p>
           </p:txBody>
         </p:sp>
-        <mc:AlternateContent xmlns:mc="http://schemas.openxmlformats.org/markup-compatibility/2006">
-          <mc:Choice xmlns:a14="http://schemas.microsoft.com/office/drawing/2010/main" Requires="a14">
+        <mc:AlternateContent xmlns:mc="http://schemas.openxmlformats.org/markup-compatibility/2006" xmlns:a14="http://schemas.microsoft.com/office/drawing/2010/main">
+          <mc:Choice Requires="a14">
             <p:sp>
               <p:nvSpPr>
                 <p:cNvPr id="12" name="TextBox 11">
@@ -16345,7 +16406,7 @@
               </p:txBody>
             </p:sp>
           </mc:Choice>
-          <mc:Fallback>
+          <mc:Fallback xmlns="">
             <p:sp>
               <p:nvSpPr>
                 <p:cNvPr id="12" name="TextBox 11">
@@ -16390,8 +16451,8 @@
             </p:sp>
           </mc:Fallback>
         </mc:AlternateContent>
-        <mc:AlternateContent xmlns:mc="http://schemas.openxmlformats.org/markup-compatibility/2006">
-          <mc:Choice xmlns:a14="http://schemas.microsoft.com/office/drawing/2010/main" Requires="a14">
+        <mc:AlternateContent xmlns:mc="http://schemas.openxmlformats.org/markup-compatibility/2006" xmlns:a14="http://schemas.microsoft.com/office/drawing/2010/main">
+          <mc:Choice Requires="a14">
             <p:sp>
               <p:nvSpPr>
                 <p:cNvPr id="13" name="TextBox 12">
@@ -16476,7 +16537,7 @@
               </p:txBody>
             </p:sp>
           </mc:Choice>
-          <mc:Fallback>
+          <mc:Fallback xmlns="">
             <p:sp>
               <p:nvSpPr>
                 <p:cNvPr id="13" name="TextBox 12">
@@ -16521,8 +16582,8 @@
             </p:sp>
           </mc:Fallback>
         </mc:AlternateContent>
-        <mc:AlternateContent xmlns:mc="http://schemas.openxmlformats.org/markup-compatibility/2006">
-          <mc:Choice xmlns:a14="http://schemas.microsoft.com/office/drawing/2010/main" Requires="a14">
+        <mc:AlternateContent xmlns:mc="http://schemas.openxmlformats.org/markup-compatibility/2006" xmlns:a14="http://schemas.microsoft.com/office/drawing/2010/main">
+          <mc:Choice Requires="a14">
             <p:sp>
               <p:nvSpPr>
                 <p:cNvPr id="2" name="TextBox 1">
@@ -16607,7 +16668,7 @@
               </p:txBody>
             </p:sp>
           </mc:Choice>
-          <mc:Fallback>
+          <mc:Fallback xmlns="">
             <p:sp>
               <p:nvSpPr>
                 <p:cNvPr id="2" name="TextBox 1">
@@ -16693,8 +16754,8 @@
             </a:fontRef>
           </p:style>
         </p:cxnSp>
-        <mc:AlternateContent xmlns:mc="http://schemas.openxmlformats.org/markup-compatibility/2006">
-          <mc:Choice xmlns:a14="http://schemas.microsoft.com/office/drawing/2010/main" Requires="a14">
+        <mc:AlternateContent xmlns:mc="http://schemas.openxmlformats.org/markup-compatibility/2006" xmlns:a14="http://schemas.microsoft.com/office/drawing/2010/main">
+          <mc:Choice Requires="a14">
             <p:sp>
               <p:nvSpPr>
                 <p:cNvPr id="15" name="TextBox 14">
@@ -16797,7 +16858,7 @@
               </p:txBody>
             </p:sp>
           </mc:Choice>
-          <mc:Fallback>
+          <mc:Fallback xmlns="">
             <p:sp>
               <p:nvSpPr>
                 <p:cNvPr id="15" name="TextBox 14">
@@ -16887,8 +16948,8 @@
             </a:fontRef>
           </p:style>
         </p:cxnSp>
-        <mc:AlternateContent xmlns:mc="http://schemas.openxmlformats.org/markup-compatibility/2006">
-          <mc:Choice xmlns:a14="http://schemas.microsoft.com/office/drawing/2010/main" Requires="a14">
+        <mc:AlternateContent xmlns:mc="http://schemas.openxmlformats.org/markup-compatibility/2006" xmlns:a14="http://schemas.microsoft.com/office/drawing/2010/main">
+          <mc:Choice Requires="a14">
             <p:sp>
               <p:nvSpPr>
                 <p:cNvPr id="20" name="TextBox 19">
@@ -16991,7 +17052,7 @@
               </p:txBody>
             </p:sp>
           </mc:Choice>
-          <mc:Fallback>
+          <mc:Fallback xmlns="">
             <p:sp>
               <p:nvSpPr>
                 <p:cNvPr id="20" name="TextBox 19">
@@ -17126,8 +17187,8 @@
             </a:fontRef>
           </p:style>
         </p:cxnSp>
-        <mc:AlternateContent xmlns:mc="http://schemas.openxmlformats.org/markup-compatibility/2006">
-          <mc:Choice xmlns:a14="http://schemas.microsoft.com/office/drawing/2010/main" Requires="a14">
+        <mc:AlternateContent xmlns:mc="http://schemas.openxmlformats.org/markup-compatibility/2006" xmlns:a14="http://schemas.microsoft.com/office/drawing/2010/main">
+          <mc:Choice Requires="a14">
             <p:sp>
               <p:nvSpPr>
                 <p:cNvPr id="25" name="TextBox 24">
@@ -17230,7 +17291,7 @@
               </p:txBody>
             </p:sp>
           </mc:Choice>
-          <mc:Fallback>
+          <mc:Fallback xmlns="">
             <p:sp>
               <p:nvSpPr>
                 <p:cNvPr id="25" name="TextBox 24">
@@ -17320,8 +17381,8 @@
             </a:fontRef>
           </p:style>
         </p:cxnSp>
-        <mc:AlternateContent xmlns:mc="http://schemas.openxmlformats.org/markup-compatibility/2006">
-          <mc:Choice xmlns:a14="http://schemas.microsoft.com/office/drawing/2010/main" Requires="a14">
+        <mc:AlternateContent xmlns:mc="http://schemas.openxmlformats.org/markup-compatibility/2006" xmlns:a14="http://schemas.microsoft.com/office/drawing/2010/main">
+          <mc:Choice Requires="a14">
             <p:sp>
               <p:nvSpPr>
                 <p:cNvPr id="27" name="TextBox 26">
@@ -17424,7 +17485,7 @@
               </p:txBody>
             </p:sp>
           </mc:Choice>
-          <mc:Fallback>
+          <mc:Fallback xmlns="">
             <p:sp>
               <p:nvSpPr>
                 <p:cNvPr id="27" name="TextBox 26">
@@ -17597,8 +17658,8 @@
             </a:fontRef>
           </p:style>
         </p:cxnSp>
-        <mc:AlternateContent xmlns:mc="http://schemas.openxmlformats.org/markup-compatibility/2006">
-          <mc:Choice xmlns:a14="http://schemas.microsoft.com/office/drawing/2010/main" Requires="a14">
+        <mc:AlternateContent xmlns:mc="http://schemas.openxmlformats.org/markup-compatibility/2006" xmlns:a14="http://schemas.microsoft.com/office/drawing/2010/main">
+          <mc:Choice Requires="a14">
             <p:sp>
               <p:nvSpPr>
                 <p:cNvPr id="16" name="TextBox 15">
@@ -17685,7 +17746,7 @@
               </p:txBody>
             </p:sp>
           </mc:Choice>
-          <mc:Fallback>
+          <mc:Fallback xmlns="">
             <p:sp>
               <p:nvSpPr>
                 <p:cNvPr id="16" name="TextBox 15">
@@ -17816,8 +17877,8 @@
             </a:fontRef>
           </p:style>
         </p:cxnSp>
-        <mc:AlternateContent xmlns:mc="http://schemas.openxmlformats.org/markup-compatibility/2006">
-          <mc:Choice xmlns:a14="http://schemas.microsoft.com/office/drawing/2010/main" Requires="a14">
+        <mc:AlternateContent xmlns:mc="http://schemas.openxmlformats.org/markup-compatibility/2006" xmlns:a14="http://schemas.microsoft.com/office/drawing/2010/main">
+          <mc:Choice Requires="a14">
             <p:sp>
               <p:nvSpPr>
                 <p:cNvPr id="25" name="TextBox 24">
@@ -17929,7 +17990,7 @@
               </p:txBody>
             </p:sp>
           </mc:Choice>
-          <mc:Fallback>
+          <mc:Fallback xmlns="">
             <p:sp>
               <p:nvSpPr>
                 <p:cNvPr id="25" name="TextBox 24">
@@ -18156,8 +18217,8 @@
             </a:fontRef>
           </p:style>
         </p:cxnSp>
-        <mc:AlternateContent xmlns:mc="http://schemas.openxmlformats.org/markup-compatibility/2006">
-          <mc:Choice xmlns:a14="http://schemas.microsoft.com/office/drawing/2010/main" Requires="a14">
+        <mc:AlternateContent xmlns:mc="http://schemas.openxmlformats.org/markup-compatibility/2006" xmlns:a14="http://schemas.microsoft.com/office/drawing/2010/main">
+          <mc:Choice Requires="a14">
             <p:sp>
               <p:nvSpPr>
                 <p:cNvPr id="12" name="TextBox 11">
@@ -18244,7 +18305,7 @@
               </p:txBody>
             </p:sp>
           </mc:Choice>
-          <mc:Fallback>
+          <mc:Fallback xmlns="">
             <p:sp>
               <p:nvSpPr>
                 <p:cNvPr id="12" name="TextBox 11">
@@ -18754,8 +18815,8 @@
             </a:fontRef>
           </p:style>
         </p:cxnSp>
-        <mc:AlternateContent xmlns:mc="http://schemas.openxmlformats.org/markup-compatibility/2006">
-          <mc:Choice xmlns:a14="http://schemas.microsoft.com/office/drawing/2010/main" Requires="a14">
+        <mc:AlternateContent xmlns:mc="http://schemas.openxmlformats.org/markup-compatibility/2006" xmlns:a14="http://schemas.microsoft.com/office/drawing/2010/main">
+          <mc:Choice Requires="a14">
             <p:sp>
               <p:nvSpPr>
                 <p:cNvPr id="52" name="TextBox 51">
@@ -18842,7 +18903,7 @@
               </p:txBody>
             </p:sp>
           </mc:Choice>
-          <mc:Fallback>
+          <mc:Fallback xmlns="">
             <p:sp>
               <p:nvSpPr>
                 <p:cNvPr id="52" name="TextBox 51">
@@ -18887,8 +18948,8 @@
             </p:sp>
           </mc:Fallback>
         </mc:AlternateContent>
-        <mc:AlternateContent xmlns:mc="http://schemas.openxmlformats.org/markup-compatibility/2006">
-          <mc:Choice xmlns:a14="http://schemas.microsoft.com/office/drawing/2010/main" Requires="a14">
+        <mc:AlternateContent xmlns:mc="http://schemas.openxmlformats.org/markup-compatibility/2006" xmlns:a14="http://schemas.microsoft.com/office/drawing/2010/main">
+          <mc:Choice Requires="a14">
             <p:sp>
               <p:nvSpPr>
                 <p:cNvPr id="53" name="TextBox 52">
@@ -18975,7 +19036,7 @@
               </p:txBody>
             </p:sp>
           </mc:Choice>
-          <mc:Fallback>
+          <mc:Fallback xmlns="">
             <p:sp>
               <p:nvSpPr>
                 <p:cNvPr id="53" name="TextBox 52">
@@ -19160,8 +19221,8 @@
             </a:fontRef>
           </p:style>
         </p:cxnSp>
-        <mc:AlternateContent xmlns:mc="http://schemas.openxmlformats.org/markup-compatibility/2006">
-          <mc:Choice xmlns:a14="http://schemas.microsoft.com/office/drawing/2010/main" Requires="a14">
+        <mc:AlternateContent xmlns:mc="http://schemas.openxmlformats.org/markup-compatibility/2006" xmlns:a14="http://schemas.microsoft.com/office/drawing/2010/main">
+          <mc:Choice Requires="a14">
             <p:sp>
               <p:nvSpPr>
                 <p:cNvPr id="60" name="TextBox 59">
@@ -19248,7 +19309,7 @@
               </p:txBody>
             </p:sp>
           </mc:Choice>
-          <mc:Fallback>
+          <mc:Fallback xmlns="">
             <p:sp>
               <p:nvSpPr>
                 <p:cNvPr id="60" name="TextBox 59">
@@ -19568,8 +19629,8 @@
             </a:p>
           </p:txBody>
         </p:sp>
-        <mc:AlternateContent xmlns:mc="http://schemas.openxmlformats.org/markup-compatibility/2006">
-          <mc:Choice xmlns:a14="http://schemas.microsoft.com/office/drawing/2010/main" Requires="a14">
+        <mc:AlternateContent xmlns:mc="http://schemas.openxmlformats.org/markup-compatibility/2006" xmlns:a14="http://schemas.microsoft.com/office/drawing/2010/main">
+          <mc:Choice Requires="a14">
             <p:sp>
               <p:nvSpPr>
                 <p:cNvPr id="76" name="TextBox 75">
@@ -19654,7 +19715,7 @@
               </p:txBody>
             </p:sp>
           </mc:Choice>
-          <mc:Fallback>
+          <mc:Fallback xmlns="">
             <p:sp>
               <p:nvSpPr>
                 <p:cNvPr id="76" name="TextBox 75">
@@ -19699,8 +19760,8 @@
             </p:sp>
           </mc:Fallback>
         </mc:AlternateContent>
-        <mc:AlternateContent xmlns:mc="http://schemas.openxmlformats.org/markup-compatibility/2006">
-          <mc:Choice xmlns:a14="http://schemas.microsoft.com/office/drawing/2010/main" Requires="a14">
+        <mc:AlternateContent xmlns:mc="http://schemas.openxmlformats.org/markup-compatibility/2006" xmlns:a14="http://schemas.microsoft.com/office/drawing/2010/main">
+          <mc:Choice Requires="a14">
             <p:sp>
               <p:nvSpPr>
                 <p:cNvPr id="77" name="TextBox 76">
@@ -19785,7 +19846,7 @@
               </p:txBody>
             </p:sp>
           </mc:Choice>
-          <mc:Fallback>
+          <mc:Fallback xmlns="">
             <p:sp>
               <p:nvSpPr>
                 <p:cNvPr id="77" name="TextBox 76">
@@ -21180,8 +21241,8 @@
             </a:fontRef>
           </p:style>
         </p:cxnSp>
-        <mc:AlternateContent xmlns:mc="http://schemas.openxmlformats.org/markup-compatibility/2006">
-          <mc:Choice xmlns:a14="http://schemas.microsoft.com/office/drawing/2010/main" Requires="a14">
+        <mc:AlternateContent xmlns:mc="http://schemas.openxmlformats.org/markup-compatibility/2006" xmlns:a14="http://schemas.microsoft.com/office/drawing/2010/main">
+          <mc:Choice Requires="a14">
             <p:sp>
               <p:nvSpPr>
                 <p:cNvPr id="18" name="TextBox 17">
@@ -21284,7 +21345,7 @@
               </p:txBody>
             </p:sp>
           </mc:Choice>
-          <mc:Fallback>
+          <mc:Fallback xmlns="">
             <p:sp>
               <p:nvSpPr>
                 <p:cNvPr id="18" name="TextBox 17">
@@ -21329,8 +21390,8 @@
             </p:sp>
           </mc:Fallback>
         </mc:AlternateContent>
-        <mc:AlternateContent xmlns:mc="http://schemas.openxmlformats.org/markup-compatibility/2006">
-          <mc:Choice xmlns:a14="http://schemas.microsoft.com/office/drawing/2010/main" Requires="a14">
+        <mc:AlternateContent xmlns:mc="http://schemas.openxmlformats.org/markup-compatibility/2006" xmlns:a14="http://schemas.microsoft.com/office/drawing/2010/main">
+          <mc:Choice Requires="a14">
             <p:sp>
               <p:nvSpPr>
                 <p:cNvPr id="19" name="TextBox 18">
@@ -21433,7 +21494,7 @@
               </p:txBody>
             </p:sp>
           </mc:Choice>
-          <mc:Fallback>
+          <mc:Fallback xmlns="">
             <p:sp>
               <p:nvSpPr>
                 <p:cNvPr id="19" name="TextBox 18">
@@ -21613,8 +21674,8 @@
             </a:fontRef>
           </p:style>
         </p:cxnSp>
-        <mc:AlternateContent xmlns:mc="http://schemas.openxmlformats.org/markup-compatibility/2006">
-          <mc:Choice xmlns:a14="http://schemas.microsoft.com/office/drawing/2010/main" Requires="a14">
+        <mc:AlternateContent xmlns:mc="http://schemas.openxmlformats.org/markup-compatibility/2006" xmlns:a14="http://schemas.microsoft.com/office/drawing/2010/main">
+          <mc:Choice Requires="a14">
             <p:sp>
               <p:nvSpPr>
                 <p:cNvPr id="26" name="TextBox 25">
@@ -21717,7 +21778,7 @@
               </p:txBody>
             </p:sp>
           </mc:Choice>
-          <mc:Fallback>
+          <mc:Fallback xmlns="">
             <p:sp>
               <p:nvSpPr>
                 <p:cNvPr id="26" name="TextBox 25">
@@ -21807,8 +21868,8 @@
             </a:fontRef>
           </p:style>
         </p:cxnSp>
-        <mc:AlternateContent xmlns:mc="http://schemas.openxmlformats.org/markup-compatibility/2006">
-          <mc:Choice xmlns:a14="http://schemas.microsoft.com/office/drawing/2010/main" Requires="a14">
+        <mc:AlternateContent xmlns:mc="http://schemas.openxmlformats.org/markup-compatibility/2006" xmlns:a14="http://schemas.microsoft.com/office/drawing/2010/main">
+          <mc:Choice Requires="a14">
             <p:sp>
               <p:nvSpPr>
                 <p:cNvPr id="30" name="TextBox 29">
@@ -21911,7 +21972,7 @@
               </p:txBody>
             </p:sp>
           </mc:Choice>
-          <mc:Fallback>
+          <mc:Fallback xmlns="">
             <p:sp>
               <p:nvSpPr>
                 <p:cNvPr id="30" name="TextBox 29">
@@ -21956,8 +22017,8 @@
             </p:sp>
           </mc:Fallback>
         </mc:AlternateContent>
-        <mc:AlternateContent xmlns:mc="http://schemas.openxmlformats.org/markup-compatibility/2006">
-          <mc:Choice xmlns:a14="http://schemas.microsoft.com/office/drawing/2010/main" Requires="a14">
+        <mc:AlternateContent xmlns:mc="http://schemas.openxmlformats.org/markup-compatibility/2006" xmlns:a14="http://schemas.microsoft.com/office/drawing/2010/main">
+          <mc:Choice Requires="a14">
             <p:sp>
               <p:nvSpPr>
                 <p:cNvPr id="35" name="TextBox 34">
@@ -22042,7 +22103,7 @@
               </p:txBody>
             </p:sp>
           </mc:Choice>
-          <mc:Fallback>
+          <mc:Fallback xmlns="">
             <p:sp>
               <p:nvSpPr>
                 <p:cNvPr id="35" name="TextBox 34">
@@ -22226,8 +22287,8 @@
             </a:fontRef>
           </p:style>
         </p:cxnSp>
-        <mc:AlternateContent xmlns:mc="http://schemas.openxmlformats.org/markup-compatibility/2006">
-          <mc:Choice xmlns:a14="http://schemas.microsoft.com/office/drawing/2010/main" Requires="a14">
+        <mc:AlternateContent xmlns:mc="http://schemas.openxmlformats.org/markup-compatibility/2006" xmlns:a14="http://schemas.microsoft.com/office/drawing/2010/main">
+          <mc:Choice Requires="a14">
             <p:sp>
               <p:nvSpPr>
                 <p:cNvPr id="48" name="TextBox 47">
@@ -22307,7 +22368,7 @@
               </p:txBody>
             </p:sp>
           </mc:Choice>
-          <mc:Fallback>
+          <mc:Fallback xmlns="">
             <p:sp>
               <p:nvSpPr>
                 <p:cNvPr id="48" name="TextBox 47">
@@ -22397,8 +22458,8 @@
             </a:fontRef>
           </p:style>
         </p:cxnSp>
-        <mc:AlternateContent xmlns:mc="http://schemas.openxmlformats.org/markup-compatibility/2006">
-          <mc:Choice xmlns:a14="http://schemas.microsoft.com/office/drawing/2010/main" Requires="a14">
+        <mc:AlternateContent xmlns:mc="http://schemas.openxmlformats.org/markup-compatibility/2006" xmlns:a14="http://schemas.microsoft.com/office/drawing/2010/main">
+          <mc:Choice Requires="a14">
             <p:sp>
               <p:nvSpPr>
                 <p:cNvPr id="59" name="TextBox 58">
@@ -22501,7 +22562,7 @@
               </p:txBody>
             </p:sp>
           </mc:Choice>
-          <mc:Fallback>
+          <mc:Fallback xmlns="">
             <p:sp>
               <p:nvSpPr>
                 <p:cNvPr id="59" name="TextBox 58">
@@ -23132,8 +23193,8 @@
           </a:prstGeom>
         </p:spPr>
       </p:pic>
-      <mc:AlternateContent xmlns:mc="http://schemas.openxmlformats.org/markup-compatibility/2006">
-        <mc:Choice xmlns:a14="http://schemas.microsoft.com/office/drawing/2010/main" Requires="a14">
+      <mc:AlternateContent xmlns:mc="http://schemas.openxmlformats.org/markup-compatibility/2006" xmlns:a14="http://schemas.microsoft.com/office/drawing/2010/main">
+        <mc:Choice Requires="a14">
           <p:sp>
             <p:nvSpPr>
               <p:cNvPr id="4" name="TextBox 3">
@@ -23260,7 +23321,7 @@
             </p:txBody>
           </p:sp>
         </mc:Choice>
-        <mc:Fallback>
+        <mc:Fallback xmlns="">
           <p:sp>
             <p:nvSpPr>
               <p:cNvPr id="4" name="TextBox 3">

</xml_diff>

<commit_message>
Next step b matrix calculation
</commit_message>
<xml_diff>
--- a/TechnicalReport/Figures.pptx
+++ b/TechnicalReport/Figures.pptx
@@ -21,6 +21,9 @@
     <p:sldId id="269" r:id="rId15"/>
     <p:sldId id="270" r:id="rId16"/>
     <p:sldId id="271" r:id="rId17"/>
+    <p:sldId id="272" r:id="rId18"/>
+    <p:sldId id="273" r:id="rId19"/>
+    <p:sldId id="274" r:id="rId20"/>
   </p:sldIdLst>
   <p:sldSz cx="12192000" cy="6858000"/>
   <p:notesSz cx="6858000" cy="9144000"/>
@@ -14658,6 +14661,3608 @@
 </p:sld>
 </file>
 
+<file path=ppt/slides/slide17.xml><?xml version="1.0" encoding="utf-8"?>
+<p:sld xmlns:a="http://schemas.openxmlformats.org/drawingml/2006/main" xmlns:r="http://schemas.openxmlformats.org/officeDocument/2006/relationships" xmlns:p="http://schemas.openxmlformats.org/presentationml/2006/main">
+  <p:cSld>
+    <p:spTree>
+      <p:nvGrpSpPr>
+        <p:cNvPr id="1" name=""/>
+        <p:cNvGrpSpPr/>
+        <p:nvPr/>
+      </p:nvGrpSpPr>
+      <p:grpSpPr>
+        <a:xfrm>
+          <a:off x="0" y="0"/>
+          <a:ext cx="0" cy="0"/>
+          <a:chOff x="0" y="0"/>
+          <a:chExt cx="0" cy="0"/>
+        </a:xfrm>
+      </p:grpSpPr>
+      <p:grpSp>
+        <p:nvGrpSpPr>
+          <p:cNvPr id="19" name="Group 18">
+            <a:extLst>
+              <a:ext uri="{FF2B5EF4-FFF2-40B4-BE49-F238E27FC236}">
+                <a16:creationId xmlns:a16="http://schemas.microsoft.com/office/drawing/2014/main" id="{D8B95F1F-BDCB-6BE9-50DF-047BC542E6F5}"/>
+              </a:ext>
+            </a:extLst>
+          </p:cNvPr>
+          <p:cNvGrpSpPr/>
+          <p:nvPr/>
+        </p:nvGrpSpPr>
+        <p:grpSpPr>
+          <a:xfrm>
+            <a:off x="2233612" y="76200"/>
+            <a:ext cx="9058275" cy="6705600"/>
+            <a:chOff x="2233612" y="76200"/>
+            <a:chExt cx="9058275" cy="6705600"/>
+          </a:xfrm>
+        </p:grpSpPr>
+        <p:pic>
+          <p:nvPicPr>
+            <p:cNvPr id="18" name="Picture 17">
+              <a:extLst>
+                <a:ext uri="{FF2B5EF4-FFF2-40B4-BE49-F238E27FC236}">
+                  <a16:creationId xmlns:a16="http://schemas.microsoft.com/office/drawing/2014/main" id="{568A8195-33E5-1D77-C4C6-8433BC4ED8B5}"/>
+                </a:ext>
+              </a:extLst>
+            </p:cNvPr>
+            <p:cNvPicPr>
+              <a:picLocks noChangeAspect="1"/>
+            </p:cNvPicPr>
+            <p:nvPr/>
+          </p:nvPicPr>
+          <p:blipFill>
+            <a:blip r:embed="rId2"/>
+            <a:stretch>
+              <a:fillRect/>
+            </a:stretch>
+          </p:blipFill>
+          <p:spPr>
+            <a:xfrm>
+              <a:off x="2233612" y="76200"/>
+              <a:ext cx="9058275" cy="6705600"/>
+            </a:xfrm>
+            <a:prstGeom prst="rect">
+              <a:avLst/>
+            </a:prstGeom>
+          </p:spPr>
+        </p:pic>
+        <mc:AlternateContent xmlns:mc="http://schemas.openxmlformats.org/markup-compatibility/2006">
+          <mc:Choice xmlns:a14="http://schemas.microsoft.com/office/drawing/2010/main" Requires="a14">
+            <p:sp>
+              <p:nvSpPr>
+                <p:cNvPr id="4" name="TextBox 3">
+                  <a:extLst>
+                    <a:ext uri="{FF2B5EF4-FFF2-40B4-BE49-F238E27FC236}">
+                      <a16:creationId xmlns:a16="http://schemas.microsoft.com/office/drawing/2014/main" id="{2C3664E8-B2A7-1B06-6C98-728F13254F79}"/>
+                    </a:ext>
+                  </a:extLst>
+                </p:cNvPr>
+                <p:cNvSpPr txBox="1"/>
+                <p:nvPr/>
+              </p:nvSpPr>
+              <p:spPr>
+                <a:xfrm>
+                  <a:off x="2851737" y="3059668"/>
+                  <a:ext cx="2407920" cy="369332"/>
+                </a:xfrm>
+                <a:prstGeom prst="rect">
+                  <a:avLst/>
+                </a:prstGeom>
+                <a:noFill/>
+              </p:spPr>
+              <p:txBody>
+                <a:bodyPr wrap="square" rtlCol="0">
+                  <a:spAutoFit/>
+                </a:bodyPr>
+                <a:lstStyle/>
+                <a:p>
+                  <a14:m>
+                    <m:oMathPara xmlns:m="http://schemas.openxmlformats.org/officeDocument/2006/math">
+                      <m:oMathParaPr>
+                        <m:jc m:val="centerGroup"/>
+                      </m:oMathParaPr>
+                      <m:oMath xmlns:m="http://schemas.openxmlformats.org/officeDocument/2006/math">
+                        <m:r>
+                          <a:rPr lang="en-US" b="0" i="1" smtClean="0">
+                            <a:solidFill>
+                              <a:schemeClr val="bg2">
+                                <a:lumMod val="90000"/>
+                              </a:schemeClr>
+                            </a:solidFill>
+                            <a:latin typeface="Cambria Math" panose="02040503050406030204" pitchFamily="18" charset="0"/>
+                          </a:rPr>
+                          <m:t>𝑇</m:t>
+                        </m:r>
+                        <m:r>
+                          <a:rPr lang="en-US" b="0" i="1" smtClean="0">
+                            <a:solidFill>
+                              <a:schemeClr val="bg2">
+                                <a:lumMod val="90000"/>
+                              </a:schemeClr>
+                            </a:solidFill>
+                            <a:latin typeface="Cambria Math" panose="02040503050406030204" pitchFamily="18" charset="0"/>
+                          </a:rPr>
+                          <m:t>~ 66.67 [</m:t>
+                        </m:r>
+                        <m:r>
+                          <a:rPr lang="en-US" b="0" i="1" smtClean="0">
+                            <a:solidFill>
+                              <a:schemeClr val="bg2">
+                                <a:lumMod val="90000"/>
+                              </a:schemeClr>
+                            </a:solidFill>
+                            <a:latin typeface="Cambria Math" panose="02040503050406030204" pitchFamily="18" charset="0"/>
+                          </a:rPr>
+                          <m:t>𝑠𝑒𝑐</m:t>
+                        </m:r>
+                        <m:r>
+                          <a:rPr lang="en-US" b="0" i="1" smtClean="0">
+                            <a:solidFill>
+                              <a:schemeClr val="bg2">
+                                <a:lumMod val="90000"/>
+                              </a:schemeClr>
+                            </a:solidFill>
+                            <a:latin typeface="Cambria Math" panose="02040503050406030204" pitchFamily="18" charset="0"/>
+                          </a:rPr>
+                          <m:t>] </m:t>
+                        </m:r>
+                      </m:oMath>
+                    </m:oMathPara>
+                  </a14:m>
+                  <a:endParaRPr lang="en-US" dirty="0">
+                    <a:solidFill>
+                      <a:schemeClr val="bg2">
+                        <a:lumMod val="90000"/>
+                      </a:schemeClr>
+                    </a:solidFill>
+                  </a:endParaRPr>
+                </a:p>
+              </p:txBody>
+            </p:sp>
+          </mc:Choice>
+          <mc:Fallback>
+            <p:sp>
+              <p:nvSpPr>
+                <p:cNvPr id="4" name="TextBox 3">
+                  <a:extLst>
+                    <a:ext uri="{FF2B5EF4-FFF2-40B4-BE49-F238E27FC236}">
+                      <a16:creationId xmlns:a16="http://schemas.microsoft.com/office/drawing/2014/main" id="{2C3664E8-B2A7-1B06-6C98-728F13254F79}"/>
+                    </a:ext>
+                  </a:extLst>
+                </p:cNvPr>
+                <p:cNvSpPr txBox="1">
+                  <a:spLocks noRot="1" noChangeAspect="1" noMove="1" noResize="1" noEditPoints="1" noAdjustHandles="1" noChangeArrowheads="1" noChangeShapeType="1" noTextEdit="1"/>
+                </p:cNvSpPr>
+                <p:nvPr/>
+              </p:nvSpPr>
+              <p:spPr>
+                <a:xfrm>
+                  <a:off x="2851737" y="3059668"/>
+                  <a:ext cx="2407920" cy="369332"/>
+                </a:xfrm>
+                <a:prstGeom prst="rect">
+                  <a:avLst/>
+                </a:prstGeom>
+                <a:blipFill>
+                  <a:blip r:embed="rId3"/>
+                  <a:stretch>
+                    <a:fillRect b="-14754"/>
+                  </a:stretch>
+                </a:blipFill>
+              </p:spPr>
+              <p:txBody>
+                <a:bodyPr/>
+                <a:lstStyle/>
+                <a:p>
+                  <a:r>
+                    <a:rPr lang="en-US">
+                      <a:noFill/>
+                    </a:rPr>
+                    <a:t> </a:t>
+                  </a:r>
+                </a:p>
+              </p:txBody>
+            </p:sp>
+          </mc:Fallback>
+        </mc:AlternateContent>
+        <p:cxnSp>
+          <p:nvCxnSpPr>
+            <p:cNvPr id="6" name="Straight Arrow Connector 5">
+              <a:extLst>
+                <a:ext uri="{FF2B5EF4-FFF2-40B4-BE49-F238E27FC236}">
+                  <a16:creationId xmlns:a16="http://schemas.microsoft.com/office/drawing/2014/main" id="{40E29B41-7A9E-2193-F3AE-1D96EAA88B5C}"/>
+                </a:ext>
+              </a:extLst>
+            </p:cNvPr>
+            <p:cNvCxnSpPr>
+              <a:cxnSpLocks/>
+            </p:cNvCxnSpPr>
+            <p:nvPr/>
+          </p:nvCxnSpPr>
+          <p:spPr>
+            <a:xfrm>
+              <a:off x="3311091" y="3021167"/>
+              <a:ext cx="1183907" cy="0"/>
+            </a:xfrm>
+            <a:prstGeom prst="straightConnector1">
+              <a:avLst/>
+            </a:prstGeom>
+            <a:ln w="19050">
+              <a:solidFill>
+                <a:schemeClr val="bg1"/>
+              </a:solidFill>
+              <a:headEnd type="triangle" w="med" len="med"/>
+              <a:tailEnd type="triangle" w="med" len="med"/>
+            </a:ln>
+          </p:spPr>
+          <p:style>
+            <a:lnRef idx="1">
+              <a:schemeClr val="accent1"/>
+            </a:lnRef>
+            <a:fillRef idx="0">
+              <a:schemeClr val="accent1"/>
+            </a:fillRef>
+            <a:effectRef idx="0">
+              <a:schemeClr val="accent1"/>
+            </a:effectRef>
+            <a:fontRef idx="minor">
+              <a:schemeClr val="tx1"/>
+            </a:fontRef>
+          </p:style>
+        </p:cxnSp>
+        <p:cxnSp>
+          <p:nvCxnSpPr>
+            <p:cNvPr id="12" name="Straight Connector 11">
+              <a:extLst>
+                <a:ext uri="{FF2B5EF4-FFF2-40B4-BE49-F238E27FC236}">
+                  <a16:creationId xmlns:a16="http://schemas.microsoft.com/office/drawing/2014/main" id="{C480C131-DA3B-9548-C747-745F8A08420C}"/>
+                </a:ext>
+              </a:extLst>
+            </p:cNvPr>
+            <p:cNvCxnSpPr>
+              <a:cxnSpLocks/>
+            </p:cNvCxnSpPr>
+            <p:nvPr/>
+          </p:nvCxnSpPr>
+          <p:spPr>
+            <a:xfrm>
+              <a:off x="4494998" y="2579571"/>
+              <a:ext cx="0" cy="480097"/>
+            </a:xfrm>
+            <a:prstGeom prst="line">
+              <a:avLst/>
+            </a:prstGeom>
+            <a:ln w="19050">
+              <a:solidFill>
+                <a:schemeClr val="bg1"/>
+              </a:solidFill>
+              <a:prstDash val="dash"/>
+            </a:ln>
+          </p:spPr>
+          <p:style>
+            <a:lnRef idx="1">
+              <a:schemeClr val="accent1"/>
+            </a:lnRef>
+            <a:fillRef idx="0">
+              <a:schemeClr val="accent1"/>
+            </a:fillRef>
+            <a:effectRef idx="0">
+              <a:schemeClr val="accent1"/>
+            </a:effectRef>
+            <a:fontRef idx="minor">
+              <a:schemeClr val="tx1"/>
+            </a:fontRef>
+          </p:style>
+        </p:cxnSp>
+        <p:cxnSp>
+          <p:nvCxnSpPr>
+            <p:cNvPr id="15" name="Straight Connector 14">
+              <a:extLst>
+                <a:ext uri="{FF2B5EF4-FFF2-40B4-BE49-F238E27FC236}">
+                  <a16:creationId xmlns:a16="http://schemas.microsoft.com/office/drawing/2014/main" id="{BD9E53F3-A417-6AF9-DB4C-DFD00FE8751C}"/>
+                </a:ext>
+              </a:extLst>
+            </p:cNvPr>
+            <p:cNvCxnSpPr>
+              <a:cxnSpLocks/>
+            </p:cNvCxnSpPr>
+            <p:nvPr/>
+          </p:nvCxnSpPr>
+          <p:spPr>
+            <a:xfrm>
+              <a:off x="3311091" y="2906829"/>
+              <a:ext cx="0" cy="152839"/>
+            </a:xfrm>
+            <a:prstGeom prst="line">
+              <a:avLst/>
+            </a:prstGeom>
+            <a:ln w="19050">
+              <a:solidFill>
+                <a:schemeClr val="bg1"/>
+              </a:solidFill>
+              <a:prstDash val="dash"/>
+            </a:ln>
+          </p:spPr>
+          <p:style>
+            <a:lnRef idx="1">
+              <a:schemeClr val="accent1"/>
+            </a:lnRef>
+            <a:fillRef idx="0">
+              <a:schemeClr val="accent1"/>
+            </a:fillRef>
+            <a:effectRef idx="0">
+              <a:schemeClr val="accent1"/>
+            </a:effectRef>
+            <a:fontRef idx="minor">
+              <a:schemeClr val="tx1"/>
+            </a:fontRef>
+          </p:style>
+        </p:cxnSp>
+      </p:grpSp>
+    </p:spTree>
+    <p:extLst>
+      <p:ext uri="{BB962C8B-B14F-4D97-AF65-F5344CB8AC3E}">
+        <p14:creationId xmlns:p14="http://schemas.microsoft.com/office/powerpoint/2010/main" val="3777747364"/>
+      </p:ext>
+    </p:extLst>
+  </p:cSld>
+  <p:clrMapOvr>
+    <a:masterClrMapping/>
+  </p:clrMapOvr>
+</p:sld>
+</file>
+
+<file path=ppt/slides/slide18.xml><?xml version="1.0" encoding="utf-8"?>
+<p:sld xmlns:a="http://schemas.openxmlformats.org/drawingml/2006/main" xmlns:r="http://schemas.openxmlformats.org/officeDocument/2006/relationships" xmlns:p="http://schemas.openxmlformats.org/presentationml/2006/main">
+  <p:cSld>
+    <p:spTree>
+      <p:nvGrpSpPr>
+        <p:cNvPr id="1" name=""/>
+        <p:cNvGrpSpPr/>
+        <p:nvPr/>
+      </p:nvGrpSpPr>
+      <p:grpSpPr>
+        <a:xfrm>
+          <a:off x="0" y="0"/>
+          <a:ext cx="0" cy="0"/>
+          <a:chOff x="0" y="0"/>
+          <a:chExt cx="0" cy="0"/>
+        </a:xfrm>
+      </p:grpSpPr>
+      <p:pic>
+        <p:nvPicPr>
+          <p:cNvPr id="27" name="Picture 26">
+            <a:extLst>
+              <a:ext uri="{FF2B5EF4-FFF2-40B4-BE49-F238E27FC236}">
+                <a16:creationId xmlns:a16="http://schemas.microsoft.com/office/drawing/2014/main" id="{245E93C8-26BC-F568-B9E8-BAB43A7F0048}"/>
+              </a:ext>
+            </a:extLst>
+          </p:cNvPr>
+          <p:cNvPicPr>
+            <a:picLocks noChangeAspect="1"/>
+          </p:cNvPicPr>
+          <p:nvPr/>
+        </p:nvPicPr>
+        <p:blipFill>
+          <a:blip r:embed="rId2"/>
+          <a:stretch>
+            <a:fillRect/>
+          </a:stretch>
+        </p:blipFill>
+        <p:spPr>
+          <a:xfrm>
+            <a:off x="787927" y="128588"/>
+            <a:ext cx="4687634" cy="3519486"/>
+          </a:xfrm>
+          <a:prstGeom prst="rect">
+            <a:avLst/>
+          </a:prstGeom>
+        </p:spPr>
+      </p:pic>
+      <mc:AlternateContent xmlns:mc="http://schemas.openxmlformats.org/markup-compatibility/2006">
+        <mc:Choice xmlns:a14="http://schemas.microsoft.com/office/drawing/2010/main" Requires="a14">
+          <p:sp>
+            <p:nvSpPr>
+              <p:cNvPr id="4" name="TextBox 3">
+                <a:extLst>
+                  <a:ext uri="{FF2B5EF4-FFF2-40B4-BE49-F238E27FC236}">
+                    <a16:creationId xmlns:a16="http://schemas.microsoft.com/office/drawing/2014/main" id="{6BEF40EB-1E3D-0A1B-909D-696B58AEE572}"/>
+                  </a:ext>
+                </a:extLst>
+              </p:cNvPr>
+              <p:cNvSpPr txBox="1"/>
+              <p:nvPr/>
+            </p:nvSpPr>
+            <p:spPr>
+              <a:xfrm>
+                <a:off x="958688" y="1802136"/>
+                <a:ext cx="1265614" cy="369332"/>
+              </a:xfrm>
+              <a:prstGeom prst="rect">
+                <a:avLst/>
+              </a:prstGeom>
+              <a:noFill/>
+            </p:spPr>
+            <p:txBody>
+              <a:bodyPr wrap="square" rtlCol="0">
+                <a:spAutoFit/>
+              </a:bodyPr>
+              <a:lstStyle/>
+              <a:p>
+                <a14:m>
+                  <m:oMathPara xmlns:m="http://schemas.openxmlformats.org/officeDocument/2006/math">
+                    <m:oMathParaPr>
+                      <m:jc m:val="centerGroup"/>
+                    </m:oMathParaPr>
+                    <m:oMath xmlns:m="http://schemas.openxmlformats.org/officeDocument/2006/math">
+                      <m:r>
+                        <a:rPr lang="en-US" b="0" i="1" smtClean="0">
+                          <a:solidFill>
+                            <a:schemeClr val="bg1"/>
+                          </a:solidFill>
+                          <a:latin typeface="Cambria Math" panose="02040503050406030204" pitchFamily="18" charset="0"/>
+                        </a:rPr>
+                        <m:t>𝑇</m:t>
+                      </m:r>
+                      <m:r>
+                        <a:rPr lang="en-US" b="0" i="1" smtClean="0">
+                          <a:solidFill>
+                            <a:schemeClr val="bg1"/>
+                          </a:solidFill>
+                          <a:latin typeface="Cambria Math" panose="02040503050406030204" pitchFamily="18" charset="0"/>
+                        </a:rPr>
+                        <m:t>~ 0.60 [</m:t>
+                      </m:r>
+                      <m:r>
+                        <a:rPr lang="en-US" b="0" i="1" smtClean="0">
+                          <a:solidFill>
+                            <a:schemeClr val="bg1"/>
+                          </a:solidFill>
+                          <a:latin typeface="Cambria Math" panose="02040503050406030204" pitchFamily="18" charset="0"/>
+                        </a:rPr>
+                        <m:t>𝑠𝑒𝑐</m:t>
+                      </m:r>
+                      <m:r>
+                        <a:rPr lang="en-US" b="0" i="1" smtClean="0">
+                          <a:solidFill>
+                            <a:schemeClr val="bg1"/>
+                          </a:solidFill>
+                          <a:latin typeface="Cambria Math" panose="02040503050406030204" pitchFamily="18" charset="0"/>
+                        </a:rPr>
+                        <m:t>] </m:t>
+                      </m:r>
+                    </m:oMath>
+                  </m:oMathPara>
+                </a14:m>
+                <a:endParaRPr lang="en-US" dirty="0">
+                  <a:solidFill>
+                    <a:schemeClr val="bg2">
+                      <a:lumMod val="90000"/>
+                    </a:schemeClr>
+                  </a:solidFill>
+                </a:endParaRPr>
+              </a:p>
+            </p:txBody>
+          </p:sp>
+        </mc:Choice>
+        <mc:Fallback>
+          <p:sp>
+            <p:nvSpPr>
+              <p:cNvPr id="4" name="TextBox 3">
+                <a:extLst>
+                  <a:ext uri="{FF2B5EF4-FFF2-40B4-BE49-F238E27FC236}">
+                    <a16:creationId xmlns:a16="http://schemas.microsoft.com/office/drawing/2014/main" id="{6BEF40EB-1E3D-0A1B-909D-696B58AEE572}"/>
+                  </a:ext>
+                </a:extLst>
+              </p:cNvPr>
+              <p:cNvSpPr txBox="1">
+                <a:spLocks noRot="1" noChangeAspect="1" noMove="1" noResize="1" noEditPoints="1" noAdjustHandles="1" noChangeArrowheads="1" noChangeShapeType="1" noTextEdit="1"/>
+              </p:cNvSpPr>
+              <p:nvPr/>
+            </p:nvSpPr>
+            <p:spPr>
+              <a:xfrm>
+                <a:off x="958688" y="1802136"/>
+                <a:ext cx="1265614" cy="369332"/>
+              </a:xfrm>
+              <a:prstGeom prst="rect">
+                <a:avLst/>
+              </a:prstGeom>
+              <a:blipFill>
+                <a:blip r:embed="rId3"/>
+                <a:stretch>
+                  <a:fillRect r="-20673" b="-16667"/>
+                </a:stretch>
+              </a:blipFill>
+            </p:spPr>
+            <p:txBody>
+              <a:bodyPr/>
+              <a:lstStyle/>
+              <a:p>
+                <a:r>
+                  <a:rPr lang="en-US">
+                    <a:noFill/>
+                  </a:rPr>
+                  <a:t> </a:t>
+                </a:r>
+              </a:p>
+            </p:txBody>
+          </p:sp>
+        </mc:Fallback>
+      </mc:AlternateContent>
+      <p:cxnSp>
+        <p:nvCxnSpPr>
+          <p:cNvPr id="5" name="Straight Arrow Connector 4">
+            <a:extLst>
+              <a:ext uri="{FF2B5EF4-FFF2-40B4-BE49-F238E27FC236}">
+                <a16:creationId xmlns:a16="http://schemas.microsoft.com/office/drawing/2014/main" id="{535A065C-FFFE-14F6-E4E2-2FB98F692B8A}"/>
+              </a:ext>
+            </a:extLst>
+          </p:cNvPr>
+          <p:cNvCxnSpPr>
+            <a:cxnSpLocks/>
+          </p:cNvCxnSpPr>
+          <p:nvPr/>
+        </p:nvCxnSpPr>
+        <p:spPr>
+          <a:xfrm>
+            <a:off x="1061306" y="1694485"/>
+            <a:ext cx="324582" cy="0"/>
+          </a:xfrm>
+          <a:prstGeom prst="straightConnector1">
+            <a:avLst/>
+          </a:prstGeom>
+          <a:ln w="19050">
+            <a:solidFill>
+              <a:schemeClr val="bg1"/>
+            </a:solidFill>
+            <a:headEnd type="triangle" w="med" len="med"/>
+            <a:tailEnd type="triangle" w="med" len="med"/>
+          </a:ln>
+        </p:spPr>
+        <p:style>
+          <a:lnRef idx="1">
+            <a:schemeClr val="accent1"/>
+          </a:lnRef>
+          <a:fillRef idx="0">
+            <a:schemeClr val="accent1"/>
+          </a:fillRef>
+          <a:effectRef idx="0">
+            <a:schemeClr val="accent1"/>
+          </a:effectRef>
+          <a:fontRef idx="minor">
+            <a:schemeClr val="tx1"/>
+          </a:fontRef>
+        </p:style>
+      </p:cxnSp>
+      <p:cxnSp>
+        <p:nvCxnSpPr>
+          <p:cNvPr id="6" name="Straight Connector 5">
+            <a:extLst>
+              <a:ext uri="{FF2B5EF4-FFF2-40B4-BE49-F238E27FC236}">
+                <a16:creationId xmlns:a16="http://schemas.microsoft.com/office/drawing/2014/main" id="{A202AFD0-9341-EA3C-94A4-295A38D7579C}"/>
+              </a:ext>
+            </a:extLst>
+          </p:cNvPr>
+          <p:cNvCxnSpPr>
+            <a:cxnSpLocks/>
+          </p:cNvCxnSpPr>
+          <p:nvPr/>
+        </p:nvCxnSpPr>
+        <p:spPr>
+          <a:xfrm>
+            <a:off x="1385888" y="1505064"/>
+            <a:ext cx="0" cy="218403"/>
+          </a:xfrm>
+          <a:prstGeom prst="line">
+            <a:avLst/>
+          </a:prstGeom>
+          <a:ln w="19050">
+            <a:solidFill>
+              <a:schemeClr val="bg1"/>
+            </a:solidFill>
+            <a:prstDash val="dash"/>
+          </a:ln>
+        </p:spPr>
+        <p:style>
+          <a:lnRef idx="1">
+            <a:schemeClr val="accent1"/>
+          </a:lnRef>
+          <a:fillRef idx="0">
+            <a:schemeClr val="accent1"/>
+          </a:fillRef>
+          <a:effectRef idx="0">
+            <a:schemeClr val="accent1"/>
+          </a:effectRef>
+          <a:fontRef idx="minor">
+            <a:schemeClr val="tx1"/>
+          </a:fontRef>
+        </p:style>
+      </p:cxnSp>
+      <p:cxnSp>
+        <p:nvCxnSpPr>
+          <p:cNvPr id="7" name="Straight Connector 6">
+            <a:extLst>
+              <a:ext uri="{FF2B5EF4-FFF2-40B4-BE49-F238E27FC236}">
+                <a16:creationId xmlns:a16="http://schemas.microsoft.com/office/drawing/2014/main" id="{A01727DD-5E82-082A-282A-9AECCA11E6F0}"/>
+              </a:ext>
+            </a:extLst>
+          </p:cNvPr>
+          <p:cNvCxnSpPr>
+            <a:cxnSpLocks/>
+          </p:cNvCxnSpPr>
+          <p:nvPr/>
+        </p:nvCxnSpPr>
+        <p:spPr>
+          <a:xfrm flipH="1">
+            <a:off x="1059842" y="1568493"/>
+            <a:ext cx="1464" cy="161173"/>
+          </a:xfrm>
+          <a:prstGeom prst="line">
+            <a:avLst/>
+          </a:prstGeom>
+          <a:ln w="19050">
+            <a:solidFill>
+              <a:schemeClr val="bg1"/>
+            </a:solidFill>
+            <a:prstDash val="dash"/>
+          </a:ln>
+        </p:spPr>
+        <p:style>
+          <a:lnRef idx="1">
+            <a:schemeClr val="accent1"/>
+          </a:lnRef>
+          <a:fillRef idx="0">
+            <a:schemeClr val="accent1"/>
+          </a:fillRef>
+          <a:effectRef idx="0">
+            <a:schemeClr val="accent1"/>
+          </a:effectRef>
+          <a:fontRef idx="minor">
+            <a:schemeClr val="tx1"/>
+          </a:fontRef>
+        </p:style>
+      </p:cxnSp>
+      <p:sp>
+        <p:nvSpPr>
+          <p:cNvPr id="23" name="TextBox 22">
+            <a:extLst>
+              <a:ext uri="{FF2B5EF4-FFF2-40B4-BE49-F238E27FC236}">
+                <a16:creationId xmlns:a16="http://schemas.microsoft.com/office/drawing/2014/main" id="{4E8981BA-88CB-C125-E133-BAD5B7C23CE0}"/>
+              </a:ext>
+            </a:extLst>
+          </p:cNvPr>
+          <p:cNvSpPr txBox="1"/>
+          <p:nvPr/>
+        </p:nvSpPr>
+        <p:spPr>
+          <a:xfrm>
+            <a:off x="4664159" y="409271"/>
+            <a:ext cx="1265614" cy="646331"/>
+          </a:xfrm>
+          <a:prstGeom prst="rect">
+            <a:avLst/>
+          </a:prstGeom>
+          <a:noFill/>
+        </p:spPr>
+        <p:txBody>
+          <a:bodyPr wrap="square" rtlCol="0">
+            <a:spAutoFit/>
+          </a:bodyPr>
+          <a:lstStyle/>
+          <a:p>
+            <a:r>
+              <a:rPr lang="en-US" dirty="0"/>
+              <a:t>Short period</a:t>
+            </a:r>
+          </a:p>
+        </p:txBody>
+      </p:sp>
+      <p:grpSp>
+        <p:nvGrpSpPr>
+          <p:cNvPr id="17" name="Group 16">
+            <a:extLst>
+              <a:ext uri="{FF2B5EF4-FFF2-40B4-BE49-F238E27FC236}">
+                <a16:creationId xmlns:a16="http://schemas.microsoft.com/office/drawing/2014/main" id="{9CD4F587-FFA2-D65F-D5FE-295AA3A46B46}"/>
+              </a:ext>
+            </a:extLst>
+          </p:cNvPr>
+          <p:cNvGrpSpPr/>
+          <p:nvPr/>
+        </p:nvGrpSpPr>
+        <p:grpSpPr>
+          <a:xfrm>
+            <a:off x="5475561" y="128588"/>
+            <a:ext cx="4754308" cy="3519488"/>
+            <a:chOff x="2233612" y="76200"/>
+            <a:chExt cx="9058275" cy="6705600"/>
+          </a:xfrm>
+        </p:grpSpPr>
+        <p:pic>
+          <p:nvPicPr>
+            <p:cNvPr id="18" name="Picture 17">
+              <a:extLst>
+                <a:ext uri="{FF2B5EF4-FFF2-40B4-BE49-F238E27FC236}">
+                  <a16:creationId xmlns:a16="http://schemas.microsoft.com/office/drawing/2014/main" id="{026F004E-562E-6F3F-76A8-05973CAA192C}"/>
+                </a:ext>
+              </a:extLst>
+            </p:cNvPr>
+            <p:cNvPicPr>
+              <a:picLocks noChangeAspect="1"/>
+            </p:cNvPicPr>
+            <p:nvPr/>
+          </p:nvPicPr>
+          <p:blipFill>
+            <a:blip r:embed="rId4"/>
+            <a:stretch>
+              <a:fillRect/>
+            </a:stretch>
+          </p:blipFill>
+          <p:spPr>
+            <a:xfrm>
+              <a:off x="2233612" y="76200"/>
+              <a:ext cx="9058275" cy="6705600"/>
+            </a:xfrm>
+            <a:prstGeom prst="rect">
+              <a:avLst/>
+            </a:prstGeom>
+          </p:spPr>
+        </p:pic>
+        <mc:AlternateContent xmlns:mc="http://schemas.openxmlformats.org/markup-compatibility/2006">
+          <mc:Choice xmlns:a14="http://schemas.microsoft.com/office/drawing/2010/main" Requires="a14">
+            <p:sp>
+              <p:nvSpPr>
+                <p:cNvPr id="19" name="TextBox 18">
+                  <a:extLst>
+                    <a:ext uri="{FF2B5EF4-FFF2-40B4-BE49-F238E27FC236}">
+                      <a16:creationId xmlns:a16="http://schemas.microsoft.com/office/drawing/2014/main" id="{9D8BF706-BED4-FB6C-1E47-983F7CFD186B}"/>
+                    </a:ext>
+                  </a:extLst>
+                </p:cNvPr>
+                <p:cNvSpPr txBox="1"/>
+                <p:nvPr/>
+              </p:nvSpPr>
+              <p:spPr>
+                <a:xfrm>
+                  <a:off x="2506930" y="3244333"/>
+                  <a:ext cx="2407920" cy="703680"/>
+                </a:xfrm>
+                <a:prstGeom prst="rect">
+                  <a:avLst/>
+                </a:prstGeom>
+                <a:noFill/>
+                <a:ln>
+                  <a:noFill/>
+                </a:ln>
+              </p:spPr>
+              <p:txBody>
+                <a:bodyPr wrap="square" rtlCol="0">
+                  <a:spAutoFit/>
+                </a:bodyPr>
+                <a:lstStyle/>
+                <a:p>
+                  <a14:m>
+                    <m:oMathPara xmlns:m="http://schemas.openxmlformats.org/officeDocument/2006/math">
+                      <m:oMathParaPr>
+                        <m:jc m:val="centerGroup"/>
+                      </m:oMathParaPr>
+                      <m:oMath xmlns:m="http://schemas.openxmlformats.org/officeDocument/2006/math">
+                        <m:r>
+                          <a:rPr lang="en-US" b="0" i="1" smtClean="0">
+                            <a:solidFill>
+                              <a:schemeClr val="bg1"/>
+                            </a:solidFill>
+                            <a:latin typeface="Cambria Math" panose="02040503050406030204" pitchFamily="18" charset="0"/>
+                          </a:rPr>
+                          <m:t>𝑇</m:t>
+                        </m:r>
+                        <m:r>
+                          <a:rPr lang="en-US" b="0" i="1" smtClean="0">
+                            <a:solidFill>
+                              <a:schemeClr val="bg1"/>
+                            </a:solidFill>
+                            <a:latin typeface="Cambria Math" panose="02040503050406030204" pitchFamily="18" charset="0"/>
+                          </a:rPr>
+                          <m:t>~ 66.67 [</m:t>
+                        </m:r>
+                        <m:r>
+                          <a:rPr lang="en-US" b="0" i="1" smtClean="0">
+                            <a:solidFill>
+                              <a:schemeClr val="bg1"/>
+                            </a:solidFill>
+                            <a:latin typeface="Cambria Math" panose="02040503050406030204" pitchFamily="18" charset="0"/>
+                          </a:rPr>
+                          <m:t>𝑠𝑒𝑐</m:t>
+                        </m:r>
+                        <m:r>
+                          <a:rPr lang="en-US" b="0" i="1" smtClean="0">
+                            <a:solidFill>
+                              <a:schemeClr val="bg1"/>
+                            </a:solidFill>
+                            <a:latin typeface="Cambria Math" panose="02040503050406030204" pitchFamily="18" charset="0"/>
+                          </a:rPr>
+                          <m:t>] </m:t>
+                        </m:r>
+                      </m:oMath>
+                    </m:oMathPara>
+                  </a14:m>
+                  <a:endParaRPr lang="en-US" dirty="0">
+                    <a:solidFill>
+                      <a:schemeClr val="bg1"/>
+                    </a:solidFill>
+                  </a:endParaRPr>
+                </a:p>
+              </p:txBody>
+            </p:sp>
+          </mc:Choice>
+          <mc:Fallback>
+            <p:sp>
+              <p:nvSpPr>
+                <p:cNvPr id="19" name="TextBox 18">
+                  <a:extLst>
+                    <a:ext uri="{FF2B5EF4-FFF2-40B4-BE49-F238E27FC236}">
+                      <a16:creationId xmlns:a16="http://schemas.microsoft.com/office/drawing/2014/main" id="{9D8BF706-BED4-FB6C-1E47-983F7CFD186B}"/>
+                    </a:ext>
+                  </a:extLst>
+                </p:cNvPr>
+                <p:cNvSpPr txBox="1">
+                  <a:spLocks noRot="1" noChangeAspect="1" noMove="1" noResize="1" noEditPoints="1" noAdjustHandles="1" noChangeArrowheads="1" noChangeShapeType="1" noTextEdit="1"/>
+                </p:cNvSpPr>
+                <p:nvPr/>
+              </p:nvSpPr>
+              <p:spPr>
+                <a:xfrm>
+                  <a:off x="2506930" y="3244333"/>
+                  <a:ext cx="2407920" cy="703680"/>
+                </a:xfrm>
+                <a:prstGeom prst="rect">
+                  <a:avLst/>
+                </a:prstGeom>
+                <a:blipFill>
+                  <a:blip r:embed="rId5"/>
+                  <a:stretch>
+                    <a:fillRect r="-30918" b="-16667"/>
+                  </a:stretch>
+                </a:blipFill>
+                <a:ln>
+                  <a:noFill/>
+                </a:ln>
+              </p:spPr>
+              <p:txBody>
+                <a:bodyPr/>
+                <a:lstStyle/>
+                <a:p>
+                  <a:r>
+                    <a:rPr lang="en-US">
+                      <a:noFill/>
+                    </a:rPr>
+                    <a:t> </a:t>
+                  </a:r>
+                </a:p>
+              </p:txBody>
+            </p:sp>
+          </mc:Fallback>
+        </mc:AlternateContent>
+        <p:cxnSp>
+          <p:nvCxnSpPr>
+            <p:cNvPr id="20" name="Straight Arrow Connector 19">
+              <a:extLst>
+                <a:ext uri="{FF2B5EF4-FFF2-40B4-BE49-F238E27FC236}">
+                  <a16:creationId xmlns:a16="http://schemas.microsoft.com/office/drawing/2014/main" id="{E2DF3315-0EEB-AEBE-8E40-CAF367EAB2B2}"/>
+                </a:ext>
+              </a:extLst>
+            </p:cNvPr>
+            <p:cNvCxnSpPr>
+              <a:cxnSpLocks/>
+            </p:cNvCxnSpPr>
+            <p:nvPr/>
+          </p:nvCxnSpPr>
+          <p:spPr>
+            <a:xfrm>
+              <a:off x="3311091" y="3021167"/>
+              <a:ext cx="1183907" cy="0"/>
+            </a:xfrm>
+            <a:prstGeom prst="straightConnector1">
+              <a:avLst/>
+            </a:prstGeom>
+            <a:ln w="19050">
+              <a:solidFill>
+                <a:schemeClr val="bg1"/>
+              </a:solidFill>
+              <a:headEnd type="triangle" w="med" len="med"/>
+              <a:tailEnd type="triangle" w="med" len="med"/>
+            </a:ln>
+          </p:spPr>
+          <p:style>
+            <a:lnRef idx="1">
+              <a:schemeClr val="accent1"/>
+            </a:lnRef>
+            <a:fillRef idx="0">
+              <a:schemeClr val="accent1"/>
+            </a:fillRef>
+            <a:effectRef idx="0">
+              <a:schemeClr val="accent1"/>
+            </a:effectRef>
+            <a:fontRef idx="minor">
+              <a:schemeClr val="tx1"/>
+            </a:fontRef>
+          </p:style>
+        </p:cxnSp>
+        <p:cxnSp>
+          <p:nvCxnSpPr>
+            <p:cNvPr id="21" name="Straight Connector 20">
+              <a:extLst>
+                <a:ext uri="{FF2B5EF4-FFF2-40B4-BE49-F238E27FC236}">
+                  <a16:creationId xmlns:a16="http://schemas.microsoft.com/office/drawing/2014/main" id="{D0C5F5B4-E2AF-F981-0967-4D773A69A6F0}"/>
+                </a:ext>
+              </a:extLst>
+            </p:cNvPr>
+            <p:cNvCxnSpPr>
+              <a:cxnSpLocks/>
+            </p:cNvCxnSpPr>
+            <p:nvPr/>
+          </p:nvCxnSpPr>
+          <p:spPr>
+            <a:xfrm>
+              <a:off x="4494998" y="2579571"/>
+              <a:ext cx="0" cy="480097"/>
+            </a:xfrm>
+            <a:prstGeom prst="line">
+              <a:avLst/>
+            </a:prstGeom>
+            <a:ln w="19050">
+              <a:solidFill>
+                <a:schemeClr val="bg1"/>
+              </a:solidFill>
+              <a:prstDash val="dash"/>
+            </a:ln>
+          </p:spPr>
+          <p:style>
+            <a:lnRef idx="1">
+              <a:schemeClr val="accent1"/>
+            </a:lnRef>
+            <a:fillRef idx="0">
+              <a:schemeClr val="accent1"/>
+            </a:fillRef>
+            <a:effectRef idx="0">
+              <a:schemeClr val="accent1"/>
+            </a:effectRef>
+            <a:fontRef idx="minor">
+              <a:schemeClr val="tx1"/>
+            </a:fontRef>
+          </p:style>
+        </p:cxnSp>
+        <p:cxnSp>
+          <p:nvCxnSpPr>
+            <p:cNvPr id="22" name="Straight Connector 21">
+              <a:extLst>
+                <a:ext uri="{FF2B5EF4-FFF2-40B4-BE49-F238E27FC236}">
+                  <a16:creationId xmlns:a16="http://schemas.microsoft.com/office/drawing/2014/main" id="{512911F0-4A9C-E434-9841-726578DBDF91}"/>
+                </a:ext>
+              </a:extLst>
+            </p:cNvPr>
+            <p:cNvCxnSpPr>
+              <a:cxnSpLocks/>
+            </p:cNvCxnSpPr>
+            <p:nvPr/>
+          </p:nvCxnSpPr>
+          <p:spPr>
+            <a:xfrm>
+              <a:off x="3311091" y="2906829"/>
+              <a:ext cx="0" cy="152839"/>
+            </a:xfrm>
+            <a:prstGeom prst="line">
+              <a:avLst/>
+            </a:prstGeom>
+            <a:ln w="19050">
+              <a:solidFill>
+                <a:schemeClr val="bg1"/>
+              </a:solidFill>
+              <a:prstDash val="dash"/>
+            </a:ln>
+          </p:spPr>
+          <p:style>
+            <a:lnRef idx="1">
+              <a:schemeClr val="accent1"/>
+            </a:lnRef>
+            <a:fillRef idx="0">
+              <a:schemeClr val="accent1"/>
+            </a:fillRef>
+            <a:effectRef idx="0">
+              <a:schemeClr val="accent1"/>
+            </a:effectRef>
+            <a:fontRef idx="minor">
+              <a:schemeClr val="tx1"/>
+            </a:fontRef>
+          </p:style>
+        </p:cxnSp>
+      </p:grpSp>
+      <p:sp>
+        <p:nvSpPr>
+          <p:cNvPr id="25" name="TextBox 24">
+            <a:extLst>
+              <a:ext uri="{FF2B5EF4-FFF2-40B4-BE49-F238E27FC236}">
+                <a16:creationId xmlns:a16="http://schemas.microsoft.com/office/drawing/2014/main" id="{C04594E9-4FAC-1F59-5790-3518A8353396}"/>
+              </a:ext>
+            </a:extLst>
+          </p:cNvPr>
+          <p:cNvSpPr txBox="1"/>
+          <p:nvPr/>
+        </p:nvSpPr>
+        <p:spPr>
+          <a:xfrm>
+            <a:off x="9353908" y="547771"/>
+            <a:ext cx="1265614" cy="369332"/>
+          </a:xfrm>
+          <a:prstGeom prst="rect">
+            <a:avLst/>
+          </a:prstGeom>
+          <a:noFill/>
+        </p:spPr>
+        <p:txBody>
+          <a:bodyPr wrap="square" rtlCol="0">
+            <a:spAutoFit/>
+          </a:bodyPr>
+          <a:lstStyle/>
+          <a:p>
+            <a:r>
+              <a:rPr lang="en-US" dirty="0"/>
+              <a:t>Phugoid</a:t>
+            </a:r>
+          </a:p>
+        </p:txBody>
+      </p:sp>
+      <mc:AlternateContent xmlns:mc="http://schemas.openxmlformats.org/markup-compatibility/2006">
+        <mc:Choice xmlns:a14="http://schemas.microsoft.com/office/drawing/2010/main" Requires="a14">
+          <p:sp>
+            <p:nvSpPr>
+              <p:cNvPr id="31" name="TextBox 30">
+                <a:extLst>
+                  <a:ext uri="{FF2B5EF4-FFF2-40B4-BE49-F238E27FC236}">
+                    <a16:creationId xmlns:a16="http://schemas.microsoft.com/office/drawing/2014/main" id="{D340B3A8-C4D5-A01B-EC53-334B577458DC}"/>
+                  </a:ext>
+                </a:extLst>
+              </p:cNvPr>
+              <p:cNvSpPr txBox="1"/>
+              <p:nvPr/>
+            </p:nvSpPr>
+            <p:spPr>
+              <a:xfrm>
+                <a:off x="1191418" y="630725"/>
+                <a:ext cx="1265614" cy="369332"/>
+              </a:xfrm>
+              <a:prstGeom prst="rect">
+                <a:avLst/>
+              </a:prstGeom>
+              <a:noFill/>
+            </p:spPr>
+            <p:txBody>
+              <a:bodyPr wrap="square" rtlCol="0">
+                <a:spAutoFit/>
+              </a:bodyPr>
+              <a:lstStyle/>
+              <a:p>
+                <a14:m>
+                  <m:oMathPara xmlns:m="http://schemas.openxmlformats.org/officeDocument/2006/math">
+                    <m:oMathParaPr>
+                      <m:jc m:val="centerGroup"/>
+                    </m:oMathParaPr>
+                    <m:oMath xmlns:m="http://schemas.openxmlformats.org/officeDocument/2006/math">
+                      <m:r>
+                        <a:rPr lang="en-US" b="0" i="1" smtClean="0">
+                          <a:solidFill>
+                            <a:schemeClr val="bg1"/>
+                          </a:solidFill>
+                          <a:latin typeface="Cambria Math" panose="02040503050406030204" pitchFamily="18" charset="0"/>
+                        </a:rPr>
+                        <m:t>1) </m:t>
+                      </m:r>
+                      <m:r>
+                        <a:rPr lang="en-US" b="0" i="1" smtClean="0">
+                          <a:solidFill>
+                            <a:schemeClr val="bg1"/>
+                          </a:solidFill>
+                          <a:latin typeface="Cambria Math" panose="02040503050406030204" pitchFamily="18" charset="0"/>
+                        </a:rPr>
+                        <m:t>𝑢</m:t>
+                      </m:r>
+                      <m:d>
+                        <m:dPr>
+                          <m:begChr m:val="["/>
+                          <m:endChr m:val="]"/>
+                          <m:ctrlPr>
+                            <a:rPr lang="en-US" b="0" i="1" smtClean="0">
+                              <a:solidFill>
+                                <a:schemeClr val="bg1"/>
+                              </a:solidFill>
+                              <a:latin typeface="Cambria Math" panose="02040503050406030204" pitchFamily="18" charset="0"/>
+                            </a:rPr>
+                          </m:ctrlPr>
+                        </m:dPr>
+                        <m:e>
+                          <m:r>
+                            <a:rPr lang="en-US" b="0" i="1" smtClean="0">
+                              <a:solidFill>
+                                <a:schemeClr val="bg1"/>
+                              </a:solidFill>
+                              <a:latin typeface="Cambria Math" panose="02040503050406030204" pitchFamily="18" charset="0"/>
+                            </a:rPr>
+                            <m:t>𝑚</m:t>
+                          </m:r>
+                          <m:r>
+                            <a:rPr lang="en-US" b="0" i="1" smtClean="0">
+                              <a:solidFill>
+                                <a:schemeClr val="bg1"/>
+                              </a:solidFill>
+                              <a:latin typeface="Cambria Math" panose="02040503050406030204" pitchFamily="18" charset="0"/>
+                            </a:rPr>
+                            <m:t>\</m:t>
+                          </m:r>
+                          <m:r>
+                            <m:rPr>
+                              <m:sty m:val="p"/>
+                            </m:rPr>
+                            <a:rPr lang="en-US" b="0" i="1" smtClean="0">
+                              <a:solidFill>
+                                <a:schemeClr val="bg1"/>
+                              </a:solidFill>
+                              <a:latin typeface="Cambria Math" panose="02040503050406030204" pitchFamily="18" charset="0"/>
+                            </a:rPr>
+                            <m:t>s</m:t>
+                          </m:r>
+                        </m:e>
+                      </m:d>
+                    </m:oMath>
+                  </m:oMathPara>
+                </a14:m>
+                <a:endParaRPr lang="en-US" dirty="0">
+                  <a:solidFill>
+                    <a:schemeClr val="bg2">
+                      <a:lumMod val="90000"/>
+                    </a:schemeClr>
+                  </a:solidFill>
+                </a:endParaRPr>
+              </a:p>
+            </p:txBody>
+          </p:sp>
+        </mc:Choice>
+        <mc:Fallback>
+          <p:sp>
+            <p:nvSpPr>
+              <p:cNvPr id="31" name="TextBox 30">
+                <a:extLst>
+                  <a:ext uri="{FF2B5EF4-FFF2-40B4-BE49-F238E27FC236}">
+                    <a16:creationId xmlns:a16="http://schemas.microsoft.com/office/drawing/2014/main" id="{D340B3A8-C4D5-A01B-EC53-334B577458DC}"/>
+                  </a:ext>
+                </a:extLst>
+              </p:cNvPr>
+              <p:cNvSpPr txBox="1">
+                <a:spLocks noRot="1" noChangeAspect="1" noMove="1" noResize="1" noEditPoints="1" noAdjustHandles="1" noChangeArrowheads="1" noChangeShapeType="1" noTextEdit="1"/>
+              </p:cNvSpPr>
+              <p:nvPr/>
+            </p:nvSpPr>
+            <p:spPr>
+              <a:xfrm>
+                <a:off x="1191418" y="630725"/>
+                <a:ext cx="1265614" cy="369332"/>
+              </a:xfrm>
+              <a:prstGeom prst="rect">
+                <a:avLst/>
+              </a:prstGeom>
+              <a:blipFill>
+                <a:blip r:embed="rId6"/>
+                <a:stretch>
+                  <a:fillRect b="-13115"/>
+                </a:stretch>
+              </a:blipFill>
+            </p:spPr>
+            <p:txBody>
+              <a:bodyPr/>
+              <a:lstStyle/>
+              <a:p>
+                <a:r>
+                  <a:rPr lang="en-US">
+                    <a:noFill/>
+                  </a:rPr>
+                  <a:t> </a:t>
+                </a:r>
+              </a:p>
+            </p:txBody>
+          </p:sp>
+        </mc:Fallback>
+      </mc:AlternateContent>
+      <mc:AlternateContent xmlns:mc="http://schemas.openxmlformats.org/markup-compatibility/2006">
+        <mc:Choice xmlns:a14="http://schemas.microsoft.com/office/drawing/2010/main" Requires="a14">
+          <p:sp>
+            <p:nvSpPr>
+              <p:cNvPr id="32" name="TextBox 31">
+                <a:extLst>
+                  <a:ext uri="{FF2B5EF4-FFF2-40B4-BE49-F238E27FC236}">
+                    <a16:creationId xmlns:a16="http://schemas.microsoft.com/office/drawing/2014/main" id="{A9390C55-E31D-5AFA-B9B5-6D6990840A6A}"/>
+                  </a:ext>
+                </a:extLst>
+              </p:cNvPr>
+              <p:cNvSpPr txBox="1"/>
+              <p:nvPr/>
+            </p:nvSpPr>
+            <p:spPr>
+              <a:xfrm>
+                <a:off x="2935765" y="630725"/>
+                <a:ext cx="1265614" cy="369332"/>
+              </a:xfrm>
+              <a:prstGeom prst="rect">
+                <a:avLst/>
+              </a:prstGeom>
+              <a:noFill/>
+            </p:spPr>
+            <p:txBody>
+              <a:bodyPr wrap="square" rtlCol="0">
+                <a:spAutoFit/>
+              </a:bodyPr>
+              <a:lstStyle/>
+              <a:p>
+                <a14:m>
+                  <m:oMathPara xmlns:m="http://schemas.openxmlformats.org/officeDocument/2006/math">
+                    <m:oMathParaPr>
+                      <m:jc m:val="centerGroup"/>
+                    </m:oMathParaPr>
+                    <m:oMath xmlns:m="http://schemas.openxmlformats.org/officeDocument/2006/math">
+                      <m:r>
+                        <a:rPr lang="en-US" b="0" i="1" smtClean="0">
+                          <a:solidFill>
+                            <a:schemeClr val="bg1"/>
+                          </a:solidFill>
+                          <a:latin typeface="Cambria Math" panose="02040503050406030204" pitchFamily="18" charset="0"/>
+                        </a:rPr>
+                        <m:t>2) </m:t>
+                      </m:r>
+                      <m:r>
+                        <a:rPr lang="en-US" b="0" i="1" smtClean="0">
+                          <a:solidFill>
+                            <a:schemeClr val="bg1"/>
+                          </a:solidFill>
+                          <a:latin typeface="Cambria Math" panose="02040503050406030204" pitchFamily="18" charset="0"/>
+                        </a:rPr>
+                        <m:t>𝑤</m:t>
+                      </m:r>
+                      <m:r>
+                        <a:rPr lang="en-US" b="0" i="1" smtClean="0">
+                          <a:solidFill>
+                            <a:schemeClr val="bg1"/>
+                          </a:solidFill>
+                          <a:latin typeface="Cambria Math" panose="02040503050406030204" pitchFamily="18" charset="0"/>
+                        </a:rPr>
+                        <m:t> [</m:t>
+                      </m:r>
+                      <m:r>
+                        <a:rPr lang="en-US" b="0" i="1" smtClean="0">
+                          <a:solidFill>
+                            <a:schemeClr val="bg1"/>
+                          </a:solidFill>
+                          <a:latin typeface="Cambria Math" panose="02040503050406030204" pitchFamily="18" charset="0"/>
+                        </a:rPr>
+                        <m:t>𝑚</m:t>
+                      </m:r>
+                      <m:r>
+                        <m:rPr>
+                          <m:lit/>
+                        </m:rPr>
+                        <a:rPr lang="en-US" b="0" i="1" smtClean="0">
+                          <a:solidFill>
+                            <a:schemeClr val="bg1"/>
+                          </a:solidFill>
+                          <a:latin typeface="Cambria Math" panose="02040503050406030204" pitchFamily="18" charset="0"/>
+                        </a:rPr>
+                        <m:t>/</m:t>
+                      </m:r>
+                      <m:r>
+                        <a:rPr lang="en-US" b="0" i="1" smtClean="0">
+                          <a:solidFill>
+                            <a:schemeClr val="bg1"/>
+                          </a:solidFill>
+                          <a:latin typeface="Cambria Math" panose="02040503050406030204" pitchFamily="18" charset="0"/>
+                        </a:rPr>
+                        <m:t>𝑠</m:t>
+                      </m:r>
+                      <m:r>
+                        <a:rPr lang="en-US" b="0" i="1" smtClean="0">
+                          <a:solidFill>
+                            <a:schemeClr val="bg1"/>
+                          </a:solidFill>
+                          <a:latin typeface="Cambria Math" panose="02040503050406030204" pitchFamily="18" charset="0"/>
+                        </a:rPr>
+                        <m:t>]</m:t>
+                      </m:r>
+                    </m:oMath>
+                  </m:oMathPara>
+                </a14:m>
+                <a:endParaRPr lang="en-US" dirty="0">
+                  <a:solidFill>
+                    <a:schemeClr val="bg2">
+                      <a:lumMod val="90000"/>
+                    </a:schemeClr>
+                  </a:solidFill>
+                </a:endParaRPr>
+              </a:p>
+            </p:txBody>
+          </p:sp>
+        </mc:Choice>
+        <mc:Fallback>
+          <p:sp>
+            <p:nvSpPr>
+              <p:cNvPr id="32" name="TextBox 31">
+                <a:extLst>
+                  <a:ext uri="{FF2B5EF4-FFF2-40B4-BE49-F238E27FC236}">
+                    <a16:creationId xmlns:a16="http://schemas.microsoft.com/office/drawing/2014/main" id="{A9390C55-E31D-5AFA-B9B5-6D6990840A6A}"/>
+                  </a:ext>
+                </a:extLst>
+              </p:cNvPr>
+              <p:cNvSpPr txBox="1">
+                <a:spLocks noRot="1" noChangeAspect="1" noMove="1" noResize="1" noEditPoints="1" noAdjustHandles="1" noChangeArrowheads="1" noChangeShapeType="1" noTextEdit="1"/>
+              </p:cNvSpPr>
+              <p:nvPr/>
+            </p:nvSpPr>
+            <p:spPr>
+              <a:xfrm>
+                <a:off x="2935765" y="630725"/>
+                <a:ext cx="1265614" cy="369332"/>
+              </a:xfrm>
+              <a:prstGeom prst="rect">
+                <a:avLst/>
+              </a:prstGeom>
+              <a:blipFill>
+                <a:blip r:embed="rId7"/>
+                <a:stretch>
+                  <a:fillRect r="-1449" b="-14754"/>
+                </a:stretch>
+              </a:blipFill>
+            </p:spPr>
+            <p:txBody>
+              <a:bodyPr/>
+              <a:lstStyle/>
+              <a:p>
+                <a:r>
+                  <a:rPr lang="en-US">
+                    <a:noFill/>
+                  </a:rPr>
+                  <a:t> </a:t>
+                </a:r>
+              </a:p>
+            </p:txBody>
+          </p:sp>
+        </mc:Fallback>
+      </mc:AlternateContent>
+      <mc:AlternateContent xmlns:mc="http://schemas.openxmlformats.org/markup-compatibility/2006">
+        <mc:Choice xmlns:a14="http://schemas.microsoft.com/office/drawing/2010/main" Requires="a14">
+          <p:sp>
+            <p:nvSpPr>
+              <p:cNvPr id="33" name="TextBox 32">
+                <a:extLst>
+                  <a:ext uri="{FF2B5EF4-FFF2-40B4-BE49-F238E27FC236}">
+                    <a16:creationId xmlns:a16="http://schemas.microsoft.com/office/drawing/2014/main" id="{B18B920F-29FF-89B2-EF04-499413DB6A53}"/>
+                  </a:ext>
+                </a:extLst>
+              </p:cNvPr>
+              <p:cNvSpPr txBox="1"/>
+              <p:nvPr/>
+            </p:nvSpPr>
+            <p:spPr>
+              <a:xfrm>
+                <a:off x="2935765" y="2411900"/>
+                <a:ext cx="1265614" cy="369332"/>
+              </a:xfrm>
+              <a:prstGeom prst="rect">
+                <a:avLst/>
+              </a:prstGeom>
+              <a:noFill/>
+            </p:spPr>
+            <p:txBody>
+              <a:bodyPr wrap="square" rtlCol="0">
+                <a:spAutoFit/>
+              </a:bodyPr>
+              <a:lstStyle/>
+              <a:p>
+                <a14:m>
+                  <m:oMathPara xmlns:m="http://schemas.openxmlformats.org/officeDocument/2006/math">
+                    <m:oMathParaPr>
+                      <m:jc m:val="centerGroup"/>
+                    </m:oMathParaPr>
+                    <m:oMath xmlns:m="http://schemas.openxmlformats.org/officeDocument/2006/math">
+                      <m:r>
+                        <a:rPr lang="en-US" b="0" i="1" smtClean="0">
+                          <a:solidFill>
+                            <a:schemeClr val="bg2">
+                              <a:lumMod val="90000"/>
+                            </a:schemeClr>
+                          </a:solidFill>
+                          <a:latin typeface="Cambria Math" panose="02040503050406030204" pitchFamily="18" charset="0"/>
+                        </a:rPr>
+                        <m:t>4) </m:t>
+                      </m:r>
+                      <m:r>
+                        <a:rPr lang="el-GR" b="0" i="1" smtClean="0">
+                          <a:solidFill>
+                            <a:schemeClr val="bg2">
+                              <a:lumMod val="90000"/>
+                            </a:schemeClr>
+                          </a:solidFill>
+                          <a:latin typeface="Cambria Math" panose="02040503050406030204" pitchFamily="18" charset="0"/>
+                        </a:rPr>
+                        <m:t>𝜃</m:t>
+                      </m:r>
+                      <m:r>
+                        <a:rPr lang="el-GR" b="0" i="1" smtClean="0">
+                          <a:solidFill>
+                            <a:schemeClr val="bg2">
+                              <a:lumMod val="90000"/>
+                            </a:schemeClr>
+                          </a:solidFill>
+                          <a:latin typeface="Cambria Math" panose="02040503050406030204" pitchFamily="18" charset="0"/>
+                        </a:rPr>
+                        <m:t> [</m:t>
+                      </m:r>
+                      <m:r>
+                        <a:rPr lang="en-US" b="0" i="1" smtClean="0">
+                          <a:solidFill>
+                            <a:schemeClr val="bg2">
+                              <a:lumMod val="90000"/>
+                            </a:schemeClr>
+                          </a:solidFill>
+                          <a:latin typeface="Cambria Math" panose="02040503050406030204" pitchFamily="18" charset="0"/>
+                        </a:rPr>
+                        <m:t>𝑑𝑒𝑔</m:t>
+                      </m:r>
+                      <m:r>
+                        <a:rPr lang="en-US" b="0" i="1" smtClean="0">
+                          <a:solidFill>
+                            <a:schemeClr val="bg2">
+                              <a:lumMod val="90000"/>
+                            </a:schemeClr>
+                          </a:solidFill>
+                          <a:latin typeface="Cambria Math" panose="02040503050406030204" pitchFamily="18" charset="0"/>
+                        </a:rPr>
+                        <m:t>]</m:t>
+                      </m:r>
+                    </m:oMath>
+                  </m:oMathPara>
+                </a14:m>
+                <a:endParaRPr lang="en-US" dirty="0">
+                  <a:solidFill>
+                    <a:schemeClr val="bg2">
+                      <a:lumMod val="90000"/>
+                    </a:schemeClr>
+                  </a:solidFill>
+                </a:endParaRPr>
+              </a:p>
+            </p:txBody>
+          </p:sp>
+        </mc:Choice>
+        <mc:Fallback>
+          <p:sp>
+            <p:nvSpPr>
+              <p:cNvPr id="33" name="TextBox 32">
+                <a:extLst>
+                  <a:ext uri="{FF2B5EF4-FFF2-40B4-BE49-F238E27FC236}">
+                    <a16:creationId xmlns:a16="http://schemas.microsoft.com/office/drawing/2014/main" id="{B18B920F-29FF-89B2-EF04-499413DB6A53}"/>
+                  </a:ext>
+                </a:extLst>
+              </p:cNvPr>
+              <p:cNvSpPr txBox="1">
+                <a:spLocks noRot="1" noChangeAspect="1" noMove="1" noResize="1" noEditPoints="1" noAdjustHandles="1" noChangeArrowheads="1" noChangeShapeType="1" noTextEdit="1"/>
+              </p:cNvSpPr>
+              <p:nvPr/>
+            </p:nvSpPr>
+            <p:spPr>
+              <a:xfrm>
+                <a:off x="2935765" y="2411900"/>
+                <a:ext cx="1265614" cy="369332"/>
+              </a:xfrm>
+              <a:prstGeom prst="rect">
+                <a:avLst/>
+              </a:prstGeom>
+              <a:blipFill>
+                <a:blip r:embed="rId8"/>
+                <a:stretch>
+                  <a:fillRect b="-16667"/>
+                </a:stretch>
+              </a:blipFill>
+            </p:spPr>
+            <p:txBody>
+              <a:bodyPr/>
+              <a:lstStyle/>
+              <a:p>
+                <a:r>
+                  <a:rPr lang="en-US">
+                    <a:noFill/>
+                  </a:rPr>
+                  <a:t> </a:t>
+                </a:r>
+              </a:p>
+            </p:txBody>
+          </p:sp>
+        </mc:Fallback>
+      </mc:AlternateContent>
+      <mc:AlternateContent xmlns:mc="http://schemas.openxmlformats.org/markup-compatibility/2006">
+        <mc:Choice xmlns:a14="http://schemas.microsoft.com/office/drawing/2010/main" Requires="a14">
+          <p:sp>
+            <p:nvSpPr>
+              <p:cNvPr id="34" name="TextBox 33">
+                <a:extLst>
+                  <a:ext uri="{FF2B5EF4-FFF2-40B4-BE49-F238E27FC236}">
+                    <a16:creationId xmlns:a16="http://schemas.microsoft.com/office/drawing/2014/main" id="{A3DF14BC-A17D-196E-8B8D-93599C0F4F9D}"/>
+                  </a:ext>
+                </a:extLst>
+              </p:cNvPr>
+              <p:cNvSpPr txBox="1"/>
+              <p:nvPr/>
+            </p:nvSpPr>
+            <p:spPr>
+              <a:xfrm>
+                <a:off x="1191417" y="2411900"/>
+                <a:ext cx="1440439" cy="382477"/>
+              </a:xfrm>
+              <a:prstGeom prst="rect">
+                <a:avLst/>
+              </a:prstGeom>
+              <a:noFill/>
+            </p:spPr>
+            <p:txBody>
+              <a:bodyPr wrap="square" rtlCol="0">
+                <a:spAutoFit/>
+              </a:bodyPr>
+              <a:lstStyle/>
+              <a:p>
+                <a14:m>
+                  <m:oMathPara xmlns:m="http://schemas.openxmlformats.org/officeDocument/2006/math">
+                    <m:oMathParaPr>
+                      <m:jc m:val="centerGroup"/>
+                    </m:oMathParaPr>
+                    <m:oMath xmlns:m="http://schemas.openxmlformats.org/officeDocument/2006/math">
+                      <m:r>
+                        <a:rPr lang="en-US" i="1" smtClean="0">
+                          <a:solidFill>
+                            <a:schemeClr val="bg2">
+                              <a:lumMod val="90000"/>
+                            </a:schemeClr>
+                          </a:solidFill>
+                          <a:latin typeface="Cambria Math" panose="02040503050406030204" pitchFamily="18" charset="0"/>
+                        </a:rPr>
+                        <m:t>3</m:t>
+                      </m:r>
+                      <m:r>
+                        <a:rPr lang="en-US" b="0" i="1" smtClean="0">
+                          <a:solidFill>
+                            <a:schemeClr val="bg2">
+                              <a:lumMod val="90000"/>
+                            </a:schemeClr>
+                          </a:solidFill>
+                          <a:latin typeface="Cambria Math" panose="02040503050406030204" pitchFamily="18" charset="0"/>
+                        </a:rPr>
+                        <m:t>) </m:t>
+                      </m:r>
+                      <m:acc>
+                        <m:accPr>
+                          <m:chr m:val="̇"/>
+                          <m:ctrlPr>
+                            <a:rPr lang="en-US" b="0" i="1" smtClean="0">
+                              <a:solidFill>
+                                <a:schemeClr val="bg2">
+                                  <a:lumMod val="90000"/>
+                                </a:schemeClr>
+                              </a:solidFill>
+                              <a:latin typeface="Cambria Math" panose="02040503050406030204" pitchFamily="18" charset="0"/>
+                            </a:rPr>
+                          </m:ctrlPr>
+                        </m:accPr>
+                        <m:e>
+                          <m:r>
+                            <a:rPr lang="el-GR" b="0" i="1" smtClean="0">
+                              <a:solidFill>
+                                <a:schemeClr val="bg2">
+                                  <a:lumMod val="90000"/>
+                                </a:schemeClr>
+                              </a:solidFill>
+                              <a:latin typeface="Cambria Math" panose="02040503050406030204" pitchFamily="18" charset="0"/>
+                            </a:rPr>
+                            <m:t>𝜃</m:t>
+                          </m:r>
+                        </m:e>
+                      </m:acc>
+                      <m:r>
+                        <a:rPr lang="el-GR" b="0" i="1" smtClean="0">
+                          <a:solidFill>
+                            <a:schemeClr val="bg2">
+                              <a:lumMod val="90000"/>
+                            </a:schemeClr>
+                          </a:solidFill>
+                          <a:latin typeface="Cambria Math" panose="02040503050406030204" pitchFamily="18" charset="0"/>
+                        </a:rPr>
+                        <m:t> [</m:t>
+                      </m:r>
+                      <m:r>
+                        <a:rPr lang="en-US" b="0" i="1" smtClean="0">
+                          <a:solidFill>
+                            <a:schemeClr val="bg2">
+                              <a:lumMod val="90000"/>
+                            </a:schemeClr>
+                          </a:solidFill>
+                          <a:latin typeface="Cambria Math" panose="02040503050406030204" pitchFamily="18" charset="0"/>
+                        </a:rPr>
+                        <m:t>𝑑𝑒𝑔</m:t>
+                      </m:r>
+                      <m:r>
+                        <a:rPr lang="en-US" b="0" i="1" smtClean="0">
+                          <a:solidFill>
+                            <a:schemeClr val="bg2">
+                              <a:lumMod val="90000"/>
+                            </a:schemeClr>
+                          </a:solidFill>
+                          <a:latin typeface="Cambria Math" panose="02040503050406030204" pitchFamily="18" charset="0"/>
+                        </a:rPr>
+                        <m:t>/</m:t>
+                      </m:r>
+                      <m:r>
+                        <a:rPr lang="en-US" b="0" i="1" smtClean="0">
+                          <a:solidFill>
+                            <a:schemeClr val="bg2">
+                              <a:lumMod val="90000"/>
+                            </a:schemeClr>
+                          </a:solidFill>
+                          <a:latin typeface="Cambria Math" panose="02040503050406030204" pitchFamily="18" charset="0"/>
+                        </a:rPr>
+                        <m:t>𝑠</m:t>
+                      </m:r>
+                      <m:r>
+                        <a:rPr lang="en-US" b="0" i="1" smtClean="0">
+                          <a:solidFill>
+                            <a:schemeClr val="bg2">
+                              <a:lumMod val="90000"/>
+                            </a:schemeClr>
+                          </a:solidFill>
+                          <a:latin typeface="Cambria Math" panose="02040503050406030204" pitchFamily="18" charset="0"/>
+                        </a:rPr>
+                        <m:t>]</m:t>
+                      </m:r>
+                    </m:oMath>
+                  </m:oMathPara>
+                </a14:m>
+                <a:endParaRPr lang="en-US" dirty="0">
+                  <a:solidFill>
+                    <a:schemeClr val="bg2">
+                      <a:lumMod val="90000"/>
+                    </a:schemeClr>
+                  </a:solidFill>
+                </a:endParaRPr>
+              </a:p>
+            </p:txBody>
+          </p:sp>
+        </mc:Choice>
+        <mc:Fallback>
+          <p:sp>
+            <p:nvSpPr>
+              <p:cNvPr id="34" name="TextBox 33">
+                <a:extLst>
+                  <a:ext uri="{FF2B5EF4-FFF2-40B4-BE49-F238E27FC236}">
+                    <a16:creationId xmlns:a16="http://schemas.microsoft.com/office/drawing/2014/main" id="{A3DF14BC-A17D-196E-8B8D-93599C0F4F9D}"/>
+                  </a:ext>
+                </a:extLst>
+              </p:cNvPr>
+              <p:cNvSpPr txBox="1">
+                <a:spLocks noRot="1" noChangeAspect="1" noMove="1" noResize="1" noEditPoints="1" noAdjustHandles="1" noChangeArrowheads="1" noChangeShapeType="1" noTextEdit="1"/>
+              </p:cNvSpPr>
+              <p:nvPr/>
+            </p:nvSpPr>
+            <p:spPr>
+              <a:xfrm>
+                <a:off x="1191417" y="2411900"/>
+                <a:ext cx="1440439" cy="382477"/>
+              </a:xfrm>
+              <a:prstGeom prst="rect">
+                <a:avLst/>
+              </a:prstGeom>
+              <a:blipFill>
+                <a:blip r:embed="rId9"/>
+                <a:stretch>
+                  <a:fillRect r="-422" b="-17742"/>
+                </a:stretch>
+              </a:blipFill>
+            </p:spPr>
+            <p:txBody>
+              <a:bodyPr/>
+              <a:lstStyle/>
+              <a:p>
+                <a:r>
+                  <a:rPr lang="en-US">
+                    <a:noFill/>
+                  </a:rPr>
+                  <a:t> </a:t>
+                </a:r>
+              </a:p>
+            </p:txBody>
+          </p:sp>
+        </mc:Fallback>
+      </mc:AlternateContent>
+      <p:pic>
+        <p:nvPicPr>
+          <p:cNvPr id="37" name="Picture 36">
+            <a:extLst>
+              <a:ext uri="{FF2B5EF4-FFF2-40B4-BE49-F238E27FC236}">
+                <a16:creationId xmlns:a16="http://schemas.microsoft.com/office/drawing/2014/main" id="{8492A82B-A1E7-39CE-D478-F418C9FC7A3D}"/>
+              </a:ext>
+            </a:extLst>
+          </p:cNvPr>
+          <p:cNvPicPr>
+            <a:picLocks noChangeAspect="1"/>
+          </p:cNvPicPr>
+          <p:nvPr/>
+        </p:nvPicPr>
+        <p:blipFill>
+          <a:blip r:embed="rId10"/>
+          <a:stretch>
+            <a:fillRect/>
+          </a:stretch>
+        </p:blipFill>
+        <p:spPr>
+          <a:xfrm>
+            <a:off x="3021510" y="2794378"/>
+            <a:ext cx="1419407" cy="685781"/>
+          </a:xfrm>
+          <a:prstGeom prst="rect">
+            <a:avLst/>
+          </a:prstGeom>
+        </p:spPr>
+      </p:pic>
+      <p:pic>
+        <p:nvPicPr>
+          <p:cNvPr id="39" name="Picture 38">
+            <a:extLst>
+              <a:ext uri="{FF2B5EF4-FFF2-40B4-BE49-F238E27FC236}">
+                <a16:creationId xmlns:a16="http://schemas.microsoft.com/office/drawing/2014/main" id="{C881202B-49C5-9B74-D8D3-6891CC820EC8}"/>
+              </a:ext>
+            </a:extLst>
+          </p:cNvPr>
+          <p:cNvPicPr>
+            <a:picLocks noChangeAspect="1"/>
+          </p:cNvPicPr>
+          <p:nvPr/>
+        </p:nvPicPr>
+        <p:blipFill>
+          <a:blip r:embed="rId11"/>
+          <a:stretch>
+            <a:fillRect/>
+          </a:stretch>
+        </p:blipFill>
+        <p:spPr>
+          <a:xfrm>
+            <a:off x="7692176" y="2785556"/>
+            <a:ext cx="1419406" cy="694603"/>
+          </a:xfrm>
+          <a:prstGeom prst="rect">
+            <a:avLst/>
+          </a:prstGeom>
+        </p:spPr>
+      </p:pic>
+    </p:spTree>
+    <p:extLst>
+      <p:ext uri="{BB962C8B-B14F-4D97-AF65-F5344CB8AC3E}">
+        <p14:creationId xmlns:p14="http://schemas.microsoft.com/office/powerpoint/2010/main" val="2520950145"/>
+      </p:ext>
+    </p:extLst>
+  </p:cSld>
+  <p:clrMapOvr>
+    <a:masterClrMapping/>
+  </p:clrMapOvr>
+</p:sld>
+</file>
+
+<file path=ppt/slides/slide19.xml><?xml version="1.0" encoding="utf-8"?>
+<p:sld xmlns:a="http://schemas.openxmlformats.org/drawingml/2006/main" xmlns:r="http://schemas.openxmlformats.org/officeDocument/2006/relationships" xmlns:p="http://schemas.openxmlformats.org/presentationml/2006/main">
+  <p:cSld>
+    <p:spTree>
+      <p:nvGrpSpPr>
+        <p:cNvPr id="1" name=""/>
+        <p:cNvGrpSpPr/>
+        <p:nvPr/>
+      </p:nvGrpSpPr>
+      <p:grpSpPr>
+        <a:xfrm>
+          <a:off x="0" y="0"/>
+          <a:ext cx="0" cy="0"/>
+          <a:chOff x="0" y="0"/>
+          <a:chExt cx="0" cy="0"/>
+        </a:xfrm>
+      </p:grpSpPr>
+      <p:pic>
+        <p:nvPicPr>
+          <p:cNvPr id="19" name="Picture 18">
+            <a:extLst>
+              <a:ext uri="{FF2B5EF4-FFF2-40B4-BE49-F238E27FC236}">
+                <a16:creationId xmlns:a16="http://schemas.microsoft.com/office/drawing/2014/main" id="{F4955C07-A309-E3A7-62D5-72367EDCDCB6}"/>
+              </a:ext>
+            </a:extLst>
+          </p:cNvPr>
+          <p:cNvPicPr>
+            <a:picLocks noChangeAspect="1"/>
+          </p:cNvPicPr>
+          <p:nvPr/>
+        </p:nvPicPr>
+        <p:blipFill>
+          <a:blip r:embed="rId2"/>
+          <a:stretch>
+            <a:fillRect/>
+          </a:stretch>
+        </p:blipFill>
+        <p:spPr>
+          <a:xfrm>
+            <a:off x="35961" y="61913"/>
+            <a:ext cx="5817721" cy="4253494"/>
+          </a:xfrm>
+          <a:prstGeom prst="rect">
+            <a:avLst/>
+          </a:prstGeom>
+        </p:spPr>
+      </p:pic>
+      <p:sp>
+        <p:nvSpPr>
+          <p:cNvPr id="6" name="TextBox 5">
+            <a:extLst>
+              <a:ext uri="{FF2B5EF4-FFF2-40B4-BE49-F238E27FC236}">
+                <a16:creationId xmlns:a16="http://schemas.microsoft.com/office/drawing/2014/main" id="{1EB4F576-007D-272B-9854-3FD8E1B8D2EB}"/>
+              </a:ext>
+            </a:extLst>
+          </p:cNvPr>
+          <p:cNvSpPr txBox="1"/>
+          <p:nvPr/>
+        </p:nvSpPr>
+        <p:spPr>
+          <a:xfrm>
+            <a:off x="4588069" y="500147"/>
+            <a:ext cx="1265614" cy="923330"/>
+          </a:xfrm>
+          <a:prstGeom prst="rect">
+            <a:avLst/>
+          </a:prstGeom>
+          <a:noFill/>
+        </p:spPr>
+        <p:txBody>
+          <a:bodyPr wrap="square" rtlCol="0">
+            <a:spAutoFit/>
+          </a:bodyPr>
+          <a:lstStyle/>
+          <a:p>
+            <a:r>
+              <a:rPr lang="en-US" dirty="0"/>
+              <a:t>Roll subsidence mode</a:t>
+            </a:r>
+          </a:p>
+        </p:txBody>
+      </p:sp>
+      <mc:AlternateContent xmlns:mc="http://schemas.openxmlformats.org/markup-compatibility/2006">
+        <mc:Choice xmlns:a14="http://schemas.microsoft.com/office/drawing/2010/main" Requires="a14">
+          <p:sp>
+            <p:nvSpPr>
+              <p:cNvPr id="11" name="TextBox 10">
+                <a:extLst>
+                  <a:ext uri="{FF2B5EF4-FFF2-40B4-BE49-F238E27FC236}">
+                    <a16:creationId xmlns:a16="http://schemas.microsoft.com/office/drawing/2014/main" id="{AD6F0A6E-97B8-4E7D-4D7F-900BDDB4911F}"/>
+                  </a:ext>
+                </a:extLst>
+              </p:cNvPr>
+              <p:cNvSpPr txBox="1"/>
+              <p:nvPr/>
+            </p:nvSpPr>
+            <p:spPr>
+              <a:xfrm>
+                <a:off x="0" y="2089860"/>
+                <a:ext cx="2407920" cy="369332"/>
+              </a:xfrm>
+              <a:prstGeom prst="rect">
+                <a:avLst/>
+              </a:prstGeom>
+              <a:noFill/>
+            </p:spPr>
+            <p:txBody>
+              <a:bodyPr wrap="square" rtlCol="0">
+                <a:spAutoFit/>
+              </a:bodyPr>
+              <a:lstStyle/>
+              <a:p>
+                <a14:m>
+                  <m:oMathPara xmlns:m="http://schemas.openxmlformats.org/officeDocument/2006/math">
+                    <m:oMathParaPr>
+                      <m:jc m:val="centerGroup"/>
+                    </m:oMathParaPr>
+                    <m:oMath xmlns:m="http://schemas.openxmlformats.org/officeDocument/2006/math">
+                      <m:sSub>
+                        <m:sSubPr>
+                          <m:ctrlPr>
+                            <a:rPr lang="en-US" b="0" i="1" smtClean="0">
+                              <a:solidFill>
+                                <a:schemeClr val="bg1"/>
+                              </a:solidFill>
+                              <a:latin typeface="Cambria Math" panose="02040503050406030204" pitchFamily="18" charset="0"/>
+                            </a:rPr>
+                          </m:ctrlPr>
+                        </m:sSubPr>
+                        <m:e>
+                          <m:r>
+                            <a:rPr lang="en-US" b="0" i="1" smtClean="0">
+                              <a:solidFill>
+                                <a:schemeClr val="bg1"/>
+                              </a:solidFill>
+                              <a:latin typeface="Cambria Math" panose="02040503050406030204" pitchFamily="18" charset="0"/>
+                            </a:rPr>
+                            <m:t>𝑡</m:t>
+                          </m:r>
+                        </m:e>
+                        <m:sub>
+                          <m:r>
+                            <a:rPr lang="en-US" b="0" i="1" smtClean="0">
+                              <a:solidFill>
+                                <a:schemeClr val="bg1"/>
+                              </a:solidFill>
+                              <a:latin typeface="Cambria Math" panose="02040503050406030204" pitchFamily="18" charset="0"/>
+                            </a:rPr>
+                            <m:t>𝑠</m:t>
+                          </m:r>
+                        </m:sub>
+                      </m:sSub>
+                      <m:r>
+                        <a:rPr lang="en-US" b="0" i="1" smtClean="0">
+                          <a:solidFill>
+                            <a:schemeClr val="bg1"/>
+                          </a:solidFill>
+                          <a:latin typeface="Cambria Math" panose="02040503050406030204" pitchFamily="18" charset="0"/>
+                        </a:rPr>
+                        <m:t>~ 0.028 [</m:t>
+                      </m:r>
+                      <m:r>
+                        <a:rPr lang="en-US" b="0" i="1" smtClean="0">
+                          <a:solidFill>
+                            <a:schemeClr val="bg1"/>
+                          </a:solidFill>
+                          <a:latin typeface="Cambria Math" panose="02040503050406030204" pitchFamily="18" charset="0"/>
+                        </a:rPr>
+                        <m:t>𝑠𝑒𝑐</m:t>
+                      </m:r>
+                      <m:r>
+                        <a:rPr lang="en-US" b="0" i="1" smtClean="0">
+                          <a:solidFill>
+                            <a:schemeClr val="bg1"/>
+                          </a:solidFill>
+                          <a:latin typeface="Cambria Math" panose="02040503050406030204" pitchFamily="18" charset="0"/>
+                        </a:rPr>
+                        <m:t>] </m:t>
+                      </m:r>
+                    </m:oMath>
+                  </m:oMathPara>
+                </a14:m>
+                <a:endParaRPr lang="en-US" dirty="0">
+                  <a:solidFill>
+                    <a:schemeClr val="bg2">
+                      <a:lumMod val="90000"/>
+                    </a:schemeClr>
+                  </a:solidFill>
+                </a:endParaRPr>
+              </a:p>
+            </p:txBody>
+          </p:sp>
+        </mc:Choice>
+        <mc:Fallback>
+          <p:sp>
+            <p:nvSpPr>
+              <p:cNvPr id="11" name="TextBox 10">
+                <a:extLst>
+                  <a:ext uri="{FF2B5EF4-FFF2-40B4-BE49-F238E27FC236}">
+                    <a16:creationId xmlns:a16="http://schemas.microsoft.com/office/drawing/2014/main" id="{AD6F0A6E-97B8-4E7D-4D7F-900BDDB4911F}"/>
+                  </a:ext>
+                </a:extLst>
+              </p:cNvPr>
+              <p:cNvSpPr txBox="1">
+                <a:spLocks noRot="1" noChangeAspect="1" noMove="1" noResize="1" noEditPoints="1" noAdjustHandles="1" noChangeArrowheads="1" noChangeShapeType="1" noTextEdit="1"/>
+              </p:cNvSpPr>
+              <p:nvPr/>
+            </p:nvSpPr>
+            <p:spPr>
+              <a:xfrm>
+                <a:off x="0" y="2089860"/>
+                <a:ext cx="2407920" cy="369332"/>
+              </a:xfrm>
+              <a:prstGeom prst="rect">
+                <a:avLst/>
+              </a:prstGeom>
+              <a:blipFill>
+                <a:blip r:embed="rId3"/>
+                <a:stretch>
+                  <a:fillRect b="-16667"/>
+                </a:stretch>
+              </a:blipFill>
+            </p:spPr>
+            <p:txBody>
+              <a:bodyPr/>
+              <a:lstStyle/>
+              <a:p>
+                <a:r>
+                  <a:rPr lang="en-US">
+                    <a:noFill/>
+                  </a:rPr>
+                  <a:t> </a:t>
+                </a:r>
+              </a:p>
+            </p:txBody>
+          </p:sp>
+        </mc:Fallback>
+      </mc:AlternateContent>
+      <p:cxnSp>
+        <p:nvCxnSpPr>
+          <p:cNvPr id="12" name="Straight Arrow Connector 11">
+            <a:extLst>
+              <a:ext uri="{FF2B5EF4-FFF2-40B4-BE49-F238E27FC236}">
+                <a16:creationId xmlns:a16="http://schemas.microsoft.com/office/drawing/2014/main" id="{563F69B6-133D-7024-D368-ABE71309D5DB}"/>
+              </a:ext>
+            </a:extLst>
+          </p:cNvPr>
+          <p:cNvCxnSpPr>
+            <a:cxnSpLocks/>
+          </p:cNvCxnSpPr>
+          <p:nvPr/>
+        </p:nvCxnSpPr>
+        <p:spPr>
+          <a:xfrm flipV="1">
+            <a:off x="361399" y="2013440"/>
+            <a:ext cx="1685123" cy="7602"/>
+          </a:xfrm>
+          <a:prstGeom prst="straightConnector1">
+            <a:avLst/>
+          </a:prstGeom>
+          <a:ln w="19050">
+            <a:solidFill>
+              <a:schemeClr val="bg1"/>
+            </a:solidFill>
+            <a:headEnd type="triangle" w="med" len="med"/>
+            <a:tailEnd type="triangle" w="med" len="med"/>
+          </a:ln>
+        </p:spPr>
+        <p:style>
+          <a:lnRef idx="1">
+            <a:schemeClr val="accent1"/>
+          </a:lnRef>
+          <a:fillRef idx="0">
+            <a:schemeClr val="accent1"/>
+          </a:fillRef>
+          <a:effectRef idx="0">
+            <a:schemeClr val="accent1"/>
+          </a:effectRef>
+          <a:fontRef idx="minor">
+            <a:schemeClr val="tx1"/>
+          </a:fontRef>
+        </p:style>
+      </p:cxnSp>
+      <p:cxnSp>
+        <p:nvCxnSpPr>
+          <p:cNvPr id="13" name="Straight Connector 12">
+            <a:extLst>
+              <a:ext uri="{FF2B5EF4-FFF2-40B4-BE49-F238E27FC236}">
+                <a16:creationId xmlns:a16="http://schemas.microsoft.com/office/drawing/2014/main" id="{AE1BD68C-6C3C-182A-C24F-0A89D4A08DB1}"/>
+              </a:ext>
+            </a:extLst>
+          </p:cNvPr>
+          <p:cNvCxnSpPr>
+            <a:cxnSpLocks/>
+          </p:cNvCxnSpPr>
+          <p:nvPr/>
+        </p:nvCxnSpPr>
+        <p:spPr>
+          <a:xfrm>
+            <a:off x="2046522" y="1799011"/>
+            <a:ext cx="0" cy="264739"/>
+          </a:xfrm>
+          <a:prstGeom prst="line">
+            <a:avLst/>
+          </a:prstGeom>
+          <a:ln w="19050">
+            <a:solidFill>
+              <a:schemeClr val="bg1"/>
+            </a:solidFill>
+            <a:prstDash val="dash"/>
+          </a:ln>
+        </p:spPr>
+        <p:style>
+          <a:lnRef idx="1">
+            <a:schemeClr val="accent1"/>
+          </a:lnRef>
+          <a:fillRef idx="0">
+            <a:schemeClr val="accent1"/>
+          </a:fillRef>
+          <a:effectRef idx="0">
+            <a:schemeClr val="accent1"/>
+          </a:effectRef>
+          <a:fontRef idx="minor">
+            <a:schemeClr val="tx1"/>
+          </a:fontRef>
+        </p:style>
+      </p:cxnSp>
+      <p:cxnSp>
+        <p:nvCxnSpPr>
+          <p:cNvPr id="14" name="Straight Connector 13">
+            <a:extLst>
+              <a:ext uri="{FF2B5EF4-FFF2-40B4-BE49-F238E27FC236}">
+                <a16:creationId xmlns:a16="http://schemas.microsoft.com/office/drawing/2014/main" id="{281514FE-8902-0731-AF64-8224DE0A095F}"/>
+              </a:ext>
+            </a:extLst>
+          </p:cNvPr>
+          <p:cNvCxnSpPr>
+            <a:cxnSpLocks/>
+          </p:cNvCxnSpPr>
+          <p:nvPr/>
+        </p:nvCxnSpPr>
+        <p:spPr>
+          <a:xfrm>
+            <a:off x="354615" y="1937021"/>
+            <a:ext cx="0" cy="152839"/>
+          </a:xfrm>
+          <a:prstGeom prst="line">
+            <a:avLst/>
+          </a:prstGeom>
+          <a:ln w="19050">
+            <a:solidFill>
+              <a:schemeClr val="bg1"/>
+            </a:solidFill>
+            <a:prstDash val="dash"/>
+          </a:ln>
+        </p:spPr>
+        <p:style>
+          <a:lnRef idx="1">
+            <a:schemeClr val="accent1"/>
+          </a:lnRef>
+          <a:fillRef idx="0">
+            <a:schemeClr val="accent1"/>
+          </a:fillRef>
+          <a:effectRef idx="0">
+            <a:schemeClr val="accent1"/>
+          </a:effectRef>
+          <a:fontRef idx="minor">
+            <a:schemeClr val="tx1"/>
+          </a:fontRef>
+        </p:style>
+      </p:cxnSp>
+      <p:pic>
+        <p:nvPicPr>
+          <p:cNvPr id="21" name="Picture 20">
+            <a:extLst>
+              <a:ext uri="{FF2B5EF4-FFF2-40B4-BE49-F238E27FC236}">
+                <a16:creationId xmlns:a16="http://schemas.microsoft.com/office/drawing/2014/main" id="{A537194F-6804-425E-7B30-9B2B731B9FBE}"/>
+              </a:ext>
+            </a:extLst>
+          </p:cNvPr>
+          <p:cNvPicPr>
+            <a:picLocks noChangeAspect="1"/>
+          </p:cNvPicPr>
+          <p:nvPr/>
+        </p:nvPicPr>
+        <p:blipFill>
+          <a:blip r:embed="rId4"/>
+          <a:stretch>
+            <a:fillRect/>
+          </a:stretch>
+        </p:blipFill>
+        <p:spPr>
+          <a:xfrm>
+            <a:off x="5853682" y="80962"/>
+            <a:ext cx="6153993" cy="4253495"/>
+          </a:xfrm>
+          <a:prstGeom prst="rect">
+            <a:avLst/>
+          </a:prstGeom>
+        </p:spPr>
+      </p:pic>
+      <mc:AlternateContent xmlns:mc="http://schemas.openxmlformats.org/markup-compatibility/2006">
+        <mc:Choice xmlns:a14="http://schemas.microsoft.com/office/drawing/2010/main" Requires="a14">
+          <p:sp>
+            <p:nvSpPr>
+              <p:cNvPr id="22" name="TextBox 21">
+                <a:extLst>
+                  <a:ext uri="{FF2B5EF4-FFF2-40B4-BE49-F238E27FC236}">
+                    <a16:creationId xmlns:a16="http://schemas.microsoft.com/office/drawing/2014/main" id="{10D608FC-5859-E96D-D999-A02D39D114FA}"/>
+                  </a:ext>
+                </a:extLst>
+              </p:cNvPr>
+              <p:cNvSpPr txBox="1"/>
+              <p:nvPr/>
+            </p:nvSpPr>
+            <p:spPr>
+              <a:xfrm>
+                <a:off x="6096000" y="2119623"/>
+                <a:ext cx="2407920" cy="369332"/>
+              </a:xfrm>
+              <a:prstGeom prst="rect">
+                <a:avLst/>
+              </a:prstGeom>
+              <a:noFill/>
+            </p:spPr>
+            <p:txBody>
+              <a:bodyPr wrap="square" rtlCol="0">
+                <a:spAutoFit/>
+              </a:bodyPr>
+              <a:lstStyle/>
+              <a:p>
+                <a14:m>
+                  <m:oMathPara xmlns:m="http://schemas.openxmlformats.org/officeDocument/2006/math">
+                    <m:oMathParaPr>
+                      <m:jc m:val="centerGroup"/>
+                    </m:oMathParaPr>
+                    <m:oMath xmlns:m="http://schemas.openxmlformats.org/officeDocument/2006/math">
+                      <m:sSub>
+                        <m:sSubPr>
+                          <m:ctrlPr>
+                            <a:rPr lang="en-US" b="0" i="1" smtClean="0">
+                              <a:solidFill>
+                                <a:schemeClr val="bg1"/>
+                              </a:solidFill>
+                              <a:latin typeface="Cambria Math" panose="02040503050406030204" pitchFamily="18" charset="0"/>
+                            </a:rPr>
+                          </m:ctrlPr>
+                        </m:sSubPr>
+                        <m:e>
+                          <m:r>
+                            <a:rPr lang="en-US" b="0" i="1" smtClean="0">
+                              <a:solidFill>
+                                <a:schemeClr val="bg1"/>
+                              </a:solidFill>
+                              <a:latin typeface="Cambria Math" panose="02040503050406030204" pitchFamily="18" charset="0"/>
+                            </a:rPr>
+                            <m:t>𝑡</m:t>
+                          </m:r>
+                        </m:e>
+                        <m:sub>
+                          <m:r>
+                            <a:rPr lang="en-US" b="0" i="1" smtClean="0">
+                              <a:solidFill>
+                                <a:schemeClr val="bg1"/>
+                              </a:solidFill>
+                              <a:latin typeface="Cambria Math" panose="02040503050406030204" pitchFamily="18" charset="0"/>
+                            </a:rPr>
+                            <m:t>𝑠</m:t>
+                          </m:r>
+                        </m:sub>
+                      </m:sSub>
+                      <m:r>
+                        <a:rPr lang="en-US" b="0" i="1" smtClean="0">
+                          <a:solidFill>
+                            <a:schemeClr val="bg1"/>
+                          </a:solidFill>
+                          <a:latin typeface="Cambria Math" panose="02040503050406030204" pitchFamily="18" charset="0"/>
+                        </a:rPr>
+                        <m:t>~ 0.85 [</m:t>
+                      </m:r>
+                      <m:r>
+                        <a:rPr lang="en-US" b="0" i="1" smtClean="0">
+                          <a:solidFill>
+                            <a:schemeClr val="bg1"/>
+                          </a:solidFill>
+                          <a:latin typeface="Cambria Math" panose="02040503050406030204" pitchFamily="18" charset="0"/>
+                        </a:rPr>
+                        <m:t>𝑠𝑒𝑐</m:t>
+                      </m:r>
+                      <m:r>
+                        <a:rPr lang="en-US" b="0" i="1" smtClean="0">
+                          <a:solidFill>
+                            <a:schemeClr val="bg1"/>
+                          </a:solidFill>
+                          <a:latin typeface="Cambria Math" panose="02040503050406030204" pitchFamily="18" charset="0"/>
+                        </a:rPr>
+                        <m:t>] </m:t>
+                      </m:r>
+                    </m:oMath>
+                  </m:oMathPara>
+                </a14:m>
+                <a:endParaRPr lang="en-US" dirty="0">
+                  <a:solidFill>
+                    <a:schemeClr val="bg2">
+                      <a:lumMod val="90000"/>
+                    </a:schemeClr>
+                  </a:solidFill>
+                </a:endParaRPr>
+              </a:p>
+            </p:txBody>
+          </p:sp>
+        </mc:Choice>
+        <mc:Fallback>
+          <p:sp>
+            <p:nvSpPr>
+              <p:cNvPr id="22" name="TextBox 21">
+                <a:extLst>
+                  <a:ext uri="{FF2B5EF4-FFF2-40B4-BE49-F238E27FC236}">
+                    <a16:creationId xmlns:a16="http://schemas.microsoft.com/office/drawing/2014/main" id="{10D608FC-5859-E96D-D999-A02D39D114FA}"/>
+                  </a:ext>
+                </a:extLst>
+              </p:cNvPr>
+              <p:cNvSpPr txBox="1">
+                <a:spLocks noRot="1" noChangeAspect="1" noMove="1" noResize="1" noEditPoints="1" noAdjustHandles="1" noChangeArrowheads="1" noChangeShapeType="1" noTextEdit="1"/>
+              </p:cNvSpPr>
+              <p:nvPr/>
+            </p:nvSpPr>
+            <p:spPr>
+              <a:xfrm>
+                <a:off x="6096000" y="2119623"/>
+                <a:ext cx="2407920" cy="369332"/>
+              </a:xfrm>
+              <a:prstGeom prst="rect">
+                <a:avLst/>
+              </a:prstGeom>
+              <a:blipFill>
+                <a:blip r:embed="rId5"/>
+                <a:stretch>
+                  <a:fillRect b="-16667"/>
+                </a:stretch>
+              </a:blipFill>
+            </p:spPr>
+            <p:txBody>
+              <a:bodyPr/>
+              <a:lstStyle/>
+              <a:p>
+                <a:r>
+                  <a:rPr lang="en-US">
+                    <a:noFill/>
+                  </a:rPr>
+                  <a:t> </a:t>
+                </a:r>
+              </a:p>
+            </p:txBody>
+          </p:sp>
+        </mc:Fallback>
+      </mc:AlternateContent>
+      <p:cxnSp>
+        <p:nvCxnSpPr>
+          <p:cNvPr id="23" name="Straight Arrow Connector 22">
+            <a:extLst>
+              <a:ext uri="{FF2B5EF4-FFF2-40B4-BE49-F238E27FC236}">
+                <a16:creationId xmlns:a16="http://schemas.microsoft.com/office/drawing/2014/main" id="{22F67960-F2D5-AA20-4E98-B8083A24EBBE}"/>
+              </a:ext>
+            </a:extLst>
+          </p:cNvPr>
+          <p:cNvCxnSpPr>
+            <a:cxnSpLocks/>
+          </p:cNvCxnSpPr>
+          <p:nvPr/>
+        </p:nvCxnSpPr>
+        <p:spPr>
+          <a:xfrm>
+            <a:off x="6533735" y="2021042"/>
+            <a:ext cx="666486" cy="0"/>
+          </a:xfrm>
+          <a:prstGeom prst="straightConnector1">
+            <a:avLst/>
+          </a:prstGeom>
+          <a:ln w="19050">
+            <a:solidFill>
+              <a:schemeClr val="bg1"/>
+            </a:solidFill>
+            <a:headEnd type="triangle" w="med" len="med"/>
+            <a:tailEnd type="triangle" w="med" len="med"/>
+          </a:ln>
+        </p:spPr>
+        <p:style>
+          <a:lnRef idx="1">
+            <a:schemeClr val="accent1"/>
+          </a:lnRef>
+          <a:fillRef idx="0">
+            <a:schemeClr val="accent1"/>
+          </a:fillRef>
+          <a:effectRef idx="0">
+            <a:schemeClr val="accent1"/>
+          </a:effectRef>
+          <a:fontRef idx="minor">
+            <a:schemeClr val="tx1"/>
+          </a:fontRef>
+        </p:style>
+      </p:cxnSp>
+      <p:cxnSp>
+        <p:nvCxnSpPr>
+          <p:cNvPr id="24" name="Straight Connector 23">
+            <a:extLst>
+              <a:ext uri="{FF2B5EF4-FFF2-40B4-BE49-F238E27FC236}">
+                <a16:creationId xmlns:a16="http://schemas.microsoft.com/office/drawing/2014/main" id="{BB2DD4B0-1632-3981-E395-E67B8F1F98B1}"/>
+              </a:ext>
+            </a:extLst>
+          </p:cNvPr>
+          <p:cNvCxnSpPr>
+            <a:cxnSpLocks/>
+          </p:cNvCxnSpPr>
+          <p:nvPr/>
+        </p:nvCxnSpPr>
+        <p:spPr>
+          <a:xfrm>
+            <a:off x="7219959" y="1531620"/>
+            <a:ext cx="0" cy="602452"/>
+          </a:xfrm>
+          <a:prstGeom prst="line">
+            <a:avLst/>
+          </a:prstGeom>
+          <a:ln w="19050">
+            <a:solidFill>
+              <a:schemeClr val="bg1"/>
+            </a:solidFill>
+            <a:prstDash val="dash"/>
+          </a:ln>
+        </p:spPr>
+        <p:style>
+          <a:lnRef idx="1">
+            <a:schemeClr val="accent1"/>
+          </a:lnRef>
+          <a:fillRef idx="0">
+            <a:schemeClr val="accent1"/>
+          </a:fillRef>
+          <a:effectRef idx="0">
+            <a:schemeClr val="accent1"/>
+          </a:effectRef>
+          <a:fontRef idx="minor">
+            <a:schemeClr val="tx1"/>
+          </a:fontRef>
+        </p:style>
+      </p:cxnSp>
+      <p:cxnSp>
+        <p:nvCxnSpPr>
+          <p:cNvPr id="25" name="Straight Connector 24">
+            <a:extLst>
+              <a:ext uri="{FF2B5EF4-FFF2-40B4-BE49-F238E27FC236}">
+                <a16:creationId xmlns:a16="http://schemas.microsoft.com/office/drawing/2014/main" id="{E526F138-756A-6E52-4E93-53FB6A804C76}"/>
+              </a:ext>
+            </a:extLst>
+          </p:cNvPr>
+          <p:cNvCxnSpPr>
+            <a:cxnSpLocks/>
+          </p:cNvCxnSpPr>
+          <p:nvPr/>
+        </p:nvCxnSpPr>
+        <p:spPr>
+          <a:xfrm>
+            <a:off x="6526951" y="1937021"/>
+            <a:ext cx="0" cy="152839"/>
+          </a:xfrm>
+          <a:prstGeom prst="line">
+            <a:avLst/>
+          </a:prstGeom>
+          <a:ln w="19050">
+            <a:solidFill>
+              <a:schemeClr val="bg1"/>
+            </a:solidFill>
+            <a:prstDash val="dash"/>
+          </a:ln>
+        </p:spPr>
+        <p:style>
+          <a:lnRef idx="1">
+            <a:schemeClr val="accent1"/>
+          </a:lnRef>
+          <a:fillRef idx="0">
+            <a:schemeClr val="accent1"/>
+          </a:fillRef>
+          <a:effectRef idx="0">
+            <a:schemeClr val="accent1"/>
+          </a:effectRef>
+          <a:fontRef idx="minor">
+            <a:schemeClr val="tx1"/>
+          </a:fontRef>
+        </p:style>
+      </p:cxnSp>
+      <p:sp>
+        <p:nvSpPr>
+          <p:cNvPr id="28" name="TextBox 27">
+            <a:extLst>
+              <a:ext uri="{FF2B5EF4-FFF2-40B4-BE49-F238E27FC236}">
+                <a16:creationId xmlns:a16="http://schemas.microsoft.com/office/drawing/2014/main" id="{B5B6BFE0-5E2D-52BC-A174-543B4D198B43}"/>
+              </a:ext>
+            </a:extLst>
+          </p:cNvPr>
+          <p:cNvSpPr txBox="1"/>
+          <p:nvPr/>
+        </p:nvSpPr>
+        <p:spPr>
+          <a:xfrm>
+            <a:off x="10620569" y="500147"/>
+            <a:ext cx="1265614" cy="369332"/>
+          </a:xfrm>
+          <a:prstGeom prst="rect">
+            <a:avLst/>
+          </a:prstGeom>
+          <a:noFill/>
+        </p:spPr>
+        <p:txBody>
+          <a:bodyPr wrap="square" rtlCol="0">
+            <a:spAutoFit/>
+          </a:bodyPr>
+          <a:lstStyle/>
+          <a:p>
+            <a:r>
+              <a:rPr lang="en-US" dirty="0"/>
+              <a:t>Dutch roll</a:t>
+            </a:r>
+          </a:p>
+        </p:txBody>
+      </p:sp>
+      <p:pic>
+        <p:nvPicPr>
+          <p:cNvPr id="30" name="Picture 29">
+            <a:extLst>
+              <a:ext uri="{FF2B5EF4-FFF2-40B4-BE49-F238E27FC236}">
+                <a16:creationId xmlns:a16="http://schemas.microsoft.com/office/drawing/2014/main" id="{BF4BC3B3-5CE0-3F54-B090-7067B38D5AAC}"/>
+              </a:ext>
+            </a:extLst>
+          </p:cNvPr>
+          <p:cNvPicPr>
+            <a:picLocks noChangeAspect="1"/>
+          </p:cNvPicPr>
+          <p:nvPr/>
+        </p:nvPicPr>
+        <p:blipFill>
+          <a:blip r:embed="rId6"/>
+          <a:stretch>
+            <a:fillRect/>
+          </a:stretch>
+        </p:blipFill>
+        <p:spPr>
+          <a:xfrm>
+            <a:off x="11967107" y="73760"/>
+            <a:ext cx="6097423" cy="4284018"/>
+          </a:xfrm>
+          <a:prstGeom prst="rect">
+            <a:avLst/>
+          </a:prstGeom>
+        </p:spPr>
+      </p:pic>
+      <mc:AlternateContent xmlns:mc="http://schemas.openxmlformats.org/markup-compatibility/2006">
+        <mc:Choice xmlns:a14="http://schemas.microsoft.com/office/drawing/2010/main" Requires="a14">
+          <p:sp>
+            <p:nvSpPr>
+              <p:cNvPr id="31" name="TextBox 30">
+                <a:extLst>
+                  <a:ext uri="{FF2B5EF4-FFF2-40B4-BE49-F238E27FC236}">
+                    <a16:creationId xmlns:a16="http://schemas.microsoft.com/office/drawing/2014/main" id="{0CF4017B-8BC7-66CC-7918-0B4830809420}"/>
+                  </a:ext>
+                </a:extLst>
+              </p:cNvPr>
+              <p:cNvSpPr txBox="1"/>
+              <p:nvPr/>
+            </p:nvSpPr>
+            <p:spPr>
+              <a:xfrm>
+                <a:off x="12007675" y="2089860"/>
+                <a:ext cx="2407920" cy="369332"/>
+              </a:xfrm>
+              <a:prstGeom prst="rect">
+                <a:avLst/>
+              </a:prstGeom>
+              <a:noFill/>
+            </p:spPr>
+            <p:txBody>
+              <a:bodyPr wrap="square" rtlCol="0">
+                <a:spAutoFit/>
+              </a:bodyPr>
+              <a:lstStyle/>
+              <a:p>
+                <a14:m>
+                  <m:oMathPara xmlns:m="http://schemas.openxmlformats.org/officeDocument/2006/math">
+                    <m:oMathParaPr>
+                      <m:jc m:val="centerGroup"/>
+                    </m:oMathParaPr>
+                    <m:oMath xmlns:m="http://schemas.openxmlformats.org/officeDocument/2006/math">
+                      <m:sSub>
+                        <m:sSubPr>
+                          <m:ctrlPr>
+                            <a:rPr lang="en-US" b="0" i="1" smtClean="0">
+                              <a:solidFill>
+                                <a:schemeClr val="bg1"/>
+                              </a:solidFill>
+                              <a:latin typeface="Cambria Math" panose="02040503050406030204" pitchFamily="18" charset="0"/>
+                            </a:rPr>
+                          </m:ctrlPr>
+                        </m:sSubPr>
+                        <m:e>
+                          <m:r>
+                            <a:rPr lang="en-US" b="0" i="1" smtClean="0">
+                              <a:solidFill>
+                                <a:schemeClr val="bg1"/>
+                              </a:solidFill>
+                              <a:latin typeface="Cambria Math" panose="02040503050406030204" pitchFamily="18" charset="0"/>
+                            </a:rPr>
+                            <m:t>𝑡</m:t>
+                          </m:r>
+                        </m:e>
+                        <m:sub>
+                          <m:r>
+                            <a:rPr lang="en-US" b="0" i="1" smtClean="0">
+                              <a:solidFill>
+                                <a:schemeClr val="bg1"/>
+                              </a:solidFill>
+                              <a:latin typeface="Cambria Math" panose="02040503050406030204" pitchFamily="18" charset="0"/>
+                            </a:rPr>
+                            <m:t>𝑠</m:t>
+                          </m:r>
+                        </m:sub>
+                      </m:sSub>
+                      <m:r>
+                        <a:rPr lang="en-US" b="0" i="1" smtClean="0">
+                          <a:solidFill>
+                            <a:schemeClr val="bg1"/>
+                          </a:solidFill>
+                          <a:latin typeface="Cambria Math" panose="02040503050406030204" pitchFamily="18" charset="0"/>
+                        </a:rPr>
+                        <m:t>~ 550 [</m:t>
+                      </m:r>
+                      <m:r>
+                        <a:rPr lang="en-US" b="0" i="1" smtClean="0">
+                          <a:solidFill>
+                            <a:schemeClr val="bg1"/>
+                          </a:solidFill>
+                          <a:latin typeface="Cambria Math" panose="02040503050406030204" pitchFamily="18" charset="0"/>
+                        </a:rPr>
+                        <m:t>𝑠𝑒𝑐</m:t>
+                      </m:r>
+                      <m:r>
+                        <a:rPr lang="en-US" b="0" i="1" smtClean="0">
+                          <a:solidFill>
+                            <a:schemeClr val="bg1"/>
+                          </a:solidFill>
+                          <a:latin typeface="Cambria Math" panose="02040503050406030204" pitchFamily="18" charset="0"/>
+                        </a:rPr>
+                        <m:t>] </m:t>
+                      </m:r>
+                    </m:oMath>
+                  </m:oMathPara>
+                </a14:m>
+                <a:endParaRPr lang="en-US" dirty="0">
+                  <a:solidFill>
+                    <a:schemeClr val="bg2">
+                      <a:lumMod val="90000"/>
+                    </a:schemeClr>
+                  </a:solidFill>
+                </a:endParaRPr>
+              </a:p>
+            </p:txBody>
+          </p:sp>
+        </mc:Choice>
+        <mc:Fallback>
+          <p:sp>
+            <p:nvSpPr>
+              <p:cNvPr id="31" name="TextBox 30">
+                <a:extLst>
+                  <a:ext uri="{FF2B5EF4-FFF2-40B4-BE49-F238E27FC236}">
+                    <a16:creationId xmlns:a16="http://schemas.microsoft.com/office/drawing/2014/main" id="{0CF4017B-8BC7-66CC-7918-0B4830809420}"/>
+                  </a:ext>
+                </a:extLst>
+              </p:cNvPr>
+              <p:cNvSpPr txBox="1">
+                <a:spLocks noRot="1" noChangeAspect="1" noMove="1" noResize="1" noEditPoints="1" noAdjustHandles="1" noChangeArrowheads="1" noChangeShapeType="1" noTextEdit="1"/>
+              </p:cNvSpPr>
+              <p:nvPr/>
+            </p:nvSpPr>
+            <p:spPr>
+              <a:xfrm>
+                <a:off x="12007675" y="2089860"/>
+                <a:ext cx="2407920" cy="369332"/>
+              </a:xfrm>
+              <a:prstGeom prst="rect">
+                <a:avLst/>
+              </a:prstGeom>
+              <a:blipFill>
+                <a:blip r:embed="rId7"/>
+                <a:stretch>
+                  <a:fillRect b="-16667"/>
+                </a:stretch>
+              </a:blipFill>
+            </p:spPr>
+            <p:txBody>
+              <a:bodyPr/>
+              <a:lstStyle/>
+              <a:p>
+                <a:r>
+                  <a:rPr lang="en-US">
+                    <a:noFill/>
+                  </a:rPr>
+                  <a:t> </a:t>
+                </a:r>
+              </a:p>
+            </p:txBody>
+          </p:sp>
+        </mc:Fallback>
+      </mc:AlternateContent>
+      <p:cxnSp>
+        <p:nvCxnSpPr>
+          <p:cNvPr id="32" name="Straight Arrow Connector 31">
+            <a:extLst>
+              <a:ext uri="{FF2B5EF4-FFF2-40B4-BE49-F238E27FC236}">
+                <a16:creationId xmlns:a16="http://schemas.microsoft.com/office/drawing/2014/main" id="{467351F4-AE56-5935-7206-7E85E7663441}"/>
+              </a:ext>
+            </a:extLst>
+          </p:cNvPr>
+          <p:cNvCxnSpPr>
+            <a:cxnSpLocks/>
+          </p:cNvCxnSpPr>
+          <p:nvPr/>
+        </p:nvCxnSpPr>
+        <p:spPr>
+          <a:xfrm flipV="1">
+            <a:off x="12369074" y="2013440"/>
+            <a:ext cx="1685123" cy="7602"/>
+          </a:xfrm>
+          <a:prstGeom prst="straightConnector1">
+            <a:avLst/>
+          </a:prstGeom>
+          <a:ln w="19050">
+            <a:solidFill>
+              <a:schemeClr val="bg1"/>
+            </a:solidFill>
+            <a:headEnd type="triangle" w="med" len="med"/>
+            <a:tailEnd type="triangle" w="med" len="med"/>
+          </a:ln>
+        </p:spPr>
+        <p:style>
+          <a:lnRef idx="1">
+            <a:schemeClr val="accent1"/>
+          </a:lnRef>
+          <a:fillRef idx="0">
+            <a:schemeClr val="accent1"/>
+          </a:fillRef>
+          <a:effectRef idx="0">
+            <a:schemeClr val="accent1"/>
+          </a:effectRef>
+          <a:fontRef idx="minor">
+            <a:schemeClr val="tx1"/>
+          </a:fontRef>
+        </p:style>
+      </p:cxnSp>
+      <p:cxnSp>
+        <p:nvCxnSpPr>
+          <p:cNvPr id="33" name="Straight Connector 32">
+            <a:extLst>
+              <a:ext uri="{FF2B5EF4-FFF2-40B4-BE49-F238E27FC236}">
+                <a16:creationId xmlns:a16="http://schemas.microsoft.com/office/drawing/2014/main" id="{3D7022A4-F348-2AA1-968D-1FAC30FF3356}"/>
+              </a:ext>
+            </a:extLst>
+          </p:cNvPr>
+          <p:cNvCxnSpPr>
+            <a:cxnSpLocks/>
+          </p:cNvCxnSpPr>
+          <p:nvPr/>
+        </p:nvCxnSpPr>
+        <p:spPr>
+          <a:xfrm>
+            <a:off x="14054197" y="1799011"/>
+            <a:ext cx="0" cy="264739"/>
+          </a:xfrm>
+          <a:prstGeom prst="line">
+            <a:avLst/>
+          </a:prstGeom>
+          <a:ln w="19050">
+            <a:solidFill>
+              <a:schemeClr val="bg1"/>
+            </a:solidFill>
+            <a:prstDash val="dash"/>
+          </a:ln>
+        </p:spPr>
+        <p:style>
+          <a:lnRef idx="1">
+            <a:schemeClr val="accent1"/>
+          </a:lnRef>
+          <a:fillRef idx="0">
+            <a:schemeClr val="accent1"/>
+          </a:fillRef>
+          <a:effectRef idx="0">
+            <a:schemeClr val="accent1"/>
+          </a:effectRef>
+          <a:fontRef idx="minor">
+            <a:schemeClr val="tx1"/>
+          </a:fontRef>
+        </p:style>
+      </p:cxnSp>
+      <p:cxnSp>
+        <p:nvCxnSpPr>
+          <p:cNvPr id="34" name="Straight Connector 33">
+            <a:extLst>
+              <a:ext uri="{FF2B5EF4-FFF2-40B4-BE49-F238E27FC236}">
+                <a16:creationId xmlns:a16="http://schemas.microsoft.com/office/drawing/2014/main" id="{4F73FD53-88A7-4D28-03D1-43BD894A97F0}"/>
+              </a:ext>
+            </a:extLst>
+          </p:cNvPr>
+          <p:cNvCxnSpPr>
+            <a:cxnSpLocks/>
+          </p:cNvCxnSpPr>
+          <p:nvPr/>
+        </p:nvCxnSpPr>
+        <p:spPr>
+          <a:xfrm>
+            <a:off x="12362290" y="1937021"/>
+            <a:ext cx="0" cy="152839"/>
+          </a:xfrm>
+          <a:prstGeom prst="line">
+            <a:avLst/>
+          </a:prstGeom>
+          <a:ln w="19050">
+            <a:solidFill>
+              <a:schemeClr val="bg1"/>
+            </a:solidFill>
+            <a:prstDash val="dash"/>
+          </a:ln>
+        </p:spPr>
+        <p:style>
+          <a:lnRef idx="1">
+            <a:schemeClr val="accent1"/>
+          </a:lnRef>
+          <a:fillRef idx="0">
+            <a:schemeClr val="accent1"/>
+          </a:fillRef>
+          <a:effectRef idx="0">
+            <a:schemeClr val="accent1"/>
+          </a:effectRef>
+          <a:fontRef idx="minor">
+            <a:schemeClr val="tx1"/>
+          </a:fontRef>
+        </p:style>
+      </p:cxnSp>
+      <p:sp>
+        <p:nvSpPr>
+          <p:cNvPr id="35" name="TextBox 34">
+            <a:extLst>
+              <a:ext uri="{FF2B5EF4-FFF2-40B4-BE49-F238E27FC236}">
+                <a16:creationId xmlns:a16="http://schemas.microsoft.com/office/drawing/2014/main" id="{9ACEA41A-5285-EACD-DDD6-0C2B034E5A3C}"/>
+              </a:ext>
+            </a:extLst>
+          </p:cNvPr>
+          <p:cNvSpPr txBox="1"/>
+          <p:nvPr/>
+        </p:nvSpPr>
+        <p:spPr>
+          <a:xfrm>
+            <a:off x="16633331" y="500147"/>
+            <a:ext cx="1265614" cy="646331"/>
+          </a:xfrm>
+          <a:prstGeom prst="rect">
+            <a:avLst/>
+          </a:prstGeom>
+          <a:noFill/>
+        </p:spPr>
+        <p:txBody>
+          <a:bodyPr wrap="square" rtlCol="0">
+            <a:spAutoFit/>
+          </a:bodyPr>
+          <a:lstStyle/>
+          <a:p>
+            <a:r>
+              <a:rPr lang="en-US" dirty="0"/>
+              <a:t>Spiral divergence</a:t>
+            </a:r>
+          </a:p>
+        </p:txBody>
+      </p:sp>
+      <mc:AlternateContent xmlns:mc="http://schemas.openxmlformats.org/markup-compatibility/2006">
+        <mc:Choice xmlns:a14="http://schemas.microsoft.com/office/drawing/2010/main" Requires="a14">
+          <p:sp>
+            <p:nvSpPr>
+              <p:cNvPr id="39" name="TextBox 38">
+                <a:extLst>
+                  <a:ext uri="{FF2B5EF4-FFF2-40B4-BE49-F238E27FC236}">
+                    <a16:creationId xmlns:a16="http://schemas.microsoft.com/office/drawing/2014/main" id="{BB93848B-57B9-BD47-0427-215D65D26D4C}"/>
+                  </a:ext>
+                </a:extLst>
+              </p:cNvPr>
+              <p:cNvSpPr txBox="1"/>
+              <p:nvPr/>
+            </p:nvSpPr>
+            <p:spPr>
+              <a:xfrm>
+                <a:off x="571153" y="638646"/>
+                <a:ext cx="1265614" cy="369332"/>
+              </a:xfrm>
+              <a:prstGeom prst="rect">
+                <a:avLst/>
+              </a:prstGeom>
+              <a:noFill/>
+            </p:spPr>
+            <p:txBody>
+              <a:bodyPr wrap="square" rtlCol="0">
+                <a:spAutoFit/>
+              </a:bodyPr>
+              <a:lstStyle/>
+              <a:p>
+                <a14:m>
+                  <m:oMathPara xmlns:m="http://schemas.openxmlformats.org/officeDocument/2006/math">
+                    <m:oMathParaPr>
+                      <m:jc m:val="centerGroup"/>
+                    </m:oMathParaPr>
+                    <m:oMath xmlns:m="http://schemas.openxmlformats.org/officeDocument/2006/math">
+                      <m:r>
+                        <a:rPr lang="en-US" b="0" i="1" smtClean="0">
+                          <a:solidFill>
+                            <a:schemeClr val="bg1"/>
+                          </a:solidFill>
+                          <a:latin typeface="Cambria Math" panose="02040503050406030204" pitchFamily="18" charset="0"/>
+                        </a:rPr>
+                        <m:t>1) </m:t>
+                      </m:r>
+                      <m:r>
+                        <a:rPr lang="en-US" b="0" i="1" smtClean="0">
+                          <a:solidFill>
+                            <a:schemeClr val="bg1"/>
+                          </a:solidFill>
+                          <a:latin typeface="Cambria Math" panose="02040503050406030204" pitchFamily="18" charset="0"/>
+                        </a:rPr>
+                        <m:t>𝑣</m:t>
+                      </m:r>
+                      <m:d>
+                        <m:dPr>
+                          <m:begChr m:val="["/>
+                          <m:endChr m:val="]"/>
+                          <m:ctrlPr>
+                            <a:rPr lang="en-US" b="0" i="1" smtClean="0">
+                              <a:solidFill>
+                                <a:schemeClr val="bg1"/>
+                              </a:solidFill>
+                              <a:latin typeface="Cambria Math" panose="02040503050406030204" pitchFamily="18" charset="0"/>
+                            </a:rPr>
+                          </m:ctrlPr>
+                        </m:dPr>
+                        <m:e>
+                          <m:r>
+                            <a:rPr lang="en-US" b="0" i="1" smtClean="0">
+                              <a:solidFill>
+                                <a:schemeClr val="bg1"/>
+                              </a:solidFill>
+                              <a:latin typeface="Cambria Math" panose="02040503050406030204" pitchFamily="18" charset="0"/>
+                            </a:rPr>
+                            <m:t>𝑚</m:t>
+                          </m:r>
+                          <m:r>
+                            <a:rPr lang="en-US" b="0" i="1" smtClean="0">
+                              <a:solidFill>
+                                <a:schemeClr val="bg1"/>
+                              </a:solidFill>
+                              <a:latin typeface="Cambria Math" panose="02040503050406030204" pitchFamily="18" charset="0"/>
+                            </a:rPr>
+                            <m:t>\</m:t>
+                          </m:r>
+                          <m:r>
+                            <m:rPr>
+                              <m:sty m:val="p"/>
+                            </m:rPr>
+                            <a:rPr lang="en-US" b="0" i="1" smtClean="0">
+                              <a:solidFill>
+                                <a:schemeClr val="bg1"/>
+                              </a:solidFill>
+                              <a:latin typeface="Cambria Math" panose="02040503050406030204" pitchFamily="18" charset="0"/>
+                            </a:rPr>
+                            <m:t>s</m:t>
+                          </m:r>
+                        </m:e>
+                      </m:d>
+                    </m:oMath>
+                  </m:oMathPara>
+                </a14:m>
+                <a:endParaRPr lang="en-US" dirty="0">
+                  <a:solidFill>
+                    <a:schemeClr val="bg2">
+                      <a:lumMod val="90000"/>
+                    </a:schemeClr>
+                  </a:solidFill>
+                </a:endParaRPr>
+              </a:p>
+            </p:txBody>
+          </p:sp>
+        </mc:Choice>
+        <mc:Fallback>
+          <p:sp>
+            <p:nvSpPr>
+              <p:cNvPr id="39" name="TextBox 38">
+                <a:extLst>
+                  <a:ext uri="{FF2B5EF4-FFF2-40B4-BE49-F238E27FC236}">
+                    <a16:creationId xmlns:a16="http://schemas.microsoft.com/office/drawing/2014/main" id="{BB93848B-57B9-BD47-0427-215D65D26D4C}"/>
+                  </a:ext>
+                </a:extLst>
+              </p:cNvPr>
+              <p:cNvSpPr txBox="1">
+                <a:spLocks noRot="1" noChangeAspect="1" noMove="1" noResize="1" noEditPoints="1" noAdjustHandles="1" noChangeArrowheads="1" noChangeShapeType="1" noTextEdit="1"/>
+              </p:cNvSpPr>
+              <p:nvPr/>
+            </p:nvSpPr>
+            <p:spPr>
+              <a:xfrm>
+                <a:off x="571153" y="638646"/>
+                <a:ext cx="1265614" cy="369332"/>
+              </a:xfrm>
+              <a:prstGeom prst="rect">
+                <a:avLst/>
+              </a:prstGeom>
+              <a:blipFill>
+                <a:blip r:embed="rId8"/>
+                <a:stretch>
+                  <a:fillRect b="-13333"/>
+                </a:stretch>
+              </a:blipFill>
+            </p:spPr>
+            <p:txBody>
+              <a:bodyPr/>
+              <a:lstStyle/>
+              <a:p>
+                <a:r>
+                  <a:rPr lang="en-US">
+                    <a:noFill/>
+                  </a:rPr>
+                  <a:t> </a:t>
+                </a:r>
+              </a:p>
+            </p:txBody>
+          </p:sp>
+        </mc:Fallback>
+      </mc:AlternateContent>
+      <mc:AlternateContent xmlns:mc="http://schemas.openxmlformats.org/markup-compatibility/2006">
+        <mc:Choice xmlns:a14="http://schemas.microsoft.com/office/drawing/2010/main" Requires="a14">
+          <p:sp>
+            <p:nvSpPr>
+              <p:cNvPr id="40" name="TextBox 39">
+                <a:extLst>
+                  <a:ext uri="{FF2B5EF4-FFF2-40B4-BE49-F238E27FC236}">
+                    <a16:creationId xmlns:a16="http://schemas.microsoft.com/office/drawing/2014/main" id="{0421F847-7216-F4FB-7B3B-76AF9FCE6B7E}"/>
+                  </a:ext>
+                </a:extLst>
+              </p:cNvPr>
+              <p:cNvSpPr txBox="1"/>
+              <p:nvPr/>
+            </p:nvSpPr>
+            <p:spPr>
+              <a:xfrm>
+                <a:off x="2883981" y="638646"/>
+                <a:ext cx="1265614" cy="369332"/>
+              </a:xfrm>
+              <a:prstGeom prst="rect">
+                <a:avLst/>
+              </a:prstGeom>
+              <a:noFill/>
+            </p:spPr>
+            <p:txBody>
+              <a:bodyPr wrap="square" rtlCol="0">
+                <a:spAutoFit/>
+              </a:bodyPr>
+              <a:lstStyle/>
+              <a:p>
+                <a14:m>
+                  <m:oMathPara xmlns:m="http://schemas.openxmlformats.org/officeDocument/2006/math">
+                    <m:oMathParaPr>
+                      <m:jc m:val="centerGroup"/>
+                    </m:oMathParaPr>
+                    <m:oMath xmlns:m="http://schemas.openxmlformats.org/officeDocument/2006/math">
+                      <m:r>
+                        <a:rPr lang="en-US" b="0" i="1" smtClean="0">
+                          <a:solidFill>
+                            <a:schemeClr val="bg1"/>
+                          </a:solidFill>
+                          <a:latin typeface="Cambria Math" panose="02040503050406030204" pitchFamily="18" charset="0"/>
+                        </a:rPr>
+                        <m:t>2) </m:t>
+                      </m:r>
+                      <m:r>
+                        <a:rPr lang="en-US" b="0" i="1" smtClean="0">
+                          <a:solidFill>
+                            <a:schemeClr val="bg1"/>
+                          </a:solidFill>
+                          <a:latin typeface="Cambria Math" panose="02040503050406030204" pitchFamily="18" charset="0"/>
+                        </a:rPr>
+                        <m:t>𝑝</m:t>
+                      </m:r>
+                      <m:d>
+                        <m:dPr>
+                          <m:begChr m:val="["/>
+                          <m:endChr m:val="]"/>
+                          <m:ctrlPr>
+                            <a:rPr lang="en-US" b="0" i="1" smtClean="0">
+                              <a:solidFill>
+                                <a:schemeClr val="bg1"/>
+                              </a:solidFill>
+                              <a:latin typeface="Cambria Math" panose="02040503050406030204" pitchFamily="18" charset="0"/>
+                            </a:rPr>
+                          </m:ctrlPr>
+                        </m:dPr>
+                        <m:e>
+                          <m:r>
+                            <a:rPr lang="en-US" b="0" i="1" smtClean="0">
+                              <a:solidFill>
+                                <a:schemeClr val="bg1"/>
+                              </a:solidFill>
+                              <a:latin typeface="Cambria Math" panose="02040503050406030204" pitchFamily="18" charset="0"/>
+                            </a:rPr>
+                            <m:t>𝑑𝑒𝑔</m:t>
+                          </m:r>
+                          <m:r>
+                            <a:rPr lang="en-US" b="0" i="1" smtClean="0">
+                              <a:solidFill>
+                                <a:schemeClr val="bg1"/>
+                              </a:solidFill>
+                              <a:latin typeface="Cambria Math" panose="02040503050406030204" pitchFamily="18" charset="0"/>
+                            </a:rPr>
+                            <m:t>\</m:t>
+                          </m:r>
+                          <m:r>
+                            <m:rPr>
+                              <m:sty m:val="p"/>
+                            </m:rPr>
+                            <a:rPr lang="en-US" b="0" i="1" smtClean="0">
+                              <a:solidFill>
+                                <a:schemeClr val="bg1"/>
+                              </a:solidFill>
+                              <a:latin typeface="Cambria Math" panose="02040503050406030204" pitchFamily="18" charset="0"/>
+                            </a:rPr>
+                            <m:t>s</m:t>
+                          </m:r>
+                        </m:e>
+                      </m:d>
+                    </m:oMath>
+                  </m:oMathPara>
+                </a14:m>
+                <a:endParaRPr lang="en-US" dirty="0">
+                  <a:solidFill>
+                    <a:schemeClr val="bg2">
+                      <a:lumMod val="90000"/>
+                    </a:schemeClr>
+                  </a:solidFill>
+                </a:endParaRPr>
+              </a:p>
+            </p:txBody>
+          </p:sp>
+        </mc:Choice>
+        <mc:Fallback>
+          <p:sp>
+            <p:nvSpPr>
+              <p:cNvPr id="40" name="TextBox 39">
+                <a:extLst>
+                  <a:ext uri="{FF2B5EF4-FFF2-40B4-BE49-F238E27FC236}">
+                    <a16:creationId xmlns:a16="http://schemas.microsoft.com/office/drawing/2014/main" id="{0421F847-7216-F4FB-7B3B-76AF9FCE6B7E}"/>
+                  </a:ext>
+                </a:extLst>
+              </p:cNvPr>
+              <p:cNvSpPr txBox="1">
+                <a:spLocks noRot="1" noChangeAspect="1" noMove="1" noResize="1" noEditPoints="1" noAdjustHandles="1" noChangeArrowheads="1" noChangeShapeType="1" noTextEdit="1"/>
+              </p:cNvSpPr>
+              <p:nvPr/>
+            </p:nvSpPr>
+            <p:spPr>
+              <a:xfrm>
+                <a:off x="2883981" y="638646"/>
+                <a:ext cx="1265614" cy="369332"/>
+              </a:xfrm>
+              <a:prstGeom prst="rect">
+                <a:avLst/>
+              </a:prstGeom>
+              <a:blipFill>
+                <a:blip r:embed="rId9"/>
+                <a:stretch>
+                  <a:fillRect b="-13333"/>
+                </a:stretch>
+              </a:blipFill>
+            </p:spPr>
+            <p:txBody>
+              <a:bodyPr/>
+              <a:lstStyle/>
+              <a:p>
+                <a:r>
+                  <a:rPr lang="en-US">
+                    <a:noFill/>
+                  </a:rPr>
+                  <a:t> </a:t>
+                </a:r>
+              </a:p>
+            </p:txBody>
+          </p:sp>
+        </mc:Fallback>
+      </mc:AlternateContent>
+      <mc:AlternateContent xmlns:mc="http://schemas.openxmlformats.org/markup-compatibility/2006">
+        <mc:Choice xmlns:a14="http://schemas.microsoft.com/office/drawing/2010/main" Requires="a14">
+          <p:sp>
+            <p:nvSpPr>
+              <p:cNvPr id="41" name="TextBox 40">
+                <a:extLst>
+                  <a:ext uri="{FF2B5EF4-FFF2-40B4-BE49-F238E27FC236}">
+                    <a16:creationId xmlns:a16="http://schemas.microsoft.com/office/drawing/2014/main" id="{75AF354C-AA77-9B1E-9EB9-9ED861C81519}"/>
+                  </a:ext>
+                </a:extLst>
+              </p:cNvPr>
+              <p:cNvSpPr txBox="1"/>
+              <p:nvPr/>
+            </p:nvSpPr>
+            <p:spPr>
+              <a:xfrm>
+                <a:off x="571153" y="2770975"/>
+                <a:ext cx="1265614" cy="369332"/>
+              </a:xfrm>
+              <a:prstGeom prst="rect">
+                <a:avLst/>
+              </a:prstGeom>
+              <a:noFill/>
+            </p:spPr>
+            <p:txBody>
+              <a:bodyPr wrap="square" rtlCol="0">
+                <a:spAutoFit/>
+              </a:bodyPr>
+              <a:lstStyle/>
+              <a:p>
+                <a14:m>
+                  <m:oMathPara xmlns:m="http://schemas.openxmlformats.org/officeDocument/2006/math">
+                    <m:oMathParaPr>
+                      <m:jc m:val="centerGroup"/>
+                    </m:oMathParaPr>
+                    <m:oMath xmlns:m="http://schemas.openxmlformats.org/officeDocument/2006/math">
+                      <m:r>
+                        <a:rPr lang="en-US" b="0" i="1" smtClean="0">
+                          <a:solidFill>
+                            <a:schemeClr val="bg1"/>
+                          </a:solidFill>
+                          <a:latin typeface="Cambria Math" panose="02040503050406030204" pitchFamily="18" charset="0"/>
+                        </a:rPr>
+                        <m:t>3) </m:t>
+                      </m:r>
+                      <m:r>
+                        <a:rPr lang="en-US" b="0" i="1" smtClean="0">
+                          <a:solidFill>
+                            <a:schemeClr val="bg1"/>
+                          </a:solidFill>
+                          <a:latin typeface="Cambria Math" panose="02040503050406030204" pitchFamily="18" charset="0"/>
+                        </a:rPr>
+                        <m:t>𝑟</m:t>
+                      </m:r>
+                      <m:d>
+                        <m:dPr>
+                          <m:begChr m:val="["/>
+                          <m:endChr m:val="]"/>
+                          <m:ctrlPr>
+                            <a:rPr lang="en-US" b="0" i="1" smtClean="0">
+                              <a:solidFill>
+                                <a:schemeClr val="bg1"/>
+                              </a:solidFill>
+                              <a:latin typeface="Cambria Math" panose="02040503050406030204" pitchFamily="18" charset="0"/>
+                            </a:rPr>
+                          </m:ctrlPr>
+                        </m:dPr>
+                        <m:e>
+                          <m:r>
+                            <a:rPr lang="en-US" b="0" i="1" smtClean="0">
+                              <a:solidFill>
+                                <a:schemeClr val="bg1"/>
+                              </a:solidFill>
+                              <a:latin typeface="Cambria Math" panose="02040503050406030204" pitchFamily="18" charset="0"/>
+                            </a:rPr>
+                            <m:t>𝑑𝑒𝑔</m:t>
+                          </m:r>
+                          <m:r>
+                            <a:rPr lang="en-US" b="0" i="1" smtClean="0">
+                              <a:solidFill>
+                                <a:schemeClr val="bg1"/>
+                              </a:solidFill>
+                              <a:latin typeface="Cambria Math" panose="02040503050406030204" pitchFamily="18" charset="0"/>
+                            </a:rPr>
+                            <m:t>\</m:t>
+                          </m:r>
+                          <m:r>
+                            <m:rPr>
+                              <m:sty m:val="p"/>
+                            </m:rPr>
+                            <a:rPr lang="en-US" b="0" i="1" smtClean="0">
+                              <a:solidFill>
+                                <a:schemeClr val="bg1"/>
+                              </a:solidFill>
+                              <a:latin typeface="Cambria Math" panose="02040503050406030204" pitchFamily="18" charset="0"/>
+                            </a:rPr>
+                            <m:t>s</m:t>
+                          </m:r>
+                        </m:e>
+                      </m:d>
+                    </m:oMath>
+                  </m:oMathPara>
+                </a14:m>
+                <a:endParaRPr lang="en-US" dirty="0">
+                  <a:solidFill>
+                    <a:schemeClr val="bg2">
+                      <a:lumMod val="90000"/>
+                    </a:schemeClr>
+                  </a:solidFill>
+                </a:endParaRPr>
+              </a:p>
+            </p:txBody>
+          </p:sp>
+        </mc:Choice>
+        <mc:Fallback>
+          <p:sp>
+            <p:nvSpPr>
+              <p:cNvPr id="41" name="TextBox 40">
+                <a:extLst>
+                  <a:ext uri="{FF2B5EF4-FFF2-40B4-BE49-F238E27FC236}">
+                    <a16:creationId xmlns:a16="http://schemas.microsoft.com/office/drawing/2014/main" id="{75AF354C-AA77-9B1E-9EB9-9ED861C81519}"/>
+                  </a:ext>
+                </a:extLst>
+              </p:cNvPr>
+              <p:cNvSpPr txBox="1">
+                <a:spLocks noRot="1" noChangeAspect="1" noMove="1" noResize="1" noEditPoints="1" noAdjustHandles="1" noChangeArrowheads="1" noChangeShapeType="1" noTextEdit="1"/>
+              </p:cNvSpPr>
+              <p:nvPr/>
+            </p:nvSpPr>
+            <p:spPr>
+              <a:xfrm>
+                <a:off x="571153" y="2770975"/>
+                <a:ext cx="1265614" cy="369332"/>
+              </a:xfrm>
+              <a:prstGeom prst="rect">
+                <a:avLst/>
+              </a:prstGeom>
+              <a:blipFill>
+                <a:blip r:embed="rId10"/>
+                <a:stretch>
+                  <a:fillRect b="-13333"/>
+                </a:stretch>
+              </a:blipFill>
+            </p:spPr>
+            <p:txBody>
+              <a:bodyPr/>
+              <a:lstStyle/>
+              <a:p>
+                <a:r>
+                  <a:rPr lang="en-US">
+                    <a:noFill/>
+                  </a:rPr>
+                  <a:t> </a:t>
+                </a:r>
+              </a:p>
+            </p:txBody>
+          </p:sp>
+        </mc:Fallback>
+      </mc:AlternateContent>
+      <mc:AlternateContent xmlns:mc="http://schemas.openxmlformats.org/markup-compatibility/2006">
+        <mc:Choice xmlns:a14="http://schemas.microsoft.com/office/drawing/2010/main" Requires="a14">
+          <p:sp>
+            <p:nvSpPr>
+              <p:cNvPr id="42" name="TextBox 41">
+                <a:extLst>
+                  <a:ext uri="{FF2B5EF4-FFF2-40B4-BE49-F238E27FC236}">
+                    <a16:creationId xmlns:a16="http://schemas.microsoft.com/office/drawing/2014/main" id="{507CC374-C4EA-31F0-425D-1310B974DB92}"/>
+                  </a:ext>
+                </a:extLst>
+              </p:cNvPr>
+              <p:cNvSpPr txBox="1"/>
+              <p:nvPr/>
+            </p:nvSpPr>
+            <p:spPr>
+              <a:xfrm>
+                <a:off x="2886062" y="2770975"/>
+                <a:ext cx="1265614" cy="369332"/>
+              </a:xfrm>
+              <a:prstGeom prst="rect">
+                <a:avLst/>
+              </a:prstGeom>
+              <a:noFill/>
+            </p:spPr>
+            <p:txBody>
+              <a:bodyPr wrap="square" rtlCol="0">
+                <a:spAutoFit/>
+              </a:bodyPr>
+              <a:lstStyle/>
+              <a:p>
+                <a14:m>
+                  <m:oMathPara xmlns:m="http://schemas.openxmlformats.org/officeDocument/2006/math">
+                    <m:oMathParaPr>
+                      <m:jc m:val="centerGroup"/>
+                    </m:oMathParaPr>
+                    <m:oMath xmlns:m="http://schemas.openxmlformats.org/officeDocument/2006/math">
+                      <m:r>
+                        <a:rPr lang="en-US" b="0" i="1" smtClean="0">
+                          <a:solidFill>
+                            <a:schemeClr val="bg1"/>
+                          </a:solidFill>
+                          <a:latin typeface="Cambria Math" panose="02040503050406030204" pitchFamily="18" charset="0"/>
+                        </a:rPr>
+                        <m:t>4) </m:t>
+                      </m:r>
+                      <m:r>
+                        <a:rPr lang="el-GR" b="0" i="1" smtClean="0">
+                          <a:solidFill>
+                            <a:schemeClr val="bg1"/>
+                          </a:solidFill>
+                          <a:latin typeface="Cambria Math" panose="02040503050406030204" pitchFamily="18" charset="0"/>
+                        </a:rPr>
+                        <m:t>𝜑</m:t>
+                      </m:r>
+                      <m:r>
+                        <a:rPr lang="el-GR" b="0" i="1" smtClean="0">
+                          <a:solidFill>
+                            <a:schemeClr val="bg1"/>
+                          </a:solidFill>
+                          <a:latin typeface="Cambria Math" panose="02040503050406030204" pitchFamily="18" charset="0"/>
+                        </a:rPr>
+                        <m:t> </m:t>
+                      </m:r>
+                      <m:d>
+                        <m:dPr>
+                          <m:begChr m:val="["/>
+                          <m:endChr m:val="]"/>
+                          <m:ctrlPr>
+                            <a:rPr lang="en-US" b="0" i="1" smtClean="0">
+                              <a:solidFill>
+                                <a:schemeClr val="bg1"/>
+                              </a:solidFill>
+                              <a:latin typeface="Cambria Math" panose="02040503050406030204" pitchFamily="18" charset="0"/>
+                            </a:rPr>
+                          </m:ctrlPr>
+                        </m:dPr>
+                        <m:e>
+                          <m:r>
+                            <a:rPr lang="en-US" b="0" i="1" smtClean="0">
+                              <a:solidFill>
+                                <a:schemeClr val="bg1"/>
+                              </a:solidFill>
+                              <a:latin typeface="Cambria Math" panose="02040503050406030204" pitchFamily="18" charset="0"/>
+                            </a:rPr>
+                            <m:t>𝑑𝑒𝑔</m:t>
+                          </m:r>
+                        </m:e>
+                      </m:d>
+                    </m:oMath>
+                  </m:oMathPara>
+                </a14:m>
+                <a:endParaRPr lang="en-US" dirty="0">
+                  <a:solidFill>
+                    <a:schemeClr val="bg2">
+                      <a:lumMod val="90000"/>
+                    </a:schemeClr>
+                  </a:solidFill>
+                </a:endParaRPr>
+              </a:p>
+            </p:txBody>
+          </p:sp>
+        </mc:Choice>
+        <mc:Fallback>
+          <p:sp>
+            <p:nvSpPr>
+              <p:cNvPr id="42" name="TextBox 41">
+                <a:extLst>
+                  <a:ext uri="{FF2B5EF4-FFF2-40B4-BE49-F238E27FC236}">
+                    <a16:creationId xmlns:a16="http://schemas.microsoft.com/office/drawing/2014/main" id="{507CC374-C4EA-31F0-425D-1310B974DB92}"/>
+                  </a:ext>
+                </a:extLst>
+              </p:cNvPr>
+              <p:cNvSpPr txBox="1">
+                <a:spLocks noRot="1" noChangeAspect="1" noMove="1" noResize="1" noEditPoints="1" noAdjustHandles="1" noChangeArrowheads="1" noChangeShapeType="1" noTextEdit="1"/>
+              </p:cNvSpPr>
+              <p:nvPr/>
+            </p:nvSpPr>
+            <p:spPr>
+              <a:xfrm>
+                <a:off x="2886062" y="2770975"/>
+                <a:ext cx="1265614" cy="369332"/>
+              </a:xfrm>
+              <a:prstGeom prst="rect">
+                <a:avLst/>
+              </a:prstGeom>
+              <a:blipFill>
+                <a:blip r:embed="rId11"/>
+                <a:stretch>
+                  <a:fillRect b="-13333"/>
+                </a:stretch>
+              </a:blipFill>
+            </p:spPr>
+            <p:txBody>
+              <a:bodyPr/>
+              <a:lstStyle/>
+              <a:p>
+                <a:r>
+                  <a:rPr lang="en-US">
+                    <a:noFill/>
+                  </a:rPr>
+                  <a:t> </a:t>
+                </a:r>
+              </a:p>
+            </p:txBody>
+          </p:sp>
+        </mc:Fallback>
+      </mc:AlternateContent>
+      <p:pic>
+        <p:nvPicPr>
+          <p:cNvPr id="46" name="Picture 45">
+            <a:extLst>
+              <a:ext uri="{FF2B5EF4-FFF2-40B4-BE49-F238E27FC236}">
+                <a16:creationId xmlns:a16="http://schemas.microsoft.com/office/drawing/2014/main" id="{308B34F1-A9F4-478C-47AF-7C2DC639C6DE}"/>
+              </a:ext>
+            </a:extLst>
+          </p:cNvPr>
+          <p:cNvPicPr>
+            <a:picLocks noChangeAspect="1"/>
+          </p:cNvPicPr>
+          <p:nvPr/>
+        </p:nvPicPr>
+        <p:blipFill>
+          <a:blip r:embed="rId12"/>
+          <a:stretch>
+            <a:fillRect/>
+          </a:stretch>
+        </p:blipFill>
+        <p:spPr>
+          <a:xfrm>
+            <a:off x="15022528" y="3499806"/>
+            <a:ext cx="1431197" cy="685782"/>
+          </a:xfrm>
+          <a:prstGeom prst="rect">
+            <a:avLst/>
+          </a:prstGeom>
+        </p:spPr>
+      </p:pic>
+      <p:pic>
+        <p:nvPicPr>
+          <p:cNvPr id="48" name="Picture 47">
+            <a:extLst>
+              <a:ext uri="{FF2B5EF4-FFF2-40B4-BE49-F238E27FC236}">
+                <a16:creationId xmlns:a16="http://schemas.microsoft.com/office/drawing/2014/main" id="{3CB02D80-5F4E-38B4-57AD-4AFC5F892FCD}"/>
+              </a:ext>
+            </a:extLst>
+          </p:cNvPr>
+          <p:cNvPicPr>
+            <a:picLocks noChangeAspect="1"/>
+          </p:cNvPicPr>
+          <p:nvPr/>
+        </p:nvPicPr>
+        <p:blipFill>
+          <a:blip r:embed="rId13"/>
+          <a:stretch>
+            <a:fillRect/>
+          </a:stretch>
+        </p:blipFill>
+        <p:spPr>
+          <a:xfrm>
+            <a:off x="8968737" y="3496298"/>
+            <a:ext cx="1371564" cy="685782"/>
+          </a:xfrm>
+          <a:prstGeom prst="rect">
+            <a:avLst/>
+          </a:prstGeom>
+        </p:spPr>
+      </p:pic>
+      <p:pic>
+        <p:nvPicPr>
+          <p:cNvPr id="50" name="Picture 49">
+            <a:extLst>
+              <a:ext uri="{FF2B5EF4-FFF2-40B4-BE49-F238E27FC236}">
+                <a16:creationId xmlns:a16="http://schemas.microsoft.com/office/drawing/2014/main" id="{70E754A8-3411-5551-205C-0C4B5E81F90B}"/>
+              </a:ext>
+            </a:extLst>
+          </p:cNvPr>
+          <p:cNvPicPr>
+            <a:picLocks noChangeAspect="1"/>
+          </p:cNvPicPr>
+          <p:nvPr/>
+        </p:nvPicPr>
+        <p:blipFill>
+          <a:blip r:embed="rId14"/>
+          <a:stretch>
+            <a:fillRect/>
+          </a:stretch>
+        </p:blipFill>
+        <p:spPr>
+          <a:xfrm>
+            <a:off x="3151989" y="3496298"/>
+            <a:ext cx="1386472" cy="685782"/>
+          </a:xfrm>
+          <a:prstGeom prst="rect">
+            <a:avLst/>
+          </a:prstGeom>
+        </p:spPr>
+      </p:pic>
+    </p:spTree>
+    <p:extLst>
+      <p:ext uri="{BB962C8B-B14F-4D97-AF65-F5344CB8AC3E}">
+        <p14:creationId xmlns:p14="http://schemas.microsoft.com/office/powerpoint/2010/main" val="4265045628"/>
+      </p:ext>
+    </p:extLst>
+  </p:cSld>
+  <p:clrMapOvr>
+    <a:masterClrMapping/>
+  </p:clrMapOvr>
+</p:sld>
+</file>
+
 <file path=ppt/slides/slide2.xml><?xml version="1.0" encoding="utf-8"?>
 <p:sld xmlns:a="http://schemas.openxmlformats.org/drawingml/2006/main" xmlns:r="http://schemas.openxmlformats.org/officeDocument/2006/relationships" xmlns:p="http://schemas.openxmlformats.org/presentationml/2006/main">
   <p:cSld>

</xml_diff>

<commit_message>
Control derivatives calculation completed
</commit_message>
<xml_diff>
--- a/TechnicalReport/Figures.pptx
+++ b/TechnicalReport/Figures.pptx
@@ -24,6 +24,7 @@
     <p:sldId id="272" r:id="rId18"/>
     <p:sldId id="273" r:id="rId19"/>
     <p:sldId id="274" r:id="rId20"/>
+    <p:sldId id="275" r:id="rId21"/>
   </p:sldIdLst>
   <p:sldSz cx="12192000" cy="6858000"/>
   <p:notesSz cx="6858000" cy="9144000"/>
@@ -10543,7 +10544,7 @@
         </p:blipFill>
         <p:spPr>
           <a:xfrm>
-            <a:off x="534211" y="3429000"/>
+            <a:off x="11277373" y="-838338"/>
             <a:ext cx="4200369" cy="3285437"/>
           </a:xfrm>
           <a:prstGeom prst="rect">
@@ -10565,7 +10566,7 @@
         </p:nvGrpSpPr>
         <p:grpSpPr>
           <a:xfrm>
-            <a:off x="5044633" y="4401988"/>
+            <a:off x="244785" y="4061866"/>
             <a:ext cx="8450390" cy="2713631"/>
             <a:chOff x="1627060" y="1953619"/>
             <a:chExt cx="8450390" cy="2713631"/>
@@ -12928,6 +12929,36 @@
           </p:style>
         </p:cxnSp>
       </p:grpSp>
+      <p:pic>
+        <p:nvPicPr>
+          <p:cNvPr id="6" name="Picture 5">
+            <a:extLst>
+              <a:ext uri="{FF2B5EF4-FFF2-40B4-BE49-F238E27FC236}">
+                <a16:creationId xmlns:a16="http://schemas.microsoft.com/office/drawing/2014/main" id="{A56F8D83-3396-2BD3-3555-5F124DCB2618}"/>
+              </a:ext>
+            </a:extLst>
+          </p:cNvPr>
+          <p:cNvPicPr>
+            <a:picLocks noChangeAspect="1"/>
+          </p:cNvPicPr>
+          <p:nvPr/>
+        </p:nvPicPr>
+        <p:blipFill>
+          <a:blip r:embed="rId38"/>
+          <a:stretch>
+            <a:fillRect/>
+          </a:stretch>
+        </p:blipFill>
+        <p:spPr>
+          <a:xfrm>
+            <a:off x="5111036" y="4559421"/>
+            <a:ext cx="4994497" cy="2021582"/>
+          </a:xfrm>
+          <a:prstGeom prst="rect">
+            <a:avLst/>
+          </a:prstGeom>
+        </p:spPr>
+      </p:pic>
     </p:spTree>
     <p:extLst>
       <p:ext uri="{BB962C8B-B14F-4D97-AF65-F5344CB8AC3E}">
@@ -22753,6 +22784,66 @@
 </p:sld>
 </file>
 
+<file path=ppt/slides/slide20.xml><?xml version="1.0" encoding="utf-8"?>
+<p:sld xmlns:a="http://schemas.openxmlformats.org/drawingml/2006/main" xmlns:r="http://schemas.openxmlformats.org/officeDocument/2006/relationships" xmlns:p="http://schemas.openxmlformats.org/presentationml/2006/main">
+  <p:cSld>
+    <p:spTree>
+      <p:nvGrpSpPr>
+        <p:cNvPr id="1" name=""/>
+        <p:cNvGrpSpPr/>
+        <p:nvPr/>
+      </p:nvGrpSpPr>
+      <p:grpSpPr>
+        <a:xfrm>
+          <a:off x="0" y="0"/>
+          <a:ext cx="0" cy="0"/>
+          <a:chOff x="0" y="0"/>
+          <a:chExt cx="0" cy="0"/>
+        </a:xfrm>
+      </p:grpSpPr>
+      <p:pic>
+        <p:nvPicPr>
+          <p:cNvPr id="2" name="Picture 1">
+            <a:extLst>
+              <a:ext uri="{FF2B5EF4-FFF2-40B4-BE49-F238E27FC236}">
+                <a16:creationId xmlns:a16="http://schemas.microsoft.com/office/drawing/2014/main" id="{07226F8B-899E-6C79-8C44-ACB838D03904}"/>
+              </a:ext>
+            </a:extLst>
+          </p:cNvPr>
+          <p:cNvPicPr>
+            <a:picLocks noChangeAspect="1"/>
+          </p:cNvPicPr>
+          <p:nvPr/>
+        </p:nvPicPr>
+        <p:blipFill>
+          <a:blip r:embed="rId2"/>
+          <a:stretch>
+            <a:fillRect/>
+          </a:stretch>
+        </p:blipFill>
+        <p:spPr>
+          <a:xfrm>
+            <a:off x="1204411" y="2371725"/>
+            <a:ext cx="6029325" cy="2114550"/>
+          </a:xfrm>
+          <a:prstGeom prst="rect">
+            <a:avLst/>
+          </a:prstGeom>
+        </p:spPr>
+      </p:pic>
+    </p:spTree>
+    <p:extLst>
+      <p:ext uri="{BB962C8B-B14F-4D97-AF65-F5344CB8AC3E}">
+        <p14:creationId xmlns:p14="http://schemas.microsoft.com/office/powerpoint/2010/main" val="2885889072"/>
+      </p:ext>
+    </p:extLst>
+  </p:cSld>
+  <p:clrMapOvr>
+    <a:masterClrMapping/>
+  </p:clrMapOvr>
+</p:sld>
+</file>
+
 <file path=ppt/slides/slide3.xml><?xml version="1.0" encoding="utf-8"?>
 <p:sld xmlns:a="http://schemas.openxmlformats.org/drawingml/2006/main" xmlns:r="http://schemas.openxmlformats.org/officeDocument/2006/relationships" xmlns:p="http://schemas.openxmlformats.org/presentationml/2006/main">
   <p:cSld>

</xml_diff>

<commit_message>
Lateral control first control step done
</commit_message>
<xml_diff>
--- a/TechnicalReport/Figures.pptx
+++ b/TechnicalReport/Figures.pptx
@@ -25,11 +25,15 @@
     <p:sldId id="273" r:id="rId19"/>
     <p:sldId id="274" r:id="rId20"/>
     <p:sldId id="275" r:id="rId21"/>
-    <p:sldId id="276" r:id="rId22"/>
-    <p:sldId id="277" r:id="rId23"/>
-    <p:sldId id="278" r:id="rId24"/>
-    <p:sldId id="280" r:id="rId25"/>
-    <p:sldId id="281" r:id="rId26"/>
+    <p:sldId id="283" r:id="rId22"/>
+    <p:sldId id="276" r:id="rId23"/>
+    <p:sldId id="277" r:id="rId24"/>
+    <p:sldId id="278" r:id="rId25"/>
+    <p:sldId id="280" r:id="rId26"/>
+    <p:sldId id="281" r:id="rId27"/>
+    <p:sldId id="282" r:id="rId28"/>
+    <p:sldId id="284" r:id="rId29"/>
+    <p:sldId id="286" r:id="rId30"/>
   </p:sldIdLst>
   <p:sldSz cx="12192000" cy="6858000"/>
   <p:notesSz cx="6858000" cy="9144000"/>
@@ -22885,6 +22889,66 @@
           <p:cNvPr id="3" name="Picture 2">
             <a:extLst>
               <a:ext uri="{FF2B5EF4-FFF2-40B4-BE49-F238E27FC236}">
+                <a16:creationId xmlns:a16="http://schemas.microsoft.com/office/drawing/2014/main" id="{0C5D5CCD-0BDA-7D68-6DFD-67D63ACBACCB}"/>
+              </a:ext>
+            </a:extLst>
+          </p:cNvPr>
+          <p:cNvPicPr>
+            <a:picLocks noChangeAspect="1"/>
+          </p:cNvPicPr>
+          <p:nvPr/>
+        </p:nvPicPr>
+        <p:blipFill>
+          <a:blip r:embed="rId2"/>
+          <a:stretch>
+            <a:fillRect/>
+          </a:stretch>
+        </p:blipFill>
+        <p:spPr>
+          <a:xfrm>
+            <a:off x="2709862" y="704850"/>
+            <a:ext cx="6772275" cy="5448300"/>
+          </a:xfrm>
+          <a:prstGeom prst="rect">
+            <a:avLst/>
+          </a:prstGeom>
+        </p:spPr>
+      </p:pic>
+    </p:spTree>
+    <p:extLst>
+      <p:ext uri="{BB962C8B-B14F-4D97-AF65-F5344CB8AC3E}">
+        <p14:creationId xmlns:p14="http://schemas.microsoft.com/office/powerpoint/2010/main" val="3401590315"/>
+      </p:ext>
+    </p:extLst>
+  </p:cSld>
+  <p:clrMapOvr>
+    <a:masterClrMapping/>
+  </p:clrMapOvr>
+</p:sld>
+</file>
+
+<file path=ppt/slides/slide22.xml><?xml version="1.0" encoding="utf-8"?>
+<p:sld xmlns:a="http://schemas.openxmlformats.org/drawingml/2006/main" xmlns:r="http://schemas.openxmlformats.org/officeDocument/2006/relationships" xmlns:p="http://schemas.openxmlformats.org/presentationml/2006/main">
+  <p:cSld>
+    <p:spTree>
+      <p:nvGrpSpPr>
+        <p:cNvPr id="1" name=""/>
+        <p:cNvGrpSpPr/>
+        <p:nvPr/>
+      </p:nvGrpSpPr>
+      <p:grpSpPr>
+        <a:xfrm>
+          <a:off x="0" y="0"/>
+          <a:ext cx="0" cy="0"/>
+          <a:chOff x="0" y="0"/>
+          <a:chExt cx="0" cy="0"/>
+        </a:xfrm>
+      </p:grpSpPr>
+      <p:pic>
+        <p:nvPicPr>
+          <p:cNvPr id="3" name="Picture 2">
+            <a:extLst>
+              <a:ext uri="{FF2B5EF4-FFF2-40B4-BE49-F238E27FC236}">
                 <a16:creationId xmlns:a16="http://schemas.microsoft.com/office/drawing/2014/main" id="{B3DD53EE-33FB-B100-EEA1-6745E690187A}"/>
               </a:ext>
             </a:extLst>
@@ -22953,7 +23017,7 @@
 </p:sld>
 </file>
 
-<file path=ppt/slides/slide22.xml><?xml version="1.0" encoding="utf-8"?>
+<file path=ppt/slides/slide23.xml><?xml version="1.0" encoding="utf-8"?>
 <p:sld xmlns:a="http://schemas.openxmlformats.org/drawingml/2006/main" xmlns:r="http://schemas.openxmlformats.org/officeDocument/2006/relationships" xmlns:p="http://schemas.openxmlformats.org/presentationml/2006/main">
   <p:cSld>
     <p:spTree>
@@ -23557,7 +23621,7 @@
 </p:sld>
 </file>
 
-<file path=ppt/slides/slide23.xml><?xml version="1.0" encoding="utf-8"?>
+<file path=ppt/slides/slide24.xml><?xml version="1.0" encoding="utf-8"?>
 <p:sld xmlns:a="http://schemas.openxmlformats.org/drawingml/2006/main" xmlns:r="http://schemas.openxmlformats.org/officeDocument/2006/relationships" xmlns:p="http://schemas.openxmlformats.org/presentationml/2006/main">
   <p:cSld>
     <p:spTree>
@@ -24003,7 +24067,7 @@
 </p:sld>
 </file>
 
-<file path=ppt/slides/slide24.xml><?xml version="1.0" encoding="utf-8"?>
+<file path=ppt/slides/slide25.xml><?xml version="1.0" encoding="utf-8"?>
 <p:sld xmlns:a="http://schemas.openxmlformats.org/drawingml/2006/main" xmlns:r="http://schemas.openxmlformats.org/officeDocument/2006/relationships" xmlns:p="http://schemas.openxmlformats.org/presentationml/2006/main">
   <p:cSld>
     <p:spTree>
@@ -24656,7 +24720,7 @@
 </p:sld>
 </file>
 
-<file path=ppt/slides/slide25.xml><?xml version="1.0" encoding="utf-8"?>
+<file path=ppt/slides/slide26.xml><?xml version="1.0" encoding="utf-8"?>
 <p:sld xmlns:a="http://schemas.openxmlformats.org/drawingml/2006/main" xmlns:r="http://schemas.openxmlformats.org/officeDocument/2006/relationships" xmlns:p="http://schemas.openxmlformats.org/presentationml/2006/main">
   <p:cSld>
     <p:spTree>
@@ -25738,6 +25802,765 @@
     <p:extLst>
       <p:ext uri="{BB962C8B-B14F-4D97-AF65-F5344CB8AC3E}">
         <p14:creationId xmlns:p14="http://schemas.microsoft.com/office/powerpoint/2010/main" val="336044923"/>
+      </p:ext>
+    </p:extLst>
+  </p:cSld>
+  <p:clrMapOvr>
+    <a:masterClrMapping/>
+  </p:clrMapOvr>
+</p:sld>
+</file>
+
+<file path=ppt/slides/slide27.xml><?xml version="1.0" encoding="utf-8"?>
+<p:sld xmlns:a="http://schemas.openxmlformats.org/drawingml/2006/main" xmlns:r="http://schemas.openxmlformats.org/officeDocument/2006/relationships" xmlns:p="http://schemas.openxmlformats.org/presentationml/2006/main">
+  <p:cSld>
+    <p:spTree>
+      <p:nvGrpSpPr>
+        <p:cNvPr id="1" name=""/>
+        <p:cNvGrpSpPr/>
+        <p:nvPr/>
+      </p:nvGrpSpPr>
+      <p:grpSpPr>
+        <a:xfrm>
+          <a:off x="0" y="0"/>
+          <a:ext cx="0" cy="0"/>
+          <a:chOff x="0" y="0"/>
+          <a:chExt cx="0" cy="0"/>
+        </a:xfrm>
+      </p:grpSpPr>
+      <p:pic>
+        <p:nvPicPr>
+          <p:cNvPr id="2" name="Picture 1">
+            <a:extLst>
+              <a:ext uri="{FF2B5EF4-FFF2-40B4-BE49-F238E27FC236}">
+                <a16:creationId xmlns:a16="http://schemas.microsoft.com/office/drawing/2014/main" id="{C1A72A57-65D2-AAF1-5A06-B271949C645E}"/>
+              </a:ext>
+            </a:extLst>
+          </p:cNvPr>
+          <p:cNvPicPr>
+            <a:picLocks noChangeAspect="1"/>
+          </p:cNvPicPr>
+          <p:nvPr/>
+        </p:nvPicPr>
+        <p:blipFill>
+          <a:blip r:embed="rId2"/>
+          <a:stretch>
+            <a:fillRect/>
+          </a:stretch>
+        </p:blipFill>
+        <p:spPr>
+          <a:xfrm>
+            <a:off x="405767" y="2146734"/>
+            <a:ext cx="10376533" cy="2564531"/>
+          </a:xfrm>
+          <a:prstGeom prst="rect">
+            <a:avLst/>
+          </a:prstGeom>
+        </p:spPr>
+      </p:pic>
+      <p:sp>
+        <p:nvSpPr>
+          <p:cNvPr id="3" name="Rectangle 2">
+            <a:extLst>
+              <a:ext uri="{FF2B5EF4-FFF2-40B4-BE49-F238E27FC236}">
+                <a16:creationId xmlns:a16="http://schemas.microsoft.com/office/drawing/2014/main" id="{ED51CD18-AF6F-6FCE-1D2C-F9BDE0A96D08}"/>
+              </a:ext>
+            </a:extLst>
+          </p:cNvPr>
+          <p:cNvSpPr/>
+          <p:nvPr/>
+        </p:nvSpPr>
+        <p:spPr>
+          <a:xfrm>
+            <a:off x="2247900" y="3149600"/>
+            <a:ext cx="3759200" cy="279399"/>
+          </a:xfrm>
+          <a:prstGeom prst="rect">
+            <a:avLst/>
+          </a:prstGeom>
+          <a:solidFill>
+            <a:srgbClr val="FF0000">
+              <a:alpha val="36000"/>
+            </a:srgbClr>
+          </a:solidFill>
+          <a:ln>
+            <a:solidFill>
+              <a:schemeClr val="tx1"/>
+            </a:solidFill>
+          </a:ln>
+        </p:spPr>
+        <p:style>
+          <a:lnRef idx="2">
+            <a:schemeClr val="accent1">
+              <a:shade val="50000"/>
+            </a:schemeClr>
+          </a:lnRef>
+          <a:fillRef idx="1">
+            <a:schemeClr val="accent1"/>
+          </a:fillRef>
+          <a:effectRef idx="0">
+            <a:schemeClr val="accent1"/>
+          </a:effectRef>
+          <a:fontRef idx="minor">
+            <a:schemeClr val="lt1"/>
+          </a:fontRef>
+        </p:style>
+        <p:txBody>
+          <a:bodyPr rtlCol="0" anchor="ctr"/>
+          <a:lstStyle/>
+          <a:p>
+            <a:pPr algn="ctr"/>
+            <a:endParaRPr lang="en-US"/>
+          </a:p>
+        </p:txBody>
+      </p:sp>
+    </p:spTree>
+    <p:extLst>
+      <p:ext uri="{BB962C8B-B14F-4D97-AF65-F5344CB8AC3E}">
+        <p14:creationId xmlns:p14="http://schemas.microsoft.com/office/powerpoint/2010/main" val="878981215"/>
+      </p:ext>
+    </p:extLst>
+  </p:cSld>
+  <p:clrMapOvr>
+    <a:masterClrMapping/>
+  </p:clrMapOvr>
+</p:sld>
+</file>
+
+<file path=ppt/slides/slide28.xml><?xml version="1.0" encoding="utf-8"?>
+<p:sld xmlns:a="http://schemas.openxmlformats.org/drawingml/2006/main" xmlns:r="http://schemas.openxmlformats.org/officeDocument/2006/relationships" xmlns:p="http://schemas.openxmlformats.org/presentationml/2006/main">
+  <p:cSld>
+    <p:spTree>
+      <p:nvGrpSpPr>
+        <p:cNvPr id="1" name=""/>
+        <p:cNvGrpSpPr/>
+        <p:nvPr/>
+      </p:nvGrpSpPr>
+      <p:grpSpPr>
+        <a:xfrm>
+          <a:off x="0" y="0"/>
+          <a:ext cx="0" cy="0"/>
+          <a:chOff x="0" y="0"/>
+          <a:chExt cx="0" cy="0"/>
+        </a:xfrm>
+      </p:grpSpPr>
+      <p:pic>
+        <p:nvPicPr>
+          <p:cNvPr id="7" name="Picture 6">
+            <a:extLst>
+              <a:ext uri="{FF2B5EF4-FFF2-40B4-BE49-F238E27FC236}">
+                <a16:creationId xmlns:a16="http://schemas.microsoft.com/office/drawing/2014/main" id="{8601DECA-16DE-F001-2077-48B0351ADFC7}"/>
+              </a:ext>
+            </a:extLst>
+          </p:cNvPr>
+          <p:cNvPicPr>
+            <a:picLocks noChangeAspect="1"/>
+          </p:cNvPicPr>
+          <p:nvPr/>
+        </p:nvPicPr>
+        <p:blipFill>
+          <a:blip r:embed="rId2"/>
+          <a:stretch>
+            <a:fillRect/>
+          </a:stretch>
+        </p:blipFill>
+        <p:spPr>
+          <a:xfrm>
+            <a:off x="0" y="853440"/>
+            <a:ext cx="7755709" cy="4935451"/>
+          </a:xfrm>
+          <a:prstGeom prst="rect">
+            <a:avLst/>
+          </a:prstGeom>
+        </p:spPr>
+      </p:pic>
+    </p:spTree>
+    <p:extLst>
+      <p:ext uri="{BB962C8B-B14F-4D97-AF65-F5344CB8AC3E}">
+        <p14:creationId xmlns:p14="http://schemas.microsoft.com/office/powerpoint/2010/main" val="2254744327"/>
+      </p:ext>
+    </p:extLst>
+  </p:cSld>
+  <p:clrMapOvr>
+    <a:masterClrMapping/>
+  </p:clrMapOvr>
+</p:sld>
+</file>
+
+<file path=ppt/slides/slide29.xml><?xml version="1.0" encoding="utf-8"?>
+<p:sld xmlns:a="http://schemas.openxmlformats.org/drawingml/2006/main" xmlns:r="http://schemas.openxmlformats.org/officeDocument/2006/relationships" xmlns:p="http://schemas.openxmlformats.org/presentationml/2006/main">
+  <p:cSld>
+    <p:spTree>
+      <p:nvGrpSpPr>
+        <p:cNvPr id="1" name=""/>
+        <p:cNvGrpSpPr/>
+        <p:nvPr/>
+      </p:nvGrpSpPr>
+      <p:grpSpPr>
+        <a:xfrm>
+          <a:off x="0" y="0"/>
+          <a:ext cx="0" cy="0"/>
+          <a:chOff x="0" y="0"/>
+          <a:chExt cx="0" cy="0"/>
+        </a:xfrm>
+      </p:grpSpPr>
+      <p:pic>
+        <p:nvPicPr>
+          <p:cNvPr id="2" name="Picture 1">
+            <a:extLst>
+              <a:ext uri="{FF2B5EF4-FFF2-40B4-BE49-F238E27FC236}">
+                <a16:creationId xmlns:a16="http://schemas.microsoft.com/office/drawing/2014/main" id="{FD87387B-AE03-344A-8F1B-DDB8A208C894}"/>
+              </a:ext>
+            </a:extLst>
+          </p:cNvPr>
+          <p:cNvPicPr>
+            <a:picLocks noChangeAspect="1"/>
+          </p:cNvPicPr>
+          <p:nvPr/>
+        </p:nvPicPr>
+        <p:blipFill>
+          <a:blip r:embed="rId2"/>
+          <a:stretch>
+            <a:fillRect/>
+          </a:stretch>
+        </p:blipFill>
+        <p:spPr>
+          <a:xfrm>
+            <a:off x="2047461" y="1033640"/>
+            <a:ext cx="7722704" cy="2395360"/>
+          </a:xfrm>
+          <a:prstGeom prst="rect">
+            <a:avLst/>
+          </a:prstGeom>
+        </p:spPr>
+      </p:pic>
+      <mc:AlternateContent xmlns:mc="http://schemas.openxmlformats.org/markup-compatibility/2006">
+        <mc:Choice xmlns:a14="http://schemas.microsoft.com/office/drawing/2010/main" Requires="a14">
+          <p:sp>
+            <p:nvSpPr>
+              <p:cNvPr id="9" name="TextBox 8">
+                <a:extLst>
+                  <a:ext uri="{FF2B5EF4-FFF2-40B4-BE49-F238E27FC236}">
+                    <a16:creationId xmlns:a16="http://schemas.microsoft.com/office/drawing/2014/main" id="{6970E818-857B-A047-F6FA-72EBDDCC6317}"/>
+                  </a:ext>
+                </a:extLst>
+              </p:cNvPr>
+              <p:cNvSpPr txBox="1"/>
+              <p:nvPr/>
+            </p:nvSpPr>
+            <p:spPr>
+              <a:xfrm>
+                <a:off x="2703609" y="383420"/>
+                <a:ext cx="6784782" cy="646331"/>
+              </a:xfrm>
+              <a:prstGeom prst="rect">
+                <a:avLst/>
+              </a:prstGeom>
+              <a:noFill/>
+            </p:spPr>
+            <p:txBody>
+              <a:bodyPr wrap="square" rtlCol="0">
+                <a:spAutoFit/>
+              </a:bodyPr>
+              <a:lstStyle/>
+              <a:p>
+                <a:pPr algn="ctr"/>
+                <a:r>
+                  <a:rPr lang="en-US" dirty="0"/>
+                  <a:t>Time response to initial conditions </a:t>
+                </a:r>
+                <a14:m>
+                  <m:oMath xmlns:m="http://schemas.openxmlformats.org/officeDocument/2006/math">
+                    <m:sSub>
+                      <m:sSubPr>
+                        <m:ctrlPr>
+                          <a:rPr lang="en-US" b="0" i="1" smtClean="0">
+                            <a:latin typeface="Cambria Math" panose="02040503050406030204" pitchFamily="18" charset="0"/>
+                          </a:rPr>
+                        </m:ctrlPr>
+                      </m:sSubPr>
+                      <m:e>
+                        <m:r>
+                          <a:rPr lang="en-US" b="0" i="1" smtClean="0">
+                            <a:latin typeface="Cambria Math" panose="02040503050406030204" pitchFamily="18" charset="0"/>
+                          </a:rPr>
+                          <m:t>𝑞</m:t>
+                        </m:r>
+                      </m:e>
+                      <m:sub>
+                        <m:r>
+                          <a:rPr lang="en-US" b="0" i="1" smtClean="0">
+                            <a:latin typeface="Cambria Math" panose="02040503050406030204" pitchFamily="18" charset="0"/>
+                          </a:rPr>
+                          <m:t>0</m:t>
+                        </m:r>
+                      </m:sub>
+                    </m:sSub>
+                    <m:r>
+                      <a:rPr lang="en-US" b="0" i="1" smtClean="0">
+                        <a:latin typeface="Cambria Math" panose="02040503050406030204" pitchFamily="18" charset="0"/>
+                      </a:rPr>
+                      <m:t>=1 </m:t>
+                    </m:r>
+                    <m:d>
+                      <m:dPr>
+                        <m:begChr m:val="["/>
+                        <m:endChr m:val="]"/>
+                        <m:ctrlPr>
+                          <a:rPr lang="en-US" b="0" i="1" smtClean="0">
+                            <a:latin typeface="Cambria Math" panose="02040503050406030204" pitchFamily="18" charset="0"/>
+                          </a:rPr>
+                        </m:ctrlPr>
+                      </m:dPr>
+                      <m:e>
+                        <m:r>
+                          <a:rPr lang="en-US" b="0" i="1" smtClean="0">
+                            <a:latin typeface="Cambria Math" panose="02040503050406030204" pitchFamily="18" charset="0"/>
+                          </a:rPr>
+                          <m:t>𝑑𝑒𝑔</m:t>
+                        </m:r>
+                        <m:r>
+                          <m:rPr>
+                            <m:lit/>
+                          </m:rPr>
+                          <a:rPr lang="en-US" b="0" i="1" smtClean="0">
+                            <a:latin typeface="Cambria Math" panose="02040503050406030204" pitchFamily="18" charset="0"/>
+                          </a:rPr>
+                          <m:t>/</m:t>
+                        </m:r>
+                        <m:r>
+                          <a:rPr lang="en-US" b="0" i="1" smtClean="0">
+                            <a:latin typeface="Cambria Math" panose="02040503050406030204" pitchFamily="18" charset="0"/>
+                          </a:rPr>
+                          <m:t>𝑠𝑒𝑐</m:t>
+                        </m:r>
+                      </m:e>
+                    </m:d>
+                  </m:oMath>
+                </a14:m>
+                <a:r>
+                  <a:rPr lang="en-US" dirty="0"/>
+                  <a:t> for : The entire system, The short period system and The open loop system</a:t>
+                </a:r>
+              </a:p>
+            </p:txBody>
+          </p:sp>
+        </mc:Choice>
+        <mc:Fallback>
+          <p:sp>
+            <p:nvSpPr>
+              <p:cNvPr id="9" name="TextBox 8">
+                <a:extLst>
+                  <a:ext uri="{FF2B5EF4-FFF2-40B4-BE49-F238E27FC236}">
+                    <a16:creationId xmlns:a16="http://schemas.microsoft.com/office/drawing/2014/main" id="{6970E818-857B-A047-F6FA-72EBDDCC6317}"/>
+                  </a:ext>
+                </a:extLst>
+              </p:cNvPr>
+              <p:cNvSpPr txBox="1">
+                <a:spLocks noRot="1" noChangeAspect="1" noMove="1" noResize="1" noEditPoints="1" noAdjustHandles="1" noChangeArrowheads="1" noChangeShapeType="1" noTextEdit="1"/>
+              </p:cNvSpPr>
+              <p:nvPr/>
+            </p:nvSpPr>
+            <p:spPr>
+              <a:xfrm>
+                <a:off x="2703609" y="383420"/>
+                <a:ext cx="6784782" cy="646331"/>
+              </a:xfrm>
+              <a:prstGeom prst="rect">
+                <a:avLst/>
+              </a:prstGeom>
+              <a:blipFill>
+                <a:blip r:embed="rId3"/>
+                <a:stretch>
+                  <a:fillRect t="-5660" b="-14151"/>
+                </a:stretch>
+              </a:blipFill>
+            </p:spPr>
+            <p:txBody>
+              <a:bodyPr/>
+              <a:lstStyle/>
+              <a:p>
+                <a:r>
+                  <a:rPr lang="en-US">
+                    <a:noFill/>
+                  </a:rPr>
+                  <a:t> </a:t>
+                </a:r>
+              </a:p>
+            </p:txBody>
+          </p:sp>
+        </mc:Fallback>
+      </mc:AlternateContent>
+      <mc:AlternateContent xmlns:mc="http://schemas.openxmlformats.org/markup-compatibility/2006">
+        <mc:Choice xmlns:a14="http://schemas.microsoft.com/office/drawing/2010/main" Requires="a14">
+          <p:sp>
+            <p:nvSpPr>
+              <p:cNvPr id="10" name="TextBox 9">
+                <a:extLst>
+                  <a:ext uri="{FF2B5EF4-FFF2-40B4-BE49-F238E27FC236}">
+                    <a16:creationId xmlns:a16="http://schemas.microsoft.com/office/drawing/2014/main" id="{1D354E80-21D4-C054-7E94-6C5E4EC44B14}"/>
+                  </a:ext>
+                </a:extLst>
+              </p:cNvPr>
+              <p:cNvSpPr txBox="1"/>
+              <p:nvPr/>
+            </p:nvSpPr>
+            <p:spPr>
+              <a:xfrm>
+                <a:off x="2703609" y="5828249"/>
+                <a:ext cx="6784782" cy="369332"/>
+              </a:xfrm>
+              <a:prstGeom prst="rect">
+                <a:avLst/>
+              </a:prstGeom>
+              <a:noFill/>
+            </p:spPr>
+            <p:txBody>
+              <a:bodyPr wrap="square" rtlCol="0">
+                <a:spAutoFit/>
+              </a:bodyPr>
+              <a:lstStyle/>
+              <a:p>
+                <a:pPr algn="ctr"/>
+                <a:r>
+                  <a:rPr lang="en-US" dirty="0"/>
+                  <a:t>Time </a:t>
+                </a:r>
+                <a14:m>
+                  <m:oMath xmlns:m="http://schemas.openxmlformats.org/officeDocument/2006/math">
+                    <m:r>
+                      <a:rPr lang="en-US" b="0" i="1" smtClean="0">
+                        <a:latin typeface="Cambria Math" panose="02040503050406030204" pitchFamily="18" charset="0"/>
+                      </a:rPr>
+                      <m:t>[</m:t>
+                    </m:r>
+                    <m:r>
+                      <a:rPr lang="en-US" b="0" i="1" smtClean="0">
+                        <a:latin typeface="Cambria Math" panose="02040503050406030204" pitchFamily="18" charset="0"/>
+                      </a:rPr>
+                      <m:t>𝑠𝑒𝑐</m:t>
+                    </m:r>
+                    <m:r>
+                      <a:rPr lang="en-US" b="0" i="1" smtClean="0">
+                        <a:latin typeface="Cambria Math" panose="02040503050406030204" pitchFamily="18" charset="0"/>
+                      </a:rPr>
+                      <m:t>]</m:t>
+                    </m:r>
+                  </m:oMath>
+                </a14:m>
+                <a:endParaRPr lang="en-US" dirty="0"/>
+              </a:p>
+            </p:txBody>
+          </p:sp>
+        </mc:Choice>
+        <mc:Fallback>
+          <p:sp>
+            <p:nvSpPr>
+              <p:cNvPr id="10" name="TextBox 9">
+                <a:extLst>
+                  <a:ext uri="{FF2B5EF4-FFF2-40B4-BE49-F238E27FC236}">
+                    <a16:creationId xmlns:a16="http://schemas.microsoft.com/office/drawing/2014/main" id="{1D354E80-21D4-C054-7E94-6C5E4EC44B14}"/>
+                  </a:ext>
+                </a:extLst>
+              </p:cNvPr>
+              <p:cNvSpPr txBox="1">
+                <a:spLocks noRot="1" noChangeAspect="1" noMove="1" noResize="1" noEditPoints="1" noAdjustHandles="1" noChangeArrowheads="1" noChangeShapeType="1" noTextEdit="1"/>
+              </p:cNvSpPr>
+              <p:nvPr/>
+            </p:nvSpPr>
+            <p:spPr>
+              <a:xfrm>
+                <a:off x="2703609" y="5828249"/>
+                <a:ext cx="6784782" cy="369332"/>
+              </a:xfrm>
+              <a:prstGeom prst="rect">
+                <a:avLst/>
+              </a:prstGeom>
+              <a:blipFill>
+                <a:blip r:embed="rId4"/>
+                <a:stretch>
+                  <a:fillRect t="-8197" b="-24590"/>
+                </a:stretch>
+              </a:blipFill>
+            </p:spPr>
+            <p:txBody>
+              <a:bodyPr/>
+              <a:lstStyle/>
+              <a:p>
+                <a:r>
+                  <a:rPr lang="en-US">
+                    <a:noFill/>
+                  </a:rPr>
+                  <a:t> </a:t>
+                </a:r>
+              </a:p>
+            </p:txBody>
+          </p:sp>
+        </mc:Fallback>
+      </mc:AlternateContent>
+      <mc:AlternateContent xmlns:mc="http://schemas.openxmlformats.org/markup-compatibility/2006">
+        <mc:Choice xmlns:a14="http://schemas.microsoft.com/office/drawing/2010/main" Requires="a14">
+          <p:sp>
+            <p:nvSpPr>
+              <p:cNvPr id="11" name="TextBox 10">
+                <a:extLst>
+                  <a:ext uri="{FF2B5EF4-FFF2-40B4-BE49-F238E27FC236}">
+                    <a16:creationId xmlns:a16="http://schemas.microsoft.com/office/drawing/2014/main" id="{6BFDC600-21A1-C684-085F-85BF212CED4B}"/>
+                  </a:ext>
+                </a:extLst>
+              </p:cNvPr>
+              <p:cNvSpPr txBox="1"/>
+              <p:nvPr/>
+            </p:nvSpPr>
+            <p:spPr>
+              <a:xfrm rot="16200000">
+                <a:off x="822240" y="4305458"/>
+                <a:ext cx="1429693" cy="646331"/>
+              </a:xfrm>
+              <a:prstGeom prst="rect">
+                <a:avLst/>
+              </a:prstGeom>
+              <a:noFill/>
+            </p:spPr>
+            <p:txBody>
+              <a:bodyPr wrap="square" rtlCol="0">
+                <a:spAutoFit/>
+              </a:bodyPr>
+              <a:lstStyle/>
+              <a:p>
+                <a:pPr algn="ctr"/>
+                <a:r>
+                  <a:rPr lang="en-US" dirty="0"/>
+                  <a:t>Rudder angle </a:t>
+                </a:r>
+                <a14:m>
+                  <m:oMath xmlns:m="http://schemas.openxmlformats.org/officeDocument/2006/math">
+                    <m:r>
+                      <a:rPr lang="en-US" b="0" i="1" smtClean="0">
+                        <a:latin typeface="Cambria Math" panose="02040503050406030204" pitchFamily="18" charset="0"/>
+                      </a:rPr>
+                      <m:t>[</m:t>
+                    </m:r>
+                    <m:r>
+                      <a:rPr lang="en-US" b="0" i="1" smtClean="0">
+                        <a:latin typeface="Cambria Math" panose="02040503050406030204" pitchFamily="18" charset="0"/>
+                      </a:rPr>
+                      <m:t>𝑑𝑒𝑔</m:t>
+                    </m:r>
+                    <m:r>
+                      <a:rPr lang="en-US" b="0" i="1" smtClean="0">
+                        <a:latin typeface="Cambria Math" panose="02040503050406030204" pitchFamily="18" charset="0"/>
+                      </a:rPr>
+                      <m:t>]</m:t>
+                    </m:r>
+                  </m:oMath>
+                </a14:m>
+                <a:endParaRPr lang="en-US" dirty="0"/>
+              </a:p>
+            </p:txBody>
+          </p:sp>
+        </mc:Choice>
+        <mc:Fallback>
+          <p:sp>
+            <p:nvSpPr>
+              <p:cNvPr id="11" name="TextBox 10">
+                <a:extLst>
+                  <a:ext uri="{FF2B5EF4-FFF2-40B4-BE49-F238E27FC236}">
+                    <a16:creationId xmlns:a16="http://schemas.microsoft.com/office/drawing/2014/main" id="{6BFDC600-21A1-C684-085F-85BF212CED4B}"/>
+                  </a:ext>
+                </a:extLst>
+              </p:cNvPr>
+              <p:cNvSpPr txBox="1">
+                <a:spLocks noRot="1" noChangeAspect="1" noMove="1" noResize="1" noEditPoints="1" noAdjustHandles="1" noChangeArrowheads="1" noChangeShapeType="1" noTextEdit="1"/>
+              </p:cNvSpPr>
+              <p:nvPr/>
+            </p:nvSpPr>
+            <p:spPr>
+              <a:xfrm rot="16200000">
+                <a:off x="822240" y="4305458"/>
+                <a:ext cx="1429693" cy="646331"/>
+              </a:xfrm>
+              <a:prstGeom prst="rect">
+                <a:avLst/>
+              </a:prstGeom>
+              <a:blipFill>
+                <a:blip r:embed="rId5"/>
+                <a:stretch>
+                  <a:fillRect l="-4717" t="-6383" r="-8491" b="-3404"/>
+                </a:stretch>
+              </a:blipFill>
+            </p:spPr>
+            <p:txBody>
+              <a:bodyPr/>
+              <a:lstStyle/>
+              <a:p>
+                <a:r>
+                  <a:rPr lang="en-US">
+                    <a:noFill/>
+                  </a:rPr>
+                  <a:t> </a:t>
+                </a:r>
+              </a:p>
+            </p:txBody>
+          </p:sp>
+        </mc:Fallback>
+      </mc:AlternateContent>
+      <mc:AlternateContent xmlns:mc="http://schemas.openxmlformats.org/markup-compatibility/2006">
+        <mc:Choice xmlns:a14="http://schemas.microsoft.com/office/drawing/2010/main" Requires="a14">
+          <p:sp>
+            <p:nvSpPr>
+              <p:cNvPr id="12" name="TextBox 11">
+                <a:extLst>
+                  <a:ext uri="{FF2B5EF4-FFF2-40B4-BE49-F238E27FC236}">
+                    <a16:creationId xmlns:a16="http://schemas.microsoft.com/office/drawing/2014/main" id="{6B7EF5DC-D258-F417-9EA9-03DC92FB6BA1}"/>
+                  </a:ext>
+                </a:extLst>
+              </p:cNvPr>
+              <p:cNvSpPr txBox="1"/>
+              <p:nvPr/>
+            </p:nvSpPr>
+            <p:spPr>
+              <a:xfrm rot="16200000">
+                <a:off x="641445" y="1906210"/>
+                <a:ext cx="1791282" cy="646331"/>
+              </a:xfrm>
+              <a:prstGeom prst="rect">
+                <a:avLst/>
+              </a:prstGeom>
+              <a:noFill/>
+            </p:spPr>
+            <p:txBody>
+              <a:bodyPr wrap="square" rtlCol="0">
+                <a:spAutoFit/>
+              </a:bodyPr>
+              <a:lstStyle/>
+              <a:p>
+                <a:pPr algn="ctr"/>
+                <a:r>
+                  <a:rPr lang="en-US" dirty="0"/>
+                  <a:t>Yaw rate </a:t>
+                </a:r>
+                <a14:m>
+                  <m:oMath xmlns:m="http://schemas.openxmlformats.org/officeDocument/2006/math">
+                    <m:r>
+                      <a:rPr lang="en-US" b="0" i="1" smtClean="0">
+                        <a:latin typeface="Cambria Math" panose="02040503050406030204" pitchFamily="18" charset="0"/>
+                      </a:rPr>
+                      <m:t>[</m:t>
+                    </m:r>
+                    <m:r>
+                      <a:rPr lang="en-US" b="0" i="1" smtClean="0">
+                        <a:latin typeface="Cambria Math" panose="02040503050406030204" pitchFamily="18" charset="0"/>
+                      </a:rPr>
+                      <m:t>𝑑𝑒𝑔</m:t>
+                    </m:r>
+                    <m:r>
+                      <m:rPr>
+                        <m:lit/>
+                      </m:rPr>
+                      <a:rPr lang="en-US" b="0" i="1" smtClean="0">
+                        <a:latin typeface="Cambria Math" panose="02040503050406030204" pitchFamily="18" charset="0"/>
+                      </a:rPr>
+                      <m:t>/</m:t>
+                    </m:r>
+                    <m:r>
+                      <a:rPr lang="en-US" b="0" i="1" smtClean="0">
+                        <a:latin typeface="Cambria Math" panose="02040503050406030204" pitchFamily="18" charset="0"/>
+                      </a:rPr>
+                      <m:t>𝑠𝑒𝑐</m:t>
+                    </m:r>
+                    <m:r>
+                      <a:rPr lang="en-US" b="0" i="1" smtClean="0">
+                        <a:latin typeface="Cambria Math" panose="02040503050406030204" pitchFamily="18" charset="0"/>
+                      </a:rPr>
+                      <m:t>]</m:t>
+                    </m:r>
+                  </m:oMath>
+                </a14:m>
+                <a:endParaRPr lang="en-US" dirty="0"/>
+              </a:p>
+            </p:txBody>
+          </p:sp>
+        </mc:Choice>
+        <mc:Fallback>
+          <p:sp>
+            <p:nvSpPr>
+              <p:cNvPr id="12" name="TextBox 11">
+                <a:extLst>
+                  <a:ext uri="{FF2B5EF4-FFF2-40B4-BE49-F238E27FC236}">
+                    <a16:creationId xmlns:a16="http://schemas.microsoft.com/office/drawing/2014/main" id="{6B7EF5DC-D258-F417-9EA9-03DC92FB6BA1}"/>
+                  </a:ext>
+                </a:extLst>
+              </p:cNvPr>
+              <p:cNvSpPr txBox="1">
+                <a:spLocks noRot="1" noChangeAspect="1" noMove="1" noResize="1" noEditPoints="1" noAdjustHandles="1" noChangeArrowheads="1" noChangeShapeType="1" noTextEdit="1"/>
+              </p:cNvSpPr>
+              <p:nvPr/>
+            </p:nvSpPr>
+            <p:spPr>
+              <a:xfrm rot="16200000">
+                <a:off x="641445" y="1906210"/>
+                <a:ext cx="1791282" cy="646331"/>
+              </a:xfrm>
+              <a:prstGeom prst="rect">
+                <a:avLst/>
+              </a:prstGeom>
+              <a:blipFill>
+                <a:blip r:embed="rId6"/>
+                <a:stretch>
+                  <a:fillRect l="-4717" r="-8491"/>
+                </a:stretch>
+              </a:blipFill>
+            </p:spPr>
+            <p:txBody>
+              <a:bodyPr/>
+              <a:lstStyle/>
+              <a:p>
+                <a:r>
+                  <a:rPr lang="en-US">
+                    <a:noFill/>
+                  </a:rPr>
+                  <a:t> </a:t>
+                </a:r>
+              </a:p>
+            </p:txBody>
+          </p:sp>
+        </mc:Fallback>
+      </mc:AlternateContent>
+      <p:pic>
+        <p:nvPicPr>
+          <p:cNvPr id="4" name="Picture 3">
+            <a:extLst>
+              <a:ext uri="{FF2B5EF4-FFF2-40B4-BE49-F238E27FC236}">
+                <a16:creationId xmlns:a16="http://schemas.microsoft.com/office/drawing/2014/main" id="{ABA1322F-0E47-B112-1B0A-9F1AF1B91A10}"/>
+              </a:ext>
+            </a:extLst>
+          </p:cNvPr>
+          <p:cNvPicPr>
+            <a:picLocks noChangeAspect="1"/>
+          </p:cNvPicPr>
+          <p:nvPr/>
+        </p:nvPicPr>
+        <p:blipFill>
+          <a:blip r:embed="rId7"/>
+          <a:stretch>
+            <a:fillRect/>
+          </a:stretch>
+        </p:blipFill>
+        <p:spPr>
+          <a:xfrm>
+            <a:off x="2047463" y="3429000"/>
+            <a:ext cx="7722702" cy="2395360"/>
+          </a:xfrm>
+          <a:prstGeom prst="rect">
+            <a:avLst/>
+          </a:prstGeom>
+        </p:spPr>
+      </p:pic>
+    </p:spTree>
+    <p:extLst>
+      <p:ext uri="{BB962C8B-B14F-4D97-AF65-F5344CB8AC3E}">
+        <p14:creationId xmlns:p14="http://schemas.microsoft.com/office/powerpoint/2010/main" val="3490340217"/>
       </p:ext>
     </p:extLst>
   </p:cSld>

</xml_diff>

<commit_message>
Lateral control report completed
</commit_message>
<xml_diff>
--- a/TechnicalReport/Figures.pptx
+++ b/TechnicalReport/Figures.pptx
@@ -35,6 +35,7 @@
     <p:sldId id="284" r:id="rId29"/>
     <p:sldId id="286" r:id="rId30"/>
     <p:sldId id="288" r:id="rId31"/>
+    <p:sldId id="289" r:id="rId32"/>
   </p:sldIdLst>
   <p:sldSz cx="12192000" cy="6858000"/>
   <p:notesSz cx="6858000" cy="9144000"/>
@@ -26005,446 +26006,467 @@
           <a:chExt cx="0" cy="0"/>
         </a:xfrm>
       </p:grpSpPr>
-      <p:sp>
-        <p:nvSpPr>
-          <p:cNvPr id="9" name="TextBox 8">
+      <p:grpSp>
+        <p:nvGrpSpPr>
+          <p:cNvPr id="16" name="Group 15">
             <a:extLst>
               <a:ext uri="{FF2B5EF4-FFF2-40B4-BE49-F238E27FC236}">
-                <a16:creationId xmlns:a16="http://schemas.microsoft.com/office/drawing/2014/main" id="{6970E818-857B-A047-F6FA-72EBDDCC6317}"/>
+                <a16:creationId xmlns:a16="http://schemas.microsoft.com/office/drawing/2014/main" id="{7FE42CE9-7423-6C6F-2B57-E2A9D12D645F}"/>
               </a:ext>
             </a:extLst>
           </p:cNvPr>
-          <p:cNvSpPr txBox="1"/>
+          <p:cNvGrpSpPr/>
           <p:nvPr/>
-        </p:nvSpPr>
-        <p:spPr>
+        </p:nvGrpSpPr>
+        <p:grpSpPr>
           <a:xfrm>
-            <a:off x="2703609" y="477698"/>
-            <a:ext cx="6784782" cy="369332"/>
+            <a:off x="1213920" y="599618"/>
+            <a:ext cx="8556245" cy="5597963"/>
+            <a:chOff x="1213920" y="599618"/>
+            <a:chExt cx="8556245" cy="5597963"/>
           </a:xfrm>
-          <a:prstGeom prst="rect">
-            <a:avLst/>
-          </a:prstGeom>
-          <a:noFill/>
-        </p:spPr>
-        <p:txBody>
-          <a:bodyPr wrap="square" rtlCol="0">
-            <a:spAutoFit/>
-          </a:bodyPr>
-          <a:lstStyle/>
-          <a:p>
-            <a:pPr algn="ctr"/>
-            <a:r>
-              <a:rPr lang="en-US" dirty="0"/>
-              <a:t>Time response</a:t>
-            </a:r>
-            <a:r>
-              <a:rPr lang="el-GR" dirty="0"/>
-              <a:t> </a:t>
-            </a:r>
-            <a:r>
-              <a:rPr lang="en-US" dirty="0"/>
-              <a:t>of Dutch roll dumper system.</a:t>
-            </a:r>
-          </a:p>
-        </p:txBody>
-      </p:sp>
-      <mc:AlternateContent xmlns:mc="http://schemas.openxmlformats.org/markup-compatibility/2006">
-        <mc:Choice xmlns:a14="http://schemas.microsoft.com/office/drawing/2010/main" Requires="a14">
-          <p:sp>
-            <p:nvSpPr>
-              <p:cNvPr id="10" name="TextBox 9">
-                <a:extLst>
-                  <a:ext uri="{FF2B5EF4-FFF2-40B4-BE49-F238E27FC236}">
-                    <a16:creationId xmlns:a16="http://schemas.microsoft.com/office/drawing/2014/main" id="{1D354E80-21D4-C054-7E94-6C5E4EC44B14}"/>
-                  </a:ext>
-                </a:extLst>
-              </p:cNvPr>
-              <p:cNvSpPr txBox="1"/>
-              <p:nvPr/>
-            </p:nvSpPr>
-            <p:spPr>
-              <a:xfrm>
-                <a:off x="2703609" y="5828249"/>
-                <a:ext cx="6784782" cy="369332"/>
-              </a:xfrm>
-              <a:prstGeom prst="rect">
-                <a:avLst/>
-              </a:prstGeom>
-              <a:noFill/>
-            </p:spPr>
-            <p:txBody>
-              <a:bodyPr wrap="square" rtlCol="0">
-                <a:spAutoFit/>
-              </a:bodyPr>
-              <a:lstStyle/>
-              <a:p>
-                <a:pPr algn="ctr"/>
-                <a:r>
-                  <a:rPr lang="en-US" dirty="0"/>
-                  <a:t>Time </a:t>
-                </a:r>
-                <a14:m>
-                  <m:oMath xmlns:m="http://schemas.openxmlformats.org/officeDocument/2006/math">
-                    <m:r>
-                      <a:rPr lang="en-US" b="0" i="1" smtClean="0">
-                        <a:latin typeface="Cambria Math" panose="02040503050406030204" pitchFamily="18" charset="0"/>
-                      </a:rPr>
-                      <m:t>[</m:t>
-                    </m:r>
-                    <m:r>
-                      <a:rPr lang="en-US" b="0" i="1" smtClean="0">
-                        <a:latin typeface="Cambria Math" panose="02040503050406030204" pitchFamily="18" charset="0"/>
-                      </a:rPr>
-                      <m:t>𝑠𝑒𝑐</m:t>
-                    </m:r>
-                    <m:r>
-                      <a:rPr lang="en-US" b="0" i="1" smtClean="0">
-                        <a:latin typeface="Cambria Math" panose="02040503050406030204" pitchFamily="18" charset="0"/>
-                      </a:rPr>
-                      <m:t>]</m:t>
-                    </m:r>
-                  </m:oMath>
-                </a14:m>
-                <a:endParaRPr lang="en-US" dirty="0"/>
-              </a:p>
-            </p:txBody>
-          </p:sp>
-        </mc:Choice>
-        <mc:Fallback>
-          <p:sp>
-            <p:nvSpPr>
-              <p:cNvPr id="10" name="TextBox 9">
-                <a:extLst>
-                  <a:ext uri="{FF2B5EF4-FFF2-40B4-BE49-F238E27FC236}">
-                    <a16:creationId xmlns:a16="http://schemas.microsoft.com/office/drawing/2014/main" id="{1D354E80-21D4-C054-7E94-6C5E4EC44B14}"/>
-                  </a:ext>
-                </a:extLst>
-              </p:cNvPr>
-              <p:cNvSpPr txBox="1">
-                <a:spLocks noRot="1" noChangeAspect="1" noMove="1" noResize="1" noEditPoints="1" noAdjustHandles="1" noChangeArrowheads="1" noChangeShapeType="1" noTextEdit="1"/>
-              </p:cNvSpPr>
-              <p:nvPr/>
-            </p:nvSpPr>
-            <p:spPr>
-              <a:xfrm>
-                <a:off x="2703609" y="5828249"/>
-                <a:ext cx="6784782" cy="369332"/>
-              </a:xfrm>
-              <a:prstGeom prst="rect">
-                <a:avLst/>
-              </a:prstGeom>
-              <a:blipFill>
-                <a:blip r:embed="rId2"/>
-                <a:stretch>
-                  <a:fillRect t="-8197" b="-24590"/>
-                </a:stretch>
-              </a:blipFill>
-            </p:spPr>
-            <p:txBody>
-              <a:bodyPr/>
-              <a:lstStyle/>
-              <a:p>
-                <a:r>
-                  <a:rPr lang="en-US">
-                    <a:noFill/>
-                  </a:rPr>
-                  <a:t> </a:t>
-                </a:r>
-              </a:p>
-            </p:txBody>
-          </p:sp>
-        </mc:Fallback>
-      </mc:AlternateContent>
-      <mc:AlternateContent xmlns:mc="http://schemas.openxmlformats.org/markup-compatibility/2006">
-        <mc:Choice xmlns:a14="http://schemas.microsoft.com/office/drawing/2010/main" Requires="a14">
-          <p:sp>
-            <p:nvSpPr>
-              <p:cNvPr id="11" name="TextBox 10">
-                <a:extLst>
-                  <a:ext uri="{FF2B5EF4-FFF2-40B4-BE49-F238E27FC236}">
-                    <a16:creationId xmlns:a16="http://schemas.microsoft.com/office/drawing/2014/main" id="{6BFDC600-21A1-C684-085F-85BF212CED4B}"/>
-                  </a:ext>
-                </a:extLst>
-              </p:cNvPr>
-              <p:cNvSpPr txBox="1"/>
-              <p:nvPr/>
-            </p:nvSpPr>
-            <p:spPr>
-              <a:xfrm rot="16200000">
-                <a:off x="822240" y="4305458"/>
-                <a:ext cx="1429693" cy="646331"/>
-              </a:xfrm>
-              <a:prstGeom prst="rect">
-                <a:avLst/>
-              </a:prstGeom>
-              <a:noFill/>
-            </p:spPr>
-            <p:txBody>
-              <a:bodyPr wrap="square" rtlCol="0">
-                <a:spAutoFit/>
-              </a:bodyPr>
-              <a:lstStyle/>
-              <a:p>
-                <a:pPr algn="ctr"/>
-                <a:r>
-                  <a:rPr lang="en-US" dirty="0"/>
-                  <a:t>Rudder angle </a:t>
-                </a:r>
-                <a14:m>
-                  <m:oMath xmlns:m="http://schemas.openxmlformats.org/officeDocument/2006/math">
-                    <m:r>
-                      <a:rPr lang="en-US" b="0" i="1" smtClean="0">
-                        <a:latin typeface="Cambria Math" panose="02040503050406030204" pitchFamily="18" charset="0"/>
-                      </a:rPr>
-                      <m:t>[</m:t>
-                    </m:r>
-                    <m:r>
-                      <a:rPr lang="en-US" b="0" i="1" smtClean="0">
-                        <a:latin typeface="Cambria Math" panose="02040503050406030204" pitchFamily="18" charset="0"/>
-                      </a:rPr>
-                      <m:t>𝑑𝑒𝑔</m:t>
-                    </m:r>
-                    <m:r>
-                      <a:rPr lang="en-US" b="0" i="1" smtClean="0">
-                        <a:latin typeface="Cambria Math" panose="02040503050406030204" pitchFamily="18" charset="0"/>
-                      </a:rPr>
-                      <m:t>]</m:t>
-                    </m:r>
-                  </m:oMath>
-                </a14:m>
-                <a:endParaRPr lang="en-US" dirty="0"/>
-              </a:p>
-            </p:txBody>
-          </p:sp>
-        </mc:Choice>
-        <mc:Fallback>
-          <p:sp>
-            <p:nvSpPr>
-              <p:cNvPr id="11" name="TextBox 10">
-                <a:extLst>
-                  <a:ext uri="{FF2B5EF4-FFF2-40B4-BE49-F238E27FC236}">
-                    <a16:creationId xmlns:a16="http://schemas.microsoft.com/office/drawing/2014/main" id="{6BFDC600-21A1-C684-085F-85BF212CED4B}"/>
-                  </a:ext>
-                </a:extLst>
-              </p:cNvPr>
-              <p:cNvSpPr txBox="1">
-                <a:spLocks noRot="1" noChangeAspect="1" noMove="1" noResize="1" noEditPoints="1" noAdjustHandles="1" noChangeArrowheads="1" noChangeShapeType="1" noTextEdit="1"/>
-              </p:cNvSpPr>
-              <p:nvPr/>
-            </p:nvSpPr>
-            <p:spPr>
-              <a:xfrm rot="16200000">
-                <a:off x="822240" y="4305458"/>
-                <a:ext cx="1429693" cy="646331"/>
-              </a:xfrm>
-              <a:prstGeom prst="rect">
-                <a:avLst/>
-              </a:prstGeom>
-              <a:blipFill>
-                <a:blip r:embed="rId3"/>
-                <a:stretch>
-                  <a:fillRect l="-4717" t="-6383" r="-8491" b="-3404"/>
-                </a:stretch>
-              </a:blipFill>
-            </p:spPr>
-            <p:txBody>
-              <a:bodyPr/>
-              <a:lstStyle/>
-              <a:p>
-                <a:r>
-                  <a:rPr lang="en-US">
-                    <a:noFill/>
-                  </a:rPr>
-                  <a:t> </a:t>
-                </a:r>
-              </a:p>
-            </p:txBody>
-          </p:sp>
-        </mc:Fallback>
-      </mc:AlternateContent>
-      <mc:AlternateContent xmlns:mc="http://schemas.openxmlformats.org/markup-compatibility/2006">
-        <mc:Choice xmlns:a14="http://schemas.microsoft.com/office/drawing/2010/main" Requires="a14">
-          <p:sp>
-            <p:nvSpPr>
-              <p:cNvPr id="12" name="TextBox 11">
-                <a:extLst>
-                  <a:ext uri="{FF2B5EF4-FFF2-40B4-BE49-F238E27FC236}">
-                    <a16:creationId xmlns:a16="http://schemas.microsoft.com/office/drawing/2014/main" id="{6B7EF5DC-D258-F417-9EA9-03DC92FB6BA1}"/>
-                  </a:ext>
-                </a:extLst>
-              </p:cNvPr>
-              <p:cNvSpPr txBox="1"/>
-              <p:nvPr/>
-            </p:nvSpPr>
-            <p:spPr>
-              <a:xfrm rot="16200000">
-                <a:off x="641445" y="1906210"/>
-                <a:ext cx="1791282" cy="646331"/>
-              </a:xfrm>
-              <a:prstGeom prst="rect">
-                <a:avLst/>
-              </a:prstGeom>
-              <a:noFill/>
-            </p:spPr>
-            <p:txBody>
-              <a:bodyPr wrap="square" rtlCol="0">
-                <a:spAutoFit/>
-              </a:bodyPr>
-              <a:lstStyle/>
-              <a:p>
-                <a:pPr algn="ctr"/>
-                <a:r>
-                  <a:rPr lang="en-US" dirty="0"/>
-                  <a:t>Yaw rate </a:t>
-                </a:r>
-                <a14:m>
-                  <m:oMath xmlns:m="http://schemas.openxmlformats.org/officeDocument/2006/math">
-                    <m:r>
-                      <a:rPr lang="en-US" b="0" i="1" smtClean="0">
-                        <a:latin typeface="Cambria Math" panose="02040503050406030204" pitchFamily="18" charset="0"/>
-                      </a:rPr>
-                      <m:t>[</m:t>
-                    </m:r>
-                    <m:r>
-                      <a:rPr lang="en-US" b="0" i="1" smtClean="0">
-                        <a:latin typeface="Cambria Math" panose="02040503050406030204" pitchFamily="18" charset="0"/>
-                      </a:rPr>
-                      <m:t>𝑑𝑒𝑔</m:t>
-                    </m:r>
-                    <m:r>
-                      <m:rPr>
-                        <m:lit/>
-                      </m:rPr>
-                      <a:rPr lang="en-US" b="0" i="1" smtClean="0">
-                        <a:latin typeface="Cambria Math" panose="02040503050406030204" pitchFamily="18" charset="0"/>
-                      </a:rPr>
-                      <m:t>/</m:t>
-                    </m:r>
-                    <m:r>
-                      <a:rPr lang="en-US" b="0" i="1" smtClean="0">
-                        <a:latin typeface="Cambria Math" panose="02040503050406030204" pitchFamily="18" charset="0"/>
-                      </a:rPr>
-                      <m:t>𝑠𝑒𝑐</m:t>
-                    </m:r>
-                    <m:r>
-                      <a:rPr lang="en-US" b="0" i="1" smtClean="0">
-                        <a:latin typeface="Cambria Math" panose="02040503050406030204" pitchFamily="18" charset="0"/>
-                      </a:rPr>
-                      <m:t>]</m:t>
-                    </m:r>
-                  </m:oMath>
-                </a14:m>
-                <a:endParaRPr lang="en-US" dirty="0"/>
-              </a:p>
-            </p:txBody>
-          </p:sp>
-        </mc:Choice>
-        <mc:Fallback>
-          <p:sp>
-            <p:nvSpPr>
-              <p:cNvPr id="12" name="TextBox 11">
-                <a:extLst>
-                  <a:ext uri="{FF2B5EF4-FFF2-40B4-BE49-F238E27FC236}">
-                    <a16:creationId xmlns:a16="http://schemas.microsoft.com/office/drawing/2014/main" id="{6B7EF5DC-D258-F417-9EA9-03DC92FB6BA1}"/>
-                  </a:ext>
-                </a:extLst>
-              </p:cNvPr>
-              <p:cNvSpPr txBox="1">
-                <a:spLocks noRot="1" noChangeAspect="1" noMove="1" noResize="1" noEditPoints="1" noAdjustHandles="1" noChangeArrowheads="1" noChangeShapeType="1" noTextEdit="1"/>
-              </p:cNvSpPr>
-              <p:nvPr/>
-            </p:nvSpPr>
-            <p:spPr>
-              <a:xfrm rot="16200000">
-                <a:off x="641445" y="1906210"/>
-                <a:ext cx="1791282" cy="646331"/>
-              </a:xfrm>
-              <a:prstGeom prst="rect">
-                <a:avLst/>
-              </a:prstGeom>
-              <a:blipFill>
-                <a:blip r:embed="rId4"/>
-                <a:stretch>
-                  <a:fillRect l="-4717" r="-8491"/>
-                </a:stretch>
-              </a:blipFill>
-            </p:spPr>
-            <p:txBody>
-              <a:bodyPr/>
-              <a:lstStyle/>
-              <a:p>
-                <a:r>
-                  <a:rPr lang="en-US">
-                    <a:noFill/>
-                  </a:rPr>
-                  <a:t> </a:t>
-                </a:r>
-              </a:p>
-            </p:txBody>
-          </p:sp>
-        </mc:Fallback>
-      </mc:AlternateContent>
-      <p:pic>
-        <p:nvPicPr>
-          <p:cNvPr id="13" name="Picture 12">
-            <a:extLst>
-              <a:ext uri="{FF2B5EF4-FFF2-40B4-BE49-F238E27FC236}">
-                <a16:creationId xmlns:a16="http://schemas.microsoft.com/office/drawing/2014/main" id="{0BFC5C4C-CFB4-69E3-2E6C-15A416858B43}"/>
-              </a:ext>
-            </a:extLst>
-          </p:cNvPr>
-          <p:cNvPicPr>
-            <a:picLocks noChangeAspect="1"/>
-          </p:cNvPicPr>
-          <p:nvPr/>
-        </p:nvPicPr>
-        <p:blipFill>
-          <a:blip r:embed="rId5"/>
-          <a:stretch>
-            <a:fillRect/>
-          </a:stretch>
-        </p:blipFill>
-        <p:spPr>
-          <a:xfrm>
-            <a:off x="2047463" y="1033640"/>
-            <a:ext cx="7722702" cy="2395360"/>
-          </a:xfrm>
-          <a:prstGeom prst="rect">
-            <a:avLst/>
-          </a:prstGeom>
-        </p:spPr>
-      </p:pic>
-      <p:pic>
-        <p:nvPicPr>
-          <p:cNvPr id="15" name="Picture 14">
-            <a:extLst>
-              <a:ext uri="{FF2B5EF4-FFF2-40B4-BE49-F238E27FC236}">
-                <a16:creationId xmlns:a16="http://schemas.microsoft.com/office/drawing/2014/main" id="{C2C3716D-026C-4A02-5BE0-94278488EA6B}"/>
-              </a:ext>
-            </a:extLst>
-          </p:cNvPr>
-          <p:cNvPicPr>
-            <a:picLocks noChangeAspect="1"/>
-          </p:cNvPicPr>
-          <p:nvPr/>
-        </p:nvPicPr>
-        <p:blipFill>
-          <a:blip r:embed="rId6"/>
-          <a:stretch>
-            <a:fillRect/>
-          </a:stretch>
-        </p:blipFill>
-        <p:spPr>
-          <a:xfrm>
-            <a:off x="2047463" y="3429000"/>
-            <a:ext cx="7722702" cy="2395360"/>
-          </a:xfrm>
-          <a:prstGeom prst="rect">
-            <a:avLst/>
-          </a:prstGeom>
-        </p:spPr>
-      </p:pic>
+        </p:grpSpPr>
+        <p:sp>
+          <p:nvSpPr>
+            <p:cNvPr id="9" name="TextBox 8">
+              <a:extLst>
+                <a:ext uri="{FF2B5EF4-FFF2-40B4-BE49-F238E27FC236}">
+                  <a16:creationId xmlns:a16="http://schemas.microsoft.com/office/drawing/2014/main" id="{6970E818-857B-A047-F6FA-72EBDDCC6317}"/>
+                </a:ext>
+              </a:extLst>
+            </p:cNvPr>
+            <p:cNvSpPr txBox="1"/>
+            <p:nvPr/>
+          </p:nvSpPr>
+          <p:spPr>
+            <a:xfrm>
+              <a:off x="2703609" y="599618"/>
+              <a:ext cx="6784782" cy="369332"/>
+            </a:xfrm>
+            <a:prstGeom prst="rect">
+              <a:avLst/>
+            </a:prstGeom>
+            <a:noFill/>
+          </p:spPr>
+          <p:txBody>
+            <a:bodyPr wrap="square" rtlCol="0">
+              <a:spAutoFit/>
+            </a:bodyPr>
+            <a:lstStyle/>
+            <a:p>
+              <a:pPr algn="ctr"/>
+              <a:r>
+                <a:rPr lang="en-US" dirty="0"/>
+                <a:t>Time response</a:t>
+              </a:r>
+              <a:r>
+                <a:rPr lang="el-GR" dirty="0"/>
+                <a:t> </a:t>
+              </a:r>
+              <a:r>
+                <a:rPr lang="en-US" dirty="0"/>
+                <a:t>of Dutch roll dumper system.</a:t>
+              </a:r>
+            </a:p>
+          </p:txBody>
+        </p:sp>
+        <mc:AlternateContent xmlns:mc="http://schemas.openxmlformats.org/markup-compatibility/2006">
+          <mc:Choice xmlns:a14="http://schemas.microsoft.com/office/drawing/2010/main" Requires="a14">
+            <p:sp>
+              <p:nvSpPr>
+                <p:cNvPr id="10" name="TextBox 9">
+                  <a:extLst>
+                    <a:ext uri="{FF2B5EF4-FFF2-40B4-BE49-F238E27FC236}">
+                      <a16:creationId xmlns:a16="http://schemas.microsoft.com/office/drawing/2014/main" id="{1D354E80-21D4-C054-7E94-6C5E4EC44B14}"/>
+                    </a:ext>
+                  </a:extLst>
+                </p:cNvPr>
+                <p:cNvSpPr txBox="1"/>
+                <p:nvPr/>
+              </p:nvSpPr>
+              <p:spPr>
+                <a:xfrm>
+                  <a:off x="2703609" y="5828249"/>
+                  <a:ext cx="6784782" cy="369332"/>
+                </a:xfrm>
+                <a:prstGeom prst="rect">
+                  <a:avLst/>
+                </a:prstGeom>
+                <a:noFill/>
+              </p:spPr>
+              <p:txBody>
+                <a:bodyPr wrap="square" rtlCol="0">
+                  <a:spAutoFit/>
+                </a:bodyPr>
+                <a:lstStyle/>
+                <a:p>
+                  <a:pPr algn="ctr"/>
+                  <a:r>
+                    <a:rPr lang="en-US" dirty="0"/>
+                    <a:t>Time </a:t>
+                  </a:r>
+                  <a14:m>
+                    <m:oMath xmlns:m="http://schemas.openxmlformats.org/officeDocument/2006/math">
+                      <m:r>
+                        <a:rPr lang="en-US" b="0" i="1" smtClean="0">
+                          <a:latin typeface="Cambria Math" panose="02040503050406030204" pitchFamily="18" charset="0"/>
+                        </a:rPr>
+                        <m:t>[</m:t>
+                      </m:r>
+                      <m:r>
+                        <a:rPr lang="en-US" b="0" i="1" smtClean="0">
+                          <a:latin typeface="Cambria Math" panose="02040503050406030204" pitchFamily="18" charset="0"/>
+                        </a:rPr>
+                        <m:t>𝑠𝑒𝑐</m:t>
+                      </m:r>
+                      <m:r>
+                        <a:rPr lang="en-US" b="0" i="1" smtClean="0">
+                          <a:latin typeface="Cambria Math" panose="02040503050406030204" pitchFamily="18" charset="0"/>
+                        </a:rPr>
+                        <m:t>]</m:t>
+                      </m:r>
+                    </m:oMath>
+                  </a14:m>
+                  <a:endParaRPr lang="en-US" dirty="0"/>
+                </a:p>
+              </p:txBody>
+            </p:sp>
+          </mc:Choice>
+          <mc:Fallback>
+            <p:sp>
+              <p:nvSpPr>
+                <p:cNvPr id="10" name="TextBox 9">
+                  <a:extLst>
+                    <a:ext uri="{FF2B5EF4-FFF2-40B4-BE49-F238E27FC236}">
+                      <a16:creationId xmlns:a16="http://schemas.microsoft.com/office/drawing/2014/main" id="{1D354E80-21D4-C054-7E94-6C5E4EC44B14}"/>
+                    </a:ext>
+                  </a:extLst>
+                </p:cNvPr>
+                <p:cNvSpPr txBox="1">
+                  <a:spLocks noRot="1" noChangeAspect="1" noMove="1" noResize="1" noEditPoints="1" noAdjustHandles="1" noChangeArrowheads="1" noChangeShapeType="1" noTextEdit="1"/>
+                </p:cNvSpPr>
+                <p:nvPr/>
+              </p:nvSpPr>
+              <p:spPr>
+                <a:xfrm>
+                  <a:off x="2703609" y="5828249"/>
+                  <a:ext cx="6784782" cy="369332"/>
+                </a:xfrm>
+                <a:prstGeom prst="rect">
+                  <a:avLst/>
+                </a:prstGeom>
+                <a:blipFill>
+                  <a:blip r:embed="rId2"/>
+                  <a:stretch>
+                    <a:fillRect t="-8197" b="-24590"/>
+                  </a:stretch>
+                </a:blipFill>
+              </p:spPr>
+              <p:txBody>
+                <a:bodyPr/>
+                <a:lstStyle/>
+                <a:p>
+                  <a:r>
+                    <a:rPr lang="en-US">
+                      <a:noFill/>
+                    </a:rPr>
+                    <a:t> </a:t>
+                  </a:r>
+                </a:p>
+              </p:txBody>
+            </p:sp>
+          </mc:Fallback>
+        </mc:AlternateContent>
+        <mc:AlternateContent xmlns:mc="http://schemas.openxmlformats.org/markup-compatibility/2006">
+          <mc:Choice xmlns:a14="http://schemas.microsoft.com/office/drawing/2010/main" Requires="a14">
+            <p:sp>
+              <p:nvSpPr>
+                <p:cNvPr id="11" name="TextBox 10">
+                  <a:extLst>
+                    <a:ext uri="{FF2B5EF4-FFF2-40B4-BE49-F238E27FC236}">
+                      <a16:creationId xmlns:a16="http://schemas.microsoft.com/office/drawing/2014/main" id="{6BFDC600-21A1-C684-085F-85BF212CED4B}"/>
+                    </a:ext>
+                  </a:extLst>
+                </p:cNvPr>
+                <p:cNvSpPr txBox="1"/>
+                <p:nvPr/>
+              </p:nvSpPr>
+              <p:spPr>
+                <a:xfrm rot="16200000">
+                  <a:off x="822240" y="4305458"/>
+                  <a:ext cx="1429693" cy="646331"/>
+                </a:xfrm>
+                <a:prstGeom prst="rect">
+                  <a:avLst/>
+                </a:prstGeom>
+                <a:noFill/>
+              </p:spPr>
+              <p:txBody>
+                <a:bodyPr wrap="square" rtlCol="0">
+                  <a:spAutoFit/>
+                </a:bodyPr>
+                <a:lstStyle/>
+                <a:p>
+                  <a:pPr algn="ctr"/>
+                  <a:r>
+                    <a:rPr lang="en-US" dirty="0"/>
+                    <a:t>Rudder angle </a:t>
+                  </a:r>
+                  <a14:m>
+                    <m:oMath xmlns:m="http://schemas.openxmlformats.org/officeDocument/2006/math">
+                      <m:r>
+                        <a:rPr lang="en-US" b="0" i="1" smtClean="0">
+                          <a:latin typeface="Cambria Math" panose="02040503050406030204" pitchFamily="18" charset="0"/>
+                        </a:rPr>
+                        <m:t>[</m:t>
+                      </m:r>
+                      <m:r>
+                        <a:rPr lang="en-US" b="0" i="1" smtClean="0">
+                          <a:latin typeface="Cambria Math" panose="02040503050406030204" pitchFamily="18" charset="0"/>
+                        </a:rPr>
+                        <m:t>𝑑𝑒𝑔</m:t>
+                      </m:r>
+                      <m:r>
+                        <a:rPr lang="en-US" b="0" i="1" smtClean="0">
+                          <a:latin typeface="Cambria Math" panose="02040503050406030204" pitchFamily="18" charset="0"/>
+                        </a:rPr>
+                        <m:t>]</m:t>
+                      </m:r>
+                    </m:oMath>
+                  </a14:m>
+                  <a:endParaRPr lang="en-US" dirty="0"/>
+                </a:p>
+              </p:txBody>
+            </p:sp>
+          </mc:Choice>
+          <mc:Fallback>
+            <p:sp>
+              <p:nvSpPr>
+                <p:cNvPr id="11" name="TextBox 10">
+                  <a:extLst>
+                    <a:ext uri="{FF2B5EF4-FFF2-40B4-BE49-F238E27FC236}">
+                      <a16:creationId xmlns:a16="http://schemas.microsoft.com/office/drawing/2014/main" id="{6BFDC600-21A1-C684-085F-85BF212CED4B}"/>
+                    </a:ext>
+                  </a:extLst>
+                </p:cNvPr>
+                <p:cNvSpPr txBox="1">
+                  <a:spLocks noRot="1" noChangeAspect="1" noMove="1" noResize="1" noEditPoints="1" noAdjustHandles="1" noChangeArrowheads="1" noChangeShapeType="1" noTextEdit="1"/>
+                </p:cNvSpPr>
+                <p:nvPr/>
+              </p:nvSpPr>
+              <p:spPr>
+                <a:xfrm rot="16200000">
+                  <a:off x="822240" y="4305458"/>
+                  <a:ext cx="1429693" cy="646331"/>
+                </a:xfrm>
+                <a:prstGeom prst="rect">
+                  <a:avLst/>
+                </a:prstGeom>
+                <a:blipFill>
+                  <a:blip r:embed="rId3"/>
+                  <a:stretch>
+                    <a:fillRect l="-4717" t="-6383" r="-8491" b="-3404"/>
+                  </a:stretch>
+                </a:blipFill>
+              </p:spPr>
+              <p:txBody>
+                <a:bodyPr/>
+                <a:lstStyle/>
+                <a:p>
+                  <a:r>
+                    <a:rPr lang="en-US">
+                      <a:noFill/>
+                    </a:rPr>
+                    <a:t> </a:t>
+                  </a:r>
+                </a:p>
+              </p:txBody>
+            </p:sp>
+          </mc:Fallback>
+        </mc:AlternateContent>
+        <mc:AlternateContent xmlns:mc="http://schemas.openxmlformats.org/markup-compatibility/2006">
+          <mc:Choice xmlns:a14="http://schemas.microsoft.com/office/drawing/2010/main" Requires="a14">
+            <p:sp>
+              <p:nvSpPr>
+                <p:cNvPr id="12" name="TextBox 11">
+                  <a:extLst>
+                    <a:ext uri="{FF2B5EF4-FFF2-40B4-BE49-F238E27FC236}">
+                      <a16:creationId xmlns:a16="http://schemas.microsoft.com/office/drawing/2014/main" id="{6B7EF5DC-D258-F417-9EA9-03DC92FB6BA1}"/>
+                    </a:ext>
+                  </a:extLst>
+                </p:cNvPr>
+                <p:cNvSpPr txBox="1"/>
+                <p:nvPr/>
+              </p:nvSpPr>
+              <p:spPr>
+                <a:xfrm rot="16200000">
+                  <a:off x="641445" y="1906210"/>
+                  <a:ext cx="1791282" cy="646331"/>
+                </a:xfrm>
+                <a:prstGeom prst="rect">
+                  <a:avLst/>
+                </a:prstGeom>
+                <a:noFill/>
+              </p:spPr>
+              <p:txBody>
+                <a:bodyPr wrap="square" rtlCol="0">
+                  <a:spAutoFit/>
+                </a:bodyPr>
+                <a:lstStyle/>
+                <a:p>
+                  <a:pPr algn="ctr"/>
+                  <a:r>
+                    <a:rPr lang="en-US" dirty="0"/>
+                    <a:t>Yaw rate </a:t>
+                  </a:r>
+                  <a14:m>
+                    <m:oMath xmlns:m="http://schemas.openxmlformats.org/officeDocument/2006/math">
+                      <m:r>
+                        <a:rPr lang="en-US" b="0" i="1" smtClean="0">
+                          <a:latin typeface="Cambria Math" panose="02040503050406030204" pitchFamily="18" charset="0"/>
+                        </a:rPr>
+                        <m:t>[</m:t>
+                      </m:r>
+                      <m:r>
+                        <a:rPr lang="en-US" b="0" i="1" smtClean="0">
+                          <a:latin typeface="Cambria Math" panose="02040503050406030204" pitchFamily="18" charset="0"/>
+                        </a:rPr>
+                        <m:t>𝑑𝑒𝑔</m:t>
+                      </m:r>
+                      <m:r>
+                        <m:rPr>
+                          <m:lit/>
+                        </m:rPr>
+                        <a:rPr lang="en-US" b="0" i="1" smtClean="0">
+                          <a:latin typeface="Cambria Math" panose="02040503050406030204" pitchFamily="18" charset="0"/>
+                        </a:rPr>
+                        <m:t>/</m:t>
+                      </m:r>
+                      <m:r>
+                        <a:rPr lang="en-US" b="0" i="1" smtClean="0">
+                          <a:latin typeface="Cambria Math" panose="02040503050406030204" pitchFamily="18" charset="0"/>
+                        </a:rPr>
+                        <m:t>𝑠𝑒𝑐</m:t>
+                      </m:r>
+                      <m:r>
+                        <a:rPr lang="en-US" b="0" i="1" smtClean="0">
+                          <a:latin typeface="Cambria Math" panose="02040503050406030204" pitchFamily="18" charset="0"/>
+                        </a:rPr>
+                        <m:t>]</m:t>
+                      </m:r>
+                    </m:oMath>
+                  </a14:m>
+                  <a:endParaRPr lang="en-US" dirty="0"/>
+                </a:p>
+              </p:txBody>
+            </p:sp>
+          </mc:Choice>
+          <mc:Fallback>
+            <p:sp>
+              <p:nvSpPr>
+                <p:cNvPr id="12" name="TextBox 11">
+                  <a:extLst>
+                    <a:ext uri="{FF2B5EF4-FFF2-40B4-BE49-F238E27FC236}">
+                      <a16:creationId xmlns:a16="http://schemas.microsoft.com/office/drawing/2014/main" id="{6B7EF5DC-D258-F417-9EA9-03DC92FB6BA1}"/>
+                    </a:ext>
+                  </a:extLst>
+                </p:cNvPr>
+                <p:cNvSpPr txBox="1">
+                  <a:spLocks noRot="1" noChangeAspect="1" noMove="1" noResize="1" noEditPoints="1" noAdjustHandles="1" noChangeArrowheads="1" noChangeShapeType="1" noTextEdit="1"/>
+                </p:cNvSpPr>
+                <p:nvPr/>
+              </p:nvSpPr>
+              <p:spPr>
+                <a:xfrm rot="16200000">
+                  <a:off x="641445" y="1906210"/>
+                  <a:ext cx="1791282" cy="646331"/>
+                </a:xfrm>
+                <a:prstGeom prst="rect">
+                  <a:avLst/>
+                </a:prstGeom>
+                <a:blipFill>
+                  <a:blip r:embed="rId4"/>
+                  <a:stretch>
+                    <a:fillRect l="-4717" r="-8491"/>
+                  </a:stretch>
+                </a:blipFill>
+              </p:spPr>
+              <p:txBody>
+                <a:bodyPr/>
+                <a:lstStyle/>
+                <a:p>
+                  <a:r>
+                    <a:rPr lang="en-US">
+                      <a:noFill/>
+                    </a:rPr>
+                    <a:t> </a:t>
+                  </a:r>
+                </a:p>
+              </p:txBody>
+            </p:sp>
+          </mc:Fallback>
+        </mc:AlternateContent>
+        <p:pic>
+          <p:nvPicPr>
+            <p:cNvPr id="13" name="Picture 12">
+              <a:extLst>
+                <a:ext uri="{FF2B5EF4-FFF2-40B4-BE49-F238E27FC236}">
+                  <a16:creationId xmlns:a16="http://schemas.microsoft.com/office/drawing/2014/main" id="{0BFC5C4C-CFB4-69E3-2E6C-15A416858B43}"/>
+                </a:ext>
+              </a:extLst>
+            </p:cNvPr>
+            <p:cNvPicPr>
+              <a:picLocks noChangeAspect="1"/>
+            </p:cNvPicPr>
+            <p:nvPr/>
+          </p:nvPicPr>
+          <p:blipFill>
+            <a:blip r:embed="rId5"/>
+            <a:stretch>
+              <a:fillRect/>
+            </a:stretch>
+          </p:blipFill>
+          <p:spPr>
+            <a:xfrm>
+              <a:off x="2047463" y="1033640"/>
+              <a:ext cx="7722702" cy="2395360"/>
+            </a:xfrm>
+            <a:prstGeom prst="rect">
+              <a:avLst/>
+            </a:prstGeom>
+          </p:spPr>
+        </p:pic>
+        <p:pic>
+          <p:nvPicPr>
+            <p:cNvPr id="15" name="Picture 14">
+              <a:extLst>
+                <a:ext uri="{FF2B5EF4-FFF2-40B4-BE49-F238E27FC236}">
+                  <a16:creationId xmlns:a16="http://schemas.microsoft.com/office/drawing/2014/main" id="{C2C3716D-026C-4A02-5BE0-94278488EA6B}"/>
+                </a:ext>
+              </a:extLst>
+            </p:cNvPr>
+            <p:cNvPicPr>
+              <a:picLocks noChangeAspect="1"/>
+            </p:cNvPicPr>
+            <p:nvPr/>
+          </p:nvPicPr>
+          <p:blipFill>
+            <a:blip r:embed="rId6"/>
+            <a:stretch>
+              <a:fillRect/>
+            </a:stretch>
+          </p:blipFill>
+          <p:spPr>
+            <a:xfrm>
+              <a:off x="2047463" y="3429000"/>
+              <a:ext cx="7722702" cy="2395360"/>
+            </a:xfrm>
+            <a:prstGeom prst="rect">
+              <a:avLst/>
+            </a:prstGeom>
+          </p:spPr>
+        </p:pic>
+      </p:grpSp>
     </p:spTree>
     <p:extLst>
       <p:ext uri="{BB962C8B-B14F-4D97-AF65-F5344CB8AC3E}">
@@ -29455,6 +29477,145 @@
     <p:extLst>
       <p:ext uri="{BB962C8B-B14F-4D97-AF65-F5344CB8AC3E}">
         <p14:creationId xmlns:p14="http://schemas.microsoft.com/office/powerpoint/2010/main" val="295395356"/>
+      </p:ext>
+    </p:extLst>
+  </p:cSld>
+  <p:clrMapOvr>
+    <a:masterClrMapping/>
+  </p:clrMapOvr>
+</p:sld>
+</file>
+
+<file path=ppt/slides/slide31.xml><?xml version="1.0" encoding="utf-8"?>
+<p:sld xmlns:a="http://schemas.openxmlformats.org/drawingml/2006/main" xmlns:r="http://schemas.openxmlformats.org/officeDocument/2006/relationships" xmlns:p="http://schemas.openxmlformats.org/presentationml/2006/main">
+  <p:cSld>
+    <p:spTree>
+      <p:nvGrpSpPr>
+        <p:cNvPr id="1" name=""/>
+        <p:cNvGrpSpPr/>
+        <p:nvPr/>
+      </p:nvGrpSpPr>
+      <p:grpSpPr>
+        <a:xfrm>
+          <a:off x="0" y="0"/>
+          <a:ext cx="0" cy="0"/>
+          <a:chOff x="0" y="0"/>
+          <a:chExt cx="0" cy="0"/>
+        </a:xfrm>
+      </p:grpSpPr>
+      <p:pic>
+        <p:nvPicPr>
+          <p:cNvPr id="13" name="Picture 12">
+            <a:extLst>
+              <a:ext uri="{FF2B5EF4-FFF2-40B4-BE49-F238E27FC236}">
+                <a16:creationId xmlns:a16="http://schemas.microsoft.com/office/drawing/2014/main" id="{A063D0C2-457B-0784-FAF8-733286F3E087}"/>
+              </a:ext>
+            </a:extLst>
+          </p:cNvPr>
+          <p:cNvPicPr>
+            <a:picLocks noChangeAspect="1"/>
+          </p:cNvPicPr>
+          <p:nvPr/>
+        </p:nvPicPr>
+        <p:blipFill>
+          <a:blip r:embed="rId2"/>
+          <a:stretch>
+            <a:fillRect/>
+          </a:stretch>
+        </p:blipFill>
+        <p:spPr>
+          <a:xfrm>
+            <a:off x="542925" y="2411693"/>
+            <a:ext cx="8362950" cy="3459021"/>
+          </a:xfrm>
+          <a:prstGeom prst="rect">
+            <a:avLst/>
+          </a:prstGeom>
+        </p:spPr>
+      </p:pic>
+      <p:pic>
+        <p:nvPicPr>
+          <p:cNvPr id="5" name="Picture 4">
+            <a:extLst>
+              <a:ext uri="{FF2B5EF4-FFF2-40B4-BE49-F238E27FC236}">
+                <a16:creationId xmlns:a16="http://schemas.microsoft.com/office/drawing/2014/main" id="{47C10062-3789-A9F1-80F9-B388BE2AE661}"/>
+              </a:ext>
+            </a:extLst>
+          </p:cNvPr>
+          <p:cNvPicPr>
+            <a:picLocks noChangeAspect="1"/>
+          </p:cNvPicPr>
+          <p:nvPr/>
+        </p:nvPicPr>
+        <p:blipFill>
+          <a:blip r:embed="rId3"/>
+          <a:stretch>
+            <a:fillRect/>
+          </a:stretch>
+        </p:blipFill>
+        <p:spPr>
+          <a:xfrm>
+            <a:off x="1766887" y="2012155"/>
+            <a:ext cx="2415751" cy="1338263"/>
+          </a:xfrm>
+          <a:prstGeom prst="rect">
+            <a:avLst/>
+          </a:prstGeom>
+          <a:ln w="28575">
+            <a:solidFill>
+              <a:schemeClr val="tx1"/>
+            </a:solidFill>
+          </a:ln>
+        </p:spPr>
+      </p:pic>
+      <p:cxnSp>
+        <p:nvCxnSpPr>
+          <p:cNvPr id="7" name="Straight Arrow Connector 6">
+            <a:extLst>
+              <a:ext uri="{FF2B5EF4-FFF2-40B4-BE49-F238E27FC236}">
+                <a16:creationId xmlns:a16="http://schemas.microsoft.com/office/drawing/2014/main" id="{DFB1B0A0-149C-61DD-AF98-D2848A9DE9BD}"/>
+              </a:ext>
+            </a:extLst>
+          </p:cNvPr>
+          <p:cNvCxnSpPr>
+            <a:cxnSpLocks/>
+          </p:cNvCxnSpPr>
+          <p:nvPr/>
+        </p:nvCxnSpPr>
+        <p:spPr>
+          <a:xfrm flipH="1" flipV="1">
+            <a:off x="4276725" y="2681286"/>
+            <a:ext cx="1295400" cy="471489"/>
+          </a:xfrm>
+          <a:prstGeom prst="straightConnector1">
+            <a:avLst/>
+          </a:prstGeom>
+          <a:ln w="28575">
+            <a:solidFill>
+              <a:schemeClr val="tx1"/>
+            </a:solidFill>
+            <a:tailEnd type="triangle"/>
+          </a:ln>
+        </p:spPr>
+        <p:style>
+          <a:lnRef idx="1">
+            <a:schemeClr val="accent1"/>
+          </a:lnRef>
+          <a:fillRef idx="0">
+            <a:schemeClr val="accent1"/>
+          </a:fillRef>
+          <a:effectRef idx="0">
+            <a:schemeClr val="accent1"/>
+          </a:effectRef>
+          <a:fontRef idx="minor">
+            <a:schemeClr val="tx1"/>
+          </a:fontRef>
+        </p:style>
+      </p:cxnSp>
+    </p:spTree>
+    <p:extLst>
+      <p:ext uri="{BB962C8B-B14F-4D97-AF65-F5344CB8AC3E}">
+        <p14:creationId xmlns:p14="http://schemas.microsoft.com/office/powerpoint/2010/main" val="3601731221"/>
       </p:ext>
     </p:extLst>
   </p:cSld>

</xml_diff>